<commit_message>
further additions to the report
</commit_message>
<xml_diff>
--- a/relazione/ML-2023-PRJ-Slides-Demo.pptx
+++ b/relazione/ML-2023-PRJ-Slides-Demo.pptx
@@ -6,7 +6,7 @@
     <p:sldMasterId id="2147483661" r:id="rId2"/>
   </p:sldMasterIdLst>
   <p:notesMasterIdLst>
-    <p:notesMasterId r:id="rId19"/>
+    <p:notesMasterId r:id="rId20"/>
   </p:notesMasterIdLst>
   <p:sldIdLst>
     <p:sldId id="256" r:id="rId3"/>
@@ -21,10 +21,11 @@
     <p:sldId id="262" r:id="rId12"/>
     <p:sldId id="263" r:id="rId13"/>
     <p:sldId id="264" r:id="rId14"/>
-    <p:sldId id="265" r:id="rId15"/>
-    <p:sldId id="266" r:id="rId16"/>
-    <p:sldId id="267" r:id="rId17"/>
-    <p:sldId id="268" r:id="rId18"/>
+    <p:sldId id="272" r:id="rId15"/>
+    <p:sldId id="265" r:id="rId16"/>
+    <p:sldId id="266" r:id="rId17"/>
+    <p:sldId id="267" r:id="rId18"/>
+    <p:sldId id="268" r:id="rId19"/>
   </p:sldIdLst>
   <p:sldSz cx="9144000" cy="5143500" type="screen16x9"/>
   <p:notesSz cx="6858000" cy="9144000"/>
@@ -123,6 +124,11 @@
       </a:defRPr>
     </a:lvl9pPr>
   </p:defaultTextStyle>
+  <p:extLst>
+    <p:ext uri="{EFAFB233-063F-42B5-8137-9DF3F51BA10A}">
+      <p15:sldGuideLst xmlns:p15="http://schemas.microsoft.com/office/powerpoint/2012/main"/>
+    </p:ext>
+  </p:extLst>
 </p:presentation>
 </file>
 
@@ -208,7 +214,7 @@
           <a:p>
             <a:fld id="{6A71CC8E-465E-46C0-91CA-2080D1264305}" type="datetimeFigureOut">
               <a:rPr lang="it-IT" smtClean="0"/>
-              <a:t>16/01/2024</a:t>
+              <a:t>17/01/2024</a:t>
             </a:fld>
             <a:endParaRPr lang="it-IT"/>
           </a:p>
@@ -5869,7 +5875,27 @@
                 <a:latin typeface="Arial"/>
                 <a:ea typeface="Arial"/>
               </a:rPr>
-              <a:t>Date xx/yy/xyzz</a:t>
+              <a:t>Date </a:t>
+            </a:r>
+            <a:r>
+              <a:rPr lang="it" sz="1520" spc="-1" dirty="0">
+                <a:solidFill>
+                  <a:srgbClr val="000000"/>
+                </a:solidFill>
+                <a:latin typeface="Arial"/>
+                <a:ea typeface="Arial"/>
+              </a:rPr>
+              <a:t>01</a:t>
+            </a:r>
+            <a:r>
+              <a:rPr lang="it" sz="1520" b="0" strike="noStrike" spc="-1" dirty="0">
+                <a:solidFill>
+                  <a:srgbClr val="000000"/>
+                </a:solidFill>
+                <a:latin typeface="Arial"/>
+                <a:ea typeface="Arial"/>
+              </a:rPr>
+              <a:t>/02/2023</a:t>
             </a:r>
             <a:endParaRPr lang="it-IT" sz="1520" b="0" strike="noStrike" spc="-1" dirty="0">
               <a:latin typeface="Arial"/>
@@ -6048,11 +6074,20 @@
                 </a:solidFill>
                 <a:latin typeface="Arial"/>
               </a:rPr>
-              <a:t> schema: data splitting</a:t>
+              <a:t> schema: data splitting </a:t>
+            </a:r>
+            <a:r>
+              <a:rPr lang="it-IT" sz="2600" b="0" strike="noStrike" spc="-1" dirty="0">
+                <a:solidFill>
+                  <a:srgbClr val="FF0000"/>
+                </a:solidFill>
+                <a:latin typeface="Arial"/>
+              </a:rPr>
+              <a:t>Aggiungere?</a:t>
             </a:r>
             <a:endParaRPr lang="it-IT" sz="2400" b="0" strike="noStrike" spc="-1" dirty="0">
               <a:solidFill>
-                <a:srgbClr val="000000"/>
+                <a:srgbClr val="FF0000"/>
               </a:solidFill>
               <a:latin typeface="Arial"/>
             </a:endParaRPr>
@@ -6098,181 +6133,450 @@
               </a:tabLst>
             </a:pPr>
             <a:r>
-              <a:rPr lang="it" sz="1800" b="0" strike="noStrike" spc="-1">
-                <a:solidFill>
-                  <a:srgbClr val="000000"/>
-                </a:solidFill>
-                <a:latin typeface="Arial"/>
-                <a:ea typeface="Arial"/>
-              </a:rPr>
-              <a:t>Typically the points 1-2 of the section 3.2 o</a:t>
-            </a:r>
-            <a:r>
-              <a:rPr lang="it" sz="1800" b="0" strike="noStrike" spc="-1">
-                <a:solidFill>
-                  <a:srgbClr val="595959"/>
-                </a:solidFill>
-                <a:latin typeface="Arial"/>
-                <a:ea typeface="Arial"/>
-              </a:rPr>
-              <a:t>f </a:t>
-            </a:r>
-            <a:r>
-              <a:rPr lang="it" sz="1800" b="0" strike="noStrike" spc="-1">
-                <a:solidFill>
-                  <a:srgbClr val="000000"/>
-                </a:solidFill>
-                <a:latin typeface="Arial"/>
-                <a:ea typeface="Arial"/>
-              </a:rPr>
-              <a:t>file “ML-23-Report-info-...”</a:t>
-            </a:r>
-            <a:endParaRPr lang="it-IT" sz="1800" b="0" strike="noStrike" spc="-1">
-              <a:solidFill>
-                <a:srgbClr val="000000"/>
-              </a:solidFill>
-              <a:latin typeface="Arial"/>
-            </a:endParaRPr>
-          </a:p>
-          <a:p>
-            <a:pPr marL="457200" indent="-343080">
-              <a:lnSpc>
-                <a:spcPct val="115000"/>
-              </a:lnSpc>
-              <a:spcBef>
-                <a:spcPts val="1199"/>
-              </a:spcBef>
-              <a:buClr>
-                <a:srgbClr val="000000"/>
-              </a:buClr>
-              <a:buFont typeface="Arial"/>
-              <a:buChar char="-"/>
-              <a:tabLst>
-                <a:tab pos="0" algn="l"/>
-              </a:tabLst>
-            </a:pPr>
-            <a:r>
-              <a:rPr lang="it" sz="1800" b="0" strike="noStrike" spc="-1">
-                <a:solidFill>
-                  <a:srgbClr val="000000"/>
-                </a:solidFill>
-                <a:latin typeface="Arial"/>
-                <a:ea typeface="Arial"/>
-              </a:rPr>
-              <a:t>Which schema have you used for model selection and model assessment? </a:t>
-            </a:r>
-            <a:endParaRPr lang="it-IT" sz="1800" b="0" strike="noStrike" spc="-1">
-              <a:solidFill>
-                <a:srgbClr val="000000"/>
-              </a:solidFill>
-              <a:latin typeface="Arial"/>
-            </a:endParaRPr>
-          </a:p>
-          <a:p>
-            <a:pPr marL="914400" lvl="1" indent="-317520">
-              <a:lnSpc>
-                <a:spcPct val="115000"/>
-              </a:lnSpc>
-              <a:buClr>
-                <a:srgbClr val="000000"/>
-              </a:buClr>
-              <a:buFont typeface="Arial"/>
-              <a:buChar char="-"/>
-              <a:tabLst>
-                <a:tab pos="0" algn="l"/>
-              </a:tabLst>
-            </a:pPr>
-            <a:r>
-              <a:rPr lang="it" sz="1400" b="0" strike="noStrike" spc="-1">
-                <a:solidFill>
-                  <a:srgbClr val="000000"/>
-                </a:solidFill>
-                <a:latin typeface="Arial"/>
-                <a:ea typeface="Arial"/>
-              </a:rPr>
-              <a:t>Validation schema can be easily reported in a graphical form, e.g.</a:t>
-            </a:r>
-            <a:endParaRPr lang="it-IT" sz="1400" b="0" strike="noStrike" spc="-1">
-              <a:solidFill>
-                <a:srgbClr val="000000"/>
-              </a:solidFill>
-              <a:latin typeface="Arial"/>
-            </a:endParaRPr>
+              <a:rPr lang="it-IT" sz="1400" b="0" strike="noStrike" spc="-1" dirty="0" err="1">
+                <a:solidFill>
+                  <a:srgbClr val="000000"/>
+                </a:solidFill>
+                <a:latin typeface="Arial"/>
+              </a:rPr>
+              <a:t>We</a:t>
+            </a:r>
+            <a:r>
+              <a:rPr lang="it-IT" sz="1400" b="0" strike="noStrike" spc="-1" dirty="0">
+                <a:solidFill>
+                  <a:srgbClr val="000000"/>
+                </a:solidFill>
+                <a:latin typeface="Arial"/>
+              </a:rPr>
+              <a:t> </a:t>
+            </a:r>
+            <a:r>
+              <a:rPr lang="it-IT" sz="1400" b="0" strike="noStrike" spc="-1" dirty="0" err="1">
+                <a:solidFill>
+                  <a:srgbClr val="000000"/>
+                </a:solidFill>
+                <a:latin typeface="Arial"/>
+              </a:rPr>
+              <a:t>held</a:t>
+            </a:r>
+            <a:r>
+              <a:rPr lang="it-IT" sz="1400" b="0" strike="noStrike" spc="-1" dirty="0">
+                <a:solidFill>
+                  <a:srgbClr val="000000"/>
+                </a:solidFill>
+                <a:latin typeface="Arial"/>
+              </a:rPr>
+              <a:t> out 20% of the data (</a:t>
+            </a:r>
+            <a:r>
+              <a:rPr lang="it-IT" sz="1400" b="0" strike="noStrike" spc="-1" dirty="0" err="1">
+                <a:solidFill>
+                  <a:srgbClr val="000000"/>
+                </a:solidFill>
+                <a:latin typeface="Arial"/>
+              </a:rPr>
+              <a:t>randomly</a:t>
+            </a:r>
+            <a:r>
+              <a:rPr lang="it-IT" sz="1400" b="0" strike="noStrike" spc="-1" dirty="0">
+                <a:solidFill>
+                  <a:srgbClr val="000000"/>
+                </a:solidFill>
+                <a:latin typeface="Arial"/>
+              </a:rPr>
+              <a:t> </a:t>
+            </a:r>
+            <a:r>
+              <a:rPr lang="it-IT" sz="1400" b="0" strike="noStrike" spc="-1" dirty="0" err="1">
+                <a:solidFill>
+                  <a:srgbClr val="000000"/>
+                </a:solidFill>
+                <a:latin typeface="Arial"/>
+              </a:rPr>
+              <a:t>sampled</a:t>
+            </a:r>
+            <a:r>
+              <a:rPr lang="it-IT" sz="1400" b="0" strike="noStrike" spc="-1" dirty="0">
+                <a:solidFill>
+                  <a:srgbClr val="000000"/>
+                </a:solidFill>
+                <a:latin typeface="Arial"/>
+              </a:rPr>
+              <a:t> by fixing the </a:t>
+            </a:r>
+            <a:r>
+              <a:rPr lang="it-IT" sz="1400" b="0" strike="noStrike" spc="-1" dirty="0" err="1">
+                <a:solidFill>
+                  <a:srgbClr val="000000"/>
+                </a:solidFill>
+                <a:latin typeface="Arial"/>
+              </a:rPr>
+              <a:t>seed</a:t>
+            </a:r>
+            <a:r>
+              <a:rPr lang="it-IT" sz="1400" b="0" strike="noStrike" spc="-1" dirty="0">
+                <a:solidFill>
+                  <a:srgbClr val="000000"/>
+                </a:solidFill>
+                <a:latin typeface="Arial"/>
+              </a:rPr>
+              <a:t> for </a:t>
+            </a:r>
+            <a:r>
+              <a:rPr lang="it-IT" sz="1400" b="0" strike="noStrike" spc="-1" dirty="0" err="1">
+                <a:solidFill>
+                  <a:srgbClr val="000000"/>
+                </a:solidFill>
+                <a:latin typeface="Arial"/>
+              </a:rPr>
+              <a:t>reproducibility</a:t>
+            </a:r>
+            <a:r>
+              <a:rPr lang="it-IT" sz="1400" b="0" strike="noStrike" spc="-1" dirty="0">
+                <a:solidFill>
+                  <a:srgbClr val="000000"/>
+                </a:solidFill>
+                <a:latin typeface="Arial"/>
+              </a:rPr>
+              <a:t>) to use </a:t>
+            </a:r>
+            <a:r>
+              <a:rPr lang="it-IT" sz="1400" b="0" strike="noStrike" spc="-1" dirty="0" err="1">
+                <a:solidFill>
+                  <a:srgbClr val="000000"/>
+                </a:solidFill>
+                <a:latin typeface="Arial"/>
+              </a:rPr>
+              <a:t>it</a:t>
+            </a:r>
+            <a:r>
+              <a:rPr lang="it-IT" sz="1400" b="0" strike="noStrike" spc="-1" dirty="0">
+                <a:solidFill>
+                  <a:srgbClr val="000000"/>
+                </a:solidFill>
+                <a:latin typeface="Arial"/>
+              </a:rPr>
+              <a:t> </a:t>
+            </a:r>
+            <a:r>
+              <a:rPr lang="it-IT" sz="1400" b="0" strike="noStrike" spc="-1" dirty="0" err="1">
+                <a:solidFill>
+                  <a:srgbClr val="000000"/>
+                </a:solidFill>
+                <a:latin typeface="Arial"/>
+              </a:rPr>
+              <a:t>as</a:t>
+            </a:r>
+            <a:r>
+              <a:rPr lang="it-IT" sz="1400" b="0" strike="noStrike" spc="-1" dirty="0">
+                <a:solidFill>
+                  <a:srgbClr val="000000"/>
+                </a:solidFill>
+                <a:latin typeface="Arial"/>
+              </a:rPr>
+              <a:t> an </a:t>
+            </a:r>
+            <a:r>
+              <a:rPr lang="it-IT" sz="1400" b="0" strike="noStrike" spc="-1" dirty="0" err="1">
+                <a:solidFill>
+                  <a:srgbClr val="000000"/>
+                </a:solidFill>
+                <a:latin typeface="Arial"/>
+              </a:rPr>
+              <a:t>internal</a:t>
+            </a:r>
+            <a:r>
+              <a:rPr lang="it-IT" sz="1400" b="0" strike="noStrike" spc="-1" dirty="0">
+                <a:solidFill>
+                  <a:srgbClr val="000000"/>
+                </a:solidFill>
+                <a:latin typeface="Arial"/>
+              </a:rPr>
+              <a:t> test set.</a:t>
+            </a:r>
           </a:p>
           <a:p>
             <a:pPr>
               <a:lnSpc>
                 <a:spcPct val="115000"/>
               </a:lnSpc>
-              <a:spcBef>
-                <a:spcPts val="1199"/>
-              </a:spcBef>
               <a:buNone/>
               <a:tabLst>
                 <a:tab pos="0" algn="l"/>
               </a:tabLst>
             </a:pPr>
-            <a:br>
-              <a:rPr sz="1000"/>
-            </a:br>
-            <a:endParaRPr lang="it-IT" sz="1000" b="0" strike="noStrike" spc="-1">
-              <a:solidFill>
-                <a:srgbClr val="000000"/>
-              </a:solidFill>
-              <a:latin typeface="Arial"/>
-            </a:endParaRPr>
-          </a:p>
-          <a:p>
-            <a:pPr marL="914400" lvl="1" indent="-317520">
-              <a:lnSpc>
-                <a:spcPct val="115000"/>
-              </a:lnSpc>
-              <a:spcBef>
-                <a:spcPts val="1199"/>
-              </a:spcBef>
-              <a:buClr>
-                <a:srgbClr val="000000"/>
-              </a:buClr>
-              <a:buFont typeface="Arial"/>
-              <a:buChar char="-"/>
-              <a:tabLst>
-                <a:tab pos="0" algn="l"/>
-              </a:tabLst>
-            </a:pPr>
-            <a:r>
-              <a:rPr lang="it" sz="1400" b="0" strike="noStrike" spc="-1">
-                <a:solidFill>
-                  <a:srgbClr val="000000"/>
-                </a:solidFill>
-                <a:latin typeface="Arial"/>
-                <a:ea typeface="Arial"/>
-              </a:rPr>
-              <a:t>Have you a final retraining? </a:t>
-            </a:r>
-            <a:endParaRPr lang="it-IT" sz="1400" b="0" strike="noStrike" spc="-1">
-              <a:solidFill>
-                <a:srgbClr val="000000"/>
-              </a:solidFill>
-              <a:latin typeface="Arial"/>
-            </a:endParaRPr>
-          </a:p>
-          <a:p>
-            <a:pPr>
-              <a:lnSpc>
-                <a:spcPct val="115000"/>
-              </a:lnSpc>
-              <a:spcBef>
-                <a:spcPts val="1199"/>
-              </a:spcBef>
-              <a:spcAft>
-                <a:spcPts val="1199"/>
-              </a:spcAft>
-              <a:buNone/>
-              <a:tabLst>
-                <a:tab pos="0" algn="l"/>
-              </a:tabLst>
-            </a:pPr>
-            <a:endParaRPr lang="it-IT" sz="1800" b="0" strike="noStrike" spc="-1">
+            <a:r>
+              <a:rPr lang="it-IT" sz="1400" spc="-1" dirty="0">
+                <a:solidFill>
+                  <a:srgbClr val="000000"/>
+                </a:solidFill>
+                <a:latin typeface="Arial"/>
+              </a:rPr>
+              <a:t>On t</a:t>
+            </a:r>
+            <a:r>
+              <a:rPr lang="it-IT" sz="1400" b="0" strike="noStrike" spc="-1" dirty="0">
+                <a:solidFill>
+                  <a:srgbClr val="000000"/>
+                </a:solidFill>
+                <a:latin typeface="Arial"/>
+              </a:rPr>
+              <a:t>he </a:t>
+            </a:r>
+            <a:r>
+              <a:rPr lang="it-IT" sz="1400" b="0" strike="noStrike" spc="-1" dirty="0" err="1">
+                <a:solidFill>
+                  <a:srgbClr val="000000"/>
+                </a:solidFill>
+                <a:latin typeface="Arial"/>
+              </a:rPr>
+              <a:t>remaining</a:t>
+            </a:r>
+            <a:r>
+              <a:rPr lang="it-IT" sz="1400" b="0" strike="noStrike" spc="-1" dirty="0">
+                <a:solidFill>
+                  <a:srgbClr val="000000"/>
+                </a:solidFill>
+                <a:latin typeface="Arial"/>
+              </a:rPr>
+              <a:t> part of the data </a:t>
+            </a:r>
+            <a:r>
+              <a:rPr lang="it-IT" sz="1400" spc="-1" dirty="0" err="1">
+                <a:solidFill>
+                  <a:srgbClr val="000000"/>
+                </a:solidFill>
+                <a:latin typeface="Arial"/>
+              </a:rPr>
+              <a:t>we</a:t>
+            </a:r>
+            <a:r>
+              <a:rPr lang="it-IT" sz="1400" spc="-1" dirty="0">
+                <a:solidFill>
+                  <a:srgbClr val="000000"/>
+                </a:solidFill>
+                <a:latin typeface="Arial"/>
+              </a:rPr>
+              <a:t> do training and </a:t>
+            </a:r>
+            <a:r>
+              <a:rPr lang="it-IT" sz="1400" spc="-1" dirty="0" err="1">
+                <a:solidFill>
+                  <a:srgbClr val="000000"/>
+                </a:solidFill>
+                <a:latin typeface="Arial"/>
+              </a:rPr>
+              <a:t>validation</a:t>
+            </a:r>
+            <a:r>
+              <a:rPr lang="it-IT" sz="1400" spc="-1" dirty="0">
+                <a:solidFill>
+                  <a:srgbClr val="000000"/>
+                </a:solidFill>
+                <a:latin typeface="Arial"/>
+              </a:rPr>
+              <a:t> following a 5-fold Cross </a:t>
+            </a:r>
+            <a:r>
+              <a:rPr lang="it-IT" sz="1400" spc="-1" dirty="0" err="1">
+                <a:solidFill>
+                  <a:srgbClr val="000000"/>
+                </a:solidFill>
+                <a:latin typeface="Arial"/>
+              </a:rPr>
+              <a:t>Validation</a:t>
+            </a:r>
+            <a:r>
+              <a:rPr lang="it-IT" sz="1400" spc="-1" dirty="0">
+                <a:solidFill>
+                  <a:srgbClr val="000000"/>
+                </a:solidFill>
+                <a:latin typeface="Arial"/>
+              </a:rPr>
+              <a:t> schema. </a:t>
+            </a:r>
+            <a:r>
+              <a:rPr lang="it-IT" sz="1400" spc="-1" dirty="0" err="1">
+                <a:solidFill>
+                  <a:srgbClr val="000000"/>
+                </a:solidFill>
+                <a:latin typeface="Arial"/>
+              </a:rPr>
+              <a:t>This</a:t>
+            </a:r>
+            <a:r>
+              <a:rPr lang="it-IT" sz="1400" spc="-1" dirty="0">
+                <a:solidFill>
+                  <a:srgbClr val="000000"/>
+                </a:solidFill>
+                <a:latin typeface="Arial"/>
+              </a:rPr>
+              <a:t> </a:t>
+            </a:r>
+            <a:r>
+              <a:rPr lang="it-IT" sz="1400" spc="-1" dirty="0" err="1">
+                <a:solidFill>
+                  <a:srgbClr val="000000"/>
+                </a:solidFill>
+                <a:latin typeface="Arial"/>
+              </a:rPr>
+              <a:t>is</a:t>
+            </a:r>
+            <a:r>
+              <a:rPr lang="it-IT" sz="1400" spc="-1" dirty="0">
+                <a:solidFill>
+                  <a:srgbClr val="000000"/>
+                </a:solidFill>
+                <a:latin typeface="Arial"/>
+              </a:rPr>
+              <a:t> </a:t>
+            </a:r>
+            <a:r>
+              <a:rPr lang="it-IT" sz="1400" spc="-1" dirty="0" err="1">
+                <a:solidFill>
+                  <a:srgbClr val="000000"/>
+                </a:solidFill>
+                <a:latin typeface="Arial"/>
+              </a:rPr>
+              <a:t>done</a:t>
+            </a:r>
+            <a:r>
+              <a:rPr lang="it-IT" sz="1400" spc="-1" dirty="0">
+                <a:solidFill>
+                  <a:srgbClr val="000000"/>
+                </a:solidFill>
+                <a:latin typeface="Arial"/>
+              </a:rPr>
+              <a:t> by </a:t>
+            </a:r>
+            <a:r>
+              <a:rPr lang="it-IT" sz="1400" spc="-1" dirty="0" err="1">
+                <a:solidFill>
+                  <a:srgbClr val="000000"/>
+                </a:solidFill>
+                <a:latin typeface="Arial"/>
+              </a:rPr>
+              <a:t>Scikit-Learn’s</a:t>
+            </a:r>
+            <a:r>
+              <a:rPr lang="it-IT" sz="1400" spc="-1" dirty="0">
+                <a:solidFill>
+                  <a:srgbClr val="000000"/>
+                </a:solidFill>
+                <a:latin typeface="Arial"/>
+              </a:rPr>
+              <a:t> </a:t>
+            </a:r>
+            <a:r>
+              <a:rPr lang="it-IT" sz="1400" spc="-1" dirty="0" err="1">
+                <a:solidFill>
+                  <a:srgbClr val="000000"/>
+                </a:solidFill>
+                <a:latin typeface="Consolas" panose="020B0609020204030204" pitchFamily="49" charset="0"/>
+                <a:ea typeface="Verdana" panose="020B0604030504040204" pitchFamily="34" charset="0"/>
+              </a:rPr>
+              <a:t>GridSearchCV</a:t>
+            </a:r>
+            <a:r>
+              <a:rPr lang="it-IT" sz="1400" spc="-1" dirty="0">
+                <a:solidFill>
+                  <a:srgbClr val="000000"/>
+                </a:solidFill>
+                <a:latin typeface="Arial"/>
+              </a:rPr>
+              <a:t>, </a:t>
+            </a:r>
+            <a:r>
+              <a:rPr lang="it-IT" sz="1400" spc="-1" dirty="0" err="1">
+                <a:solidFill>
+                  <a:srgbClr val="000000"/>
+                </a:solidFill>
+                <a:latin typeface="Arial"/>
+              </a:rPr>
+              <a:t>when</a:t>
+            </a:r>
+            <a:r>
+              <a:rPr lang="it-IT" sz="1400" spc="-1" dirty="0">
+                <a:solidFill>
+                  <a:srgbClr val="000000"/>
+                </a:solidFill>
+                <a:latin typeface="Arial"/>
+              </a:rPr>
+              <a:t> the </a:t>
+            </a:r>
+            <a:r>
+              <a:rPr lang="it-IT" sz="1400" spc="-1" dirty="0" err="1">
+                <a:solidFill>
+                  <a:srgbClr val="000000"/>
+                </a:solidFill>
+                <a:latin typeface="Arial"/>
+              </a:rPr>
+              <a:t>grid</a:t>
+            </a:r>
+            <a:r>
+              <a:rPr lang="it-IT" sz="1400" spc="-1" dirty="0">
+                <a:solidFill>
+                  <a:srgbClr val="000000"/>
+                </a:solidFill>
+                <a:latin typeface="Arial"/>
+              </a:rPr>
+              <a:t> </a:t>
+            </a:r>
+            <a:r>
+              <a:rPr lang="it-IT" sz="1400" spc="-1" dirty="0" err="1">
+                <a:solidFill>
+                  <a:srgbClr val="000000"/>
+                </a:solidFill>
+                <a:latin typeface="Arial"/>
+              </a:rPr>
+              <a:t>search</a:t>
+            </a:r>
+            <a:r>
+              <a:rPr lang="it-IT" sz="1400" spc="-1" dirty="0">
+                <a:solidFill>
+                  <a:srgbClr val="000000"/>
+                </a:solidFill>
+                <a:latin typeface="Arial"/>
+              </a:rPr>
+              <a:t> </a:t>
+            </a:r>
+            <a:r>
+              <a:rPr lang="it-IT" sz="1400" spc="-1" dirty="0" err="1">
+                <a:solidFill>
+                  <a:srgbClr val="000000"/>
+                </a:solidFill>
+                <a:latin typeface="Arial"/>
+              </a:rPr>
+              <a:t>is</a:t>
+            </a:r>
+            <a:r>
+              <a:rPr lang="it-IT" sz="1400" spc="-1" dirty="0">
+                <a:solidFill>
+                  <a:srgbClr val="000000"/>
+                </a:solidFill>
+                <a:latin typeface="Arial"/>
+              </a:rPr>
+              <a:t> </a:t>
+            </a:r>
+            <a:r>
+              <a:rPr lang="it-IT" sz="1400" spc="-1" dirty="0" err="1">
+                <a:solidFill>
+                  <a:srgbClr val="000000"/>
+                </a:solidFill>
+                <a:latin typeface="Arial"/>
+              </a:rPr>
+              <a:t>performed</a:t>
+            </a:r>
+            <a:r>
+              <a:rPr lang="it-IT" sz="1400" spc="-1" dirty="0">
+                <a:solidFill>
+                  <a:srgbClr val="000000"/>
+                </a:solidFill>
+                <a:latin typeface="Arial"/>
+              </a:rPr>
+              <a:t>. </a:t>
+            </a:r>
+            <a:endParaRPr lang="it-IT" sz="1800" b="0" strike="noStrike" spc="-1" dirty="0">
               <a:solidFill>
                 <a:srgbClr val="000000"/>
               </a:solidFill>
@@ -6364,7 +6668,7 @@
         </p:blipFill>
         <p:spPr>
           <a:xfrm>
-            <a:off x="2432880" y="2333520"/>
+            <a:off x="2359620" y="2387086"/>
             <a:ext cx="4424400" cy="626400"/>
           </a:xfrm>
           <a:prstGeom prst="rect">
@@ -6516,7 +6820,7 @@
               </a:tabLst>
             </a:pPr>
             <a:r>
-              <a:rPr lang="it" sz="1800" b="0" strike="noStrike" spc="-1">
+              <a:rPr lang="it" sz="1800" b="0" strike="noStrike" spc="-1" dirty="0">
                 <a:solidFill>
                   <a:srgbClr val="000000"/>
                 </a:solidFill>
@@ -6526,7 +6830,7 @@
               <a:t>Typically the points 2-3 of the section 3.2 o</a:t>
             </a:r>
             <a:r>
-              <a:rPr lang="it" sz="1800" b="0" strike="noStrike" spc="-1">
+              <a:rPr lang="it" sz="1800" b="0" strike="noStrike" spc="-1" dirty="0">
                 <a:solidFill>
                   <a:srgbClr val="595959"/>
                 </a:solidFill>
@@ -6536,7 +6840,7 @@
               <a:t>f </a:t>
             </a:r>
             <a:r>
-              <a:rPr lang="it" sz="1800" b="0" strike="noStrike" spc="-1">
+              <a:rPr lang="it" sz="1800" b="0" strike="noStrike" spc="-1" dirty="0">
                 <a:solidFill>
                   <a:srgbClr val="000000"/>
                 </a:solidFill>
@@ -6545,7 +6849,7 @@
               </a:rPr>
               <a:t>file “ML-23-Report-info-...”</a:t>
             </a:r>
-            <a:endParaRPr lang="it-IT" sz="1800" b="0" strike="noStrike" spc="-1">
+            <a:endParaRPr lang="it-IT" sz="1800" b="0" strike="noStrike" spc="-1" dirty="0">
               <a:solidFill>
                 <a:srgbClr val="000000"/>
               </a:solidFill>
@@ -6570,7 +6874,7 @@
               </a:tabLst>
             </a:pPr>
             <a:r>
-              <a:rPr lang="it" sz="1800" b="0" strike="noStrike" spc="-1">
+              <a:rPr lang="it" sz="1800" b="0" strike="noStrike" spc="-1" dirty="0">
                 <a:solidFill>
                   <a:srgbClr val="000000"/>
                 </a:solidFill>
@@ -6580,7 +6884,7 @@
               <a:t>Schema and range of explored hyper-parameters (values used for the grid search, possibly table/tables): </a:t>
             </a:r>
             <a:r>
-              <a:rPr lang="it" sz="1600" b="0" strike="noStrike" spc="-1">
+              <a:rPr lang="it" sz="1600" b="0" strike="noStrike" spc="-1" dirty="0">
                 <a:solidFill>
                   <a:srgbClr val="000000"/>
                 </a:solidFill>
@@ -6590,7 +6894,7 @@
               <a:t>see the file “ML-23-Report-info-...” and also the </a:t>
             </a:r>
             <a:r>
-              <a:rPr lang="it" sz="1600" b="0" i="1" strike="noStrike" spc="-1">
+              <a:rPr lang="it" sz="1600" b="0" i="1" strike="noStrike" spc="-1" dirty="0">
                 <a:solidFill>
                   <a:srgbClr val="000000"/>
                 </a:solidFill>
@@ -6600,7 +6904,7 @@
               <a:t>check list</a:t>
             </a:r>
             <a:r>
-              <a:rPr lang="it" sz="1600" b="0" strike="noStrike" spc="-1">
+              <a:rPr lang="it" sz="1600" b="0" strike="noStrike" spc="-1" dirty="0">
                 <a:solidFill>
                   <a:srgbClr val="000000"/>
                 </a:solidFill>
@@ -6609,7 +6913,7 @@
               </a:rPr>
               <a:t> note on the “Model selection”, for the CUP application</a:t>
             </a:r>
-            <a:endParaRPr lang="it-IT" sz="1600" b="0" strike="noStrike" spc="-1">
+            <a:endParaRPr lang="it-IT" sz="1600" b="0" strike="noStrike" spc="-1" dirty="0">
               <a:solidFill>
                 <a:srgbClr val="000000"/>
               </a:solidFill>
@@ -6631,7 +6935,7 @@
               </a:tabLst>
             </a:pPr>
             <a:r>
-              <a:rPr lang="it" sz="1400" b="0" strike="noStrike" spc="-1">
+              <a:rPr lang="it" sz="1400" b="0" strike="noStrike" spc="-1" dirty="0">
                 <a:solidFill>
                   <a:srgbClr val="000000"/>
                 </a:solidFill>
@@ -6640,7 +6944,7 @@
               </a:rPr>
               <a:t>The synthesis of the hyperparameters setting must be reported on the slides, while a complete description can be inserted in a document within the code package (call it “hyperparameters-setting”) and in the Appendix slides (selecting what is more relevant).  </a:t>
             </a:r>
-            <a:endParaRPr lang="it-IT" sz="1400" b="0" strike="noStrike" spc="-1">
+            <a:endParaRPr lang="it-IT" sz="1400" b="0" strike="noStrike" spc="-1" dirty="0">
               <a:solidFill>
                 <a:srgbClr val="000000"/>
               </a:solidFill>
@@ -7151,7 +7455,7 @@
       </p:grpSpPr>
       <p:sp>
         <p:nvSpPr>
-          <p:cNvPr id="111" name="PlaceHolder 1"/>
+          <p:cNvPr id="108" name="PlaceHolder 1"/>
           <p:cNvSpPr>
             <a:spLocks noGrp="1"/>
           </p:cNvSpPr>
@@ -7161,7 +7465,7 @@
         </p:nvSpPr>
         <p:spPr>
           <a:xfrm>
-            <a:off x="311760" y="2700"/>
+            <a:off x="311760" y="0"/>
             <a:ext cx="8520120" cy="572400"/>
           </a:xfrm>
           <a:prstGeom prst="rect">
@@ -7195,7 +7499,27 @@
                 <a:latin typeface="Arial"/>
                 <a:ea typeface="Arial"/>
               </a:rPr>
-              <a:t>Discussion (may be more slides)</a:t>
+              <a:t>CUP</a:t>
+            </a:r>
+            <a:r>
+              <a:rPr lang="it" sz="2400" b="0" strike="noStrike" spc="-1" dirty="0">
+                <a:solidFill>
+                  <a:srgbClr val="000000"/>
+                </a:solidFill>
+                <a:latin typeface="Arial"/>
+                <a:ea typeface="Arial"/>
+              </a:rPr>
+              <a:t> </a:t>
+            </a:r>
+            <a:r>
+              <a:rPr lang="it" sz="2600" b="0" strike="noStrike" spc="-1" dirty="0">
+                <a:solidFill>
+                  <a:srgbClr val="000000"/>
+                </a:solidFill>
+                <a:latin typeface="Arial"/>
+                <a:ea typeface="Arial"/>
+              </a:rPr>
+              <a:t>Results: final model</a:t>
             </a:r>
             <a:endParaRPr lang="it-IT" sz="2400" b="0" strike="noStrike" spc="-1" dirty="0">
               <a:solidFill>
@@ -7208,154 +7532,12 @@
       </p:sp>
       <p:sp>
         <p:nvSpPr>
-          <p:cNvPr id="112" name="PlaceHolder 2"/>
+          <p:cNvPr id="110" name="PlaceHolder 3"/>
           <p:cNvSpPr>
             <a:spLocks noGrp="1"/>
           </p:cNvSpPr>
           <p:nvPr>
-            <p:ph/>
-          </p:nvPr>
-        </p:nvSpPr>
-        <p:spPr>
-          <a:xfrm>
-            <a:off x="311760" y="1152360"/>
-            <a:ext cx="8520120" cy="3416040"/>
-          </a:xfrm>
-          <a:prstGeom prst="rect">
-            <a:avLst/>
-          </a:prstGeom>
-          <a:noFill/>
-          <a:ln w="0">
-            <a:noFill/>
-          </a:ln>
-        </p:spPr>
-        <p:txBody>
-          <a:bodyPr tIns="91440" bIns="91440" anchor="t">
-            <a:normAutofit/>
-          </a:bodyPr>
-          <a:lstStyle/>
-          <a:p>
-            <a:pPr>
-              <a:lnSpc>
-                <a:spcPct val="115000"/>
-              </a:lnSpc>
-              <a:buNone/>
-              <a:tabLst>
-                <a:tab pos="0" algn="l"/>
-              </a:tabLst>
-            </a:pPr>
-            <a:r>
-              <a:rPr lang="it" sz="1800" b="0" strike="noStrike" spc="-1" dirty="0">
-                <a:solidFill>
-                  <a:srgbClr val="000000"/>
-                </a:solidFill>
-                <a:latin typeface="Arial"/>
-                <a:ea typeface="Arial"/>
-              </a:rPr>
-              <a:t>Discuss whether any proposed techniques or novelties  improved or not the results, in terms of any performance (efficacy, efficiency, …) </a:t>
-            </a:r>
-            <a:endParaRPr lang="it-IT" sz="1800" b="0" strike="noStrike" spc="-1" dirty="0">
-              <a:solidFill>
-                <a:srgbClr val="000000"/>
-              </a:solidFill>
-              <a:latin typeface="Arial"/>
-            </a:endParaRPr>
-          </a:p>
-          <a:p>
-            <a:pPr marL="457200" indent="-317520">
-              <a:lnSpc>
-                <a:spcPct val="115000"/>
-              </a:lnSpc>
-              <a:spcBef>
-                <a:spcPts val="1199"/>
-              </a:spcBef>
-              <a:buClr>
-                <a:srgbClr val="000000"/>
-              </a:buClr>
-              <a:buFont typeface="Calibri"/>
-              <a:buChar char="●"/>
-              <a:tabLst>
-                <a:tab pos="0" algn="l"/>
-              </a:tabLst>
-            </a:pPr>
-            <a:r>
-              <a:rPr lang="it" sz="1400" b="0" strike="noStrike" spc="-1" dirty="0">
-                <a:solidFill>
-                  <a:srgbClr val="000000"/>
-                </a:solidFill>
-                <a:latin typeface="Calibri"/>
-                <a:ea typeface="Calibri"/>
-              </a:rPr>
-              <a:t>Don’t forget to empathize the novelties that you introduced in your model (prj A or B) or used advanced techniques (prj B) w.r.t. to the results and/or any significant/critical analyses and any interesting finding/insight</a:t>
-            </a:r>
-            <a:endParaRPr lang="it-IT" sz="1400" b="0" strike="noStrike" spc="-1" dirty="0">
-              <a:solidFill>
-                <a:srgbClr val="000000"/>
-              </a:solidFill>
-              <a:latin typeface="Arial"/>
-            </a:endParaRPr>
-          </a:p>
-          <a:p>
-            <a:pPr marL="457200" indent="-317520">
-              <a:lnSpc>
-                <a:spcPct val="115000"/>
-              </a:lnSpc>
-              <a:buClr>
-                <a:srgbClr val="000000"/>
-              </a:buClr>
-              <a:buFont typeface="Calibri"/>
-              <a:buChar char="●"/>
-              <a:tabLst>
-                <a:tab pos="0" algn="l"/>
-              </a:tabLst>
-            </a:pPr>
-            <a:r>
-              <a:rPr lang="it" sz="1400" b="0" strike="noStrike" spc="-1" dirty="0">
-                <a:solidFill>
-                  <a:srgbClr val="000000"/>
-                </a:solidFill>
-                <a:latin typeface="Calibri"/>
-                <a:ea typeface="Calibri"/>
-              </a:rPr>
-              <a:t>I.e: don’t forget a “Discussion/Analysis” answering “what did you learn?” on the Models/Hyperparameters/Results/Efficacy/Efficiency, selecting/highlighting what is more significant in your opinion (time and space constraints helps!)</a:t>
-            </a:r>
-            <a:endParaRPr lang="it-IT" sz="1400" b="0" strike="noStrike" spc="-1" dirty="0">
-              <a:solidFill>
-                <a:srgbClr val="000000"/>
-              </a:solidFill>
-              <a:latin typeface="Arial"/>
-            </a:endParaRPr>
-          </a:p>
-          <a:p>
-            <a:pPr>
-              <a:lnSpc>
-                <a:spcPct val="115000"/>
-              </a:lnSpc>
-              <a:spcAft>
-                <a:spcPts val="1199"/>
-              </a:spcAft>
-              <a:buNone/>
-              <a:tabLst>
-                <a:tab pos="0" algn="l"/>
-              </a:tabLst>
-            </a:pPr>
-            <a:endParaRPr lang="it-IT" sz="1400" b="0" strike="noStrike" spc="-1" dirty="0">
-              <a:solidFill>
-                <a:srgbClr val="000000"/>
-              </a:solidFill>
-              <a:latin typeface="Arial"/>
-            </a:endParaRPr>
-          </a:p>
-        </p:txBody>
-      </p:sp>
-      <p:sp>
-        <p:nvSpPr>
-          <p:cNvPr id="113" name="PlaceHolder 3"/>
-          <p:cNvSpPr>
-            <a:spLocks noGrp="1"/>
-          </p:cNvSpPr>
-          <p:nvPr>
-            <p:ph type="sldNum" idx="11"/>
+            <p:ph type="sldNum" idx="10"/>
           </p:nvPr>
         </p:nvSpPr>
         <p:spPr>
@@ -7403,7 +7585,7 @@
                 <a:tab pos="0" algn="l"/>
               </a:tabLst>
             </a:pPr>
-            <a:fld id="{EB566EBC-D211-4A49-9CB5-B894905094F3}" type="slidenum">
+            <a:fld id="{70083C99-8290-44C9-AB12-6D72EC62BA1C}" type="slidenum">
               <a:rPr lang="it" sz="1000" b="0" strike="noStrike" spc="-1">
                 <a:solidFill>
                   <a:srgbClr val="595959"/>
@@ -7419,7 +7601,888 @@
           </a:p>
         </p:txBody>
       </p:sp>
+      <p:sp>
+        <p:nvSpPr>
+          <p:cNvPr id="2" name="Rettangolo 1">
+            <a:extLst>
+              <a:ext uri="{FF2B5EF4-FFF2-40B4-BE49-F238E27FC236}">
+                <a16:creationId xmlns:a16="http://schemas.microsoft.com/office/drawing/2014/main" id="{A84D9135-3616-EE45-ECF4-129488406C5F}"/>
+              </a:ext>
+            </a:extLst>
+          </p:cNvPr>
+          <p:cNvSpPr/>
+          <p:nvPr/>
+        </p:nvSpPr>
+        <p:spPr>
+          <a:xfrm>
+            <a:off x="311759" y="1399945"/>
+            <a:ext cx="3836658" cy="2566564"/>
+          </a:xfrm>
+          <a:prstGeom prst="rect">
+            <a:avLst/>
+          </a:prstGeom>
+        </p:spPr>
+        <p:style>
+          <a:lnRef idx="2">
+            <a:schemeClr val="accent3">
+              <a:shade val="15000"/>
+            </a:schemeClr>
+          </a:lnRef>
+          <a:fillRef idx="1">
+            <a:schemeClr val="accent3"/>
+          </a:fillRef>
+          <a:effectRef idx="0">
+            <a:schemeClr val="accent3"/>
+          </a:effectRef>
+          <a:fontRef idx="minor">
+            <a:schemeClr val="lt1"/>
+          </a:fontRef>
+        </p:style>
+        <p:txBody>
+          <a:bodyPr rtlCol="0" anchor="ctr"/>
+          <a:lstStyle/>
+          <a:p>
+            <a:pPr algn="ctr"/>
+            <a:r>
+              <a:rPr lang="it-IT" dirty="0"/>
+              <a:t>Learning curve plot for the </a:t>
+            </a:r>
+            <a:r>
+              <a:rPr lang="it-IT" dirty="0" err="1"/>
+              <a:t>final</a:t>
+            </a:r>
+            <a:r>
+              <a:rPr lang="it-IT" dirty="0"/>
+              <a:t> model</a:t>
+            </a:r>
+          </a:p>
+        </p:txBody>
+      </p:sp>
+      <p:sp>
+        <p:nvSpPr>
+          <p:cNvPr id="4" name="CasellaDiTesto 3">
+            <a:extLst>
+              <a:ext uri="{FF2B5EF4-FFF2-40B4-BE49-F238E27FC236}">
+                <a16:creationId xmlns:a16="http://schemas.microsoft.com/office/drawing/2014/main" id="{A2C03CD9-5D4B-7181-8758-3C5F98479B49}"/>
+              </a:ext>
+            </a:extLst>
+          </p:cNvPr>
+          <p:cNvSpPr txBox="1"/>
+          <p:nvPr/>
+        </p:nvSpPr>
+        <p:spPr>
+          <a:xfrm>
+            <a:off x="311760" y="572400"/>
+            <a:ext cx="8832240" cy="523220"/>
+          </a:xfrm>
+          <a:prstGeom prst="rect">
+            <a:avLst/>
+          </a:prstGeom>
+          <a:noFill/>
+        </p:spPr>
+        <p:txBody>
+          <a:bodyPr wrap="square" rtlCol="0">
+            <a:spAutoFit/>
+          </a:bodyPr>
+          <a:lstStyle/>
+          <a:p>
+            <a:r>
+              <a:rPr lang="it-IT" sz="1400" dirty="0" err="1"/>
+              <a:t>We</a:t>
+            </a:r>
+            <a:r>
+              <a:rPr lang="it-IT" sz="1400" dirty="0"/>
+              <a:t> </a:t>
+            </a:r>
+            <a:r>
+              <a:rPr lang="it-IT" sz="1400" dirty="0" err="1"/>
+              <a:t>chose</a:t>
+            </a:r>
+            <a:r>
+              <a:rPr lang="it-IT" sz="1400" dirty="0"/>
+              <a:t> XYZ </a:t>
+            </a:r>
+            <a:r>
+              <a:rPr lang="it-IT" sz="1400" dirty="0" err="1"/>
+              <a:t>as</a:t>
+            </a:r>
+            <a:r>
+              <a:rPr lang="it-IT" sz="1400" dirty="0"/>
+              <a:t> the </a:t>
+            </a:r>
+            <a:r>
+              <a:rPr lang="it-IT" sz="1400" dirty="0" err="1"/>
+              <a:t>final</a:t>
+            </a:r>
+            <a:r>
+              <a:rPr lang="it-IT" sz="1400" dirty="0"/>
+              <a:t> model, with the </a:t>
+            </a:r>
+            <a:r>
+              <a:rPr lang="it-IT" sz="1400" dirty="0" err="1"/>
+              <a:t>hyperparameters</a:t>
+            </a:r>
+            <a:r>
+              <a:rPr lang="it-IT" sz="1400" dirty="0"/>
+              <a:t> in </a:t>
+            </a:r>
+            <a:r>
+              <a:rPr lang="it-IT" sz="1400" dirty="0" err="1"/>
+              <a:t>Table</a:t>
+            </a:r>
+            <a:r>
+              <a:rPr lang="it-IT" sz="1400" dirty="0"/>
+              <a:t> 4. The </a:t>
+            </a:r>
+            <a:r>
+              <a:rPr lang="it-IT" sz="1400" dirty="0" err="1"/>
+              <a:t>results</a:t>
+            </a:r>
+            <a:r>
+              <a:rPr lang="it-IT" sz="1400" dirty="0"/>
+              <a:t> </a:t>
+            </a:r>
+            <a:r>
+              <a:rPr lang="it-IT" sz="1400" dirty="0" err="1"/>
+              <a:t>achieved</a:t>
+            </a:r>
+            <a:r>
+              <a:rPr lang="it-IT" sz="1400" dirty="0"/>
+              <a:t> by </a:t>
+            </a:r>
+            <a:r>
+              <a:rPr lang="it-IT" sz="1400" dirty="0" err="1"/>
+              <a:t>this</a:t>
+            </a:r>
+            <a:r>
+              <a:rPr lang="it-IT" sz="1400" dirty="0"/>
+              <a:t> model can be </a:t>
+            </a:r>
+            <a:r>
+              <a:rPr lang="it-IT" sz="1400" dirty="0" err="1"/>
+              <a:t>seen</a:t>
+            </a:r>
+            <a:r>
+              <a:rPr lang="it-IT" sz="1400" dirty="0"/>
+              <a:t> in </a:t>
+            </a:r>
+            <a:r>
+              <a:rPr lang="it-IT" sz="1400" dirty="0" err="1"/>
+              <a:t>Table</a:t>
+            </a:r>
+            <a:r>
+              <a:rPr lang="it-IT" sz="1400" dirty="0"/>
+              <a:t> 5. </a:t>
+            </a:r>
+            <a:r>
+              <a:rPr lang="it-IT" sz="1400" dirty="0" err="1"/>
+              <a:t>We</a:t>
+            </a:r>
+            <a:r>
+              <a:rPr lang="it-IT" sz="1400" dirty="0"/>
+              <a:t> </a:t>
+            </a:r>
+            <a:r>
+              <a:rPr lang="it-IT" sz="1400" dirty="0" err="1"/>
+              <a:t>chose</a:t>
+            </a:r>
+            <a:r>
+              <a:rPr lang="it-IT" sz="1400" dirty="0"/>
+              <a:t> </a:t>
+            </a:r>
+            <a:r>
+              <a:rPr lang="it-IT" sz="1400" dirty="0" err="1"/>
+              <a:t>this</a:t>
+            </a:r>
+            <a:r>
+              <a:rPr lang="it-IT" sz="1400" dirty="0"/>
+              <a:t> model </a:t>
+            </a:r>
+            <a:r>
+              <a:rPr lang="it-IT" sz="1400" dirty="0" err="1"/>
+              <a:t>because</a:t>
+            </a:r>
+            <a:r>
+              <a:rPr lang="it-IT" sz="1400" dirty="0"/>
+              <a:t>…</a:t>
+            </a:r>
+          </a:p>
+        </p:txBody>
+      </p:sp>
+      <p:graphicFrame>
+        <p:nvGraphicFramePr>
+          <p:cNvPr id="7" name="Tabella 6">
+            <a:extLst>
+              <a:ext uri="{FF2B5EF4-FFF2-40B4-BE49-F238E27FC236}">
+                <a16:creationId xmlns:a16="http://schemas.microsoft.com/office/drawing/2014/main" id="{777633CE-63A0-BCE9-FC8D-732B7C7A8340}"/>
+              </a:ext>
+            </a:extLst>
+          </p:cNvPr>
+          <p:cNvGraphicFramePr>
+            <a:graphicFrameLocks noGrp="1"/>
+          </p:cNvGraphicFramePr>
+          <p:nvPr>
+            <p:extLst>
+              <p:ext uri="{D42A27DB-BD31-4B8C-83A1-F6EECF244321}">
+                <p14:modId xmlns:p14="http://schemas.microsoft.com/office/powerpoint/2010/main" val="2642985504"/>
+              </p:ext>
+            </p:extLst>
+          </p:nvPr>
+        </p:nvGraphicFramePr>
+        <p:xfrm>
+          <a:off x="4940504" y="1707722"/>
+          <a:ext cx="3532096" cy="3078480"/>
+        </p:xfrm>
+        <a:graphic>
+          <a:graphicData uri="http://schemas.openxmlformats.org/drawingml/2006/table">
+            <a:tbl>
+              <a:tblPr firstRow="1" bandRow="1">
+                <a:tableStyleId>{0E3FDE45-AF77-4B5C-9715-49D594BDF05E}</a:tableStyleId>
+              </a:tblPr>
+              <a:tblGrid>
+                <a:gridCol w="1766048">
+                  <a:extLst>
+                    <a:ext uri="{9D8B030D-6E8A-4147-A177-3AD203B41FA5}">
+                      <a16:colId xmlns:a16="http://schemas.microsoft.com/office/drawing/2014/main" val="3787004382"/>
+                    </a:ext>
+                  </a:extLst>
+                </a:gridCol>
+                <a:gridCol w="1766048">
+                  <a:extLst>
+                    <a:ext uri="{9D8B030D-6E8A-4147-A177-3AD203B41FA5}">
+                      <a16:colId xmlns:a16="http://schemas.microsoft.com/office/drawing/2014/main" val="3118583425"/>
+                    </a:ext>
+                  </a:extLst>
+                </a:gridCol>
+              </a:tblGrid>
+              <a:tr h="319523">
+                <a:tc>
+                  <a:txBody>
+                    <a:bodyPr/>
+                    <a:lstStyle/>
+                    <a:p>
+                      <a:pPr algn="ctr"/>
+                      <a:r>
+                        <a:rPr lang="it-IT" sz="1600" dirty="0" err="1"/>
+                        <a:t>Hyperparameter</a:t>
+                      </a:r>
+                      <a:endParaRPr lang="it-IT" sz="1400" dirty="0"/>
+                    </a:p>
+                  </a:txBody>
+                  <a:tcPr/>
+                </a:tc>
+                <a:tc>
+                  <a:txBody>
+                    <a:bodyPr/>
+                    <a:lstStyle/>
+                    <a:p>
+                      <a:pPr algn="ctr"/>
+                      <a:r>
+                        <a:rPr lang="it-IT" sz="1600" dirty="0"/>
+                        <a:t>Value</a:t>
+                      </a:r>
+                      <a:endParaRPr lang="it-IT" sz="1400" dirty="0"/>
+                    </a:p>
+                  </a:txBody>
+                  <a:tcPr/>
+                </a:tc>
+                <a:extLst>
+                  <a:ext uri="{0D108BD9-81ED-4DB2-BD59-A6C34878D82A}">
+                    <a16:rowId xmlns:a16="http://schemas.microsoft.com/office/drawing/2014/main" val="2786860970"/>
+                  </a:ext>
+                </a:extLst>
+              </a:tr>
+              <a:tr h="290476">
+                <a:tc>
+                  <a:txBody>
+                    <a:bodyPr/>
+                    <a:lstStyle/>
+                    <a:p>
+                      <a:r>
+                        <a:rPr lang="it-IT" sz="1400" dirty="0"/>
+                        <a:t>λ</a:t>
+                      </a:r>
+                    </a:p>
+                  </a:txBody>
+                  <a:tcPr anchor="ctr"/>
+                </a:tc>
+                <a:tc>
+                  <a:txBody>
+                    <a:bodyPr/>
+                    <a:lstStyle/>
+                    <a:p>
+                      <a:endParaRPr lang="it-IT" sz="1400" dirty="0"/>
+                    </a:p>
+                  </a:txBody>
+                  <a:tcPr anchor="ctr"/>
+                </a:tc>
+                <a:extLst>
+                  <a:ext uri="{0D108BD9-81ED-4DB2-BD59-A6C34878D82A}">
+                    <a16:rowId xmlns:a16="http://schemas.microsoft.com/office/drawing/2014/main" val="1204997882"/>
+                  </a:ext>
+                </a:extLst>
+              </a:tr>
+              <a:tr h="290476">
+                <a:tc>
+                  <a:txBody>
+                    <a:bodyPr/>
+                    <a:lstStyle/>
+                    <a:p>
+                      <a:r>
+                        <a:rPr lang="it-IT" sz="1400" dirty="0"/>
+                        <a:t>η</a:t>
+                      </a:r>
+                    </a:p>
+                  </a:txBody>
+                  <a:tcPr anchor="ctr"/>
+                </a:tc>
+                <a:tc>
+                  <a:txBody>
+                    <a:bodyPr/>
+                    <a:lstStyle/>
+                    <a:p>
+                      <a:endParaRPr lang="it-IT" sz="1400"/>
+                    </a:p>
+                  </a:txBody>
+                  <a:tcPr anchor="ctr"/>
+                </a:tc>
+                <a:extLst>
+                  <a:ext uri="{0D108BD9-81ED-4DB2-BD59-A6C34878D82A}">
+                    <a16:rowId xmlns:a16="http://schemas.microsoft.com/office/drawing/2014/main" val="1648143604"/>
+                  </a:ext>
+                </a:extLst>
+              </a:tr>
+              <a:tr h="290476">
+                <a:tc>
+                  <a:txBody>
+                    <a:bodyPr/>
+                    <a:lstStyle/>
+                    <a:p>
+                      <a:r>
+                        <a:rPr lang="it-IT" sz="1400" dirty="0"/>
+                        <a:t>α</a:t>
+                      </a:r>
+                    </a:p>
+                  </a:txBody>
+                  <a:tcPr anchor="ctr"/>
+                </a:tc>
+                <a:tc>
+                  <a:txBody>
+                    <a:bodyPr/>
+                    <a:lstStyle/>
+                    <a:p>
+                      <a:endParaRPr lang="it-IT" sz="1400" dirty="0"/>
+                    </a:p>
+                  </a:txBody>
+                  <a:tcPr anchor="ctr"/>
+                </a:tc>
+                <a:extLst>
+                  <a:ext uri="{0D108BD9-81ED-4DB2-BD59-A6C34878D82A}">
+                    <a16:rowId xmlns:a16="http://schemas.microsoft.com/office/drawing/2014/main" val="1111024146"/>
+                  </a:ext>
+                </a:extLst>
+              </a:tr>
+              <a:tr h="290476">
+                <a:tc>
+                  <a:txBody>
+                    <a:bodyPr/>
+                    <a:lstStyle/>
+                    <a:p>
+                      <a:r>
+                        <a:rPr lang="it-IT" sz="1400" dirty="0"/>
+                        <a:t>Nesterov</a:t>
+                      </a:r>
+                    </a:p>
+                  </a:txBody>
+                  <a:tcPr anchor="ctr"/>
+                </a:tc>
+                <a:tc>
+                  <a:txBody>
+                    <a:bodyPr/>
+                    <a:lstStyle/>
+                    <a:p>
+                      <a:endParaRPr lang="it-IT" sz="1400" dirty="0"/>
+                    </a:p>
+                  </a:txBody>
+                  <a:tcPr anchor="ctr"/>
+                </a:tc>
+                <a:extLst>
+                  <a:ext uri="{0D108BD9-81ED-4DB2-BD59-A6C34878D82A}">
+                    <a16:rowId xmlns:a16="http://schemas.microsoft.com/office/drawing/2014/main" val="2573131355"/>
+                  </a:ext>
+                </a:extLst>
+              </a:tr>
+              <a:tr h="290476">
+                <a:tc>
+                  <a:txBody>
+                    <a:bodyPr/>
+                    <a:lstStyle/>
+                    <a:p>
+                      <a:r>
+                        <a:rPr lang="it-IT" sz="1400" dirty="0" err="1"/>
+                        <a:t>Activation</a:t>
+                      </a:r>
+                      <a:r>
+                        <a:rPr lang="it-IT" sz="1400" dirty="0"/>
+                        <a:t> </a:t>
+                      </a:r>
+                      <a:r>
+                        <a:rPr lang="it-IT" sz="1400" dirty="0" err="1"/>
+                        <a:t>function</a:t>
+                      </a:r>
+                      <a:endParaRPr lang="it-IT" sz="1400" dirty="0"/>
+                    </a:p>
+                  </a:txBody>
+                  <a:tcPr anchor="ctr"/>
+                </a:tc>
+                <a:tc>
+                  <a:txBody>
+                    <a:bodyPr/>
+                    <a:lstStyle/>
+                    <a:p>
+                      <a:endParaRPr lang="it-IT" sz="1400" dirty="0"/>
+                    </a:p>
+                  </a:txBody>
+                  <a:tcPr anchor="ctr"/>
+                </a:tc>
+                <a:extLst>
+                  <a:ext uri="{0D108BD9-81ED-4DB2-BD59-A6C34878D82A}">
+                    <a16:rowId xmlns:a16="http://schemas.microsoft.com/office/drawing/2014/main" val="2799601177"/>
+                  </a:ext>
+                </a:extLst>
+              </a:tr>
+              <a:tr h="290476">
+                <a:tc>
+                  <a:txBody>
+                    <a:bodyPr/>
+                    <a:lstStyle/>
+                    <a:p>
+                      <a:r>
+                        <a:rPr lang="it-IT" sz="1400" dirty="0"/>
+                        <a:t>Architecture</a:t>
+                      </a:r>
+                    </a:p>
+                  </a:txBody>
+                  <a:tcPr anchor="ctr"/>
+                </a:tc>
+                <a:tc>
+                  <a:txBody>
+                    <a:bodyPr/>
+                    <a:lstStyle/>
+                    <a:p>
+                      <a:endParaRPr lang="it-IT" sz="1400" dirty="0"/>
+                    </a:p>
+                  </a:txBody>
+                  <a:tcPr anchor="ctr"/>
+                </a:tc>
+                <a:extLst>
+                  <a:ext uri="{0D108BD9-81ED-4DB2-BD59-A6C34878D82A}">
+                    <a16:rowId xmlns:a16="http://schemas.microsoft.com/office/drawing/2014/main" val="127039440"/>
+                  </a:ext>
+                </a:extLst>
+              </a:tr>
+              <a:tr h="290476">
+                <a:tc>
+                  <a:txBody>
+                    <a:bodyPr/>
+                    <a:lstStyle/>
+                    <a:p>
+                      <a:r>
+                        <a:rPr lang="it-IT" sz="1400" dirty="0"/>
+                        <a:t>Dropout </a:t>
+                      </a:r>
+                      <a:r>
+                        <a:rPr lang="it-IT" sz="1400" dirty="0" err="1"/>
+                        <a:t>hyperp</a:t>
+                      </a:r>
+                      <a:r>
+                        <a:rPr lang="it-IT" sz="1400" dirty="0"/>
+                        <a:t>. </a:t>
+                      </a:r>
+                    </a:p>
+                  </a:txBody>
+                  <a:tcPr anchor="ctr"/>
+                </a:tc>
+                <a:tc>
+                  <a:txBody>
+                    <a:bodyPr/>
+                    <a:lstStyle/>
+                    <a:p>
+                      <a:endParaRPr lang="it-IT" sz="1400" dirty="0"/>
+                    </a:p>
+                  </a:txBody>
+                  <a:tcPr anchor="ctr"/>
+                </a:tc>
+                <a:extLst>
+                  <a:ext uri="{0D108BD9-81ED-4DB2-BD59-A6C34878D82A}">
+                    <a16:rowId xmlns:a16="http://schemas.microsoft.com/office/drawing/2014/main" val="2486866869"/>
+                  </a:ext>
+                </a:extLst>
+              </a:tr>
+              <a:tr h="290476">
+                <a:tc>
+                  <a:txBody>
+                    <a:bodyPr/>
+                    <a:lstStyle/>
+                    <a:p>
+                      <a:r>
+                        <a:rPr lang="it-IT" sz="1400" i="1" dirty="0"/>
+                        <a:t>Other1</a:t>
+                      </a:r>
+                    </a:p>
+                  </a:txBody>
+                  <a:tcPr anchor="ctr"/>
+                </a:tc>
+                <a:tc>
+                  <a:txBody>
+                    <a:bodyPr/>
+                    <a:lstStyle/>
+                    <a:p>
+                      <a:endParaRPr lang="it-IT" sz="1400" dirty="0"/>
+                    </a:p>
+                  </a:txBody>
+                  <a:tcPr anchor="ctr"/>
+                </a:tc>
+                <a:extLst>
+                  <a:ext uri="{0D108BD9-81ED-4DB2-BD59-A6C34878D82A}">
+                    <a16:rowId xmlns:a16="http://schemas.microsoft.com/office/drawing/2014/main" val="3632243018"/>
+                  </a:ext>
+                </a:extLst>
+              </a:tr>
+              <a:tr h="290476">
+                <a:tc>
+                  <a:txBody>
+                    <a:bodyPr/>
+                    <a:lstStyle/>
+                    <a:p>
+                      <a:r>
+                        <a:rPr lang="it-IT" sz="1400" i="1" dirty="0"/>
+                        <a:t>Other2</a:t>
+                      </a:r>
+                    </a:p>
+                  </a:txBody>
+                  <a:tcPr anchor="ctr"/>
+                </a:tc>
+                <a:tc>
+                  <a:txBody>
+                    <a:bodyPr/>
+                    <a:lstStyle/>
+                    <a:p>
+                      <a:endParaRPr lang="it-IT" sz="1400" dirty="0"/>
+                    </a:p>
+                  </a:txBody>
+                  <a:tcPr anchor="ctr"/>
+                </a:tc>
+                <a:extLst>
+                  <a:ext uri="{0D108BD9-81ED-4DB2-BD59-A6C34878D82A}">
+                    <a16:rowId xmlns:a16="http://schemas.microsoft.com/office/drawing/2014/main" val="1940216586"/>
+                  </a:ext>
+                </a:extLst>
+              </a:tr>
+            </a:tbl>
+          </a:graphicData>
+        </a:graphic>
+      </p:graphicFrame>
+      <p:sp>
+        <p:nvSpPr>
+          <p:cNvPr id="8" name="CasellaDiTesto 7">
+            <a:extLst>
+              <a:ext uri="{FF2B5EF4-FFF2-40B4-BE49-F238E27FC236}">
+                <a16:creationId xmlns:a16="http://schemas.microsoft.com/office/drawing/2014/main" id="{F52BA1DF-F72B-638D-1318-03E4102720C5}"/>
+              </a:ext>
+            </a:extLst>
+          </p:cNvPr>
+          <p:cNvSpPr txBox="1"/>
+          <p:nvPr/>
+        </p:nvSpPr>
+        <p:spPr>
+          <a:xfrm>
+            <a:off x="4940501" y="1399945"/>
+            <a:ext cx="3532097" cy="307777"/>
+          </a:xfrm>
+          <a:prstGeom prst="rect">
+            <a:avLst/>
+          </a:prstGeom>
+          <a:noFill/>
+        </p:spPr>
+        <p:txBody>
+          <a:bodyPr wrap="square" rtlCol="0">
+            <a:spAutoFit/>
+          </a:bodyPr>
+          <a:lstStyle/>
+          <a:p>
+            <a:pPr algn="ctr"/>
+            <a:r>
+              <a:rPr lang="it-IT" sz="1400" b="1" dirty="0" err="1"/>
+              <a:t>Table</a:t>
+            </a:r>
+            <a:r>
+              <a:rPr lang="it-IT" sz="1400" b="1" dirty="0"/>
+              <a:t> 4</a:t>
+            </a:r>
+            <a:r>
+              <a:rPr lang="it-IT" sz="1400" dirty="0"/>
+              <a:t>: </a:t>
+            </a:r>
+            <a:r>
+              <a:rPr lang="it-IT" sz="1400" dirty="0" err="1"/>
+              <a:t>Final</a:t>
+            </a:r>
+            <a:r>
+              <a:rPr lang="it-IT" sz="1400" dirty="0"/>
+              <a:t> </a:t>
+            </a:r>
+            <a:r>
+              <a:rPr lang="it-IT" sz="1400" dirty="0" err="1"/>
+              <a:t>model’s</a:t>
+            </a:r>
+            <a:r>
+              <a:rPr lang="it-IT" sz="1400" dirty="0"/>
+              <a:t> </a:t>
+            </a:r>
+            <a:r>
+              <a:rPr lang="it-IT" sz="1400" dirty="0" err="1"/>
+              <a:t>summary</a:t>
+            </a:r>
+            <a:endParaRPr lang="it-IT" sz="1400" dirty="0"/>
+          </a:p>
+        </p:txBody>
+      </p:sp>
+      <p:graphicFrame>
+        <p:nvGraphicFramePr>
+          <p:cNvPr id="11" name="Tabella 10">
+            <a:extLst>
+              <a:ext uri="{FF2B5EF4-FFF2-40B4-BE49-F238E27FC236}">
+                <a16:creationId xmlns:a16="http://schemas.microsoft.com/office/drawing/2014/main" id="{90EE3416-EDB5-199A-8539-2AD3786AEA6B}"/>
+              </a:ext>
+            </a:extLst>
+          </p:cNvPr>
+          <p:cNvGraphicFramePr>
+            <a:graphicFrameLocks noGrp="1"/>
+          </p:cNvGraphicFramePr>
+          <p:nvPr>
+            <p:extLst>
+              <p:ext uri="{D42A27DB-BD31-4B8C-83A1-F6EECF244321}">
+                <p14:modId xmlns:p14="http://schemas.microsoft.com/office/powerpoint/2010/main" val="1871988525"/>
+              </p:ext>
+            </p:extLst>
+          </p:nvPr>
+        </p:nvGraphicFramePr>
+        <p:xfrm>
+          <a:off x="311759" y="4586260"/>
+          <a:ext cx="3836658" cy="304800"/>
+        </p:xfrm>
+        <a:graphic>
+          <a:graphicData uri="http://schemas.openxmlformats.org/drawingml/2006/table">
+            <a:tbl>
+              <a:tblPr bandRow="1">
+                <a:tableStyleId>{0E3FDE45-AF77-4B5C-9715-49D594BDF05E}</a:tableStyleId>
+              </a:tblPr>
+              <a:tblGrid>
+                <a:gridCol w="1278886">
+                  <a:extLst>
+                    <a:ext uri="{9D8B030D-6E8A-4147-A177-3AD203B41FA5}">
+                      <a16:colId xmlns:a16="http://schemas.microsoft.com/office/drawing/2014/main" val="4019716620"/>
+                    </a:ext>
+                  </a:extLst>
+                </a:gridCol>
+                <a:gridCol w="1278886">
+                  <a:extLst>
+                    <a:ext uri="{9D8B030D-6E8A-4147-A177-3AD203B41FA5}">
+                      <a16:colId xmlns:a16="http://schemas.microsoft.com/office/drawing/2014/main" val="1120584406"/>
+                    </a:ext>
+                  </a:extLst>
+                </a:gridCol>
+                <a:gridCol w="1278886">
+                  <a:extLst>
+                    <a:ext uri="{9D8B030D-6E8A-4147-A177-3AD203B41FA5}">
+                      <a16:colId xmlns:a16="http://schemas.microsoft.com/office/drawing/2014/main" val="3881263521"/>
+                    </a:ext>
+                  </a:extLst>
+                </a:gridCol>
+              </a:tblGrid>
+              <a:tr h="294067">
+                <a:tc>
+                  <a:txBody>
+                    <a:bodyPr/>
+                    <a:lstStyle/>
+                    <a:p>
+                      <a:r>
+                        <a:rPr lang="it-IT" sz="1400" dirty="0"/>
+                        <a:t>TR:</a:t>
+                      </a:r>
+                    </a:p>
+                  </a:txBody>
+                  <a:tcPr/>
+                </a:tc>
+                <a:tc>
+                  <a:txBody>
+                    <a:bodyPr/>
+                    <a:lstStyle/>
+                    <a:p>
+                      <a:r>
+                        <a:rPr lang="it-IT" sz="1400" dirty="0"/>
+                        <a:t>VL:</a:t>
+                      </a:r>
+                    </a:p>
+                  </a:txBody>
+                  <a:tcPr/>
+                </a:tc>
+                <a:tc>
+                  <a:txBody>
+                    <a:bodyPr/>
+                    <a:lstStyle/>
+                    <a:p>
+                      <a:r>
+                        <a:rPr lang="it-IT" sz="1400" dirty="0"/>
+                        <a:t>TS:</a:t>
+                      </a:r>
+                    </a:p>
+                  </a:txBody>
+                  <a:tcPr/>
+                </a:tc>
+                <a:extLst>
+                  <a:ext uri="{0D108BD9-81ED-4DB2-BD59-A6C34878D82A}">
+                    <a16:rowId xmlns:a16="http://schemas.microsoft.com/office/drawing/2014/main" val="1134138711"/>
+                  </a:ext>
+                </a:extLst>
+              </a:tr>
+            </a:tbl>
+          </a:graphicData>
+        </a:graphic>
+      </p:graphicFrame>
+      <p:sp>
+        <p:nvSpPr>
+          <p:cNvPr id="13" name="CasellaDiTesto 12">
+            <a:extLst>
+              <a:ext uri="{FF2B5EF4-FFF2-40B4-BE49-F238E27FC236}">
+                <a16:creationId xmlns:a16="http://schemas.microsoft.com/office/drawing/2014/main" id="{464C7860-14BA-5467-A384-1E8512A6D36C}"/>
+              </a:ext>
+            </a:extLst>
+          </p:cNvPr>
+          <p:cNvSpPr txBox="1"/>
+          <p:nvPr/>
+        </p:nvSpPr>
+        <p:spPr>
+          <a:xfrm>
+            <a:off x="311760" y="4275237"/>
+            <a:ext cx="3836657" cy="307777"/>
+          </a:xfrm>
+          <a:prstGeom prst="rect">
+            <a:avLst/>
+          </a:prstGeom>
+          <a:noFill/>
+        </p:spPr>
+        <p:txBody>
+          <a:bodyPr wrap="square" rtlCol="0">
+            <a:spAutoFit/>
+          </a:bodyPr>
+          <a:lstStyle/>
+          <a:p>
+            <a:pPr marL="0" marR="0" indent="0" algn="ctr" rtl="0" eaLnBrk="1" fontAlgn="auto" latinLnBrk="0" hangingPunct="1">
+              <a:spcBef>
+                <a:spcPts val="0"/>
+              </a:spcBef>
+              <a:spcAft>
+                <a:spcPts val="0"/>
+              </a:spcAft>
+            </a:pPr>
+            <a:r>
+              <a:rPr lang="it-IT" sz="1400" b="1" kern="1200" dirty="0" err="1">
+                <a:solidFill>
+                  <a:srgbClr val="000000"/>
+                </a:solidFill>
+                <a:effectLst/>
+                <a:latin typeface="Arial" panose="020B0604020202020204" pitchFamily="34" charset="0"/>
+                <a:ea typeface="DejaVu Sans" panose="020B0603030804020204" pitchFamily="34" charset="0"/>
+                <a:cs typeface="DejaVu Sans" panose="020B0603030804020204" pitchFamily="34" charset="0"/>
+              </a:rPr>
+              <a:t>Table</a:t>
+            </a:r>
+            <a:r>
+              <a:rPr lang="it-IT" sz="1400" b="1" kern="1200" dirty="0">
+                <a:solidFill>
+                  <a:srgbClr val="000000"/>
+                </a:solidFill>
+                <a:effectLst/>
+                <a:latin typeface="Arial" panose="020B0604020202020204" pitchFamily="34" charset="0"/>
+                <a:ea typeface="DejaVu Sans" panose="020B0603030804020204" pitchFamily="34" charset="0"/>
+                <a:cs typeface="DejaVu Sans" panose="020B0603030804020204" pitchFamily="34" charset="0"/>
+              </a:rPr>
+              <a:t> 5</a:t>
+            </a:r>
+            <a:r>
+              <a:rPr lang="it-IT" sz="1400" kern="1200" dirty="0">
+                <a:solidFill>
+                  <a:srgbClr val="000000"/>
+                </a:solidFill>
+                <a:effectLst/>
+                <a:latin typeface="Arial" panose="020B0604020202020204" pitchFamily="34" charset="0"/>
+                <a:ea typeface="DejaVu Sans" panose="020B0603030804020204" pitchFamily="34" charset="0"/>
+                <a:cs typeface="DejaVu Sans" panose="020B0603030804020204" pitchFamily="34" charset="0"/>
+              </a:rPr>
+              <a:t>: </a:t>
+            </a:r>
+            <a:r>
+              <a:rPr lang="it-IT" sz="1400" kern="1200" dirty="0" err="1">
+                <a:solidFill>
+                  <a:srgbClr val="000000"/>
+                </a:solidFill>
+                <a:effectLst/>
+                <a:latin typeface="Arial" panose="020B0604020202020204" pitchFamily="34" charset="0"/>
+                <a:ea typeface="DejaVu Sans" panose="020B0603030804020204" pitchFamily="34" charset="0"/>
+                <a:cs typeface="DejaVu Sans" panose="020B0603030804020204" pitchFamily="34" charset="0"/>
+              </a:rPr>
+              <a:t>Final</a:t>
+            </a:r>
+            <a:r>
+              <a:rPr lang="it-IT" sz="1400" kern="1200" dirty="0">
+                <a:solidFill>
+                  <a:srgbClr val="000000"/>
+                </a:solidFill>
+                <a:effectLst/>
+                <a:latin typeface="Arial" panose="020B0604020202020204" pitchFamily="34" charset="0"/>
+                <a:ea typeface="DejaVu Sans" panose="020B0603030804020204" pitchFamily="34" charset="0"/>
+                <a:cs typeface="DejaVu Sans" panose="020B0603030804020204" pitchFamily="34" charset="0"/>
+              </a:rPr>
+              <a:t> </a:t>
+            </a:r>
+            <a:r>
+              <a:rPr lang="it-IT" sz="1400" kern="1200" dirty="0" err="1">
+                <a:solidFill>
+                  <a:srgbClr val="000000"/>
+                </a:solidFill>
+                <a:effectLst/>
+                <a:latin typeface="Arial" panose="020B0604020202020204" pitchFamily="34" charset="0"/>
+                <a:ea typeface="DejaVu Sans" panose="020B0603030804020204" pitchFamily="34" charset="0"/>
+                <a:cs typeface="DejaVu Sans" panose="020B0603030804020204" pitchFamily="34" charset="0"/>
+              </a:rPr>
+              <a:t>model’s</a:t>
+            </a:r>
+            <a:r>
+              <a:rPr lang="it-IT" sz="1400" kern="1200" dirty="0">
+                <a:solidFill>
+                  <a:srgbClr val="000000"/>
+                </a:solidFill>
+                <a:effectLst/>
+                <a:latin typeface="Arial" panose="020B0604020202020204" pitchFamily="34" charset="0"/>
+                <a:ea typeface="DejaVu Sans" panose="020B0603030804020204" pitchFamily="34" charset="0"/>
+                <a:cs typeface="DejaVu Sans" panose="020B0603030804020204" pitchFamily="34" charset="0"/>
+              </a:rPr>
+              <a:t> MEE on the datasets</a:t>
+            </a:r>
+            <a:endParaRPr lang="it-IT" sz="1100" dirty="0">
+              <a:effectLst/>
+            </a:endParaRPr>
+          </a:p>
+        </p:txBody>
+      </p:sp>
     </p:spTree>
+    <p:extLst>
+      <p:ext uri="{BB962C8B-B14F-4D97-AF65-F5344CB8AC3E}">
+        <p14:creationId xmlns:p14="http://schemas.microsoft.com/office/powerpoint/2010/main" val="479709121"/>
+      </p:ext>
+    </p:extLst>
   </p:cSld>
   <p:clrMapOvr>
     <a:masterClrMapping/>
@@ -7446,7 +8509,7 @@
       </p:grpSpPr>
       <p:sp>
         <p:nvSpPr>
-          <p:cNvPr id="114" name="PlaceHolder 1"/>
+          <p:cNvPr id="111" name="PlaceHolder 1"/>
           <p:cNvSpPr>
             <a:spLocks noGrp="1"/>
           </p:cNvSpPr>
@@ -7490,7 +8553,7 @@
                 <a:latin typeface="Arial"/>
                 <a:ea typeface="Arial"/>
               </a:rPr>
-              <a:t>Conclusions</a:t>
+              <a:t>Discussion (may be more slides)</a:t>
             </a:r>
             <a:endParaRPr lang="it-IT" sz="2400" b="0" strike="noStrike" spc="-1" dirty="0">
               <a:solidFill>
@@ -7503,7 +8566,7 @@
       </p:sp>
       <p:sp>
         <p:nvSpPr>
-          <p:cNvPr id="115" name="PlaceHolder 2"/>
+          <p:cNvPr id="112" name="PlaceHolder 2"/>
           <p:cNvSpPr>
             <a:spLocks noGrp="1"/>
           </p:cNvSpPr>
@@ -7534,25 +8597,22 @@
               <a:lnSpc>
                 <a:spcPct val="115000"/>
               </a:lnSpc>
-              <a:spcBef>
-                <a:spcPts val="1199"/>
-              </a:spcBef>
               <a:buNone/>
               <a:tabLst>
                 <a:tab pos="0" algn="l"/>
               </a:tabLst>
             </a:pPr>
             <a:r>
-              <a:rPr lang="it" sz="1800" b="0" strike="noStrike" spc="-1">
+              <a:rPr lang="it" sz="1800" b="0" strike="noStrike" spc="-1" dirty="0">
                 <a:solidFill>
                   <a:srgbClr val="000000"/>
                 </a:solidFill>
                 <a:latin typeface="Arial"/>
                 <a:ea typeface="Arial"/>
               </a:rPr>
-              <a:t>What you have drawn and what you learned (in short)</a:t>
-            </a:r>
-            <a:endParaRPr lang="it-IT" sz="1800" b="0" strike="noStrike" spc="-1">
+              <a:t>Discuss whether any proposed techniques or novelties  improved or not the results, in terms of any performance (efficacy, efficiency, …) </a:t>
+            </a:r>
+            <a:endParaRPr lang="it-IT" sz="1800" b="0" strike="noStrike" spc="-1" dirty="0">
               <a:solidFill>
                 <a:srgbClr val="000000"/>
               </a:solidFill>
@@ -7560,29 +8620,33 @@
             </a:endParaRPr>
           </a:p>
           <a:p>
-            <a:pPr>
+            <a:pPr marL="457200" indent="-317520">
               <a:lnSpc>
                 <a:spcPct val="115000"/>
               </a:lnSpc>
               <a:spcBef>
                 <a:spcPts val="1199"/>
               </a:spcBef>
-              <a:buNone/>
+              <a:buClr>
+                <a:srgbClr val="000000"/>
+              </a:buClr>
+              <a:buFont typeface="Calibri"/>
+              <a:buChar char="●"/>
               <a:tabLst>
                 <a:tab pos="0" algn="l"/>
               </a:tabLst>
             </a:pPr>
             <a:r>
-              <a:rPr lang="it" sz="1800" b="0" strike="noStrike" spc="-1">
-                <a:solidFill>
-                  <a:srgbClr val="000000"/>
-                </a:solidFill>
-                <a:latin typeface="Arial"/>
-                <a:ea typeface="Arial"/>
-              </a:rPr>
-              <a:t>Blind Test Results: name of the result files and your nickname</a:t>
-            </a:r>
-            <a:endParaRPr lang="it-IT" sz="1800" b="0" strike="noStrike" spc="-1">
+              <a:rPr lang="it" sz="1400" b="0" strike="noStrike" spc="-1" dirty="0">
+                <a:solidFill>
+                  <a:srgbClr val="000000"/>
+                </a:solidFill>
+                <a:latin typeface="Calibri"/>
+                <a:ea typeface="Calibri"/>
+              </a:rPr>
+              <a:t>Don’t forget to empathize the novelties that you introduced in your model (prj A or B) or used advanced techniques (prj B) w.r.t. to the results and/or any significant/critical analyses and any interesting finding/insight</a:t>
+            </a:r>
+            <a:endParaRPr lang="it-IT" sz="1400" b="0" strike="noStrike" spc="-1" dirty="0">
               <a:solidFill>
                 <a:srgbClr val="000000"/>
               </a:solidFill>
@@ -7590,13 +8654,41 @@
             </a:endParaRPr>
           </a:p>
           <a:p>
+            <a:pPr marL="457200" indent="-317520">
+              <a:lnSpc>
+                <a:spcPct val="115000"/>
+              </a:lnSpc>
+              <a:buClr>
+                <a:srgbClr val="000000"/>
+              </a:buClr>
+              <a:buFont typeface="Calibri"/>
+              <a:buChar char="●"/>
+              <a:tabLst>
+                <a:tab pos="0" algn="l"/>
+              </a:tabLst>
+            </a:pPr>
+            <a:r>
+              <a:rPr lang="it" sz="1400" b="0" strike="noStrike" spc="-1" dirty="0">
+                <a:solidFill>
+                  <a:srgbClr val="000000"/>
+                </a:solidFill>
+                <a:latin typeface="Calibri"/>
+                <a:ea typeface="Calibri"/>
+              </a:rPr>
+              <a:t>I.e: don’t forget a “Discussion/Analysis” answering “what did you learn?” on the Models/Hyperparameters/Results/Efficacy/Efficiency, selecting/highlighting what is more significant in your opinion (time and space constraints helps!)</a:t>
+            </a:r>
+            <a:endParaRPr lang="it-IT" sz="1400" b="0" strike="noStrike" spc="-1" dirty="0">
+              <a:solidFill>
+                <a:srgbClr val="000000"/>
+              </a:solidFill>
+              <a:latin typeface="Arial"/>
+            </a:endParaRPr>
+          </a:p>
+          <a:p>
             <a:pPr>
               <a:lnSpc>
                 <a:spcPct val="115000"/>
               </a:lnSpc>
-              <a:spcBef>
-                <a:spcPts val="1199"/>
-              </a:spcBef>
               <a:spcAft>
                 <a:spcPts val="1199"/>
               </a:spcAft>
@@ -7605,7 +8697,7 @@
                 <a:tab pos="0" algn="l"/>
               </a:tabLst>
             </a:pPr>
-            <a:endParaRPr lang="it-IT" sz="1800" b="0" strike="noStrike" spc="-1">
+            <a:endParaRPr lang="it-IT" sz="1400" b="0" strike="noStrike" spc="-1" dirty="0">
               <a:solidFill>
                 <a:srgbClr val="000000"/>
               </a:solidFill>
@@ -7616,12 +8708,12 @@
       </p:sp>
       <p:sp>
         <p:nvSpPr>
-          <p:cNvPr id="116" name="PlaceHolder 3"/>
+          <p:cNvPr id="113" name="PlaceHolder 3"/>
           <p:cNvSpPr>
             <a:spLocks noGrp="1"/>
           </p:cNvSpPr>
           <p:nvPr>
-            <p:ph type="sldNum" idx="12"/>
+            <p:ph type="sldNum" idx="11"/>
           </p:nvPr>
         </p:nvSpPr>
         <p:spPr>
@@ -7669,7 +8761,7 @@
                 <a:tab pos="0" algn="l"/>
               </a:tabLst>
             </a:pPr>
-            <a:fld id="{0290D2CD-F684-4A0F-9162-8897609F2911}" type="slidenum">
+            <a:fld id="{EB566EBC-D211-4A49-9CB5-B894905094F3}" type="slidenum">
               <a:rPr lang="it" sz="1000" b="0" strike="noStrike" spc="-1">
                 <a:solidFill>
                   <a:srgbClr val="595959"/>
@@ -7712,7 +8804,7 @@
       </p:grpSpPr>
       <p:sp>
         <p:nvSpPr>
-          <p:cNvPr id="117" name="PlaceHolder 1"/>
+          <p:cNvPr id="114" name="PlaceHolder 1"/>
           <p:cNvSpPr>
             <a:spLocks noGrp="1"/>
           </p:cNvSpPr>
@@ -7756,19 +8848,9 @@
                 <a:latin typeface="Arial"/>
                 <a:ea typeface="Arial"/>
               </a:rPr>
-              <a:t>Bibliography - 1</a:t>
-            </a:r>
-            <a:r>
-              <a:rPr lang="it" sz="2800" b="0" strike="noStrike" spc="-1" dirty="0">
-                <a:solidFill>
-                  <a:srgbClr val="000000"/>
-                </a:solidFill>
-                <a:latin typeface="Arial"/>
-                <a:ea typeface="Arial"/>
-              </a:rPr>
-              <a:t> </a:t>
-            </a:r>
-            <a:endParaRPr lang="it-IT" sz="2800" b="0" strike="noStrike" spc="-1" dirty="0">
+              <a:t>Conclusions</a:t>
+            </a:r>
+            <a:endParaRPr lang="it-IT" sz="2400" b="0" strike="noStrike" spc="-1" dirty="0">
               <a:solidFill>
                 <a:srgbClr val="000000"/>
               </a:solidFill>
@@ -7779,7 +8861,7 @@
       </p:sp>
       <p:sp>
         <p:nvSpPr>
-          <p:cNvPr id="118" name="PlaceHolder 2"/>
+          <p:cNvPr id="115" name="PlaceHolder 2"/>
           <p:cNvSpPr>
             <a:spLocks noGrp="1"/>
           </p:cNvSpPr>
@@ -7813,68 +8895,22 @@
               <a:spcBef>
                 <a:spcPts val="1199"/>
               </a:spcBef>
-              <a:spcAft>
-                <a:spcPts val="1199"/>
-              </a:spcAft>
+              <a:buNone/>
               <a:tabLst>
                 <a:tab pos="0" algn="l"/>
               </a:tabLst>
             </a:pPr>
             <a:r>
-              <a:rPr lang="it-IT" sz="1600" spc="-1" dirty="0" err="1">
-                <a:solidFill>
-                  <a:srgbClr val="000000"/>
-                </a:solidFill>
-                <a:latin typeface="Arial"/>
-              </a:rPr>
-              <a:t>Main</a:t>
-            </a:r>
-            <a:r>
-              <a:rPr lang="it-IT" sz="1600" spc="-1" dirty="0">
-                <a:solidFill>
-                  <a:srgbClr val="000000"/>
-                </a:solidFill>
-                <a:latin typeface="Arial"/>
-              </a:rPr>
-              <a:t> libraries and software tools </a:t>
-            </a:r>
-            <a:r>
-              <a:rPr lang="it-IT" sz="1600" spc="-1" dirty="0" err="1">
-                <a:solidFill>
-                  <a:srgbClr val="000000"/>
-                </a:solidFill>
-                <a:latin typeface="Arial"/>
-              </a:rPr>
-              <a:t>used</a:t>
-            </a:r>
-            <a:r>
-              <a:rPr lang="it-IT" sz="1600" spc="-1" dirty="0">
-                <a:solidFill>
-                  <a:srgbClr val="000000"/>
-                </a:solidFill>
-                <a:latin typeface="Arial"/>
-              </a:rPr>
-              <a:t> for </a:t>
-            </a:r>
-            <a:r>
-              <a:rPr lang="it-IT" sz="1600" spc="-1" dirty="0" err="1">
-                <a:solidFill>
-                  <a:srgbClr val="000000"/>
-                </a:solidFill>
-                <a:latin typeface="Arial"/>
-              </a:rPr>
-              <a:t>this</a:t>
-            </a:r>
-            <a:r>
-              <a:rPr lang="it-IT" sz="1600" spc="-1" dirty="0">
-                <a:solidFill>
-                  <a:srgbClr val="000000"/>
-                </a:solidFill>
-                <a:latin typeface="Arial"/>
-              </a:rPr>
-              <a:t> project:</a:t>
-            </a:r>
-            <a:endParaRPr lang="it-IT" sz="2000" spc="-1" dirty="0">
+              <a:rPr lang="it" sz="1800" b="0" strike="noStrike" spc="-1">
+                <a:solidFill>
+                  <a:srgbClr val="000000"/>
+                </a:solidFill>
+                <a:latin typeface="Arial"/>
+                <a:ea typeface="Arial"/>
+              </a:rPr>
+              <a:t>What you have drawn and what you learned (in short)</a:t>
+            </a:r>
+            <a:endParaRPr lang="it-IT" sz="1800" b="0" strike="noStrike" spc="-1">
               <a:solidFill>
                 <a:srgbClr val="000000"/>
               </a:solidFill>
@@ -7882,7 +8918,37 @@
             </a:endParaRPr>
           </a:p>
           <a:p>
-            <a:pPr marL="342900" indent="-342900">
+            <a:pPr>
+              <a:lnSpc>
+                <a:spcPct val="115000"/>
+              </a:lnSpc>
+              <a:spcBef>
+                <a:spcPts val="1199"/>
+              </a:spcBef>
+              <a:buNone/>
+              <a:tabLst>
+                <a:tab pos="0" algn="l"/>
+              </a:tabLst>
+            </a:pPr>
+            <a:r>
+              <a:rPr lang="it" sz="1800" b="0" strike="noStrike" spc="-1">
+                <a:solidFill>
+                  <a:srgbClr val="000000"/>
+                </a:solidFill>
+                <a:latin typeface="Arial"/>
+                <a:ea typeface="Arial"/>
+              </a:rPr>
+              <a:t>Blind Test Results: name of the result files and your nickname</a:t>
+            </a:r>
+            <a:endParaRPr lang="it-IT" sz="1800" b="0" strike="noStrike" spc="-1">
+              <a:solidFill>
+                <a:srgbClr val="000000"/>
+              </a:solidFill>
+              <a:latin typeface="Arial"/>
+            </a:endParaRPr>
+          </a:p>
+          <a:p>
+            <a:pPr>
               <a:lnSpc>
                 <a:spcPct val="115000"/>
               </a:lnSpc>
@@ -7892,547 +8958,28 @@
               <a:spcAft>
                 <a:spcPts val="1199"/>
               </a:spcAft>
-              <a:buFont typeface="+mj-lt"/>
-              <a:buAutoNum type="arabicPeriod"/>
+              <a:buNone/>
               <a:tabLst>
                 <a:tab pos="0" algn="l"/>
               </a:tabLst>
             </a:pPr>
-            <a:r>
-              <a:rPr lang="it-IT" sz="1400" spc="-1" dirty="0">
-                <a:solidFill>
-                  <a:srgbClr val="000000"/>
-                </a:solidFill>
-                <a:latin typeface="Arial"/>
-              </a:rPr>
-              <a:t>F. </a:t>
-            </a:r>
-            <a:r>
-              <a:rPr lang="it-IT" sz="1400" spc="-1" dirty="0" err="1">
-                <a:solidFill>
-                  <a:srgbClr val="000000"/>
-                </a:solidFill>
-                <a:latin typeface="Arial"/>
-              </a:rPr>
-              <a:t>Chollet</a:t>
-            </a:r>
-            <a:r>
-              <a:rPr lang="it-IT" sz="1400" spc="-1" dirty="0">
-                <a:solidFill>
-                  <a:srgbClr val="000000"/>
-                </a:solidFill>
-                <a:latin typeface="Arial"/>
-              </a:rPr>
-              <a:t>, </a:t>
-            </a:r>
-            <a:r>
-              <a:rPr lang="it-IT" sz="1400" i="1" spc="-1" dirty="0" err="1">
-                <a:solidFill>
-                  <a:srgbClr val="000000"/>
-                </a:solidFill>
-                <a:latin typeface="Arial"/>
-              </a:rPr>
-              <a:t>Keras</a:t>
-            </a:r>
-            <a:r>
-              <a:rPr lang="it-IT" sz="1400" spc="-1" dirty="0">
-                <a:solidFill>
-                  <a:srgbClr val="000000"/>
-                </a:solidFill>
-                <a:latin typeface="Arial"/>
-              </a:rPr>
-              <a:t>, GitHub, </a:t>
-            </a:r>
-            <a:r>
-              <a:rPr lang="it-IT" sz="1400" spc="-1" dirty="0">
-                <a:solidFill>
-                  <a:srgbClr val="000000"/>
-                </a:solidFill>
-                <a:latin typeface="Arial"/>
-                <a:hlinkClick r:id="rId2"/>
-              </a:rPr>
-              <a:t>GitHub Repository</a:t>
-            </a:r>
-            <a:r>
-              <a:rPr lang="it-IT" sz="1400" spc="-1" dirty="0">
-                <a:solidFill>
-                  <a:srgbClr val="000000"/>
-                </a:solidFill>
-                <a:latin typeface="Arial"/>
-              </a:rPr>
-              <a:t>, (2015) </a:t>
-            </a:r>
-            <a:r>
-              <a:rPr lang="it-IT" sz="1400" spc="-1" dirty="0" err="1">
-                <a:solidFill>
-                  <a:srgbClr val="000000"/>
-                </a:solidFill>
-                <a:latin typeface="Arial"/>
-              </a:rPr>
-              <a:t>version</a:t>
-            </a:r>
-            <a:r>
-              <a:rPr lang="it-IT" sz="1400" spc="-1" dirty="0">
-                <a:solidFill>
-                  <a:srgbClr val="000000"/>
-                </a:solidFill>
-                <a:latin typeface="Arial"/>
-              </a:rPr>
-              <a:t> </a:t>
-            </a:r>
-            <a:r>
-              <a:rPr lang="it-IT" sz="1400" spc="-1" dirty="0">
-                <a:solidFill>
-                  <a:srgbClr val="000000"/>
-                </a:solidFill>
-                <a:latin typeface="Arial"/>
-                <a:hlinkClick r:id="rId3"/>
-              </a:rPr>
-              <a:t>3.0.2</a:t>
-            </a:r>
-            <a:endParaRPr lang="it-IT" sz="1400" spc="-1" dirty="0">
+            <a:endParaRPr lang="it-IT" sz="1800" b="0" strike="noStrike" spc="-1">
               <a:solidFill>
                 <a:srgbClr val="000000"/>
               </a:solidFill>
               <a:latin typeface="Arial"/>
             </a:endParaRPr>
           </a:p>
-          <a:p>
-            <a:pPr marL="342900" indent="-342900">
-              <a:lnSpc>
-                <a:spcPct val="115000"/>
-              </a:lnSpc>
-              <a:spcBef>
-                <a:spcPts val="1199"/>
-              </a:spcBef>
-              <a:spcAft>
-                <a:spcPts val="1199"/>
-              </a:spcAft>
-              <a:buFont typeface="+mj-lt"/>
-              <a:buAutoNum type="arabicPeriod"/>
-              <a:tabLst>
-                <a:tab pos="0" algn="l"/>
-              </a:tabLst>
-            </a:pPr>
-            <a:r>
-              <a:rPr lang="it-IT" sz="1400" spc="-1" dirty="0">
-                <a:solidFill>
-                  <a:srgbClr val="000000"/>
-                </a:solidFill>
-                <a:latin typeface="Arial"/>
-              </a:rPr>
-              <a:t>M. Abadi, A. </a:t>
-            </a:r>
-            <a:r>
-              <a:rPr lang="it-IT" sz="1400" spc="-1" dirty="0" err="1">
-                <a:solidFill>
-                  <a:srgbClr val="000000"/>
-                </a:solidFill>
-                <a:latin typeface="Arial"/>
-              </a:rPr>
-              <a:t>Agarwal</a:t>
-            </a:r>
-            <a:r>
-              <a:rPr lang="it-IT" sz="1400" spc="-1" dirty="0">
-                <a:solidFill>
-                  <a:srgbClr val="000000"/>
-                </a:solidFill>
-                <a:latin typeface="Arial"/>
-              </a:rPr>
-              <a:t> et al., 2015, </a:t>
-            </a:r>
-            <a:r>
-              <a:rPr lang="it-IT" sz="1400" i="1" spc="-1" dirty="0" err="1">
-                <a:solidFill>
-                  <a:srgbClr val="000000"/>
-                </a:solidFill>
-                <a:latin typeface="Arial"/>
-              </a:rPr>
-              <a:t>Ten</a:t>
-            </a:r>
-            <a:r>
-              <a:rPr kumimoji="0" lang="it-IT" altLang="it-IT" sz="1400" b="0" i="1" u="none" strike="noStrike" cap="none" normalizeH="0" baseline="0" dirty="0" err="1">
-                <a:ln>
-                  <a:noFill/>
-                </a:ln>
-                <a:solidFill>
-                  <a:schemeClr val="tx1"/>
-                </a:solidFill>
-                <a:effectLst/>
-                <a:latin typeface="Arial Unicode MS"/>
-              </a:rPr>
-              <a:t>sorFlow</a:t>
-            </a:r>
-            <a:r>
-              <a:rPr kumimoji="0" lang="it-IT" altLang="it-IT" sz="1400" b="0" i="1" u="none" strike="noStrike" cap="none" normalizeH="0" baseline="0" dirty="0">
-                <a:ln>
-                  <a:noFill/>
-                </a:ln>
-                <a:solidFill>
-                  <a:schemeClr val="tx1"/>
-                </a:solidFill>
-                <a:effectLst/>
-                <a:latin typeface="Arial Unicode MS"/>
-              </a:rPr>
-              <a:t>: Large-scale machine learning on </a:t>
-            </a:r>
-            <a:r>
-              <a:rPr kumimoji="0" lang="it-IT" altLang="it-IT" sz="1400" b="0" i="1" u="none" strike="noStrike" cap="none" normalizeH="0" baseline="0" dirty="0" err="1">
-                <a:ln>
-                  <a:noFill/>
-                </a:ln>
-                <a:solidFill>
-                  <a:schemeClr val="tx1"/>
-                </a:solidFill>
-                <a:effectLst/>
-                <a:latin typeface="Arial Unicode MS"/>
-              </a:rPr>
-              <a:t>heterogeneous</a:t>
-            </a:r>
-            <a:r>
-              <a:rPr kumimoji="0" lang="it-IT" altLang="it-IT" sz="1400" b="0" i="1" u="none" strike="noStrike" cap="none" normalizeH="0" baseline="0" dirty="0">
-                <a:ln>
-                  <a:noFill/>
-                </a:ln>
-                <a:solidFill>
-                  <a:schemeClr val="tx1"/>
-                </a:solidFill>
-                <a:effectLst/>
-                <a:latin typeface="Arial Unicode MS"/>
-              </a:rPr>
-              <a:t> systems</a:t>
-            </a:r>
-            <a:r>
-              <a:rPr kumimoji="0" lang="it-IT" altLang="it-IT" sz="1400" b="0" i="0" u="none" strike="noStrike" cap="none" normalizeH="0" baseline="0" dirty="0">
-                <a:ln>
-                  <a:noFill/>
-                </a:ln>
-                <a:solidFill>
-                  <a:schemeClr val="tx1"/>
-                </a:solidFill>
-                <a:effectLst/>
-                <a:latin typeface="Arial Unicode MS"/>
-              </a:rPr>
-              <a:t>. </a:t>
-            </a:r>
-            <a:r>
-              <a:rPr kumimoji="0" lang="it-IT" altLang="it-IT" sz="1400" b="0" i="0" u="none" strike="noStrike" cap="none" normalizeH="0" baseline="0" dirty="0">
-                <a:ln>
-                  <a:noFill/>
-                </a:ln>
-                <a:solidFill>
-                  <a:schemeClr val="tx1"/>
-                </a:solidFill>
-                <a:effectLst/>
-                <a:latin typeface="Arial Unicode MS"/>
-                <a:hlinkClick r:id="rId4"/>
-              </a:rPr>
-              <a:t>www.tensorflow.org</a:t>
-            </a:r>
-            <a:endParaRPr lang="it-IT" sz="1400" spc="-1" dirty="0">
-              <a:solidFill>
-                <a:srgbClr val="000000"/>
-              </a:solidFill>
-              <a:latin typeface="Arial"/>
-            </a:endParaRPr>
-          </a:p>
-          <a:p>
-            <a:pPr marL="342900" indent="-342900">
-              <a:lnSpc>
-                <a:spcPct val="115000"/>
-              </a:lnSpc>
-              <a:spcBef>
-                <a:spcPts val="1199"/>
-              </a:spcBef>
-              <a:spcAft>
-                <a:spcPts val="1199"/>
-              </a:spcAft>
-              <a:buFont typeface="+mj-lt"/>
-              <a:buAutoNum type="arabicPeriod"/>
-              <a:tabLst>
-                <a:tab pos="0" algn="l"/>
-              </a:tabLst>
-            </a:pPr>
-            <a:r>
-              <a:rPr lang="it-IT" sz="1400" spc="-1" dirty="0">
-                <a:solidFill>
-                  <a:srgbClr val="000000"/>
-                </a:solidFill>
-                <a:latin typeface="Arial"/>
-              </a:rPr>
-              <a:t>F. </a:t>
-            </a:r>
-            <a:r>
-              <a:rPr lang="it-IT" sz="1400" spc="-1" dirty="0" err="1">
-                <a:solidFill>
-                  <a:srgbClr val="000000"/>
-                </a:solidFill>
-                <a:latin typeface="Arial"/>
-              </a:rPr>
-              <a:t>Pedergosa</a:t>
-            </a:r>
-            <a:r>
-              <a:rPr lang="it-IT" sz="1400" spc="-1" dirty="0">
-                <a:solidFill>
-                  <a:srgbClr val="000000"/>
-                </a:solidFill>
-                <a:latin typeface="Arial"/>
-              </a:rPr>
-              <a:t>, G. </a:t>
-            </a:r>
-            <a:r>
-              <a:rPr lang="it-IT" sz="1400" spc="-1" dirty="0" err="1">
-                <a:solidFill>
-                  <a:srgbClr val="000000"/>
-                </a:solidFill>
-                <a:latin typeface="Arial"/>
-              </a:rPr>
-              <a:t>Varoquaux</a:t>
-            </a:r>
-            <a:r>
-              <a:rPr lang="it-IT" sz="1400" spc="-1" dirty="0">
-                <a:solidFill>
-                  <a:srgbClr val="000000"/>
-                </a:solidFill>
-                <a:latin typeface="Arial"/>
-              </a:rPr>
-              <a:t> et al, </a:t>
-            </a:r>
-            <a:r>
-              <a:rPr lang="it-IT" sz="1400" i="1" spc="-1" dirty="0" err="1">
-                <a:solidFill>
-                  <a:srgbClr val="000000"/>
-                </a:solidFill>
-                <a:latin typeface="Arial"/>
-              </a:rPr>
-              <a:t>Scikit-learn</a:t>
-            </a:r>
-            <a:r>
-              <a:rPr lang="it-IT" sz="1400" i="1" spc="-1" dirty="0">
-                <a:solidFill>
-                  <a:srgbClr val="000000"/>
-                </a:solidFill>
-                <a:latin typeface="Arial"/>
-              </a:rPr>
-              <a:t>: Machine Learning in Python</a:t>
-            </a:r>
-            <a:r>
-              <a:rPr lang="it-IT" sz="1400" spc="-1" dirty="0">
-                <a:solidFill>
-                  <a:srgbClr val="000000"/>
-                </a:solidFill>
-                <a:latin typeface="Arial"/>
-              </a:rPr>
-              <a:t>, JMLR, 12(</a:t>
-            </a:r>
-            <a:r>
-              <a:rPr lang="it-IT" sz="1400" spc="-1" dirty="0" err="1">
-                <a:solidFill>
-                  <a:srgbClr val="000000"/>
-                </a:solidFill>
-                <a:latin typeface="Arial"/>
-              </a:rPr>
-              <a:t>Oct</a:t>
-            </a:r>
-            <a:r>
-              <a:rPr lang="it-IT" sz="1400" spc="-1" dirty="0">
-                <a:solidFill>
-                  <a:srgbClr val="000000"/>
-                </a:solidFill>
-                <a:latin typeface="Arial"/>
-              </a:rPr>
-              <a:t>), (2011), pp.2825-2830 </a:t>
-            </a:r>
-          </a:p>
-          <a:p>
-            <a:pPr marL="342900" indent="-342900">
-              <a:lnSpc>
-                <a:spcPct val="115000"/>
-              </a:lnSpc>
-              <a:spcBef>
-                <a:spcPts val="1199"/>
-              </a:spcBef>
-              <a:spcAft>
-                <a:spcPts val="1199"/>
-              </a:spcAft>
-              <a:buFont typeface="+mj-lt"/>
-              <a:buAutoNum type="arabicPeriod"/>
-              <a:tabLst>
-                <a:tab pos="0" algn="l"/>
-              </a:tabLst>
-            </a:pPr>
-            <a:r>
-              <a:rPr lang="it-IT" sz="1400" spc="-1" dirty="0">
-                <a:solidFill>
-                  <a:srgbClr val="000000"/>
-                </a:solidFill>
-                <a:latin typeface="Arial"/>
-              </a:rPr>
-              <a:t>A. Garcia </a:t>
-            </a:r>
-            <a:r>
-              <a:rPr lang="it-IT" sz="1400" spc="-1" dirty="0" err="1">
-                <a:solidFill>
-                  <a:srgbClr val="000000"/>
-                </a:solidFill>
-                <a:latin typeface="Arial"/>
-              </a:rPr>
-              <a:t>Badaracco</a:t>
-            </a:r>
-            <a:r>
-              <a:rPr lang="it-IT" sz="1400" spc="-1" dirty="0">
-                <a:solidFill>
-                  <a:srgbClr val="000000"/>
-                </a:solidFill>
-                <a:latin typeface="Arial"/>
-              </a:rPr>
-              <a:t> et al, </a:t>
-            </a:r>
-            <a:r>
-              <a:rPr lang="it-IT" sz="1400" i="1" spc="-1" dirty="0" err="1">
-                <a:solidFill>
-                  <a:srgbClr val="000000"/>
-                </a:solidFill>
-                <a:latin typeface="Arial"/>
-              </a:rPr>
-              <a:t>SciKeras</a:t>
-            </a:r>
-            <a:r>
-              <a:rPr lang="it-IT" sz="1400" i="1" spc="-1" dirty="0">
-                <a:solidFill>
-                  <a:srgbClr val="000000"/>
-                </a:solidFill>
-                <a:latin typeface="Arial"/>
-              </a:rPr>
-              <a:t>: </a:t>
-            </a:r>
-            <a:r>
-              <a:rPr lang="it-IT" sz="1400" i="1" spc="-1" dirty="0" err="1">
-                <a:solidFill>
-                  <a:srgbClr val="000000"/>
-                </a:solidFill>
-                <a:latin typeface="Arial"/>
-              </a:rPr>
-              <a:t>Scikit-Learn</a:t>
-            </a:r>
-            <a:r>
-              <a:rPr lang="it-IT" sz="1400" i="1" spc="-1" dirty="0">
-                <a:solidFill>
-                  <a:srgbClr val="000000"/>
-                </a:solidFill>
-                <a:latin typeface="Arial"/>
-              </a:rPr>
-              <a:t> </a:t>
-            </a:r>
-            <a:r>
-              <a:rPr lang="it-IT" sz="1400" i="1" spc="-1" dirty="0" err="1">
-                <a:solidFill>
-                  <a:srgbClr val="000000"/>
-                </a:solidFill>
-                <a:latin typeface="Arial"/>
-              </a:rPr>
-              <a:t>wrapper</a:t>
-            </a:r>
-            <a:r>
-              <a:rPr lang="it-IT" sz="1400" i="1" spc="-1" dirty="0">
-                <a:solidFill>
-                  <a:srgbClr val="000000"/>
-                </a:solidFill>
-                <a:latin typeface="Arial"/>
-              </a:rPr>
-              <a:t> for </a:t>
-            </a:r>
-            <a:r>
-              <a:rPr lang="it-IT" sz="1400" i="1" spc="-1" dirty="0" err="1">
-                <a:solidFill>
-                  <a:srgbClr val="000000"/>
-                </a:solidFill>
-                <a:latin typeface="Arial"/>
-              </a:rPr>
-              <a:t>Keras</a:t>
-            </a:r>
-            <a:r>
-              <a:rPr lang="it-IT" sz="1400" spc="-1" dirty="0">
-                <a:solidFill>
-                  <a:srgbClr val="000000"/>
-                </a:solidFill>
-                <a:latin typeface="Arial"/>
-              </a:rPr>
-              <a:t>, GitHub, </a:t>
-            </a:r>
-            <a:r>
-              <a:rPr lang="it-IT" sz="1400" spc="-1" dirty="0">
-                <a:solidFill>
-                  <a:srgbClr val="000000"/>
-                </a:solidFill>
-                <a:latin typeface="Arial"/>
-                <a:hlinkClick r:id="rId5"/>
-              </a:rPr>
-              <a:t>GitHub Repository</a:t>
-            </a:r>
-            <a:r>
-              <a:rPr lang="it-IT" sz="1400" spc="-1" dirty="0">
-                <a:solidFill>
-                  <a:srgbClr val="000000"/>
-                </a:solidFill>
-                <a:latin typeface="Arial"/>
-              </a:rPr>
-              <a:t>, (2020) </a:t>
-            </a:r>
-            <a:r>
-              <a:rPr lang="it-IT" sz="1400" spc="-1" dirty="0" err="1">
-                <a:solidFill>
-                  <a:srgbClr val="000000"/>
-                </a:solidFill>
-                <a:latin typeface="Arial"/>
-              </a:rPr>
-              <a:t>version</a:t>
-            </a:r>
-            <a:r>
-              <a:rPr lang="it-IT" sz="1400" spc="-1" dirty="0">
-                <a:solidFill>
-                  <a:srgbClr val="000000"/>
-                </a:solidFill>
-                <a:latin typeface="Arial"/>
-              </a:rPr>
-              <a:t> </a:t>
-            </a:r>
-            <a:r>
-              <a:rPr lang="it-IT" sz="1400" i="1" spc="-1" dirty="0">
-                <a:solidFill>
-                  <a:srgbClr val="000000"/>
-                </a:solidFill>
-                <a:latin typeface="Arial"/>
-              </a:rPr>
-              <a:t> </a:t>
-            </a:r>
-            <a:r>
-              <a:rPr lang="it-IT" sz="1400" spc="-1" dirty="0">
-                <a:solidFill>
-                  <a:srgbClr val="000000"/>
-                </a:solidFill>
-                <a:latin typeface="Arial"/>
-                <a:hlinkClick r:id="rId6"/>
-              </a:rPr>
-              <a:t>0.12.0</a:t>
-            </a:r>
-            <a:endParaRPr lang="it-IT" sz="1400" spc="-1" dirty="0">
-              <a:solidFill>
-                <a:srgbClr val="000000"/>
-              </a:solidFill>
-              <a:latin typeface="Arial"/>
-            </a:endParaRPr>
-          </a:p>
-        </p:txBody>
-      </p:sp>
-      <p:sp>
-        <p:nvSpPr>
-          <p:cNvPr id="119" name="PlaceHolder 3"/>
+        </p:txBody>
+      </p:sp>
+      <p:sp>
+        <p:nvSpPr>
+          <p:cNvPr id="116" name="PlaceHolder 3"/>
           <p:cNvSpPr>
             <a:spLocks noGrp="1"/>
           </p:cNvSpPr>
           <p:nvPr>
-            <p:ph type="sldNum" idx="13"/>
+            <p:ph type="sldNum" idx="12"/>
           </p:nvPr>
         </p:nvSpPr>
         <p:spPr>
@@ -8480,7 +9027,7 @@
                 <a:tab pos="0" algn="l"/>
               </a:tabLst>
             </a:pPr>
-            <a:fld id="{F1974EC4-68EB-45C8-A197-A860EB4D25E8}" type="slidenum">
+            <a:fld id="{0290D2CD-F684-4A0F-9162-8897609F2911}" type="slidenum">
               <a:rPr lang="it" sz="1000" b="0" strike="noStrike" spc="-1">
                 <a:solidFill>
                   <a:srgbClr val="595959"/>
@@ -8523,6 +9070,817 @@
       </p:grpSpPr>
       <p:sp>
         <p:nvSpPr>
+          <p:cNvPr id="117" name="PlaceHolder 1"/>
+          <p:cNvSpPr>
+            <a:spLocks noGrp="1"/>
+          </p:cNvSpPr>
+          <p:nvPr>
+            <p:ph type="title"/>
+          </p:nvPr>
+        </p:nvSpPr>
+        <p:spPr>
+          <a:xfrm>
+            <a:off x="311760" y="2700"/>
+            <a:ext cx="8520120" cy="572400"/>
+          </a:xfrm>
+          <a:prstGeom prst="rect">
+            <a:avLst/>
+          </a:prstGeom>
+          <a:noFill/>
+          <a:ln w="0">
+            <a:noFill/>
+          </a:ln>
+        </p:spPr>
+        <p:txBody>
+          <a:bodyPr tIns="91440" bIns="91440" anchor="t">
+            <a:normAutofit fontScale="91000"/>
+          </a:bodyPr>
+          <a:lstStyle/>
+          <a:p>
+            <a:pPr>
+              <a:lnSpc>
+                <a:spcPct val="100000"/>
+              </a:lnSpc>
+              <a:buNone/>
+              <a:tabLst>
+                <a:tab pos="0" algn="l"/>
+              </a:tabLst>
+            </a:pPr>
+            <a:r>
+              <a:rPr lang="it" sz="2600" b="0" strike="noStrike" spc="-1" dirty="0">
+                <a:solidFill>
+                  <a:srgbClr val="000000"/>
+                </a:solidFill>
+                <a:latin typeface="Arial"/>
+                <a:ea typeface="Arial"/>
+              </a:rPr>
+              <a:t>Bibliography - 1</a:t>
+            </a:r>
+            <a:r>
+              <a:rPr lang="it" sz="2800" b="0" strike="noStrike" spc="-1" dirty="0">
+                <a:solidFill>
+                  <a:srgbClr val="000000"/>
+                </a:solidFill>
+                <a:latin typeface="Arial"/>
+                <a:ea typeface="Arial"/>
+              </a:rPr>
+              <a:t> </a:t>
+            </a:r>
+            <a:endParaRPr lang="it-IT" sz="2800" b="0" strike="noStrike" spc="-1" dirty="0">
+              <a:solidFill>
+                <a:srgbClr val="000000"/>
+              </a:solidFill>
+              <a:latin typeface="Arial"/>
+            </a:endParaRPr>
+          </a:p>
+        </p:txBody>
+      </p:sp>
+      <p:sp>
+        <p:nvSpPr>
+          <p:cNvPr id="118" name="PlaceHolder 2"/>
+          <p:cNvSpPr>
+            <a:spLocks noGrp="1"/>
+          </p:cNvSpPr>
+          <p:nvPr>
+            <p:ph/>
+          </p:nvPr>
+        </p:nvSpPr>
+        <p:spPr>
+          <a:xfrm>
+            <a:off x="311760" y="1152360"/>
+            <a:ext cx="8520120" cy="3416040"/>
+          </a:xfrm>
+          <a:prstGeom prst="rect">
+            <a:avLst/>
+          </a:prstGeom>
+          <a:noFill/>
+          <a:ln w="0">
+            <a:noFill/>
+          </a:ln>
+        </p:spPr>
+        <p:txBody>
+          <a:bodyPr tIns="91440" bIns="91440" anchor="t">
+            <a:normAutofit/>
+          </a:bodyPr>
+          <a:lstStyle/>
+          <a:p>
+            <a:pPr>
+              <a:lnSpc>
+                <a:spcPct val="115000"/>
+              </a:lnSpc>
+              <a:spcBef>
+                <a:spcPts val="1199"/>
+              </a:spcBef>
+              <a:spcAft>
+                <a:spcPts val="1199"/>
+              </a:spcAft>
+              <a:tabLst>
+                <a:tab pos="0" algn="l"/>
+              </a:tabLst>
+            </a:pPr>
+            <a:r>
+              <a:rPr lang="it-IT" sz="1600" spc="-1" dirty="0" err="1">
+                <a:solidFill>
+                  <a:srgbClr val="000000"/>
+                </a:solidFill>
+                <a:latin typeface="Arial"/>
+              </a:rPr>
+              <a:t>Main</a:t>
+            </a:r>
+            <a:r>
+              <a:rPr lang="it-IT" sz="1600" spc="-1" dirty="0">
+                <a:solidFill>
+                  <a:srgbClr val="000000"/>
+                </a:solidFill>
+                <a:latin typeface="Arial"/>
+              </a:rPr>
+              <a:t> libraries and software tools </a:t>
+            </a:r>
+            <a:r>
+              <a:rPr lang="it-IT" sz="1600" spc="-1" dirty="0" err="1">
+                <a:solidFill>
+                  <a:srgbClr val="000000"/>
+                </a:solidFill>
+                <a:latin typeface="Arial"/>
+              </a:rPr>
+              <a:t>used</a:t>
+            </a:r>
+            <a:r>
+              <a:rPr lang="it-IT" sz="1600" spc="-1" dirty="0">
+                <a:solidFill>
+                  <a:srgbClr val="000000"/>
+                </a:solidFill>
+                <a:latin typeface="Arial"/>
+              </a:rPr>
+              <a:t> for </a:t>
+            </a:r>
+            <a:r>
+              <a:rPr lang="it-IT" sz="1600" spc="-1" dirty="0" err="1">
+                <a:solidFill>
+                  <a:srgbClr val="000000"/>
+                </a:solidFill>
+                <a:latin typeface="Arial"/>
+              </a:rPr>
+              <a:t>this</a:t>
+            </a:r>
+            <a:r>
+              <a:rPr lang="it-IT" sz="1600" spc="-1" dirty="0">
+                <a:solidFill>
+                  <a:srgbClr val="000000"/>
+                </a:solidFill>
+                <a:latin typeface="Arial"/>
+              </a:rPr>
+              <a:t> project:</a:t>
+            </a:r>
+            <a:endParaRPr lang="it-IT" sz="2000" spc="-1" dirty="0">
+              <a:solidFill>
+                <a:srgbClr val="000000"/>
+              </a:solidFill>
+              <a:latin typeface="Arial"/>
+            </a:endParaRPr>
+          </a:p>
+          <a:p>
+            <a:pPr marL="342900" indent="-342900">
+              <a:lnSpc>
+                <a:spcPct val="115000"/>
+              </a:lnSpc>
+              <a:spcBef>
+                <a:spcPts val="1199"/>
+              </a:spcBef>
+              <a:spcAft>
+                <a:spcPts val="1199"/>
+              </a:spcAft>
+              <a:buFont typeface="+mj-lt"/>
+              <a:buAutoNum type="arabicPeriod"/>
+              <a:tabLst>
+                <a:tab pos="0" algn="l"/>
+              </a:tabLst>
+            </a:pPr>
+            <a:r>
+              <a:rPr lang="it-IT" sz="1400" spc="-1" dirty="0">
+                <a:solidFill>
+                  <a:srgbClr val="000000"/>
+                </a:solidFill>
+                <a:latin typeface="Arial"/>
+              </a:rPr>
+              <a:t>F. </a:t>
+            </a:r>
+            <a:r>
+              <a:rPr lang="it-IT" sz="1400" spc="-1" dirty="0" err="1">
+                <a:solidFill>
+                  <a:srgbClr val="000000"/>
+                </a:solidFill>
+                <a:latin typeface="Arial"/>
+              </a:rPr>
+              <a:t>Chollet</a:t>
+            </a:r>
+            <a:r>
+              <a:rPr lang="it-IT" sz="1400" spc="-1" dirty="0">
+                <a:solidFill>
+                  <a:srgbClr val="000000"/>
+                </a:solidFill>
+                <a:latin typeface="Arial"/>
+              </a:rPr>
+              <a:t>, </a:t>
+            </a:r>
+            <a:r>
+              <a:rPr lang="it-IT" sz="1400" i="1" spc="-1" dirty="0" err="1">
+                <a:solidFill>
+                  <a:srgbClr val="000000"/>
+                </a:solidFill>
+                <a:latin typeface="Arial"/>
+              </a:rPr>
+              <a:t>Keras</a:t>
+            </a:r>
+            <a:r>
+              <a:rPr lang="it-IT" sz="1400" spc="-1" dirty="0">
+                <a:solidFill>
+                  <a:srgbClr val="000000"/>
+                </a:solidFill>
+                <a:latin typeface="Arial"/>
+              </a:rPr>
+              <a:t>, GitHub, </a:t>
+            </a:r>
+            <a:r>
+              <a:rPr lang="it-IT" sz="1400" spc="-1" dirty="0">
+                <a:solidFill>
+                  <a:srgbClr val="000000"/>
+                </a:solidFill>
+                <a:latin typeface="Arial"/>
+                <a:hlinkClick r:id="rId2"/>
+              </a:rPr>
+              <a:t>GitHub Repository</a:t>
+            </a:r>
+            <a:r>
+              <a:rPr lang="it-IT" sz="1400" spc="-1" dirty="0">
+                <a:solidFill>
+                  <a:srgbClr val="000000"/>
+                </a:solidFill>
+                <a:latin typeface="Arial"/>
+              </a:rPr>
+              <a:t>, (2015) </a:t>
+            </a:r>
+            <a:r>
+              <a:rPr lang="it-IT" sz="1400" spc="-1" dirty="0" err="1">
+                <a:solidFill>
+                  <a:srgbClr val="000000"/>
+                </a:solidFill>
+                <a:latin typeface="Arial"/>
+              </a:rPr>
+              <a:t>version</a:t>
+            </a:r>
+            <a:r>
+              <a:rPr lang="it-IT" sz="1400" spc="-1" dirty="0">
+                <a:solidFill>
+                  <a:srgbClr val="000000"/>
+                </a:solidFill>
+                <a:latin typeface="Arial"/>
+              </a:rPr>
+              <a:t> </a:t>
+            </a:r>
+            <a:r>
+              <a:rPr lang="it-IT" sz="1400" spc="-1" dirty="0">
+                <a:solidFill>
+                  <a:srgbClr val="000000"/>
+                </a:solidFill>
+                <a:latin typeface="Arial"/>
+                <a:hlinkClick r:id="rId3"/>
+              </a:rPr>
+              <a:t>3.0.2</a:t>
+            </a:r>
+            <a:endParaRPr lang="it-IT" sz="1400" spc="-1" dirty="0">
+              <a:solidFill>
+                <a:srgbClr val="000000"/>
+              </a:solidFill>
+              <a:latin typeface="Arial"/>
+            </a:endParaRPr>
+          </a:p>
+          <a:p>
+            <a:pPr marL="342900" indent="-342900">
+              <a:lnSpc>
+                <a:spcPct val="115000"/>
+              </a:lnSpc>
+              <a:spcBef>
+                <a:spcPts val="1199"/>
+              </a:spcBef>
+              <a:spcAft>
+                <a:spcPts val="1199"/>
+              </a:spcAft>
+              <a:buFont typeface="+mj-lt"/>
+              <a:buAutoNum type="arabicPeriod"/>
+              <a:tabLst>
+                <a:tab pos="0" algn="l"/>
+              </a:tabLst>
+            </a:pPr>
+            <a:r>
+              <a:rPr lang="it-IT" sz="1400" spc="-1" dirty="0">
+                <a:solidFill>
+                  <a:srgbClr val="000000"/>
+                </a:solidFill>
+                <a:latin typeface="Arial"/>
+              </a:rPr>
+              <a:t>M. Abadi, A. </a:t>
+            </a:r>
+            <a:r>
+              <a:rPr lang="it-IT" sz="1400" spc="-1" dirty="0" err="1">
+                <a:solidFill>
+                  <a:srgbClr val="000000"/>
+                </a:solidFill>
+                <a:latin typeface="Arial"/>
+              </a:rPr>
+              <a:t>Agarwal</a:t>
+            </a:r>
+            <a:r>
+              <a:rPr lang="it-IT" sz="1400" spc="-1" dirty="0">
+                <a:solidFill>
+                  <a:srgbClr val="000000"/>
+                </a:solidFill>
+                <a:latin typeface="Arial"/>
+              </a:rPr>
+              <a:t> et al., 2015, </a:t>
+            </a:r>
+            <a:r>
+              <a:rPr lang="it-IT" sz="1400" i="1" spc="-1" dirty="0" err="1">
+                <a:solidFill>
+                  <a:srgbClr val="000000"/>
+                </a:solidFill>
+                <a:latin typeface="Arial"/>
+              </a:rPr>
+              <a:t>Ten</a:t>
+            </a:r>
+            <a:r>
+              <a:rPr kumimoji="0" lang="it-IT" altLang="it-IT" sz="1400" b="0" i="1" u="none" strike="noStrike" cap="none" normalizeH="0" baseline="0" dirty="0" err="1">
+                <a:ln>
+                  <a:noFill/>
+                </a:ln>
+                <a:solidFill>
+                  <a:schemeClr val="tx1"/>
+                </a:solidFill>
+                <a:effectLst/>
+                <a:latin typeface="Arial Unicode MS"/>
+              </a:rPr>
+              <a:t>sorFlow</a:t>
+            </a:r>
+            <a:r>
+              <a:rPr kumimoji="0" lang="it-IT" altLang="it-IT" sz="1400" b="0" i="1" u="none" strike="noStrike" cap="none" normalizeH="0" baseline="0" dirty="0">
+                <a:ln>
+                  <a:noFill/>
+                </a:ln>
+                <a:solidFill>
+                  <a:schemeClr val="tx1"/>
+                </a:solidFill>
+                <a:effectLst/>
+                <a:latin typeface="Arial Unicode MS"/>
+              </a:rPr>
+              <a:t>: Large-scale machine learning on </a:t>
+            </a:r>
+            <a:r>
+              <a:rPr kumimoji="0" lang="it-IT" altLang="it-IT" sz="1400" b="0" i="1" u="none" strike="noStrike" cap="none" normalizeH="0" baseline="0" dirty="0" err="1">
+                <a:ln>
+                  <a:noFill/>
+                </a:ln>
+                <a:solidFill>
+                  <a:schemeClr val="tx1"/>
+                </a:solidFill>
+                <a:effectLst/>
+                <a:latin typeface="Arial Unicode MS"/>
+              </a:rPr>
+              <a:t>heterogeneous</a:t>
+            </a:r>
+            <a:r>
+              <a:rPr kumimoji="0" lang="it-IT" altLang="it-IT" sz="1400" b="0" i="1" u="none" strike="noStrike" cap="none" normalizeH="0" baseline="0" dirty="0">
+                <a:ln>
+                  <a:noFill/>
+                </a:ln>
+                <a:solidFill>
+                  <a:schemeClr val="tx1"/>
+                </a:solidFill>
+                <a:effectLst/>
+                <a:latin typeface="Arial Unicode MS"/>
+              </a:rPr>
+              <a:t> systems</a:t>
+            </a:r>
+            <a:r>
+              <a:rPr kumimoji="0" lang="it-IT" altLang="it-IT" sz="1400" b="0" i="0" u="none" strike="noStrike" cap="none" normalizeH="0" baseline="0" dirty="0">
+                <a:ln>
+                  <a:noFill/>
+                </a:ln>
+                <a:solidFill>
+                  <a:schemeClr val="tx1"/>
+                </a:solidFill>
+                <a:effectLst/>
+                <a:latin typeface="Arial Unicode MS"/>
+              </a:rPr>
+              <a:t>. </a:t>
+            </a:r>
+            <a:r>
+              <a:rPr kumimoji="0" lang="it-IT" altLang="it-IT" sz="1400" b="0" i="0" u="none" strike="noStrike" cap="none" normalizeH="0" baseline="0" dirty="0">
+                <a:ln>
+                  <a:noFill/>
+                </a:ln>
+                <a:solidFill>
+                  <a:schemeClr val="tx1"/>
+                </a:solidFill>
+                <a:effectLst/>
+                <a:latin typeface="Arial Unicode MS"/>
+                <a:hlinkClick r:id="rId4"/>
+              </a:rPr>
+              <a:t>www.tensorflow.org</a:t>
+            </a:r>
+            <a:endParaRPr lang="it-IT" sz="1400" spc="-1" dirty="0">
+              <a:solidFill>
+                <a:srgbClr val="000000"/>
+              </a:solidFill>
+              <a:latin typeface="Arial"/>
+            </a:endParaRPr>
+          </a:p>
+          <a:p>
+            <a:pPr marL="342900" indent="-342900">
+              <a:lnSpc>
+                <a:spcPct val="115000"/>
+              </a:lnSpc>
+              <a:spcBef>
+                <a:spcPts val="1199"/>
+              </a:spcBef>
+              <a:spcAft>
+                <a:spcPts val="1199"/>
+              </a:spcAft>
+              <a:buFont typeface="+mj-lt"/>
+              <a:buAutoNum type="arabicPeriod"/>
+              <a:tabLst>
+                <a:tab pos="0" algn="l"/>
+              </a:tabLst>
+            </a:pPr>
+            <a:r>
+              <a:rPr lang="it-IT" sz="1400" spc="-1" dirty="0">
+                <a:solidFill>
+                  <a:srgbClr val="000000"/>
+                </a:solidFill>
+                <a:latin typeface="Arial"/>
+              </a:rPr>
+              <a:t>F. </a:t>
+            </a:r>
+            <a:r>
+              <a:rPr lang="it-IT" sz="1400" spc="-1" dirty="0" err="1">
+                <a:solidFill>
+                  <a:srgbClr val="000000"/>
+                </a:solidFill>
+                <a:latin typeface="Arial"/>
+              </a:rPr>
+              <a:t>Pedergosa</a:t>
+            </a:r>
+            <a:r>
+              <a:rPr lang="it-IT" sz="1400" spc="-1" dirty="0">
+                <a:solidFill>
+                  <a:srgbClr val="000000"/>
+                </a:solidFill>
+                <a:latin typeface="Arial"/>
+              </a:rPr>
+              <a:t>, G. </a:t>
+            </a:r>
+            <a:r>
+              <a:rPr lang="it-IT" sz="1400" spc="-1" dirty="0" err="1">
+                <a:solidFill>
+                  <a:srgbClr val="000000"/>
+                </a:solidFill>
+                <a:latin typeface="Arial"/>
+              </a:rPr>
+              <a:t>Varoquaux</a:t>
+            </a:r>
+            <a:r>
+              <a:rPr lang="it-IT" sz="1400" spc="-1" dirty="0">
+                <a:solidFill>
+                  <a:srgbClr val="000000"/>
+                </a:solidFill>
+                <a:latin typeface="Arial"/>
+              </a:rPr>
+              <a:t> et al, </a:t>
+            </a:r>
+            <a:r>
+              <a:rPr lang="it-IT" sz="1400" i="1" spc="-1" dirty="0" err="1">
+                <a:solidFill>
+                  <a:srgbClr val="000000"/>
+                </a:solidFill>
+                <a:latin typeface="Arial"/>
+              </a:rPr>
+              <a:t>Scikit-learn</a:t>
+            </a:r>
+            <a:r>
+              <a:rPr lang="it-IT" sz="1400" i="1" spc="-1" dirty="0">
+                <a:solidFill>
+                  <a:srgbClr val="000000"/>
+                </a:solidFill>
+                <a:latin typeface="Arial"/>
+              </a:rPr>
+              <a:t>: Machine Learning in Python</a:t>
+            </a:r>
+            <a:r>
+              <a:rPr lang="it-IT" sz="1400" spc="-1" dirty="0">
+                <a:solidFill>
+                  <a:srgbClr val="000000"/>
+                </a:solidFill>
+                <a:latin typeface="Arial"/>
+              </a:rPr>
+              <a:t>, JMLR, 12(</a:t>
+            </a:r>
+            <a:r>
+              <a:rPr lang="it-IT" sz="1400" spc="-1" dirty="0" err="1">
+                <a:solidFill>
+                  <a:srgbClr val="000000"/>
+                </a:solidFill>
+                <a:latin typeface="Arial"/>
+              </a:rPr>
+              <a:t>Oct</a:t>
+            </a:r>
+            <a:r>
+              <a:rPr lang="it-IT" sz="1400" spc="-1" dirty="0">
+                <a:solidFill>
+                  <a:srgbClr val="000000"/>
+                </a:solidFill>
+                <a:latin typeface="Arial"/>
+              </a:rPr>
+              <a:t>), (2011), pp.2825-2830 </a:t>
+            </a:r>
+          </a:p>
+          <a:p>
+            <a:pPr marL="342900" indent="-342900">
+              <a:lnSpc>
+                <a:spcPct val="115000"/>
+              </a:lnSpc>
+              <a:spcBef>
+                <a:spcPts val="1199"/>
+              </a:spcBef>
+              <a:spcAft>
+                <a:spcPts val="1199"/>
+              </a:spcAft>
+              <a:buFont typeface="+mj-lt"/>
+              <a:buAutoNum type="arabicPeriod"/>
+              <a:tabLst>
+                <a:tab pos="0" algn="l"/>
+              </a:tabLst>
+            </a:pPr>
+            <a:r>
+              <a:rPr lang="it-IT" sz="1400" spc="-1" dirty="0">
+                <a:solidFill>
+                  <a:srgbClr val="000000"/>
+                </a:solidFill>
+                <a:latin typeface="Arial"/>
+              </a:rPr>
+              <a:t>A. Garcia </a:t>
+            </a:r>
+            <a:r>
+              <a:rPr lang="it-IT" sz="1400" spc="-1" dirty="0" err="1">
+                <a:solidFill>
+                  <a:srgbClr val="000000"/>
+                </a:solidFill>
+                <a:latin typeface="Arial"/>
+              </a:rPr>
+              <a:t>Badaracco</a:t>
+            </a:r>
+            <a:r>
+              <a:rPr lang="it-IT" sz="1400" spc="-1" dirty="0">
+                <a:solidFill>
+                  <a:srgbClr val="000000"/>
+                </a:solidFill>
+                <a:latin typeface="Arial"/>
+              </a:rPr>
+              <a:t> et al, </a:t>
+            </a:r>
+            <a:r>
+              <a:rPr lang="it-IT" sz="1400" i="1" spc="-1" dirty="0" err="1">
+                <a:solidFill>
+                  <a:srgbClr val="000000"/>
+                </a:solidFill>
+                <a:latin typeface="Arial"/>
+              </a:rPr>
+              <a:t>SciKeras</a:t>
+            </a:r>
+            <a:r>
+              <a:rPr lang="it-IT" sz="1400" i="1" spc="-1" dirty="0">
+                <a:solidFill>
+                  <a:srgbClr val="000000"/>
+                </a:solidFill>
+                <a:latin typeface="Arial"/>
+              </a:rPr>
+              <a:t>: </a:t>
+            </a:r>
+            <a:r>
+              <a:rPr lang="it-IT" sz="1400" i="1" spc="-1" dirty="0" err="1">
+                <a:solidFill>
+                  <a:srgbClr val="000000"/>
+                </a:solidFill>
+                <a:latin typeface="Arial"/>
+              </a:rPr>
+              <a:t>Scikit-Learn</a:t>
+            </a:r>
+            <a:r>
+              <a:rPr lang="it-IT" sz="1400" i="1" spc="-1" dirty="0">
+                <a:solidFill>
+                  <a:srgbClr val="000000"/>
+                </a:solidFill>
+                <a:latin typeface="Arial"/>
+              </a:rPr>
+              <a:t> </a:t>
+            </a:r>
+            <a:r>
+              <a:rPr lang="it-IT" sz="1400" i="1" spc="-1" dirty="0" err="1">
+                <a:solidFill>
+                  <a:srgbClr val="000000"/>
+                </a:solidFill>
+                <a:latin typeface="Arial"/>
+              </a:rPr>
+              <a:t>wrapper</a:t>
+            </a:r>
+            <a:r>
+              <a:rPr lang="it-IT" sz="1400" i="1" spc="-1" dirty="0">
+                <a:solidFill>
+                  <a:srgbClr val="000000"/>
+                </a:solidFill>
+                <a:latin typeface="Arial"/>
+              </a:rPr>
+              <a:t> for </a:t>
+            </a:r>
+            <a:r>
+              <a:rPr lang="it-IT" sz="1400" i="1" spc="-1" dirty="0" err="1">
+                <a:solidFill>
+                  <a:srgbClr val="000000"/>
+                </a:solidFill>
+                <a:latin typeface="Arial"/>
+              </a:rPr>
+              <a:t>Keras</a:t>
+            </a:r>
+            <a:r>
+              <a:rPr lang="it-IT" sz="1400" spc="-1" dirty="0">
+                <a:solidFill>
+                  <a:srgbClr val="000000"/>
+                </a:solidFill>
+                <a:latin typeface="Arial"/>
+              </a:rPr>
+              <a:t>, GitHub, </a:t>
+            </a:r>
+            <a:r>
+              <a:rPr lang="it-IT" sz="1400" spc="-1" dirty="0">
+                <a:solidFill>
+                  <a:srgbClr val="000000"/>
+                </a:solidFill>
+                <a:latin typeface="Arial"/>
+                <a:hlinkClick r:id="rId5"/>
+              </a:rPr>
+              <a:t>GitHub Repository</a:t>
+            </a:r>
+            <a:r>
+              <a:rPr lang="it-IT" sz="1400" spc="-1" dirty="0">
+                <a:solidFill>
+                  <a:srgbClr val="000000"/>
+                </a:solidFill>
+                <a:latin typeface="Arial"/>
+              </a:rPr>
+              <a:t>, (2020) </a:t>
+            </a:r>
+            <a:r>
+              <a:rPr lang="it-IT" sz="1400" spc="-1" dirty="0" err="1">
+                <a:solidFill>
+                  <a:srgbClr val="000000"/>
+                </a:solidFill>
+                <a:latin typeface="Arial"/>
+              </a:rPr>
+              <a:t>version</a:t>
+            </a:r>
+            <a:r>
+              <a:rPr lang="it-IT" sz="1400" spc="-1" dirty="0">
+                <a:solidFill>
+                  <a:srgbClr val="000000"/>
+                </a:solidFill>
+                <a:latin typeface="Arial"/>
+              </a:rPr>
+              <a:t> </a:t>
+            </a:r>
+            <a:r>
+              <a:rPr lang="it-IT" sz="1400" i="1" spc="-1" dirty="0">
+                <a:solidFill>
+                  <a:srgbClr val="000000"/>
+                </a:solidFill>
+                <a:latin typeface="Arial"/>
+              </a:rPr>
+              <a:t> </a:t>
+            </a:r>
+            <a:r>
+              <a:rPr lang="it-IT" sz="1400" spc="-1" dirty="0">
+                <a:solidFill>
+                  <a:srgbClr val="000000"/>
+                </a:solidFill>
+                <a:latin typeface="Arial"/>
+                <a:hlinkClick r:id="rId6"/>
+              </a:rPr>
+              <a:t>0.12.0</a:t>
+            </a:r>
+            <a:endParaRPr lang="it-IT" sz="1400" spc="-1" dirty="0">
+              <a:solidFill>
+                <a:srgbClr val="000000"/>
+              </a:solidFill>
+              <a:latin typeface="Arial"/>
+            </a:endParaRPr>
+          </a:p>
+        </p:txBody>
+      </p:sp>
+      <p:sp>
+        <p:nvSpPr>
+          <p:cNvPr id="119" name="PlaceHolder 3"/>
+          <p:cNvSpPr>
+            <a:spLocks noGrp="1"/>
+          </p:cNvSpPr>
+          <p:nvPr>
+            <p:ph type="sldNum" idx="13"/>
+          </p:nvPr>
+        </p:nvSpPr>
+        <p:spPr>
+          <a:xfrm>
+            <a:off x="8472600" y="4663080"/>
+            <a:ext cx="548280" cy="393120"/>
+          </a:xfrm>
+          <a:prstGeom prst="rect">
+            <a:avLst/>
+          </a:prstGeom>
+          <a:noFill/>
+          <a:ln w="0">
+            <a:noFill/>
+          </a:ln>
+        </p:spPr>
+        <p:txBody>
+          <a:bodyPr tIns="91440" bIns="91440" anchor="ctr">
+            <a:normAutofit/>
+          </a:bodyPr>
+          <a:lstStyle>
+            <a:lvl1pPr algn="r">
+              <a:lnSpc>
+                <a:spcPct val="100000"/>
+              </a:lnSpc>
+              <a:buNone/>
+              <a:tabLst>
+                <a:tab pos="0" algn="l"/>
+              </a:tabLst>
+              <a:defRPr lang="it" sz="1000" b="0" strike="noStrike" spc="-1">
+                <a:solidFill>
+                  <a:srgbClr val="595959"/>
+                </a:solidFill>
+                <a:latin typeface="Arial"/>
+                <a:ea typeface="Arial"/>
+              </a:defRPr>
+            </a:lvl1pPr>
+          </a:lstStyle>
+          <a:p>
+            <a:pPr algn="r">
+              <a:lnSpc>
+                <a:spcPct val="100000"/>
+              </a:lnSpc>
+              <a:buNone/>
+              <a:tabLst>
+                <a:tab pos="0" algn="l"/>
+              </a:tabLst>
+            </a:pPr>
+            <a:fld id="{F1974EC4-68EB-45C8-A197-A860EB4D25E8}" type="slidenum">
+              <a:rPr lang="it" sz="1000" b="0" strike="noStrike" spc="-1">
+                <a:solidFill>
+                  <a:srgbClr val="595959"/>
+                </a:solidFill>
+                <a:latin typeface="Arial"/>
+                <a:ea typeface="Arial"/>
+              </a:rPr>
+              <a:t>16</a:t>
+            </a:fld>
+            <a:endParaRPr lang="it-IT" sz="1000" b="0" strike="noStrike" spc="-1">
+              <a:latin typeface="Times New Roman"/>
+            </a:endParaRPr>
+          </a:p>
+        </p:txBody>
+      </p:sp>
+    </p:spTree>
+  </p:cSld>
+  <p:clrMapOvr>
+    <a:masterClrMapping/>
+  </p:clrMapOvr>
+</p:sld>
+</file>
+
+<file path=ppt/slides/slide17.xml><?xml version="1.0" encoding="utf-8"?>
+<p:sld xmlns:a="http://schemas.openxmlformats.org/drawingml/2006/main" xmlns:r="http://schemas.openxmlformats.org/officeDocument/2006/relationships" xmlns:p="http://schemas.openxmlformats.org/presentationml/2006/main">
+  <p:cSld>
+    <p:spTree>
+      <p:nvGrpSpPr>
+        <p:cNvPr id="1" name=""/>
+        <p:cNvGrpSpPr/>
+        <p:nvPr/>
+      </p:nvGrpSpPr>
+      <p:grpSpPr>
+        <a:xfrm>
+          <a:off x="0" y="0"/>
+          <a:ext cx="0" cy="0"/>
+          <a:chOff x="0" y="0"/>
+          <a:chExt cx="0" cy="0"/>
+        </a:xfrm>
+      </p:grpSpPr>
+      <p:sp>
+        <p:nvSpPr>
           <p:cNvPr id="120" name="PlaceHolder 1"/>
           <p:cNvSpPr>
             <a:spLocks noGrp="1"/>
@@ -8828,7 +10186,7 @@
                 <a:latin typeface="Arial"/>
                 <a:ea typeface="Arial"/>
               </a:rPr>
-              <a:t>16</a:t>
+              <a:t>17</a:t>
             </a:fld>
             <a:endParaRPr lang="it-IT" sz="1000" b="0" strike="noStrike" spc="-1">
               <a:latin typeface="Times New Roman"/>
@@ -9457,7 +10815,9 @@
               <a:t>: </a:t>
             </a:r>
             <a:r>
-              <a:rPr lang="it-IT" sz="1400" dirty="0" err="1"/>
+              <a:rPr lang="it-IT" sz="1400" dirty="0" err="1">
+                <a:latin typeface="Consolas" panose="020B0609020204030204" pitchFamily="49" charset="0"/>
+              </a:rPr>
               <a:t>RandomForestClassifier</a:t>
             </a:r>
             <a:r>
@@ -9473,7 +10833,9 @@
               <a:t> </a:t>
             </a:r>
             <a:r>
-              <a:rPr lang="it-IT" sz="1400" dirty="0" err="1"/>
+              <a:rPr lang="it-IT" sz="1400" dirty="0" err="1">
+                <a:latin typeface="Consolas" panose="020B0609020204030204" pitchFamily="49" charset="0"/>
+              </a:rPr>
               <a:t>RandomForestRegressor</a:t>
             </a:r>
             <a:r>
@@ -9481,7 +10843,9 @@
               <a:t>, in pipeline with a </a:t>
             </a:r>
             <a:r>
-              <a:rPr lang="it-IT" sz="1400" dirty="0" err="1"/>
+              <a:rPr lang="it-IT" sz="1400" dirty="0" err="1">
+                <a:latin typeface="Consolas" panose="020B0609020204030204" pitchFamily="49" charset="0"/>
+              </a:rPr>
               <a:t>RobustScaler</a:t>
             </a:r>
             <a:r>
@@ -9725,11 +11089,11 @@
             </a:r>
             <a:r>
               <a:rPr lang="it-IT" sz="1400" dirty="0" err="1"/>
-              <a:t>squared</a:t>
+              <a:t>squared_root</a:t>
             </a:r>
             <a:r>
               <a:rPr lang="it-IT" sz="1400" dirty="0"/>
-              <a:t> root, log2 </a:t>
+              <a:t>, log2 </a:t>
             </a:r>
           </a:p>
         </p:txBody>
@@ -9969,7 +11333,9 @@
               <a:t> </a:t>
             </a:r>
             <a:r>
-              <a:rPr lang="it-IT" sz="1400" dirty="0" err="1"/>
+              <a:rPr lang="it-IT" sz="1400" dirty="0" err="1">
+                <a:latin typeface="Consolas" panose="020B0609020204030204" pitchFamily="49" charset="0"/>
+              </a:rPr>
               <a:t>MultiOutputRegressor</a:t>
             </a:r>
             <a:r>
@@ -9982,10 +11348,22 @@
             </a:r>
             <a:r>
               <a:rPr lang="it-IT" sz="1400" dirty="0"/>
-              <a:t> to a SVR, in pipeline with a </a:t>
-            </a:r>
-            <a:r>
-              <a:rPr lang="it-IT" sz="1400" dirty="0" err="1"/>
+              <a:t> to a </a:t>
+            </a:r>
+            <a:r>
+              <a:rPr lang="it-IT" sz="1400" dirty="0">
+                <a:latin typeface="Consolas" panose="020B0609020204030204" pitchFamily="49" charset="0"/>
+              </a:rPr>
+              <a:t>SVR</a:t>
+            </a:r>
+            <a:r>
+              <a:rPr lang="it-IT" sz="1400" dirty="0"/>
+              <a:t>, in pipeline with a </a:t>
+            </a:r>
+            <a:r>
+              <a:rPr lang="it-IT" sz="1400" dirty="0" err="1">
+                <a:latin typeface="Consolas" panose="020B0609020204030204" pitchFamily="49" charset="0"/>
+              </a:rPr>
               <a:t>RobustScaler</a:t>
             </a:r>
             <a:r>
@@ -10230,8 +11608,8 @@
           </a:p>
         </p:txBody>
       </p:sp>
-      <mc:AlternateContent xmlns:mc="http://schemas.openxmlformats.org/markup-compatibility/2006">
-        <mc:Choice xmlns:a14="http://schemas.microsoft.com/office/drawing/2010/main" Requires="a14">
+      <mc:AlternateContent xmlns:mc="http://schemas.openxmlformats.org/markup-compatibility/2006" xmlns:a14="http://schemas.microsoft.com/office/drawing/2010/main">
+        <mc:Choice Requires="a14">
           <p:sp>
             <p:nvSpPr>
               <p:cNvPr id="15" name="CasellaDiTesto 14">
@@ -10540,7 +11918,7 @@
             </p:txBody>
           </p:sp>
         </mc:Choice>
-        <mc:Fallback>
+        <mc:Fallback xmlns="">
           <p:sp>
             <p:nvSpPr>
               <p:cNvPr id="15" name="CasellaDiTesto 14">
@@ -10585,8 +11963,8 @@
           </p:sp>
         </mc:Fallback>
       </mc:AlternateContent>
-      <mc:AlternateContent xmlns:mc="http://schemas.openxmlformats.org/markup-compatibility/2006">
-        <mc:Choice xmlns:a14="http://schemas.microsoft.com/office/drawing/2010/main" Requires="a14">
+      <mc:AlternateContent xmlns:mc="http://schemas.openxmlformats.org/markup-compatibility/2006" xmlns:a14="http://schemas.microsoft.com/office/drawing/2010/main">
+        <mc:Choice Requires="a14">
           <p:sp>
             <p:nvSpPr>
               <p:cNvPr id="16" name="CasellaDiTesto 15">
@@ -10816,7 +12194,7 @@
             </p:txBody>
           </p:sp>
         </mc:Choice>
-        <mc:Fallback>
+        <mc:Fallback xmlns="">
           <p:sp>
             <p:nvSpPr>
               <p:cNvPr id="16" name="CasellaDiTesto 15">
@@ -10942,7 +12320,7 @@
                 <a:latin typeface="Arial"/>
                 <a:ea typeface="Arial"/>
               </a:rPr>
-              <a:t>DA FARE</a:t>
+              <a:t>Da finire</a:t>
             </a:r>
             <a:endParaRPr lang="it-IT" sz="2400" b="0" strike="noStrike" spc="-1" dirty="0">
               <a:solidFill>
@@ -11038,8 +12416,8 @@
         </p:nvSpPr>
         <p:spPr>
           <a:xfrm>
-            <a:off x="311940" y="879545"/>
-            <a:ext cx="8434800" cy="523220"/>
+            <a:off x="319038" y="573885"/>
+            <a:ext cx="8824962" cy="738664"/>
           </a:xfrm>
           <a:prstGeom prst="rect">
             <a:avLst/>
@@ -11062,19 +12440,101 @@
             </a:r>
             <a:r>
               <a:rPr lang="it-IT" sz="1400" dirty="0" err="1"/>
+              <a:t>implemented</a:t>
+            </a:r>
+            <a:r>
+              <a:rPr lang="it-IT" sz="1400" dirty="0"/>
+              <a:t> a </a:t>
+            </a:r>
+            <a:r>
+              <a:rPr lang="it-IT" sz="1400" dirty="0" err="1"/>
+              <a:t>multilayer</a:t>
+            </a:r>
+            <a:r>
+              <a:rPr lang="it-IT" sz="1400" dirty="0"/>
+              <a:t> </a:t>
+            </a:r>
+            <a:r>
+              <a:rPr lang="it-IT" sz="1400" dirty="0" err="1"/>
+              <a:t>feedforward</a:t>
+            </a:r>
+            <a:r>
+              <a:rPr lang="it-IT" sz="1400" dirty="0"/>
+              <a:t> </a:t>
+            </a:r>
+            <a:r>
+              <a:rPr lang="it-IT" sz="1400" dirty="0" err="1"/>
+              <a:t>Neural</a:t>
+            </a:r>
+            <a:r>
+              <a:rPr lang="it-IT" sz="1400" dirty="0"/>
+              <a:t> Networks </a:t>
+            </a:r>
+            <a:r>
+              <a:rPr lang="it-IT" sz="1400" dirty="0" err="1"/>
+              <a:t>using</a:t>
+            </a:r>
+            <a:r>
+              <a:rPr lang="it-IT" sz="1400" dirty="0"/>
+              <a:t> </a:t>
+            </a:r>
+            <a:r>
+              <a:rPr lang="it-IT" sz="1400" dirty="0" err="1"/>
+              <a:t>Keras</a:t>
+            </a:r>
+            <a:r>
+              <a:rPr lang="it-IT" sz="1400" dirty="0"/>
+              <a:t>. </a:t>
+            </a:r>
+            <a:r>
+              <a:rPr lang="it-IT" sz="1400" dirty="0" err="1"/>
+              <a:t>We</a:t>
+            </a:r>
+            <a:r>
+              <a:rPr lang="it-IT" sz="1400" dirty="0"/>
+              <a:t> </a:t>
+            </a:r>
+            <a:r>
+              <a:rPr lang="it-IT" sz="1400" dirty="0" err="1"/>
               <a:t>used</a:t>
             </a:r>
             <a:r>
               <a:rPr lang="it-IT" sz="1400" dirty="0"/>
-              <a:t> the Random </a:t>
+              <a:t> the </a:t>
             </a:r>
             <a:r>
               <a:rPr lang="it-IT" sz="1400" dirty="0" err="1"/>
-              <a:t>Forests</a:t>
+              <a:t>SciKeras</a:t>
             </a:r>
             <a:r>
               <a:rPr lang="it-IT" sz="1400" dirty="0"/>
-              <a:t> from </a:t>
+              <a:t> [</a:t>
+            </a:r>
+            <a:r>
+              <a:rPr lang="it-IT" sz="1400" dirty="0">
+                <a:hlinkClick r:id="rId2" action="ppaction://hlinksldjump"/>
+              </a:rPr>
+              <a:t>4</a:t>
+            </a:r>
+            <a:r>
+              <a:rPr lang="it-IT" sz="1400" dirty="0"/>
+              <a:t>] library to </a:t>
+            </a:r>
+            <a:r>
+              <a:rPr lang="it-IT" sz="1400" dirty="0" err="1"/>
+              <a:t>interface</a:t>
+            </a:r>
+            <a:r>
+              <a:rPr lang="it-IT" sz="1400" dirty="0"/>
+              <a:t> </a:t>
+            </a:r>
+            <a:r>
+              <a:rPr lang="it-IT" sz="1400" dirty="0" err="1"/>
+              <a:t>this</a:t>
+            </a:r>
+            <a:r>
+              <a:rPr lang="it-IT" sz="1400" dirty="0"/>
+              <a:t> model with </a:t>
             </a:r>
             <a:r>
               <a:rPr lang="it-IT" sz="1400" dirty="0" err="1"/>
@@ -11082,27 +12542,11 @@
             </a:r>
             <a:r>
               <a:rPr lang="it-IT" sz="1400" dirty="0"/>
-              <a:t>, in </a:t>
+              <a:t>. For the CUP task </a:t>
             </a:r>
             <a:r>
               <a:rPr lang="it-IT" sz="1400" dirty="0" err="1"/>
-              <a:t>particular</a:t>
-            </a:r>
-            <a:r>
-              <a:rPr lang="it-IT" sz="1400" dirty="0"/>
-              <a:t>: </a:t>
-            </a:r>
-            <a:r>
-              <a:rPr lang="it-IT" sz="1400" dirty="0" err="1"/>
-              <a:t>RandomForestClassifier</a:t>
-            </a:r>
-            <a:r>
-              <a:rPr lang="it-IT" sz="1400" dirty="0"/>
-              <a:t> for the Monk task; </a:t>
-            </a:r>
-            <a:r>
-              <a:rPr lang="it-IT" sz="1400" dirty="0" err="1"/>
-              <a:t>Scikit-Learn’s</a:t>
+              <a:t>we</a:t>
             </a:r>
             <a:r>
               <a:rPr lang="it-IT" sz="1400" dirty="0"/>
@@ -11110,19 +12554,29 @@
             </a:r>
             <a:r>
               <a:rPr lang="it-IT" sz="1400" dirty="0" err="1"/>
-              <a:t>RandomForestRegressor</a:t>
+              <a:t>implemented</a:t>
             </a:r>
             <a:r>
               <a:rPr lang="it-IT" sz="1400" dirty="0"/>
-              <a:t>, in pipeline with a </a:t>
+              <a:t> a </a:t>
+            </a:r>
+            <a:r>
+              <a:rPr lang="it-IT" sz="1400" dirty="0" err="1">
+                <a:latin typeface="Consolas" panose="020B0609020204030204" pitchFamily="49" charset="0"/>
+              </a:rPr>
+              <a:t>RobustScaler</a:t>
+            </a:r>
+            <a:r>
+              <a:rPr lang="it-IT" sz="1400" dirty="0"/>
+              <a:t> in pipeline with the </a:t>
             </a:r>
             <a:r>
               <a:rPr lang="it-IT" sz="1400" dirty="0" err="1"/>
-              <a:t>RobustScaler</a:t>
+              <a:t>Neural</a:t>
             </a:r>
             <a:r>
               <a:rPr lang="it-IT" sz="1400" dirty="0"/>
-              <a:t>.</a:t>
+              <a:t> Network. </a:t>
             </a:r>
           </a:p>
         </p:txBody>
@@ -11141,8 +12595,8 @@
         </p:nvSpPr>
         <p:spPr>
           <a:xfrm>
-            <a:off x="311940" y="3431974"/>
-            <a:ext cx="4140741" cy="1231106"/>
+            <a:off x="311940" y="3150636"/>
+            <a:ext cx="4140741" cy="1877437"/>
           </a:xfrm>
           <a:prstGeom prst="rect">
             <a:avLst/>
@@ -11161,15 +12615,11 @@
             </a:pPr>
             <a:r>
               <a:rPr lang="it-IT" sz="1500" i="1" dirty="0"/>
-              <a:t>N° of </a:t>
-            </a:r>
-            <a:r>
-              <a:rPr lang="it-IT" sz="1500" i="1" dirty="0" err="1"/>
-              <a:t>estimators</a:t>
+              <a:t>Learning rate η</a:t>
             </a:r>
             <a:r>
               <a:rPr lang="it-IT" sz="1400" dirty="0"/>
-              <a:t>: 100, 150</a:t>
+              <a:t>: 0.01, 0.001</a:t>
             </a:r>
           </a:p>
           <a:p>
@@ -11182,15 +12632,19 @@
             </a:pPr>
             <a:r>
               <a:rPr lang="it-IT" sz="1500" i="1" dirty="0"/>
-              <a:t>Maximum </a:t>
+              <a:t>Momentum </a:t>
             </a:r>
             <a:r>
               <a:rPr lang="it-IT" sz="1500" i="1" dirty="0" err="1"/>
-              <a:t>depth</a:t>
+              <a:t>parameter</a:t>
+            </a:r>
+            <a:r>
+              <a:rPr lang="it-IT" sz="1500" i="1" dirty="0"/>
+              <a:t> α</a:t>
             </a:r>
             <a:r>
               <a:rPr lang="it-IT" sz="1400" dirty="0"/>
-              <a:t>: 8,10</a:t>
+              <a:t>: 0.7, 0.8, 0.9</a:t>
             </a:r>
           </a:p>
           <a:p>
@@ -11202,13 +12656,75 @@
               <a:buChar char="•"/>
             </a:pPr>
             <a:r>
+              <a:rPr lang="it-IT" sz="1400" i="1" dirty="0" err="1"/>
+              <a:t>Usage</a:t>
+            </a:r>
+            <a:r>
+              <a:rPr lang="it-IT" sz="1400" i="1" dirty="0"/>
+              <a:t> of </a:t>
+            </a:r>
+            <a:r>
+              <a:rPr lang="it-IT" sz="1400" i="1" dirty="0" err="1"/>
+              <a:t>Nesterov’s</a:t>
+            </a:r>
+            <a:r>
+              <a:rPr lang="it-IT" sz="1400" i="1" dirty="0"/>
+              <a:t> </a:t>
+            </a:r>
+            <a:r>
+              <a:rPr lang="it-IT" sz="1400" i="1" dirty="0" err="1"/>
+              <a:t>momentum</a:t>
+            </a:r>
+            <a:r>
+              <a:rPr lang="it-IT" sz="1400" dirty="0"/>
+              <a:t>: True, False </a:t>
+            </a:r>
+          </a:p>
+          <a:p>
+            <a:pPr marL="285750" indent="-285750">
+              <a:lnSpc>
+                <a:spcPct val="150000"/>
+              </a:lnSpc>
+              <a:buFont typeface="Arial" panose="020B0604020202020204" pitchFamily="34" charset="0"/>
+              <a:buChar char="•"/>
+            </a:pPr>
+            <a:r>
+              <a:rPr lang="it-IT" sz="1500" i="1" dirty="0" err="1"/>
+              <a:t>Activation</a:t>
+            </a:r>
+            <a:r>
               <a:rPr lang="it-IT" sz="1500" i="1" dirty="0"/>
-              <a:t>Minimum samples split</a:t>
+              <a:t> </a:t>
+            </a:r>
+            <a:r>
+              <a:rPr lang="it-IT" sz="1500" i="1" dirty="0" err="1"/>
+              <a:t>function</a:t>
+            </a:r>
+            <a:r>
+              <a:rPr lang="it-IT" sz="1500" i="1" dirty="0"/>
+              <a:t> for the </a:t>
+            </a:r>
+            <a:r>
+              <a:rPr lang="it-IT" sz="1500" i="1" dirty="0" err="1"/>
+              <a:t>hidden</a:t>
+            </a:r>
+            <a:r>
+              <a:rPr lang="it-IT" sz="1500" i="1" dirty="0"/>
+              <a:t> </a:t>
+            </a:r>
+            <a:r>
+              <a:rPr lang="it-IT" sz="1500" i="1" dirty="0" err="1"/>
+              <a:t>layers</a:t>
             </a:r>
             <a:r>
               <a:rPr lang="it-IT" sz="1400" dirty="0"/>
-              <a:t>: 2, 8, 10</a:t>
-            </a:r>
+              <a:t>: </a:t>
+            </a:r>
+            <a:r>
+              <a:rPr lang="it-IT" sz="1400" dirty="0" err="1"/>
+              <a:t>ReLU</a:t>
+            </a:r>
+            <a:endParaRPr lang="it-IT" sz="1400" dirty="0"/>
           </a:p>
           <a:p>
             <a:pPr marL="285750" indent="-285750">
@@ -11233,7 +12749,7 @@
         </p:nvSpPr>
         <p:spPr>
           <a:xfrm>
-            <a:off x="311940" y="3093420"/>
+            <a:off x="319038" y="2287011"/>
             <a:ext cx="8267284" cy="338554"/>
           </a:xfrm>
           <a:prstGeom prst="rect">
@@ -11312,8 +12828,8 @@
         </p:nvSpPr>
         <p:spPr>
           <a:xfrm>
-            <a:off x="4452681" y="3431974"/>
-            <a:ext cx="3623984" cy="630942"/>
+            <a:off x="4452680" y="3150636"/>
+            <a:ext cx="4126543" cy="1991379"/>
           </a:xfrm>
           <a:prstGeom prst="rect">
             <a:avLst/>
@@ -11335,17 +12851,163 @@
             </a:pPr>
             <a:r>
               <a:rPr lang="it-IT" sz="1400" i="1" dirty="0"/>
-              <a:t>Minimum samples </a:t>
+              <a:t>Dropout </a:t>
             </a:r>
             <a:r>
               <a:rPr lang="it-IT" sz="1400" i="1" dirty="0" err="1"/>
-              <a:t>leaves</a:t>
+              <a:t>hyperparameter</a:t>
+            </a:r>
+            <a:r>
+              <a:rPr lang="it-IT" sz="1400" i="1" dirty="0"/>
+              <a:t> </a:t>
             </a:r>
             <a:r>
               <a:rPr lang="it-IT" sz="1400" dirty="0"/>
-              <a:t>: 1, 3, 4</a:t>
-            </a:r>
-          </a:p>
+              <a:t>(</a:t>
+            </a:r>
+            <a:r>
+              <a:rPr lang="it-IT" sz="1400" i="1" dirty="0"/>
+              <a:t>input </a:t>
+            </a:r>
+            <a:r>
+              <a:rPr lang="it-IT" sz="1400" i="1" dirty="0" err="1"/>
+              <a:t>layer</a:t>
+            </a:r>
+            <a:r>
+              <a:rPr lang="it-IT" sz="1400" dirty="0"/>
+              <a:t>): 0.1, 0.2, 0.3</a:t>
+            </a:r>
+          </a:p>
+          <a:p>
+            <a:pPr marL="285750" indent="-285750">
+              <a:lnSpc>
+                <a:spcPct val="150000"/>
+              </a:lnSpc>
+              <a:buFont typeface="Arial" panose="020B0604020202020204" pitchFamily="34" charset="0"/>
+              <a:buChar char="•"/>
+            </a:pPr>
+            <a:r>
+              <a:rPr lang="it-IT" sz="1400" i="1" dirty="0"/>
+              <a:t>Dropout </a:t>
+            </a:r>
+            <a:r>
+              <a:rPr lang="it-IT" sz="1400" i="1" dirty="0" err="1"/>
+              <a:t>hyperparameter</a:t>
+            </a:r>
+            <a:r>
+              <a:rPr lang="it-IT" sz="1400" i="1" dirty="0"/>
+              <a:t> </a:t>
+            </a:r>
+            <a:r>
+              <a:rPr lang="it-IT" sz="1400" dirty="0"/>
+              <a:t>(</a:t>
+            </a:r>
+            <a:r>
+              <a:rPr lang="it-IT" sz="1400" i="1" dirty="0" err="1"/>
+              <a:t>hidden</a:t>
+            </a:r>
+            <a:r>
+              <a:rPr lang="it-IT" sz="1400" i="1" dirty="0"/>
+              <a:t> </a:t>
+            </a:r>
+            <a:r>
+              <a:rPr lang="it-IT" sz="1400" i="1" dirty="0" err="1"/>
+              <a:t>layers</a:t>
+            </a:r>
+            <a:r>
+              <a:rPr lang="it-IT" sz="1400" dirty="0"/>
+              <a:t>): </a:t>
+            </a:r>
+            <a:br>
+              <a:rPr lang="it-IT" sz="1400" dirty="0"/>
+            </a:br>
+            <a:r>
+              <a:rPr lang="it-IT" sz="1400" dirty="0"/>
+              <a:t>(0.2, 0.2), (0.3,0.3), (0.3, 0.4)</a:t>
+            </a:r>
+          </a:p>
+          <a:p>
+            <a:pPr marL="285750" indent="-285750">
+              <a:lnSpc>
+                <a:spcPct val="150000"/>
+              </a:lnSpc>
+              <a:buFont typeface="Arial" panose="020B0604020202020204" pitchFamily="34" charset="0"/>
+              <a:buChar char="•"/>
+            </a:pPr>
+            <a:r>
+              <a:rPr lang="it-IT" sz="1400" i="1" dirty="0"/>
+              <a:t>L2 </a:t>
+            </a:r>
+            <a:r>
+              <a:rPr lang="it-IT" sz="1400" i="1" dirty="0" err="1"/>
+              <a:t>regularization</a:t>
+            </a:r>
+            <a:r>
+              <a:rPr lang="it-IT" sz="1400" i="1" dirty="0"/>
+              <a:t> </a:t>
+            </a:r>
+            <a:r>
+              <a:rPr lang="it-IT" sz="1400" i="1" dirty="0" err="1"/>
+              <a:t>hyperparameter</a:t>
+            </a:r>
+            <a:r>
+              <a:rPr lang="it-IT" sz="1400" i="1" dirty="0"/>
+              <a:t> λ</a:t>
+            </a:r>
+            <a:r>
+              <a:rPr lang="it-IT" sz="1400" dirty="0"/>
+              <a:t>: 10</a:t>
+            </a:r>
+            <a:r>
+              <a:rPr lang="it-IT" sz="1400" baseline="30000" dirty="0"/>
+              <a:t>-4</a:t>
+            </a:r>
+            <a:r>
+              <a:rPr lang="it-IT" sz="1400" dirty="0"/>
+              <a:t>, 10</a:t>
+            </a:r>
+            <a:r>
+              <a:rPr lang="it-IT" sz="1400" baseline="30000" dirty="0"/>
+              <a:t>-5</a:t>
+            </a:r>
+          </a:p>
+          <a:p>
+            <a:pPr>
+              <a:lnSpc>
+                <a:spcPct val="150000"/>
+              </a:lnSpc>
+            </a:pPr>
+            <a:endParaRPr lang="it-IT" sz="1400" dirty="0"/>
+          </a:p>
+        </p:txBody>
+      </p:sp>
+      <p:sp>
+        <p:nvSpPr>
+          <p:cNvPr id="2" name="CasellaDiTesto 1">
+            <a:extLst>
+              <a:ext uri="{FF2B5EF4-FFF2-40B4-BE49-F238E27FC236}">
+                <a16:creationId xmlns:a16="http://schemas.microsoft.com/office/drawing/2014/main" id="{360A9BC0-A62F-B75F-9419-9C8914E4A9A0}"/>
+              </a:ext>
+            </a:extLst>
+          </p:cNvPr>
+          <p:cNvSpPr txBox="1"/>
+          <p:nvPr/>
+        </p:nvSpPr>
+        <p:spPr>
+          <a:xfrm>
+            <a:off x="311939" y="2626182"/>
+            <a:ext cx="8267284" cy="523220"/>
+          </a:xfrm>
+          <a:prstGeom prst="rect">
+            <a:avLst/>
+          </a:prstGeom>
+          <a:noFill/>
+        </p:spPr>
+        <p:txBody>
+          <a:bodyPr wrap="square" rtlCol="0">
+            <a:spAutoFit/>
+          </a:bodyPr>
+          <a:lstStyle/>
           <a:p>
             <a:pPr marL="285750" indent="-285750">
               <a:buFont typeface="Arial" panose="020B0604020202020204" pitchFamily="34" charset="0"/>
@@ -11353,19 +13015,228 @@
             </a:pPr>
             <a:r>
               <a:rPr lang="it-IT" sz="1400" i="1" dirty="0"/>
-              <a:t>Maximum features</a:t>
+              <a:t>Architecture </a:t>
             </a:r>
             <a:r>
               <a:rPr lang="it-IT" sz="1400" dirty="0"/>
-              <a:t>: </a:t>
+              <a:t>(</a:t>
+            </a:r>
+            <a:r>
+              <a:rPr lang="it-IT" sz="1400" i="1" dirty="0" err="1"/>
+              <a:t>meaning</a:t>
+            </a:r>
+            <a:r>
+              <a:rPr lang="it-IT" sz="1400" i="1" dirty="0"/>
+              <a:t> of </a:t>
+            </a:r>
+            <a:r>
+              <a:rPr lang="it-IT" sz="1400" dirty="0"/>
+              <a:t>(</a:t>
+            </a:r>
+            <a:r>
+              <a:rPr lang="it-IT" sz="1400" i="1" dirty="0"/>
+              <a:t>x</a:t>
+            </a:r>
+            <a:r>
+              <a:rPr lang="it-IT" sz="1400" i="1" baseline="-25000" dirty="0"/>
+              <a:t>1</a:t>
+            </a:r>
+            <a:r>
+              <a:rPr lang="it-IT" sz="1400" dirty="0"/>
+              <a:t>,</a:t>
+            </a:r>
+            <a:r>
+              <a:rPr lang="it-IT" sz="1400" i="1" dirty="0"/>
+              <a:t>…</a:t>
+            </a:r>
+            <a:r>
+              <a:rPr lang="it-IT" sz="1400" dirty="0"/>
+              <a:t>,</a:t>
+            </a:r>
+            <a:r>
+              <a:rPr lang="it-IT" sz="1400" i="1" dirty="0" err="1"/>
+              <a:t>x</a:t>
+            </a:r>
+            <a:r>
+              <a:rPr lang="it-IT" sz="1400" i="1" baseline="-25000" dirty="0" err="1"/>
+              <a:t>n</a:t>
+            </a:r>
+            <a:r>
+              <a:rPr lang="it-IT" sz="1400" dirty="0"/>
+              <a:t>): </a:t>
+            </a:r>
+            <a:r>
+              <a:rPr lang="it-IT" sz="1400" i="1" dirty="0"/>
+              <a:t>n </a:t>
+            </a:r>
+            <a:r>
+              <a:rPr lang="it-IT" sz="1400" i="1" dirty="0" err="1"/>
+              <a:t>hidden</a:t>
+            </a:r>
+            <a:r>
+              <a:rPr lang="it-IT" sz="1400" i="1" dirty="0"/>
+              <a:t> </a:t>
+            </a:r>
+            <a:r>
+              <a:rPr lang="it-IT" sz="1400" i="1" dirty="0" err="1"/>
+              <a:t>layers</a:t>
+            </a:r>
+            <a:r>
+              <a:rPr lang="it-IT" sz="1400" dirty="0"/>
+              <a:t>. </a:t>
+            </a:r>
+            <a:r>
+              <a:rPr lang="it-IT" sz="1400" i="1" dirty="0"/>
+              <a:t>Layer i </a:t>
+            </a:r>
+            <a:r>
+              <a:rPr lang="it-IT" sz="1400" i="1" dirty="0" err="1"/>
+              <a:t>has</a:t>
+            </a:r>
+            <a:r>
+              <a:rPr lang="it-IT" sz="1400" i="1" dirty="0"/>
+              <a:t> x</a:t>
+            </a:r>
+            <a:r>
+              <a:rPr lang="it-IT" sz="1400" i="1" baseline="-25000" dirty="0"/>
+              <a:t>i</a:t>
+            </a:r>
+            <a:r>
+              <a:rPr lang="it-IT" sz="1400" i="1" dirty="0"/>
+              <a:t> </a:t>
+            </a:r>
+            <a:r>
+              <a:rPr lang="it-IT" sz="1400" i="1" dirty="0" err="1"/>
+              <a:t>units</a:t>
+            </a:r>
+            <a:r>
+              <a:rPr lang="it-IT" sz="1400" dirty="0"/>
+              <a:t>): </a:t>
+            </a:r>
+            <a:br>
+              <a:rPr lang="it-IT" sz="1400" dirty="0"/>
+            </a:br>
+            <a:r>
+              <a:rPr lang="it-IT" sz="1400" dirty="0"/>
+              <a:t>(64, 64), (128,64), (128,128)</a:t>
+            </a:r>
+          </a:p>
+        </p:txBody>
+      </p:sp>
+      <p:sp>
+        <p:nvSpPr>
+          <p:cNvPr id="3" name="CasellaDiTesto 2">
+            <a:extLst>
+              <a:ext uri="{FF2B5EF4-FFF2-40B4-BE49-F238E27FC236}">
+                <a16:creationId xmlns:a16="http://schemas.microsoft.com/office/drawing/2014/main" id="{274C2A88-6191-5D54-C905-398AEFCF8664}"/>
+              </a:ext>
+            </a:extLst>
+          </p:cNvPr>
+          <p:cNvSpPr txBox="1"/>
+          <p:nvPr/>
+        </p:nvSpPr>
+        <p:spPr>
+          <a:xfrm>
+            <a:off x="311938" y="1390370"/>
+            <a:ext cx="8832062" cy="307777"/>
+          </a:xfrm>
+          <a:prstGeom prst="rect">
+            <a:avLst/>
+          </a:prstGeom>
+          <a:noFill/>
+        </p:spPr>
+        <p:txBody>
+          <a:bodyPr wrap="square" rtlCol="0">
+            <a:spAutoFit/>
+          </a:bodyPr>
+          <a:lstStyle/>
+          <a:p>
+            <a:r>
+              <a:rPr lang="it-IT" sz="1400" dirty="0">
+                <a:solidFill>
+                  <a:srgbClr val="FF0000"/>
+                </a:solidFill>
+              </a:rPr>
+              <a:t>Inizializzazione dei pesi </a:t>
+            </a:r>
+            <a:r>
+              <a:rPr lang="it-IT" sz="1400" dirty="0"/>
+              <a:t>(direi si descrive nel dettaglio nella </a:t>
             </a:r>
             <a:r>
               <a:rPr lang="it-IT" sz="1400" dirty="0" err="1"/>
-              <a:t>squared</a:t>
+              <a:t>prox</a:t>
             </a:r>
             <a:r>
               <a:rPr lang="it-IT" sz="1400" dirty="0"/>
-              <a:t> root, log2 </a:t>
+              <a:t> slide). </a:t>
+            </a:r>
+            <a:r>
+              <a:rPr lang="it-IT" sz="1400" dirty="0" err="1"/>
+              <a:t>Cfr</a:t>
+            </a:r>
+            <a:r>
+              <a:rPr lang="it-IT" sz="1400" dirty="0"/>
+              <a:t> checklist di ML-23-Report-info</a:t>
+            </a:r>
+          </a:p>
+        </p:txBody>
+      </p:sp>
+      <p:sp>
+        <p:nvSpPr>
+          <p:cNvPr id="4" name="CasellaDiTesto 3">
+            <a:extLst>
+              <a:ext uri="{FF2B5EF4-FFF2-40B4-BE49-F238E27FC236}">
+                <a16:creationId xmlns:a16="http://schemas.microsoft.com/office/drawing/2014/main" id="{5A392564-5232-114A-B13E-5A063453402A}"/>
+              </a:ext>
+            </a:extLst>
+          </p:cNvPr>
+          <p:cNvSpPr txBox="1"/>
+          <p:nvPr/>
+        </p:nvSpPr>
+        <p:spPr>
+          <a:xfrm>
+            <a:off x="319038" y="1731016"/>
+            <a:ext cx="8832062" cy="307777"/>
+          </a:xfrm>
+          <a:prstGeom prst="rect">
+            <a:avLst/>
+          </a:prstGeom>
+          <a:noFill/>
+        </p:spPr>
+        <p:txBody>
+          <a:bodyPr wrap="square" rtlCol="0">
+            <a:spAutoFit/>
+          </a:bodyPr>
+          <a:lstStyle/>
+          <a:p>
+            <a:r>
+              <a:rPr lang="it-IT" sz="1400" dirty="0">
+                <a:solidFill>
+                  <a:srgbClr val="FF0000"/>
+                </a:solidFill>
+              </a:rPr>
+              <a:t>Criterio di arresto </a:t>
+            </a:r>
+            <a:r>
+              <a:rPr lang="it-IT" sz="1400" dirty="0"/>
+              <a:t>(se necessario si descrive nel dettaglio nella </a:t>
+            </a:r>
+            <a:r>
+              <a:rPr lang="it-IT" sz="1400" dirty="0" err="1"/>
+              <a:t>prox</a:t>
+            </a:r>
+            <a:r>
+              <a:rPr lang="it-IT" sz="1400" dirty="0"/>
+              <a:t> slide). </a:t>
+            </a:r>
+            <a:r>
+              <a:rPr lang="it-IT" sz="1400" dirty="0" err="1"/>
+              <a:t>Cfr</a:t>
+            </a:r>
+            <a:r>
+              <a:rPr lang="it-IT" sz="1400" dirty="0"/>
+              <a:t> checklist di ML-23-Report-info</a:t>
             </a:r>
           </a:p>
         </p:txBody>
@@ -11658,6 +13529,194 @@
               </a:rPr>
               <a:t>)</a:t>
             </a:r>
+          </a:p>
+        </p:txBody>
+      </p:sp>
+      <p:sp>
+        <p:nvSpPr>
+          <p:cNvPr id="2" name="CasellaDiTesto 1">
+            <a:extLst>
+              <a:ext uri="{FF2B5EF4-FFF2-40B4-BE49-F238E27FC236}">
+                <a16:creationId xmlns:a16="http://schemas.microsoft.com/office/drawing/2014/main" id="{D9884534-5F12-27F6-1B5F-8149A5D5CCB6}"/>
+              </a:ext>
+            </a:extLst>
+          </p:cNvPr>
+          <p:cNvSpPr txBox="1"/>
+          <p:nvPr/>
+        </p:nvSpPr>
+        <p:spPr>
+          <a:xfrm>
+            <a:off x="389965" y="2783541"/>
+            <a:ext cx="7732059" cy="738664"/>
+          </a:xfrm>
+          <a:prstGeom prst="rect">
+            <a:avLst/>
+          </a:prstGeom>
+          <a:noFill/>
+        </p:spPr>
+        <p:txBody>
+          <a:bodyPr wrap="square" rtlCol="0">
+            <a:spAutoFit/>
+          </a:bodyPr>
+          <a:lstStyle/>
+          <a:p>
+            <a:r>
+              <a:rPr lang="it-IT" sz="1400" dirty="0">
+                <a:solidFill>
+                  <a:srgbClr val="FF0000"/>
+                </a:solidFill>
+              </a:rPr>
+              <a:t>Abbiamo usato </a:t>
+            </a:r>
+            <a:r>
+              <a:rPr lang="it-IT" sz="1400" dirty="0" err="1">
+                <a:solidFill>
+                  <a:srgbClr val="FF0000"/>
+                </a:solidFill>
+              </a:rPr>
+              <a:t>SciKeras</a:t>
+            </a:r>
+            <a:r>
+              <a:rPr lang="it-IT" sz="1400" dirty="0">
+                <a:solidFill>
+                  <a:srgbClr val="FF0000"/>
+                </a:solidFill>
+              </a:rPr>
+              <a:t> per interfacciare con </a:t>
+            </a:r>
+            <a:r>
+              <a:rPr lang="it-IT" sz="1400" dirty="0" err="1">
+                <a:solidFill>
+                  <a:srgbClr val="FF0000"/>
+                </a:solidFill>
+              </a:rPr>
+              <a:t>Scikit-Learn</a:t>
+            </a:r>
+            <a:r>
+              <a:rPr lang="it-IT" sz="1400" dirty="0">
+                <a:solidFill>
+                  <a:srgbClr val="FF0000"/>
+                </a:solidFill>
+              </a:rPr>
+              <a:t> la NN fatta con </a:t>
+            </a:r>
+            <a:r>
+              <a:rPr lang="it-IT" sz="1400" dirty="0" err="1">
+                <a:solidFill>
+                  <a:srgbClr val="FF0000"/>
+                </a:solidFill>
+              </a:rPr>
+              <a:t>Keras</a:t>
+            </a:r>
+            <a:r>
+              <a:rPr lang="it-IT" sz="1400" dirty="0">
+                <a:solidFill>
+                  <a:srgbClr val="FF0000"/>
+                </a:solidFill>
+              </a:rPr>
+              <a:t>. Questo perché anche per le NN abbiamo usato </a:t>
+            </a:r>
+            <a:r>
+              <a:rPr lang="it-IT" sz="1400" dirty="0" err="1">
+                <a:solidFill>
+                  <a:srgbClr val="FF0000"/>
+                </a:solidFill>
+              </a:rPr>
+              <a:t>Scikit-Learn</a:t>
+            </a:r>
+            <a:r>
+              <a:rPr lang="it-IT" sz="1400" dirty="0">
+                <a:solidFill>
+                  <a:srgbClr val="FF0000"/>
+                </a:solidFill>
+              </a:rPr>
+              <a:t> per la </a:t>
+            </a:r>
+            <a:r>
+              <a:rPr lang="it-IT" sz="1400" dirty="0" err="1">
+                <a:solidFill>
+                  <a:srgbClr val="FF0000"/>
+                </a:solidFill>
+              </a:rPr>
+              <a:t>grid</a:t>
+            </a:r>
+            <a:r>
+              <a:rPr lang="it-IT" sz="1400" dirty="0">
+                <a:solidFill>
+                  <a:srgbClr val="FF0000"/>
+                </a:solidFill>
+              </a:rPr>
+              <a:t> </a:t>
+            </a:r>
+            <a:r>
+              <a:rPr lang="it-IT" sz="1400" dirty="0" err="1">
+                <a:solidFill>
+                  <a:srgbClr val="FF0000"/>
+                </a:solidFill>
+              </a:rPr>
+              <a:t>search</a:t>
+            </a:r>
+            <a:r>
+              <a:rPr lang="it-IT" sz="1400" dirty="0">
+                <a:solidFill>
+                  <a:srgbClr val="FF0000"/>
+                </a:solidFill>
+              </a:rPr>
+              <a:t> e la scelta degli </a:t>
+            </a:r>
+            <a:r>
+              <a:rPr lang="it-IT" sz="1400" dirty="0" err="1">
+                <a:solidFill>
+                  <a:srgbClr val="FF0000"/>
+                </a:solidFill>
+              </a:rPr>
+              <a:t>iperparametri</a:t>
+            </a:r>
+            <a:r>
+              <a:rPr lang="it-IT" sz="1400" dirty="0">
+                <a:solidFill>
+                  <a:srgbClr val="FF0000"/>
+                </a:solidFill>
+              </a:rPr>
+              <a:t> migliori (ottenuti dalla </a:t>
+            </a:r>
+            <a:r>
+              <a:rPr lang="it-IT" sz="1400" dirty="0" err="1">
+                <a:solidFill>
+                  <a:srgbClr val="FF0000"/>
+                </a:solidFill>
+              </a:rPr>
+              <a:t>grid</a:t>
+            </a:r>
+            <a:r>
+              <a:rPr lang="it-IT" sz="1400" dirty="0">
+                <a:solidFill>
+                  <a:srgbClr val="FF0000"/>
+                </a:solidFill>
+              </a:rPr>
+              <a:t> </a:t>
+            </a:r>
+            <a:r>
+              <a:rPr lang="it-IT" sz="1400" dirty="0" err="1">
+                <a:solidFill>
+                  <a:srgbClr val="FF0000"/>
+                </a:solidFill>
+              </a:rPr>
+              <a:t>search</a:t>
+            </a:r>
+            <a:r>
+              <a:rPr lang="it-IT" sz="1400" dirty="0">
+                <a:solidFill>
+                  <a:srgbClr val="FF0000"/>
+                </a:solidFill>
+              </a:rPr>
+              <a:t>)</a:t>
+            </a:r>
+            <a:endParaRPr lang="it-IT" dirty="0">
+              <a:solidFill>
+                <a:srgbClr val="FF0000"/>
+              </a:solidFill>
+            </a:endParaRPr>
           </a:p>
         </p:txBody>
       </p:sp>
@@ -12957,14 +15016,14 @@
           <p:nvPr>
             <p:extLst>
               <p:ext uri="{D42A27DB-BD31-4B8C-83A1-F6EECF244321}">
-                <p14:modId xmlns:p14="http://schemas.microsoft.com/office/powerpoint/2010/main" val="1281352081"/>
+                <p14:modId xmlns:p14="http://schemas.microsoft.com/office/powerpoint/2010/main" val="4041784029"/>
               </p:ext>
             </p:extLst>
           </p:nvPr>
         </p:nvGraphicFramePr>
         <p:xfrm>
-          <a:off x="311761" y="1589943"/>
-          <a:ext cx="8160842" cy="2640690"/>
+          <a:off x="311758" y="1139467"/>
+          <a:ext cx="8160842" cy="3536460"/>
         </p:xfrm>
         <a:graphic>
           <a:graphicData uri="http://schemas.openxmlformats.org/drawingml/2006/table">
@@ -13002,7 +15061,7 @@
                   </a:extLst>
                 </a:gridCol>
               </a:tblGrid>
-              <a:tr h="225137">
+              <a:tr h="481506">
                 <a:tc>
                   <a:txBody>
                     <a:bodyPr/>
@@ -13024,15 +15083,19 @@
                     <a:p>
                       <a:pPr algn="ctr"/>
                       <a:r>
+                        <a:rPr lang="it-IT" sz="1400" i="1" dirty="0"/>
+                        <a:t>Architecture</a:t>
+                      </a:r>
+                      <a:r>
                         <a:rPr lang="it-IT" sz="1600" i="1" dirty="0"/>
-                        <a:t>Architecture </a:t>
+                        <a:t> </a:t>
                       </a:r>
                       <a:r>
                         <a:rPr lang="it-IT" sz="1600" i="0" dirty="0"/>
                         <a:t>/ </a:t>
                       </a:r>
                       <a:r>
-                        <a:rPr lang="it-IT" sz="1600" i="1" dirty="0" err="1"/>
+                        <a:rPr lang="it-IT" sz="1400" i="1" dirty="0" err="1"/>
                         <a:t>optimizer</a:t>
                       </a:r>
                       <a:r>
@@ -13044,7 +15107,7 @@
                         <a:t>/ </a:t>
                       </a:r>
                       <a:r>
-                        <a:rPr lang="it-IT" sz="1600" i="1" dirty="0"/>
+                        <a:rPr lang="it-IT" sz="1400" i="1" dirty="0"/>
                         <a:t>η</a:t>
                       </a:r>
                       <a:r>
@@ -13052,7 +15115,7 @@
                         <a:t> / </a:t>
                       </a:r>
                       <a:r>
-                        <a:rPr lang="it-IT" sz="1600" i="1" dirty="0"/>
+                        <a:rPr lang="it-IT" sz="1400" i="1" dirty="0"/>
                         <a:t>α</a:t>
                       </a:r>
                       <a:r>
@@ -13060,7 +15123,7 @@
                         <a:t> / </a:t>
                       </a:r>
                       <a:r>
-                        <a:rPr lang="it-IT" sz="1600" i="1" dirty="0"/>
+                        <a:rPr lang="it-IT" sz="1400" i="1" dirty="0"/>
                         <a:t>λ</a:t>
                       </a:r>
                       <a:r>
@@ -13068,7 +15131,7 @@
                         <a:t> / </a:t>
                       </a:r>
                       <a:r>
-                        <a:rPr lang="it-IT" sz="1600" i="1" dirty="0" err="1"/>
+                        <a:rPr lang="it-IT" sz="1400" i="1" dirty="0" err="1"/>
                         <a:t>epochs</a:t>
                       </a:r>
                       <a:r>
@@ -13076,10 +15139,26 @@
                         <a:t> / </a:t>
                       </a:r>
                       <a:r>
-                        <a:rPr lang="it-IT" sz="1600" i="1" dirty="0" err="1"/>
+                        <a:rPr lang="it-IT" sz="1400" i="1" dirty="0" err="1"/>
                         <a:t>batch_size</a:t>
                       </a:r>
-                      <a:endParaRPr lang="it-IT" sz="1600" i="1" dirty="0"/>
+                      <a:r>
+                        <a:rPr lang="it-IT" sz="1400" i="1" dirty="0"/>
+                        <a:t> </a:t>
+                      </a:r>
+                      <a:r>
+                        <a:rPr lang="it-IT" sz="1400" i="0" dirty="0">
+                          <a:solidFill>
+                            <a:srgbClr val="FF0000"/>
+                          </a:solidFill>
+                        </a:rPr>
+                        <a:t>/ …</a:t>
+                      </a:r>
+                      <a:endParaRPr lang="it-IT" sz="1600" i="1" dirty="0">
+                        <a:solidFill>
+                          <a:srgbClr val="FF0000"/>
+                        </a:solidFill>
+                      </a:endParaRPr>
                     </a:p>
                   </a:txBody>
                   <a:tcPr anchor="ctr"/>
@@ -13130,7 +15209,7 @@
                   </a:ext>
                 </a:extLst>
               </a:tr>
-              <a:tr h="687190">
+              <a:tr h="985780">
                 <a:tc>
                   <a:txBody>
                     <a:bodyPr/>
@@ -13208,7 +15287,7 @@
                   </a:ext>
                 </a:extLst>
               </a:tr>
-              <a:tr h="687190">
+              <a:tr h="985780">
                 <a:tc>
                   <a:txBody>
                     <a:bodyPr/>
@@ -13287,7 +15366,7 @@
                   </a:ext>
                 </a:extLst>
               </a:tr>
-              <a:tr h="687190">
+              <a:tr h="985780">
                 <a:tc>
                   <a:txBody>
                     <a:bodyPr/>
@@ -13403,7 +15482,7 @@
         </p:nvSpPr>
         <p:spPr>
           <a:xfrm>
-            <a:off x="311760" y="1251387"/>
+            <a:off x="311757" y="800910"/>
             <a:ext cx="8160842" cy="338554"/>
           </a:xfrm>
           <a:prstGeom prst="rect">
@@ -13424,7 +15503,7 @@
             </a:r>
             <a:r>
               <a:rPr lang="it-IT" sz="1600" b="1" dirty="0"/>
-              <a:t> 1</a:t>
+              <a:t> 3</a:t>
             </a:r>
             <a:r>
               <a:rPr lang="it-IT" sz="1600" dirty="0"/>
@@ -13675,7 +15754,7 @@
         <p:spPr>
           <a:xfrm>
             <a:off x="311760" y="921124"/>
-            <a:ext cx="8160840" cy="861774"/>
+            <a:ext cx="8160840" cy="738664"/>
           </a:xfrm>
           <a:prstGeom prst="rect">
             <a:avLst/>
@@ -13689,38 +15768,33 @@
           <a:lstStyle/>
           <a:p>
             <a:r>
-              <a:rPr lang="it-IT" dirty="0"/>
+              <a:rPr lang="it-IT" sz="1400" dirty="0"/>
               <a:t>Per i tre task del </a:t>
             </a:r>
             <a:r>
-              <a:rPr lang="it-IT" dirty="0" err="1"/>
+              <a:rPr lang="it-IT" sz="1400" dirty="0" err="1"/>
               <a:t>monk</a:t>
             </a:r>
             <a:r>
-              <a:rPr lang="it-IT" dirty="0"/>
-              <a:t>, vuole la learning curve (su TR set e TS set) </a:t>
-            </a:r>
-            <a:r>
-              <a:rPr lang="it-IT" sz="1600" dirty="0"/>
-              <a:t>(MSE per epoca, nel caso di </a:t>
-            </a:r>
-            <a:r>
-              <a:rPr lang="it-IT" sz="1600" dirty="0" err="1"/>
+              <a:rPr lang="it-IT" sz="1400" dirty="0"/>
+              <a:t>, vuole la learning curve (su TR set e TS set) (MSE per epoca, nel caso di </a:t>
+            </a:r>
+            <a:r>
+              <a:rPr lang="it-IT" sz="1400" dirty="0" err="1"/>
               <a:t>sgd</a:t>
             </a:r>
             <a:r>
-              <a:rPr lang="it-IT" sz="1600" dirty="0"/>
+              <a:rPr lang="it-IT" sz="1400" dirty="0"/>
               <a:t>/</a:t>
             </a:r>
             <a:r>
-              <a:rPr lang="it-IT" sz="1600" dirty="0" err="1"/>
+              <a:rPr lang="it-IT" sz="1400" dirty="0" err="1"/>
               <a:t>minibatch</a:t>
             </a:r>
             <a:r>
-              <a:rPr lang="it-IT" sz="1600" dirty="0"/>
+              <a:rPr lang="it-IT" sz="1400" dirty="0"/>
               <a:t> vuole che ogni punto corrisponda alla media sull’epoca a cui tale punto si riferisce. Mi sa che le librerie calcolano ciò da sole?)</a:t>
             </a:r>
-            <a:endParaRPr lang="it-IT" dirty="0"/>
           </a:p>
         </p:txBody>
       </p:sp>

</xml_diff>

<commit_message>
Further changes to report
</commit_message>
<xml_diff>
--- a/relazione/ML-2023-PRJ-Slides-Demo.pptx
+++ b/relazione/ML-2023-PRJ-Slides-Demo.pptx
@@ -218,7 +218,7 @@
           <a:p>
             <a:fld id="{6A71CC8E-465E-46C0-91CA-2080D1264305}" type="datetimeFigureOut">
               <a:rPr lang="it-IT" smtClean="0"/>
-              <a:t>17/01/2024</a:t>
+              <a:t>18/01/2024</a:t>
             </a:fld>
             <a:endParaRPr lang="it-IT"/>
           </a:p>
@@ -5678,7 +5678,7 @@
         <p:spPr>
           <a:xfrm>
             <a:off x="311760" y="2676240"/>
-            <a:ext cx="8415720" cy="1477080"/>
+            <a:ext cx="8415720" cy="1374120"/>
           </a:xfrm>
           <a:prstGeom prst="rect">
             <a:avLst/>
@@ -5785,9 +5785,6 @@
               </a:rPr>
               <a:t>,</a:t>
             </a:r>
-            <a:endParaRPr lang="it-IT" sz="1520" b="0" strike="noStrike" spc="-1" dirty="0">
-              <a:latin typeface="Arial"/>
-            </a:endParaRPr>
           </a:p>
           <a:p>
             <a:pPr algn="ctr">
@@ -5800,18 +5797,24 @@
               </a:tabLst>
             </a:pPr>
             <a:r>
-              <a:rPr lang="it" sz="1520" b="0" strike="noStrike" spc="-1" dirty="0">
-                <a:solidFill>
-                  <a:srgbClr val="000000"/>
-                </a:solidFill>
-                <a:latin typeface="Arial"/>
-                <a:ea typeface="Arial"/>
-              </a:rPr>
-              <a:t>Altra</a:t>
-            </a:r>
-            <a:endParaRPr lang="it-IT" sz="1520" b="0" strike="noStrike" spc="-1" dirty="0">
-              <a:latin typeface="Arial"/>
-            </a:endParaRPr>
+              <a:rPr lang="it" sz="1520" spc="-1" dirty="0">
+                <a:solidFill>
+                  <a:srgbClr val="000000"/>
+                </a:solidFill>
+                <a:latin typeface="Arial"/>
+                <a:hlinkClick r:id="rId3"/>
+              </a:rPr>
+              <a:t>p.mollica@studenti.unipi.it</a:t>
+            </a:r>
+            <a:r>
+              <a:rPr lang="it" sz="1520" spc="-1" dirty="0">
+                <a:solidFill>
+                  <a:srgbClr val="000000"/>
+                </a:solidFill>
+                <a:latin typeface="Arial"/>
+              </a:rPr>
+              <a:t>,</a:t>
+            </a:r>
           </a:p>
           <a:p>
             <a:pPr algn="ctr">
@@ -5965,7 +5968,7 @@
           <p:nvPr/>
         </p:nvPicPr>
         <p:blipFill>
-          <a:blip r:embed="rId3"/>
+          <a:blip r:embed="rId4"/>
           <a:stretch/>
         </p:blipFill>
         <p:spPr>
@@ -14968,7 +14971,7 @@
         </p:nvSpPr>
         <p:spPr>
           <a:xfrm>
-            <a:off x="311760" y="1187179"/>
+            <a:off x="311760" y="616670"/>
             <a:ext cx="8160840" cy="307777"/>
           </a:xfrm>
           <a:prstGeom prst="rect">
@@ -15039,7 +15042,7 @@
         </p:nvSpPr>
         <p:spPr>
           <a:xfrm>
-            <a:off x="311760" y="2092926"/>
+            <a:off x="311760" y="1191093"/>
             <a:ext cx="7732059" cy="738664"/>
           </a:xfrm>
           <a:prstGeom prst="rect">
@@ -15227,7 +15230,7 @@
         </p:nvSpPr>
         <p:spPr>
           <a:xfrm>
-            <a:off x="311760" y="3413781"/>
+            <a:off x="311760" y="2140686"/>
             <a:ext cx="8062465" cy="954107"/>
           </a:xfrm>
           <a:prstGeom prst="rect">
@@ -15280,6 +15283,131 @@
                 </a:solidFill>
               </a:rPr>
               <a:t>? Ha creato qualche aspettativa? Ci ha fatto formulare qualche ipotesi? Se sì, è stata confermata o smentita?</a:t>
+            </a:r>
+          </a:p>
+        </p:txBody>
+      </p:sp>
+      <p:sp>
+        <p:nvSpPr>
+          <p:cNvPr id="5" name="CasellaDiTesto 4">
+            <a:extLst>
+              <a:ext uri="{FF2B5EF4-FFF2-40B4-BE49-F238E27FC236}">
+                <a16:creationId xmlns:a16="http://schemas.microsoft.com/office/drawing/2014/main" id="{A8087FD7-7006-3A2A-3B0A-03880C8C49E0}"/>
+              </a:ext>
+            </a:extLst>
+          </p:cNvPr>
+          <p:cNvSpPr txBox="1"/>
+          <p:nvPr/>
+        </p:nvSpPr>
+        <p:spPr>
+          <a:xfrm>
+            <a:off x="605118" y="3496235"/>
+            <a:ext cx="7120217" cy="738664"/>
+          </a:xfrm>
+          <a:prstGeom prst="rect">
+            <a:avLst/>
+          </a:prstGeom>
+          <a:noFill/>
+        </p:spPr>
+        <p:txBody>
+          <a:bodyPr wrap="square" rtlCol="0">
+            <a:spAutoFit/>
+          </a:bodyPr>
+          <a:lstStyle/>
+          <a:p>
+            <a:r>
+              <a:rPr lang="it-IT" sz="1400" dirty="0"/>
+              <a:t>Weight </a:t>
+            </a:r>
+            <a:r>
+              <a:rPr lang="it-IT" sz="1400" dirty="0" err="1"/>
+              <a:t>init</a:t>
+            </a:r>
+            <a:r>
+              <a:rPr lang="it-IT" sz="1400" dirty="0"/>
+              <a:t>. (Be </a:t>
+            </a:r>
+            <a:r>
+              <a:rPr lang="it-IT" sz="1400" dirty="0" err="1"/>
+              <a:t>normal</a:t>
+            </a:r>
+            <a:r>
+              <a:rPr lang="it-IT" sz="1400" dirty="0"/>
+              <a:t>), dropout, </a:t>
+            </a:r>
+            <a:r>
+              <a:rPr lang="it-IT" sz="1400" dirty="0" err="1"/>
+              <a:t>robust</a:t>
+            </a:r>
+            <a:r>
+              <a:rPr lang="it-IT" sz="1400" dirty="0"/>
+              <a:t> </a:t>
+            </a:r>
+            <a:r>
+              <a:rPr lang="it-IT" sz="1400" dirty="0" err="1"/>
+              <a:t>scaler</a:t>
+            </a:r>
+            <a:r>
+              <a:rPr lang="it-IT" sz="1400" dirty="0"/>
+              <a:t>, </a:t>
+            </a:r>
+            <a:r>
+              <a:rPr lang="it-IT" sz="1400" dirty="0" err="1"/>
+              <a:t>usage</a:t>
+            </a:r>
+            <a:r>
+              <a:rPr lang="it-IT" sz="1400" dirty="0"/>
+              <a:t> of a </a:t>
+            </a:r>
+            <a:r>
+              <a:rPr lang="it-IT" sz="1400" dirty="0" err="1"/>
+              <a:t>Bayesian</a:t>
+            </a:r>
+            <a:r>
+              <a:rPr lang="it-IT" sz="1400" dirty="0"/>
+              <a:t> </a:t>
+            </a:r>
+            <a:r>
+              <a:rPr lang="it-IT" sz="1400" dirty="0" err="1"/>
+              <a:t>opt</a:t>
+            </a:r>
+            <a:r>
+              <a:rPr lang="it-IT" sz="1400" dirty="0"/>
+              <a:t>, </a:t>
+            </a:r>
+            <a:r>
+              <a:rPr lang="it-IT" sz="1400" dirty="0" err="1"/>
+              <a:t>something</a:t>
+            </a:r>
+            <a:r>
+              <a:rPr lang="it-IT" sz="1400" dirty="0"/>
+              <a:t> on the dropout? </a:t>
+            </a:r>
+          </a:p>
+          <a:p>
+            <a:r>
+              <a:rPr lang="it-IT" sz="1400" dirty="0" err="1"/>
+              <a:t>Why</a:t>
+            </a:r>
+            <a:r>
+              <a:rPr lang="it-IT" sz="1400" dirty="0"/>
+              <a:t> a pipeline </a:t>
+            </a:r>
+            <a:r>
+              <a:rPr lang="it-IT" sz="1400" dirty="0" err="1"/>
+              <a:t>instead</a:t>
+            </a:r>
+            <a:r>
+              <a:rPr lang="it-IT" sz="1400" dirty="0"/>
+              <a:t> of </a:t>
+            </a:r>
+            <a:r>
+              <a:rPr lang="it-IT" sz="1400" dirty="0" err="1"/>
+              <a:t>sequential</a:t>
+            </a:r>
+            <a:r>
+              <a:rPr lang="it-IT" sz="1400" dirty="0"/>
+              <a:t>?  </a:t>
             </a:r>
           </a:p>
         </p:txBody>

</xml_diff>

<commit_message>
Added Monk results, plots and (very brief) discussion
</commit_message>
<xml_diff>
--- a/relazione/ML-2023-PRJ-Slides-Demo.pptx
+++ b/relazione/ML-2023-PRJ-Slides-Demo.pptx
@@ -6,7 +6,7 @@
     <p:sldMasterId id="2147483661" r:id="rId2"/>
   </p:sldMasterIdLst>
   <p:notesMasterIdLst>
-    <p:notesMasterId r:id="rId34"/>
+    <p:notesMasterId r:id="rId36"/>
   </p:notesMasterIdLst>
   <p:sldIdLst>
     <p:sldId id="256" r:id="rId3"/>
@@ -37,9 +37,11 @@
     <p:sldId id="283" r:id="rId28"/>
     <p:sldId id="288" r:id="rId29"/>
     <p:sldId id="291" r:id="rId30"/>
-    <p:sldId id="281" r:id="rId31"/>
-    <p:sldId id="284" r:id="rId32"/>
-    <p:sldId id="286" r:id="rId33"/>
+    <p:sldId id="292" r:id="rId31"/>
+    <p:sldId id="293" r:id="rId32"/>
+    <p:sldId id="281" r:id="rId33"/>
+    <p:sldId id="284" r:id="rId34"/>
+    <p:sldId id="286" r:id="rId35"/>
   </p:sldIdLst>
   <p:sldSz cx="9144000" cy="5143500" type="screen16x9"/>
   <p:notesSz cx="6858000" cy="9144000"/>
@@ -228,7 +230,7 @@
           <a:p>
             <a:fld id="{6A71CC8E-465E-46C0-91CA-2080D1264305}" type="datetimeFigureOut">
               <a:rPr lang="it-IT" smtClean="0"/>
-              <a:t>23/01/2024</a:t>
+              <a:t>24/01/2024</a:t>
             </a:fld>
             <a:endParaRPr lang="it-IT"/>
           </a:p>
@@ -15690,11 +15692,21 @@
                 <a:latin typeface="Arial"/>
                 <a:ea typeface="Arial"/>
               </a:rPr>
-              <a:t>Bibliography – 1</a:t>
+              <a:t>Bibliography – 1 </a:t>
+            </a:r>
+            <a:r>
+              <a:rPr lang="it" sz="2600" b="0" strike="noStrike" spc="-1" dirty="0">
+                <a:solidFill>
+                  <a:srgbClr val="FF0000"/>
+                </a:solidFill>
+                <a:latin typeface="Arial"/>
+                <a:ea typeface="Arial"/>
+              </a:rPr>
+              <a:t>Aggiustare?</a:t>
             </a:r>
             <a:endParaRPr lang="it-IT" sz="2800" b="0" strike="noStrike" spc="-1" dirty="0">
               <a:solidFill>
-                <a:srgbClr val="000000"/>
+                <a:srgbClr val="FF0000"/>
               </a:solidFill>
               <a:latin typeface="Arial"/>
             </a:endParaRPr>
@@ -16575,7 +16587,7 @@
         <p:spPr>
           <a:xfrm>
             <a:off x="490817" y="1452282"/>
-            <a:ext cx="7738783" cy="1384995"/>
+            <a:ext cx="7738783" cy="1815882"/>
           </a:xfrm>
           <a:prstGeom prst="rect">
             <a:avLst/>
@@ -16674,6 +16686,89 @@
               </a:rPr>
               <a:t>Articolo 2</a:t>
             </a:r>
+          </a:p>
+          <a:p>
+            <a:pPr marL="342900" indent="-342900">
+              <a:buFont typeface="+mj-lt"/>
+              <a:buAutoNum type="arabicPeriod" startAt="8"/>
+            </a:pPr>
+            <a:r>
+              <a:rPr lang="it-IT" sz="1400" dirty="0"/>
+              <a:t>S. </a:t>
+            </a:r>
+            <a:r>
+              <a:rPr lang="it-IT" sz="1400" dirty="0" err="1"/>
+              <a:t>Thrun</a:t>
+            </a:r>
+            <a:r>
+              <a:rPr lang="it-IT" sz="1400" dirty="0"/>
+              <a:t>, J. Bala, E. </a:t>
+            </a:r>
+            <a:r>
+              <a:rPr lang="it-IT" sz="1400" dirty="0" err="1"/>
+              <a:t>Bloedorn</a:t>
+            </a:r>
+            <a:r>
+              <a:rPr lang="it-IT" sz="1400" dirty="0"/>
+              <a:t>, I. </a:t>
+            </a:r>
+            <a:r>
+              <a:rPr lang="it-IT" sz="1400" dirty="0" err="1"/>
+              <a:t>Bratko</a:t>
+            </a:r>
+            <a:r>
+              <a:rPr lang="it-IT" sz="1400" dirty="0"/>
+              <a:t> et al. (1992). </a:t>
+            </a:r>
+            <a:r>
+              <a:rPr lang="it-IT" sz="1400" i="1" dirty="0"/>
+              <a:t>The </a:t>
+            </a:r>
+            <a:r>
+              <a:rPr lang="it-IT" sz="1400" i="1" dirty="0" err="1"/>
+              <a:t>MONK's</a:t>
+            </a:r>
+            <a:r>
+              <a:rPr lang="it-IT" sz="1400" i="1" dirty="0"/>
+              <a:t> </a:t>
+            </a:r>
+            <a:r>
+              <a:rPr lang="it-IT" sz="1400" i="1" dirty="0" err="1"/>
+              <a:t>Problems</a:t>
+            </a:r>
+            <a:r>
+              <a:rPr lang="it-IT" sz="1400" i="1" dirty="0"/>
+              <a:t>: A Performance </a:t>
+            </a:r>
+            <a:r>
+              <a:rPr lang="it-IT" sz="1400" i="1" dirty="0" err="1"/>
+              <a:t>Comparison</a:t>
+            </a:r>
+            <a:r>
+              <a:rPr lang="it-IT" sz="1400" i="1" dirty="0"/>
+              <a:t> of </a:t>
+            </a:r>
+            <a:r>
+              <a:rPr lang="it-IT" sz="1400" i="1" dirty="0" err="1"/>
+              <a:t>Different</a:t>
+            </a:r>
+            <a:r>
+              <a:rPr lang="it-IT" sz="1400" i="1" dirty="0"/>
+              <a:t> Learning </a:t>
+            </a:r>
+            <a:r>
+              <a:rPr lang="it-IT" sz="1400" i="1" dirty="0" err="1"/>
+              <a:t>Algorithms</a:t>
+            </a:r>
+            <a:r>
+              <a:rPr lang="it-IT" sz="1400" dirty="0"/>
+              <a:t>.</a:t>
+            </a:r>
+            <a:endParaRPr lang="it-IT" sz="1400" dirty="0">
+              <a:solidFill>
+                <a:srgbClr val="FF0000"/>
+              </a:solidFill>
+            </a:endParaRPr>
           </a:p>
           <a:p>
             <a:pPr marL="342900" indent="-342900">
@@ -21389,7 +21484,7 @@
           <p:nvPr>
             <p:extLst>
               <p:ext uri="{D42A27DB-BD31-4B8C-83A1-F6EECF244321}">
-                <p14:modId xmlns:p14="http://schemas.microsoft.com/office/powerpoint/2010/main" val="2280530603"/>
+                <p14:modId xmlns:p14="http://schemas.microsoft.com/office/powerpoint/2010/main" val="1776026863"/>
               </p:ext>
             </p:extLst>
           </p:nvPr>
@@ -21761,7 +21856,7 @@
                             <a:schemeClr val="tx1"/>
                           </a:solidFill>
                         </a:rPr>
-                        <a:t>71.71% </a:t>
+                        <a:t>71,71% </a:t>
                       </a:r>
                       <a:r>
                         <a:rPr lang="it-IT" sz="1400" i="0" dirty="0">
@@ -21895,15 +21990,15 @@
                       <a:r>
                         <a:rPr lang="it-IT" sz="1400" i="1" dirty="0">
                           <a:solidFill>
-                            <a:srgbClr val="FF0000"/>
+                            <a:schemeClr val="tx1"/>
                           </a:solidFill>
                         </a:rPr>
-                        <a:t>93.40% </a:t>
+                        <a:t>93,40% </a:t>
                       </a:r>
                       <a:r>
                         <a:rPr lang="it-IT" sz="1400" i="0" dirty="0">
                           <a:solidFill>
-                            <a:srgbClr val="FF0000"/>
+                            <a:schemeClr val="tx1"/>
                           </a:solidFill>
                         </a:rPr>
                         <a:t>/</a:t>
@@ -21911,10 +22006,10 @@
                       <a:r>
                         <a:rPr lang="it-IT" sz="1400" i="1" dirty="0">
                           <a:solidFill>
-                            <a:srgbClr val="FF0000"/>
+                            <a:schemeClr val="tx1"/>
                           </a:solidFill>
                         </a:rPr>
-                        <a:t> 97.22%</a:t>
+                        <a:t> 93,40%</a:t>
                       </a:r>
                     </a:p>
                   </a:txBody>
@@ -21942,11 +22037,14 @@
                         <a:tabLst/>
                         <a:defRPr/>
                       </a:pPr>
-                      <a:endParaRPr lang="it-IT" sz="1400" i="1" dirty="0">
-                        <a:solidFill>
-                          <a:srgbClr val="FF0000"/>
-                        </a:solidFill>
-                      </a:endParaRPr>
+                      <a:r>
+                        <a:rPr lang="it-IT" sz="1400" i="1" dirty="0">
+                          <a:solidFill>
+                            <a:schemeClr val="tx1"/>
+                          </a:solidFill>
+                        </a:rPr>
+                        <a:t>97,22%</a:t>
+                      </a:r>
                     </a:p>
                   </a:txBody>
                   <a:tcPr anchor="ctr"/>
@@ -22055,7 +22153,7 @@
           <p:nvPr>
             <p:extLst>
               <p:ext uri="{D42A27DB-BD31-4B8C-83A1-F6EECF244321}">
-                <p14:modId xmlns:p14="http://schemas.microsoft.com/office/powerpoint/2010/main" val="1849409378"/>
+                <p14:modId xmlns:p14="http://schemas.microsoft.com/office/powerpoint/2010/main" val="403741590"/>
               </p:ext>
             </p:extLst>
           </p:nvPr>
@@ -22483,7 +22581,7 @@
                       <a:pPr algn="ctr"/>
                       <a:r>
                         <a:rPr lang="it-IT" sz="1400" i="1" dirty="0"/>
-                        <a:t>95.37%</a:t>
+                        <a:t>95,37%</a:t>
                       </a:r>
                     </a:p>
                   </a:txBody>
@@ -22748,15 +22846,15 @@
                       <a:r>
                         <a:rPr lang="it-IT" sz="1400" i="1" dirty="0">
                           <a:solidFill>
-                            <a:srgbClr val="FF0000"/>
+                            <a:schemeClr val="tx1"/>
                           </a:solidFill>
                         </a:rPr>
-                        <a:t>93.40% </a:t>
+                        <a:t>95,88% </a:t>
                       </a:r>
                       <a:r>
                         <a:rPr lang="it-IT" sz="1400" i="0" dirty="0">
                           <a:solidFill>
-                            <a:srgbClr val="FF0000"/>
+                            <a:schemeClr val="tx1"/>
                           </a:solidFill>
                         </a:rPr>
                         <a:t>/</a:t>
@@ -22764,10 +22862,10 @@
                       <a:r>
                         <a:rPr lang="it-IT" sz="1400" i="1" dirty="0">
                           <a:solidFill>
-                            <a:srgbClr val="FF0000"/>
+                            <a:schemeClr val="tx1"/>
                           </a:solidFill>
                         </a:rPr>
-                        <a:t> 96.99%</a:t>
+                        <a:t> 92,57%</a:t>
                       </a:r>
                     </a:p>
                   </a:txBody>
@@ -22795,11 +22893,14 @@
                         <a:tabLst/>
                         <a:defRPr/>
                       </a:pPr>
-                      <a:endParaRPr lang="it-IT" sz="1400" i="1" dirty="0">
-                        <a:solidFill>
-                          <a:srgbClr val="FF0000"/>
-                        </a:solidFill>
-                      </a:endParaRPr>
+                      <a:r>
+                        <a:rPr lang="it-IT" sz="1400" i="1" dirty="0">
+                          <a:solidFill>
+                            <a:schemeClr val="tx1"/>
+                          </a:solidFill>
+                        </a:rPr>
+                        <a:t>96,99%</a:t>
+                      </a:r>
                     </a:p>
                   </a:txBody>
                   <a:tcPr anchor="ctr"/>
@@ -22981,17 +23082,17 @@
                 <a:latin typeface="Arial"/>
                 <a:ea typeface="Arial"/>
               </a:rPr>
-              <a:t>Appendix – 5 </a:t>
-            </a:r>
-            <a:r>
-              <a:rPr lang="it" sz="2400" b="0" strike="noStrike" spc="-1" dirty="0">
-                <a:solidFill>
-                  <a:srgbClr val="FF0000"/>
+              <a:t>Appendix – </a:t>
+            </a:r>
+            <a:r>
+              <a:rPr lang="it" sz="2400" spc="-1" dirty="0">
+                <a:solidFill>
+                  <a:srgbClr val="000000"/>
                 </a:solidFill>
                 <a:latin typeface="Arial"/>
                 <a:ea typeface="Arial"/>
               </a:rPr>
-              <a:t>DA FINIRE </a:t>
+              <a:t>5</a:t>
             </a:r>
             <a:br>
               <a:rPr lang="it" sz="2400" b="0" strike="noStrike" spc="-1" dirty="0">
@@ -23304,7 +23405,7 @@
         <p:spPr>
           <a:xfrm>
             <a:off x="308534" y="4061012"/>
-            <a:ext cx="8164066" cy="523220"/>
+            <a:ext cx="8403174" cy="523220"/>
           </a:xfrm>
           <a:prstGeom prst="rect">
             <a:avLst/>
@@ -23318,199 +23419,112 @@
           <a:lstStyle/>
           <a:p>
             <a:r>
-              <a:rPr lang="it-IT" sz="1400" dirty="0" err="1">
-                <a:solidFill>
-                  <a:srgbClr val="FF0000"/>
-                </a:solidFill>
-              </a:rPr>
+              <a:rPr lang="it-IT" sz="1400" dirty="0" err="1"/>
               <a:t>Interestingly</a:t>
             </a:r>
             <a:r>
-              <a:rPr lang="it-IT" sz="1400" dirty="0">
-                <a:solidFill>
-                  <a:srgbClr val="FF0000"/>
-                </a:solidFill>
-              </a:rPr>
+              <a:rPr lang="it-IT" sz="1400" dirty="0"/>
               <a:t>, </a:t>
             </a:r>
             <a:r>
-              <a:rPr lang="it-IT" sz="1400" dirty="0" err="1">
-                <a:solidFill>
-                  <a:srgbClr val="FF0000"/>
-                </a:solidFill>
-              </a:rPr>
+              <a:rPr lang="it-IT" sz="1400" dirty="0" err="1"/>
               <a:t>all</a:t>
             </a:r>
             <a:r>
-              <a:rPr lang="it-IT" sz="1400" dirty="0">
-                <a:solidFill>
-                  <a:srgbClr val="FF0000"/>
-                </a:solidFill>
-              </a:rPr>
+              <a:rPr lang="it-IT" sz="1400" dirty="0"/>
               <a:t> models </a:t>
             </a:r>
             <a:r>
-              <a:rPr lang="it-IT" sz="1400" dirty="0" err="1">
-                <a:solidFill>
-                  <a:srgbClr val="FF0000"/>
-                </a:solidFill>
-              </a:rPr>
+              <a:rPr lang="it-IT" sz="1400" dirty="0" err="1"/>
               <a:t>but</a:t>
             </a:r>
             <a:r>
-              <a:rPr lang="it-IT" sz="1400" dirty="0">
-                <a:solidFill>
-                  <a:srgbClr val="FF0000"/>
-                </a:solidFill>
-              </a:rPr>
+              <a:rPr lang="it-IT" sz="1400" dirty="0"/>
               <a:t> the Random </a:t>
             </a:r>
             <a:r>
-              <a:rPr lang="it-IT" sz="1400" dirty="0" err="1">
-                <a:solidFill>
-                  <a:srgbClr val="FF0000"/>
-                </a:solidFill>
-              </a:rPr>
+              <a:rPr lang="it-IT" sz="1400" dirty="0" err="1"/>
               <a:t>Forests</a:t>
             </a:r>
             <a:r>
-              <a:rPr lang="it-IT" sz="1400" dirty="0">
-                <a:solidFill>
-                  <a:srgbClr val="FF0000"/>
-                </a:solidFill>
-              </a:rPr>
-              <a:t> are </a:t>
-            </a:r>
-            <a:r>
-              <a:rPr lang="it-IT" sz="1400" dirty="0" err="1">
-                <a:solidFill>
-                  <a:srgbClr val="FF0000"/>
-                </a:solidFill>
-              </a:rPr>
-              <a:t>performant</a:t>
-            </a:r>
-            <a:r>
-              <a:rPr lang="it-IT" sz="1400" dirty="0">
-                <a:solidFill>
-                  <a:srgbClr val="FF0000"/>
-                </a:solidFill>
-              </a:rPr>
+              <a:rPr lang="it-IT" sz="1400" dirty="0"/>
+              <a:t> </a:t>
+            </a:r>
+            <a:r>
+              <a:rPr lang="it-IT" sz="1400" dirty="0" err="1"/>
+              <a:t>perform</a:t>
+            </a:r>
+            <a:r>
+              <a:rPr lang="it-IT" sz="1400" dirty="0"/>
+              <a:t> </a:t>
+            </a:r>
+            <a:r>
+              <a:rPr lang="it-IT" sz="1400" dirty="0" err="1"/>
+              <a:t>well</a:t>
+            </a:r>
+            <a:r>
+              <a:rPr lang="it-IT" sz="1400" dirty="0"/>
               <a:t> in the Monk 1 task.</a:t>
             </a:r>
           </a:p>
           <a:p>
             <a:r>
+              <a:rPr lang="it-IT" sz="1400" dirty="0" err="1"/>
+              <a:t>We</a:t>
+            </a:r>
+            <a:r>
+              <a:rPr lang="it-IT" sz="1400" dirty="0"/>
+              <a:t> </a:t>
+            </a:r>
+            <a:r>
+              <a:rPr lang="it-IT" sz="1400" dirty="0" err="1"/>
+              <a:t>ran</a:t>
+            </a:r>
+            <a:r>
+              <a:rPr lang="it-IT" sz="1400" dirty="0"/>
+              <a:t> </a:t>
+            </a:r>
+            <a:r>
+              <a:rPr lang="it-IT" sz="1400" dirty="0" err="1"/>
+              <a:t>similar</a:t>
+            </a:r>
+            <a:r>
+              <a:rPr lang="it-IT" sz="1400" dirty="0"/>
+              <a:t> </a:t>
+            </a:r>
+            <a:r>
+              <a:rPr lang="it-IT" sz="1400" dirty="0" err="1"/>
+              <a:t>comparisons</a:t>
+            </a:r>
+            <a:r>
+              <a:rPr lang="it-IT" sz="1400" dirty="0"/>
+              <a:t> in </a:t>
+            </a:r>
+            <a:r>
+              <a:rPr lang="it-IT" sz="1400" dirty="0" err="1"/>
+              <a:t>our</a:t>
+            </a:r>
+            <a:r>
+              <a:rPr lang="it-IT" sz="1400" dirty="0"/>
+              <a:t> </a:t>
+            </a:r>
+            <a:r>
               <a:rPr lang="it-IT" sz="1400" dirty="0" err="1">
-                <a:solidFill>
-                  <a:srgbClr val="FF0000"/>
-                </a:solidFill>
-              </a:rPr>
-              <a:t>We</a:t>
-            </a:r>
-            <a:r>
-              <a:rPr lang="it-IT" sz="1400" dirty="0">
-                <a:solidFill>
-                  <a:srgbClr val="FF0000"/>
-                </a:solidFill>
-              </a:rPr>
-              <a:t> </a:t>
-            </a:r>
-            <a:r>
-              <a:rPr lang="it-IT" sz="1400" dirty="0" err="1">
-                <a:solidFill>
-                  <a:srgbClr val="FF0000"/>
-                </a:solidFill>
-              </a:rPr>
-              <a:t>ran</a:t>
-            </a:r>
-            <a:r>
-              <a:rPr lang="it-IT" sz="1400" dirty="0">
-                <a:solidFill>
-                  <a:srgbClr val="FF0000"/>
-                </a:solidFill>
-              </a:rPr>
-              <a:t> </a:t>
-            </a:r>
-            <a:r>
-              <a:rPr lang="it-IT" sz="1400" dirty="0" err="1">
-                <a:solidFill>
-                  <a:srgbClr val="FF0000"/>
-                </a:solidFill>
-              </a:rPr>
-              <a:t>similar</a:t>
-            </a:r>
-            <a:r>
-              <a:rPr lang="it-IT" sz="1400" dirty="0">
-                <a:solidFill>
-                  <a:srgbClr val="FF0000"/>
-                </a:solidFill>
-              </a:rPr>
-              <a:t> </a:t>
-            </a:r>
-            <a:r>
-              <a:rPr lang="it-IT" sz="1400" dirty="0" err="1">
-                <a:solidFill>
-                  <a:srgbClr val="FF0000"/>
-                </a:solidFill>
-              </a:rPr>
-              <a:t>comparisons</a:t>
-            </a:r>
-            <a:r>
-              <a:rPr lang="it-IT" sz="1400" dirty="0">
-                <a:solidFill>
-                  <a:srgbClr val="FF0000"/>
-                </a:solidFill>
-              </a:rPr>
-              <a:t> in </a:t>
-            </a:r>
-            <a:r>
-              <a:rPr lang="it-IT" sz="1400" dirty="0" err="1">
-                <a:solidFill>
-                  <a:srgbClr val="FF0000"/>
-                </a:solidFill>
-              </a:rPr>
-              <a:t>our</a:t>
-            </a:r>
-            <a:r>
-              <a:rPr lang="it-IT" sz="1400" dirty="0">
-                <a:solidFill>
-                  <a:srgbClr val="FF0000"/>
-                </a:solidFill>
-              </a:rPr>
-              <a:t> </a:t>
-            </a:r>
-            <a:r>
-              <a:rPr lang="it-IT" sz="1400" dirty="0" err="1">
-                <a:solidFill>
-                  <a:srgbClr val="FF0000"/>
-                </a:solidFill>
                 <a:latin typeface="Consolas" panose="020B0609020204030204" pitchFamily="49" charset="0"/>
               </a:rPr>
               <a:t>comparison</a:t>
             </a:r>
             <a:r>
-              <a:rPr lang="it-IT" sz="1400" dirty="0">
-                <a:solidFill>
-                  <a:srgbClr val="FF0000"/>
-                </a:solidFill>
-              </a:rPr>
-              <a:t> notebooks for the </a:t>
-            </a:r>
-            <a:r>
-              <a:rPr lang="it-IT" sz="1400" dirty="0" err="1">
-                <a:solidFill>
-                  <a:srgbClr val="FF0000"/>
-                </a:solidFill>
-              </a:rPr>
+              <a:rPr lang="it-IT" sz="1400" dirty="0"/>
+              <a:t> notebook for the </a:t>
+            </a:r>
+            <a:r>
+              <a:rPr lang="it-IT" sz="1400" dirty="0" err="1"/>
               <a:t>other</a:t>
             </a:r>
             <a:r>
-              <a:rPr lang="it-IT" sz="1400" dirty="0">
-                <a:solidFill>
-                  <a:srgbClr val="FF0000"/>
-                </a:solidFill>
-              </a:rPr>
-              <a:t> Monk tasks.</a:t>
+              <a:rPr lang="it-IT" sz="1400" dirty="0"/>
+              <a:t> models.</a:t>
             </a:r>
           </a:p>
         </p:txBody>
@@ -23591,7 +23605,1910 @@
                 <a:latin typeface="Arial"/>
                 <a:ea typeface="Arial"/>
               </a:rPr>
-              <a:t>Appendix – 5</a:t>
+              <a:t>Appendix – 6</a:t>
+            </a:r>
+            <a:br>
+              <a:rPr lang="it" sz="2400" b="0" strike="noStrike" spc="-1" dirty="0">
+                <a:solidFill>
+                  <a:srgbClr val="000000"/>
+                </a:solidFill>
+                <a:latin typeface="Arial"/>
+                <a:ea typeface="Arial"/>
+              </a:rPr>
+            </a:br>
+            <a:r>
+              <a:rPr lang="it" sz="2000" spc="-1" dirty="0">
+                <a:solidFill>
+                  <a:srgbClr val="3F3F3F"/>
+                </a:solidFill>
+                <a:latin typeface="Arial"/>
+                <a:ea typeface="Arial"/>
+              </a:rPr>
+              <a:t>In-depth analysis of SVM’s performance on M</a:t>
+            </a:r>
+            <a:r>
+              <a:rPr lang="it" sz="2000" b="0" strike="noStrike" spc="-1" dirty="0">
+                <a:solidFill>
+                  <a:srgbClr val="3F3F3F"/>
+                </a:solidFill>
+                <a:latin typeface="Arial"/>
+                <a:ea typeface="Arial"/>
+              </a:rPr>
+              <a:t>onk 2 task</a:t>
+            </a:r>
+            <a:endParaRPr lang="it-IT" sz="2400" b="0" strike="noStrike" spc="-1" dirty="0">
+              <a:solidFill>
+                <a:srgbClr val="FF0000"/>
+              </a:solidFill>
+              <a:latin typeface="Arial"/>
+            </a:endParaRPr>
+          </a:p>
+        </p:txBody>
+      </p:sp>
+      <p:sp>
+        <p:nvSpPr>
+          <p:cNvPr id="122" name="PlaceHolder 3"/>
+          <p:cNvSpPr>
+            <a:spLocks noGrp="1"/>
+          </p:cNvSpPr>
+          <p:nvPr>
+            <p:ph type="sldNum" idx="14"/>
+          </p:nvPr>
+        </p:nvSpPr>
+        <p:spPr>
+          <a:xfrm>
+            <a:off x="8472600" y="4663080"/>
+            <a:ext cx="548280" cy="393120"/>
+          </a:xfrm>
+          <a:prstGeom prst="rect">
+            <a:avLst/>
+          </a:prstGeom>
+          <a:noFill/>
+          <a:ln w="0">
+            <a:noFill/>
+          </a:ln>
+        </p:spPr>
+        <p:txBody>
+          <a:bodyPr tIns="91440" bIns="91440" anchor="ctr">
+            <a:normAutofit/>
+          </a:bodyPr>
+          <a:lstStyle>
+            <a:lvl1pPr algn="r">
+              <a:lnSpc>
+                <a:spcPct val="100000"/>
+              </a:lnSpc>
+              <a:buNone/>
+              <a:tabLst>
+                <a:tab pos="0" algn="l"/>
+              </a:tabLst>
+              <a:defRPr lang="it" sz="1000" b="0" strike="noStrike" spc="-1">
+                <a:solidFill>
+                  <a:srgbClr val="595959"/>
+                </a:solidFill>
+                <a:latin typeface="Arial"/>
+                <a:ea typeface="Arial"/>
+              </a:defRPr>
+            </a:lvl1pPr>
+          </a:lstStyle>
+          <a:p>
+            <a:pPr algn="r">
+              <a:lnSpc>
+                <a:spcPct val="100000"/>
+              </a:lnSpc>
+              <a:buNone/>
+              <a:tabLst>
+                <a:tab pos="0" algn="l"/>
+              </a:tabLst>
+            </a:pPr>
+            <a:fld id="{25B94CD5-D627-49BE-818E-4A00F2BB16DF}" type="slidenum">
+              <a:rPr lang="it" sz="1000" b="0" strike="noStrike" spc="-1">
+                <a:solidFill>
+                  <a:srgbClr val="595959"/>
+                </a:solidFill>
+                <a:latin typeface="Arial"/>
+                <a:ea typeface="Arial"/>
+              </a:rPr>
+              <a:t>29</a:t>
+            </a:fld>
+            <a:endParaRPr lang="it-IT" sz="1000" b="0" strike="noStrike" spc="-1">
+              <a:latin typeface="Times New Roman"/>
+            </a:endParaRPr>
+          </a:p>
+        </p:txBody>
+      </p:sp>
+      <p:sp>
+        <p:nvSpPr>
+          <p:cNvPr id="16" name="CasellaDiTesto 15">
+            <a:extLst>
+              <a:ext uri="{FF2B5EF4-FFF2-40B4-BE49-F238E27FC236}">
+                <a16:creationId xmlns:a16="http://schemas.microsoft.com/office/drawing/2014/main" id="{34EA9030-D49A-946A-EE82-303EA4064980}"/>
+              </a:ext>
+            </a:extLst>
+          </p:cNvPr>
+          <p:cNvSpPr txBox="1"/>
+          <p:nvPr/>
+        </p:nvSpPr>
+        <p:spPr>
+          <a:xfrm>
+            <a:off x="308535" y="1057413"/>
+            <a:ext cx="8403175" cy="307777"/>
+          </a:xfrm>
+          <a:prstGeom prst="rect">
+            <a:avLst/>
+          </a:prstGeom>
+          <a:noFill/>
+        </p:spPr>
+        <p:txBody>
+          <a:bodyPr wrap="square" rtlCol="0">
+            <a:spAutoFit/>
+          </a:bodyPr>
+          <a:lstStyle/>
+          <a:p>
+            <a:r>
+              <a:rPr lang="it-IT" sz="1400" b="1" dirty="0"/>
+              <a:t>Figure</a:t>
+            </a:r>
+            <a:r>
+              <a:rPr lang="it-IT" sz="1400" b="1" dirty="0">
+                <a:solidFill>
+                  <a:srgbClr val="FF0000"/>
+                </a:solidFill>
+              </a:rPr>
+              <a:t> k+1</a:t>
+            </a:r>
+            <a:r>
+              <a:rPr lang="it-IT" sz="1400" dirty="0"/>
+              <a:t>: </a:t>
+            </a:r>
+            <a:r>
+              <a:rPr lang="it-IT" sz="1400" dirty="0" err="1"/>
+              <a:t>Confusion</a:t>
+            </a:r>
+            <a:r>
+              <a:rPr lang="it-IT" sz="1400" dirty="0"/>
+              <a:t> </a:t>
+            </a:r>
+            <a:r>
+              <a:rPr lang="it-IT" sz="1400" dirty="0" err="1"/>
+              <a:t>matrix</a:t>
+            </a:r>
+            <a:r>
+              <a:rPr lang="it-IT" sz="1400" dirty="0"/>
+              <a:t>, learning curve and ROC curve for the SVM, Monk 2 task</a:t>
+            </a:r>
+          </a:p>
+        </p:txBody>
+      </p:sp>
+      <p:sp>
+        <p:nvSpPr>
+          <p:cNvPr id="17" name="CasellaDiTesto 16">
+            <a:extLst>
+              <a:ext uri="{FF2B5EF4-FFF2-40B4-BE49-F238E27FC236}">
+                <a16:creationId xmlns:a16="http://schemas.microsoft.com/office/drawing/2014/main" id="{331140F4-4D7F-79F3-B32B-4E794EAB9ADE}"/>
+              </a:ext>
+            </a:extLst>
+          </p:cNvPr>
+          <p:cNvSpPr txBox="1"/>
+          <p:nvPr/>
+        </p:nvSpPr>
+        <p:spPr>
+          <a:xfrm>
+            <a:off x="308533" y="3943170"/>
+            <a:ext cx="8403175" cy="738664"/>
+          </a:xfrm>
+          <a:prstGeom prst="rect">
+            <a:avLst/>
+          </a:prstGeom>
+          <a:noFill/>
+        </p:spPr>
+        <p:txBody>
+          <a:bodyPr wrap="square" rtlCol="0">
+            <a:spAutoFit/>
+          </a:bodyPr>
+          <a:lstStyle/>
+          <a:p>
+            <a:r>
+              <a:rPr lang="it-IT" sz="1400" dirty="0"/>
+              <a:t>The TR set </a:t>
+            </a:r>
+            <a:r>
+              <a:rPr lang="it-IT" sz="1400" dirty="0" err="1"/>
+              <a:t>is</a:t>
+            </a:r>
+            <a:r>
+              <a:rPr lang="it-IT" sz="1400" dirty="0"/>
+              <a:t> </a:t>
+            </a:r>
+            <a:r>
+              <a:rPr lang="it-IT" sz="1400" dirty="0" err="1"/>
+              <a:t>included</a:t>
+            </a:r>
+            <a:r>
+              <a:rPr lang="it-IT" sz="1400" dirty="0"/>
+              <a:t> in TS (</a:t>
+            </a:r>
+            <a:r>
+              <a:rPr lang="it-IT" sz="1400" dirty="0" err="1"/>
+              <a:t>already</a:t>
+            </a:r>
+            <a:r>
+              <a:rPr lang="it-IT" sz="1400" dirty="0"/>
+              <a:t> </a:t>
+            </a:r>
+            <a:r>
+              <a:rPr lang="it-IT" sz="1400" dirty="0" err="1"/>
+              <a:t>noticed</a:t>
+            </a:r>
+            <a:r>
+              <a:rPr lang="it-IT" sz="1400" dirty="0"/>
+              <a:t> in class). </a:t>
+            </a:r>
+            <a:r>
+              <a:rPr lang="it-IT" sz="1400" dirty="0" err="1"/>
+              <a:t>Furthermore</a:t>
+            </a:r>
+            <a:r>
+              <a:rPr lang="it-IT" sz="1400" dirty="0"/>
+              <a:t>, the </a:t>
+            </a:r>
+            <a:r>
+              <a:rPr lang="it-IT" sz="1400" dirty="0" err="1"/>
+              <a:t>latter</a:t>
+            </a:r>
+            <a:r>
+              <a:rPr lang="it-IT" sz="1400" dirty="0"/>
+              <a:t> </a:t>
+            </a:r>
+            <a:r>
+              <a:rPr lang="it-IT" sz="1400" dirty="0" err="1"/>
+              <a:t>is</a:t>
+            </a:r>
+            <a:r>
+              <a:rPr lang="it-IT" sz="1400" dirty="0"/>
+              <a:t> </a:t>
+            </a:r>
+            <a:r>
+              <a:rPr lang="it-IT" sz="1400" dirty="0" err="1"/>
+              <a:t>really</a:t>
+            </a:r>
+            <a:r>
+              <a:rPr lang="it-IT" sz="1400" dirty="0"/>
+              <a:t> </a:t>
+            </a:r>
+            <a:r>
+              <a:rPr lang="it-IT" sz="1400" dirty="0" err="1"/>
+              <a:t>unbalanced</a:t>
+            </a:r>
+            <a:r>
+              <a:rPr lang="it-IT" sz="1400" dirty="0"/>
+              <a:t>.</a:t>
+            </a:r>
+          </a:p>
+          <a:p>
+            <a:r>
+              <a:rPr lang="it-IT" sz="1400" dirty="0"/>
+              <a:t>The SVM </a:t>
+            </a:r>
+            <a:r>
+              <a:rPr lang="it-IT" sz="1400" dirty="0" err="1"/>
+              <a:t>reaches</a:t>
+            </a:r>
+            <a:r>
+              <a:rPr lang="it-IT" sz="1400" dirty="0"/>
+              <a:t> 100% </a:t>
+            </a:r>
+            <a:r>
+              <a:rPr lang="it-IT" sz="1400" dirty="0" err="1"/>
+              <a:t>accuracy</a:t>
+            </a:r>
+            <a:r>
+              <a:rPr lang="it-IT" sz="1400" dirty="0"/>
+              <a:t> in test. In case </a:t>
+            </a:r>
+            <a:r>
+              <a:rPr lang="it-IT" sz="1400" dirty="0" err="1"/>
+              <a:t>it</a:t>
+            </a:r>
+            <a:r>
+              <a:rPr lang="it-IT" sz="1400" dirty="0"/>
+              <a:t> </a:t>
+            </a:r>
+            <a:r>
+              <a:rPr lang="it-IT" sz="1400" dirty="0" err="1"/>
+              <a:t>didn’t</a:t>
+            </a:r>
+            <a:r>
+              <a:rPr lang="it-IT" sz="1400" dirty="0"/>
+              <a:t> </a:t>
+            </a:r>
+            <a:r>
+              <a:rPr lang="it-IT" sz="1400" dirty="0" err="1"/>
+              <a:t>we</a:t>
+            </a:r>
+            <a:r>
+              <a:rPr lang="it-IT" sz="1400" dirty="0"/>
+              <a:t> </a:t>
+            </a:r>
+            <a:r>
+              <a:rPr lang="it-IT" sz="1400" dirty="0" err="1"/>
+              <a:t>thought</a:t>
+            </a:r>
+            <a:r>
+              <a:rPr lang="it-IT" sz="1400" dirty="0"/>
+              <a:t> </a:t>
+            </a:r>
+            <a:r>
+              <a:rPr lang="it-IT" sz="1400" dirty="0" err="1"/>
+              <a:t>about</a:t>
+            </a:r>
+            <a:r>
+              <a:rPr lang="it-IT" sz="1400" dirty="0"/>
+              <a:t> </a:t>
+            </a:r>
+            <a:r>
+              <a:rPr lang="it-IT" sz="1400" dirty="0" err="1"/>
+              <a:t>using</a:t>
+            </a:r>
+            <a:r>
+              <a:rPr lang="it-IT" sz="1400" dirty="0"/>
+              <a:t> </a:t>
+            </a:r>
+            <a:r>
+              <a:rPr lang="it-IT" sz="1400" dirty="0" err="1"/>
+              <a:t>undersampling</a:t>
+            </a:r>
+            <a:r>
+              <a:rPr lang="it-IT" sz="1400" dirty="0"/>
+              <a:t> (</a:t>
+            </a:r>
+            <a:r>
+              <a:rPr lang="it-IT" sz="1400" dirty="0" err="1"/>
+              <a:t>Condensed</a:t>
+            </a:r>
+            <a:r>
+              <a:rPr lang="it-IT" sz="1400" dirty="0"/>
+              <a:t> </a:t>
+            </a:r>
+            <a:r>
+              <a:rPr lang="it-IT" sz="1400" dirty="0" err="1"/>
+              <a:t>Nearest</a:t>
+            </a:r>
+            <a:r>
+              <a:rPr lang="it-IT" sz="1400" dirty="0"/>
+              <a:t> </a:t>
+            </a:r>
+            <a:r>
+              <a:rPr lang="it-IT" sz="1400" dirty="0" err="1"/>
+              <a:t>Neighbour</a:t>
+            </a:r>
+            <a:r>
+              <a:rPr lang="it-IT" sz="1400" dirty="0"/>
+              <a:t>) or </a:t>
+            </a:r>
+            <a:r>
+              <a:rPr lang="it-IT" sz="1400" dirty="0" err="1"/>
+              <a:t>oversampling</a:t>
+            </a:r>
+            <a:r>
+              <a:rPr lang="it-IT" sz="1400" dirty="0"/>
+              <a:t> (SMOTE) techniques.</a:t>
+            </a:r>
+          </a:p>
+        </p:txBody>
+      </p:sp>
+      <p:pic>
+        <p:nvPicPr>
+          <p:cNvPr id="8" name="Immagine 7">
+            <a:extLst>
+              <a:ext uri="{FF2B5EF4-FFF2-40B4-BE49-F238E27FC236}">
+                <a16:creationId xmlns:a16="http://schemas.microsoft.com/office/drawing/2014/main" id="{18E2E518-FACD-5BAE-DEC1-273EE1512F50}"/>
+              </a:ext>
+            </a:extLst>
+          </p:cNvPr>
+          <p:cNvPicPr>
+            <a:picLocks noChangeAspect="1"/>
+          </p:cNvPicPr>
+          <p:nvPr/>
+        </p:nvPicPr>
+        <p:blipFill>
+          <a:blip r:embed="rId2"/>
+          <a:stretch>
+            <a:fillRect/>
+          </a:stretch>
+        </p:blipFill>
+        <p:spPr>
+          <a:xfrm>
+            <a:off x="308534" y="1365190"/>
+            <a:ext cx="1918860" cy="2051413"/>
+          </a:xfrm>
+          <a:prstGeom prst="rect">
+            <a:avLst/>
+          </a:prstGeom>
+          <a:ln>
+            <a:noFill/>
+          </a:ln>
+        </p:spPr>
+      </p:pic>
+      <p:pic>
+        <p:nvPicPr>
+          <p:cNvPr id="13" name="Immagine 12">
+            <a:extLst>
+              <a:ext uri="{FF2B5EF4-FFF2-40B4-BE49-F238E27FC236}">
+                <a16:creationId xmlns:a16="http://schemas.microsoft.com/office/drawing/2014/main" id="{A2A46729-D064-757E-E308-474EE4DD38B2}"/>
+              </a:ext>
+            </a:extLst>
+          </p:cNvPr>
+          <p:cNvPicPr>
+            <a:picLocks noChangeAspect="1"/>
+          </p:cNvPicPr>
+          <p:nvPr/>
+        </p:nvPicPr>
+        <p:blipFill>
+          <a:blip r:embed="rId3"/>
+          <a:stretch>
+            <a:fillRect/>
+          </a:stretch>
+        </p:blipFill>
+        <p:spPr>
+          <a:xfrm>
+            <a:off x="2227394" y="1365190"/>
+            <a:ext cx="3117813" cy="2265298"/>
+          </a:xfrm>
+          <a:prstGeom prst="rect">
+            <a:avLst/>
+          </a:prstGeom>
+          <a:ln>
+            <a:noFill/>
+          </a:ln>
+        </p:spPr>
+      </p:pic>
+      <p:pic>
+        <p:nvPicPr>
+          <p:cNvPr id="18" name="Immagine 17">
+            <a:extLst>
+              <a:ext uri="{FF2B5EF4-FFF2-40B4-BE49-F238E27FC236}">
+                <a16:creationId xmlns:a16="http://schemas.microsoft.com/office/drawing/2014/main" id="{A2FEA0AA-A93F-0820-35C8-B0929945CCAB}"/>
+              </a:ext>
+            </a:extLst>
+          </p:cNvPr>
+          <p:cNvPicPr>
+            <a:picLocks noChangeAspect="1"/>
+          </p:cNvPicPr>
+          <p:nvPr/>
+        </p:nvPicPr>
+        <p:blipFill>
+          <a:blip r:embed="rId4"/>
+          <a:stretch>
+            <a:fillRect/>
+          </a:stretch>
+        </p:blipFill>
+        <p:spPr>
+          <a:xfrm>
+            <a:off x="5345207" y="1365190"/>
+            <a:ext cx="3127394" cy="2265298"/>
+          </a:xfrm>
+          <a:prstGeom prst="rect">
+            <a:avLst/>
+          </a:prstGeom>
+          <a:ln>
+            <a:noFill/>
+          </a:ln>
+        </p:spPr>
+      </p:pic>
+    </p:spTree>
+    <p:extLst>
+      <p:ext uri="{BB962C8B-B14F-4D97-AF65-F5344CB8AC3E}">
+        <p14:creationId xmlns:p14="http://schemas.microsoft.com/office/powerpoint/2010/main" val="2928979116"/>
+      </p:ext>
+    </p:extLst>
+  </p:cSld>
+  <p:clrMapOvr>
+    <a:masterClrMapping/>
+  </p:clrMapOvr>
+</p:sld>
+</file>
+
+<file path=ppt/slides/slide3.xml><?xml version="1.0" encoding="utf-8"?>
+<p:sld xmlns:a="http://schemas.openxmlformats.org/drawingml/2006/main" xmlns:r="http://schemas.openxmlformats.org/officeDocument/2006/relationships" xmlns:p="http://schemas.openxmlformats.org/presentationml/2006/main">
+  <p:cSld>
+    <p:spTree>
+      <p:nvGrpSpPr>
+        <p:cNvPr id="1" name=""/>
+        <p:cNvGrpSpPr/>
+        <p:nvPr/>
+      </p:nvGrpSpPr>
+      <p:grpSpPr>
+        <a:xfrm>
+          <a:off x="0" y="0"/>
+          <a:ext cx="0" cy="0"/>
+          <a:chOff x="0" y="0"/>
+          <a:chExt cx="0" cy="0"/>
+        </a:xfrm>
+      </p:grpSpPr>
+      <p:sp>
+        <p:nvSpPr>
+          <p:cNvPr id="83" name="PlaceHolder 3"/>
+          <p:cNvSpPr>
+            <a:spLocks noGrp="1"/>
+          </p:cNvSpPr>
+          <p:nvPr>
+            <p:ph type="sldNum" idx="3"/>
+          </p:nvPr>
+        </p:nvSpPr>
+        <p:spPr>
+          <a:xfrm>
+            <a:off x="8472600" y="4663080"/>
+            <a:ext cx="548280" cy="393120"/>
+          </a:xfrm>
+          <a:prstGeom prst="rect">
+            <a:avLst/>
+          </a:prstGeom>
+          <a:noFill/>
+          <a:ln w="0">
+            <a:noFill/>
+          </a:ln>
+        </p:spPr>
+        <p:txBody>
+          <a:bodyPr tIns="91440" bIns="91440" anchor="ctr">
+            <a:normAutofit/>
+          </a:bodyPr>
+          <a:lstStyle>
+            <a:lvl1pPr algn="r">
+              <a:lnSpc>
+                <a:spcPct val="100000"/>
+              </a:lnSpc>
+              <a:buNone/>
+              <a:tabLst>
+                <a:tab pos="0" algn="l"/>
+              </a:tabLst>
+              <a:defRPr lang="it" sz="1000" b="0" strike="noStrike" spc="-1">
+                <a:solidFill>
+                  <a:srgbClr val="595959"/>
+                </a:solidFill>
+                <a:latin typeface="Arial"/>
+                <a:ea typeface="Arial"/>
+              </a:defRPr>
+            </a:lvl1pPr>
+          </a:lstStyle>
+          <a:p>
+            <a:pPr algn="r">
+              <a:lnSpc>
+                <a:spcPct val="100000"/>
+              </a:lnSpc>
+              <a:buNone/>
+              <a:tabLst>
+                <a:tab pos="0" algn="l"/>
+              </a:tabLst>
+            </a:pPr>
+            <a:fld id="{CDE5831E-EF50-4AF8-82C3-EBDE88F03D8C}" type="slidenum">
+              <a:rPr lang="it" sz="1000" b="0" strike="noStrike" spc="-1">
+                <a:solidFill>
+                  <a:srgbClr val="595959"/>
+                </a:solidFill>
+                <a:latin typeface="Arial"/>
+                <a:ea typeface="Arial"/>
+              </a:rPr>
+              <a:t>3</a:t>
+            </a:fld>
+            <a:endParaRPr lang="it-IT" sz="1000" b="0" strike="noStrike" spc="-1" dirty="0">
+              <a:latin typeface="Times New Roman"/>
+            </a:endParaRPr>
+          </a:p>
+        </p:txBody>
+      </p:sp>
+      <p:sp>
+        <p:nvSpPr>
+          <p:cNvPr id="4" name="PlaceHolder 1">
+            <a:extLst>
+              <a:ext uri="{FF2B5EF4-FFF2-40B4-BE49-F238E27FC236}">
+                <a16:creationId xmlns:a16="http://schemas.microsoft.com/office/drawing/2014/main" id="{80C918E8-6CF7-0E0B-D3EF-88419C82AA81}"/>
+              </a:ext>
+            </a:extLst>
+          </p:cNvPr>
+          <p:cNvSpPr txBox="1">
+            <a:spLocks/>
+          </p:cNvSpPr>
+          <p:nvPr/>
+        </p:nvSpPr>
+        <p:spPr>
+          <a:xfrm>
+            <a:off x="311760" y="0"/>
+            <a:ext cx="8520120" cy="576000"/>
+          </a:xfrm>
+          <a:prstGeom prst="rect">
+            <a:avLst/>
+          </a:prstGeom>
+          <a:noFill/>
+          <a:ln w="0">
+            <a:noFill/>
+          </a:ln>
+        </p:spPr>
+        <p:txBody>
+          <a:bodyPr lIns="0" tIns="91440" rIns="0" bIns="91440" anchor="t">
+            <a:normAutofit fontScale="97500"/>
+          </a:bodyPr>
+          <a:lstStyle>
+            <a:lvl1pPr algn="l" defTabSz="914400" rtl="0" eaLnBrk="1" latinLnBrk="0" hangingPunct="1">
+              <a:lnSpc>
+                <a:spcPct val="90000"/>
+              </a:lnSpc>
+              <a:spcBef>
+                <a:spcPct val="0"/>
+              </a:spcBef>
+              <a:buNone/>
+              <a:defRPr sz="4400" kern="1200">
+                <a:solidFill>
+                  <a:schemeClr val="tx1"/>
+                </a:solidFill>
+                <a:latin typeface="+mj-lt"/>
+                <a:ea typeface="+mj-ea"/>
+                <a:cs typeface="+mj-cs"/>
+              </a:defRPr>
+            </a:lvl1pPr>
+          </a:lstStyle>
+          <a:p>
+            <a:pPr>
+              <a:lnSpc>
+                <a:spcPct val="100000"/>
+              </a:lnSpc>
+              <a:tabLst>
+                <a:tab pos="0" algn="l"/>
+              </a:tabLst>
+            </a:pPr>
+            <a:r>
+              <a:rPr lang="it" sz="2500" spc="-1" dirty="0">
+                <a:solidFill>
+                  <a:srgbClr val="000000"/>
+                </a:solidFill>
+                <a:latin typeface="Arial"/>
+                <a:ea typeface="Arial"/>
+              </a:rPr>
+              <a:t>Code structure, models overview </a:t>
+            </a:r>
+            <a:r>
+              <a:rPr lang="it" sz="2500" spc="-1" dirty="0">
+                <a:solidFill>
+                  <a:srgbClr val="FF0000"/>
+                </a:solidFill>
+                <a:latin typeface="Arial"/>
+                <a:ea typeface="Arial"/>
+              </a:rPr>
+              <a:t>da rivedere</a:t>
+            </a:r>
+            <a:endParaRPr lang="it-IT" sz="2400" spc="-1" dirty="0">
+              <a:solidFill>
+                <a:srgbClr val="FF0000"/>
+              </a:solidFill>
+              <a:latin typeface="Arial"/>
+            </a:endParaRPr>
+          </a:p>
+        </p:txBody>
+      </p:sp>
+      <p:sp>
+        <p:nvSpPr>
+          <p:cNvPr id="3" name="CasellaDiTesto 2">
+            <a:extLst>
+              <a:ext uri="{FF2B5EF4-FFF2-40B4-BE49-F238E27FC236}">
+                <a16:creationId xmlns:a16="http://schemas.microsoft.com/office/drawing/2014/main" id="{21F77B32-FB82-2079-F53B-1131754C4D18}"/>
+              </a:ext>
+            </a:extLst>
+          </p:cNvPr>
+          <p:cNvSpPr txBox="1"/>
+          <p:nvPr/>
+        </p:nvSpPr>
+        <p:spPr>
+          <a:xfrm>
+            <a:off x="311761" y="693013"/>
+            <a:ext cx="8520119" cy="1600438"/>
+          </a:xfrm>
+          <a:prstGeom prst="rect">
+            <a:avLst/>
+          </a:prstGeom>
+          <a:noFill/>
+        </p:spPr>
+        <p:txBody>
+          <a:bodyPr wrap="square" rtlCol="0">
+            <a:spAutoFit/>
+          </a:bodyPr>
+          <a:lstStyle/>
+          <a:p>
+            <a:r>
+              <a:rPr lang="it-IT" sz="1400" dirty="0"/>
+              <a:t>Basic </a:t>
+            </a:r>
+            <a:r>
+              <a:rPr lang="it-IT" sz="1400" dirty="0" err="1"/>
+              <a:t>structure</a:t>
+            </a:r>
+            <a:r>
+              <a:rPr lang="it-IT" sz="1400" dirty="0"/>
+              <a:t> of the code: </a:t>
+            </a:r>
+          </a:p>
+          <a:p>
+            <a:pPr marL="285750" indent="-285750">
+              <a:buFont typeface="Arial" panose="020B0604020202020204" pitchFamily="34" charset="0"/>
+              <a:buChar char="•"/>
+            </a:pPr>
+            <a:r>
+              <a:rPr lang="it-IT" sz="1400" dirty="0">
+                <a:hlinkClick r:id="rId2"/>
+              </a:rPr>
+              <a:t>GitHub repo</a:t>
+            </a:r>
+            <a:r>
+              <a:rPr lang="it-IT" sz="1400" dirty="0"/>
+              <a:t> in </a:t>
+            </a:r>
+            <a:r>
+              <a:rPr lang="it-IT" sz="1400" dirty="0" err="1"/>
+              <a:t>which</a:t>
+            </a:r>
+            <a:r>
+              <a:rPr lang="it-IT" sz="1400" dirty="0"/>
+              <a:t> </a:t>
+            </a:r>
+            <a:r>
+              <a:rPr lang="it-IT" sz="1400" dirty="0" err="1"/>
+              <a:t>we</a:t>
+            </a:r>
+            <a:r>
+              <a:rPr lang="it-IT" sz="1400" dirty="0"/>
+              <a:t> </a:t>
+            </a:r>
+            <a:r>
+              <a:rPr lang="it-IT" sz="1400" dirty="0" err="1"/>
+              <a:t>stored</a:t>
+            </a:r>
+            <a:r>
+              <a:rPr lang="it-IT" sz="1400" dirty="0"/>
+              <a:t> the datasets, images, notebooks and </a:t>
+            </a:r>
+            <a:r>
+              <a:rPr lang="it-IT" sz="1400" dirty="0" err="1"/>
+              <a:t>saved</a:t>
+            </a:r>
+            <a:r>
+              <a:rPr lang="it-IT" sz="1400" dirty="0"/>
+              <a:t> models. </a:t>
+            </a:r>
+          </a:p>
+          <a:p>
+            <a:pPr marL="285750" indent="-285750">
+              <a:buFont typeface="Arial" panose="020B0604020202020204" pitchFamily="34" charset="0"/>
+              <a:buChar char="•"/>
+            </a:pPr>
+            <a:r>
+              <a:rPr lang="it-IT" sz="1400" dirty="0"/>
+              <a:t>A notebook for </a:t>
+            </a:r>
+            <a:r>
+              <a:rPr lang="it-IT" sz="1400" dirty="0" err="1"/>
+              <a:t>each</a:t>
+            </a:r>
+            <a:r>
+              <a:rPr lang="it-IT" sz="1400" dirty="0"/>
+              <a:t> of the </a:t>
+            </a:r>
+            <a:r>
+              <a:rPr lang="it-IT" sz="1400" dirty="0" err="1"/>
+              <a:t>three</a:t>
+            </a:r>
+            <a:r>
+              <a:rPr lang="it-IT" sz="1400" dirty="0"/>
+              <a:t> classes of models, for </a:t>
+            </a:r>
+            <a:r>
+              <a:rPr lang="it-IT" sz="1400" dirty="0" err="1"/>
+              <a:t>each</a:t>
+            </a:r>
+            <a:r>
+              <a:rPr lang="it-IT" sz="1400" dirty="0"/>
+              <a:t> of the </a:t>
+            </a:r>
+            <a:r>
+              <a:rPr lang="it-IT" sz="1400" dirty="0" err="1"/>
+              <a:t>two</a:t>
+            </a:r>
+            <a:r>
+              <a:rPr lang="it-IT" sz="1400" dirty="0"/>
+              <a:t> tasks.</a:t>
+            </a:r>
+          </a:p>
+          <a:p>
+            <a:pPr marL="285750" indent="-285750">
+              <a:buFont typeface="Arial" panose="020B0604020202020204" pitchFamily="34" charset="0"/>
+              <a:buChar char="•"/>
+            </a:pPr>
+            <a:r>
+              <a:rPr lang="it-IT" sz="1400" dirty="0"/>
+              <a:t>In </a:t>
+            </a:r>
+            <a:r>
+              <a:rPr lang="it-IT" sz="1400" dirty="0" err="1"/>
+              <a:t>each</a:t>
+            </a:r>
+            <a:r>
+              <a:rPr lang="it-IT" sz="1400" dirty="0"/>
+              <a:t> notebook: import and </a:t>
+            </a:r>
+            <a:r>
+              <a:rPr lang="it-IT" sz="1400" dirty="0" err="1"/>
+              <a:t>process</a:t>
+            </a:r>
+            <a:r>
+              <a:rPr lang="it-IT" sz="1400" dirty="0"/>
+              <a:t> the data, create the model (</a:t>
+            </a:r>
+            <a:r>
+              <a:rPr lang="it-IT" sz="1400" dirty="0" err="1"/>
+              <a:t>often</a:t>
+            </a:r>
+            <a:r>
+              <a:rPr lang="it-IT" sz="1400" dirty="0"/>
+              <a:t> by </a:t>
+            </a:r>
+            <a:r>
+              <a:rPr lang="it-IT" sz="1400" dirty="0" err="1"/>
+              <a:t>calling</a:t>
+            </a:r>
+            <a:r>
+              <a:rPr lang="it-IT" sz="1400" dirty="0"/>
+              <a:t> a </a:t>
+            </a:r>
+            <a:r>
+              <a:rPr lang="it-IT" sz="1400" dirty="0" err="1"/>
+              <a:t>function</a:t>
+            </a:r>
+            <a:r>
+              <a:rPr lang="it-IT" sz="1400" dirty="0"/>
+              <a:t> </a:t>
+            </a:r>
+            <a:r>
+              <a:rPr lang="it-IT" sz="1400" dirty="0" err="1"/>
+              <a:t>provided</a:t>
+            </a:r>
+            <a:r>
+              <a:rPr lang="it-IT" sz="1400" dirty="0"/>
+              <a:t> by the library), set up the </a:t>
+            </a:r>
+            <a:r>
+              <a:rPr lang="it-IT" sz="1400" dirty="0" err="1"/>
+              <a:t>grid</a:t>
+            </a:r>
+            <a:r>
+              <a:rPr lang="it-IT" sz="1400" dirty="0"/>
+              <a:t> </a:t>
+            </a:r>
+            <a:r>
+              <a:rPr lang="it-IT" sz="1400" dirty="0" err="1"/>
+              <a:t>search</a:t>
+            </a:r>
+            <a:r>
+              <a:rPr lang="it-IT" sz="1400" dirty="0"/>
+              <a:t> and training </a:t>
+            </a:r>
+            <a:r>
+              <a:rPr lang="it-IT" sz="1400" dirty="0" err="1"/>
+              <a:t>process</a:t>
+            </a:r>
+            <a:r>
+              <a:rPr lang="it-IT" sz="1400" dirty="0"/>
+              <a:t>, </a:t>
+            </a:r>
+            <a:r>
+              <a:rPr lang="it-IT" sz="1400" dirty="0" err="1"/>
+              <a:t>select</a:t>
+            </a:r>
+            <a:r>
+              <a:rPr lang="it-IT" sz="1400" dirty="0"/>
+              <a:t> best </a:t>
+            </a:r>
+            <a:r>
+              <a:rPr lang="it-IT" sz="1400" dirty="0" err="1"/>
+              <a:t>hyperparameters</a:t>
+            </a:r>
+            <a:r>
+              <a:rPr lang="it-IT" sz="1400" dirty="0"/>
+              <a:t> and plot the learning curve, </a:t>
+            </a:r>
+            <a:r>
+              <a:rPr lang="it-IT" sz="1400" dirty="0" err="1"/>
+              <a:t>save</a:t>
+            </a:r>
+            <a:r>
+              <a:rPr lang="it-IT" sz="1400" dirty="0"/>
+              <a:t> the model</a:t>
+            </a:r>
+          </a:p>
+          <a:p>
+            <a:pPr marL="285750" indent="-285750">
+              <a:buFont typeface="Arial" panose="020B0604020202020204" pitchFamily="34" charset="0"/>
+              <a:buChar char="•"/>
+            </a:pPr>
+            <a:r>
+              <a:rPr lang="it-IT" sz="1400" dirty="0"/>
+              <a:t>Extra notebooks for data </a:t>
+            </a:r>
+            <a:r>
+              <a:rPr lang="it-IT" sz="1400" dirty="0" err="1"/>
+              <a:t>exploration</a:t>
+            </a:r>
+            <a:r>
+              <a:rPr lang="it-IT" sz="1400" dirty="0"/>
+              <a:t> and models </a:t>
+            </a:r>
+            <a:r>
+              <a:rPr lang="it-IT" sz="1400" dirty="0" err="1"/>
+              <a:t>comparison</a:t>
+            </a:r>
+            <a:endParaRPr lang="it-IT" sz="1400" dirty="0"/>
+          </a:p>
+        </p:txBody>
+      </p:sp>
+      <p:sp>
+        <p:nvSpPr>
+          <p:cNvPr id="11" name="CasellaDiTesto 10">
+            <a:extLst>
+              <a:ext uri="{FF2B5EF4-FFF2-40B4-BE49-F238E27FC236}">
+                <a16:creationId xmlns:a16="http://schemas.microsoft.com/office/drawing/2014/main" id="{003EBDB9-88F0-E455-63E2-1D1CE308D764}"/>
+              </a:ext>
+            </a:extLst>
+          </p:cNvPr>
+          <p:cNvSpPr txBox="1"/>
+          <p:nvPr/>
+        </p:nvSpPr>
+        <p:spPr>
+          <a:xfrm>
+            <a:off x="311760" y="3996932"/>
+            <a:ext cx="8520120" cy="523220"/>
+          </a:xfrm>
+          <a:prstGeom prst="rect">
+            <a:avLst/>
+          </a:prstGeom>
+          <a:noFill/>
+        </p:spPr>
+        <p:txBody>
+          <a:bodyPr wrap="square" rtlCol="0">
+            <a:spAutoFit/>
+          </a:bodyPr>
+          <a:lstStyle/>
+          <a:p>
+            <a:r>
+              <a:rPr lang="it-IT" sz="1400" dirty="0"/>
+              <a:t>For </a:t>
+            </a:r>
+            <a:r>
+              <a:rPr lang="it-IT" sz="1400" dirty="0" err="1"/>
+              <a:t>all</a:t>
+            </a:r>
+            <a:r>
+              <a:rPr lang="it-IT" sz="1400" dirty="0"/>
+              <a:t> </a:t>
+            </a:r>
+            <a:r>
+              <a:rPr lang="it-IT" sz="1400" dirty="0" err="1"/>
+              <a:t>these</a:t>
+            </a:r>
+            <a:r>
+              <a:rPr lang="it-IT" sz="1400" dirty="0"/>
+              <a:t> models </a:t>
+            </a:r>
+            <a:r>
+              <a:rPr lang="it-IT" sz="1400" dirty="0" err="1"/>
+              <a:t>we</a:t>
+            </a:r>
+            <a:r>
+              <a:rPr lang="it-IT" sz="1400" dirty="0"/>
+              <a:t> </a:t>
+            </a:r>
+            <a:r>
+              <a:rPr lang="it-IT" sz="1400" dirty="0" err="1"/>
+              <a:t>tried</a:t>
+            </a:r>
+            <a:r>
+              <a:rPr lang="it-IT" sz="1400" dirty="0"/>
+              <a:t> out </a:t>
+            </a:r>
+            <a:r>
+              <a:rPr lang="it-IT" sz="1400" dirty="0" err="1"/>
+              <a:t>many</a:t>
+            </a:r>
+            <a:r>
+              <a:rPr lang="it-IT" sz="1400" dirty="0"/>
+              <a:t> </a:t>
+            </a:r>
+            <a:r>
+              <a:rPr lang="it-IT" sz="1400" dirty="0" err="1"/>
+              <a:t>configurations</a:t>
+            </a:r>
+            <a:r>
+              <a:rPr lang="it-IT" sz="1400" dirty="0"/>
+              <a:t> of </a:t>
+            </a:r>
+            <a:r>
+              <a:rPr lang="it-IT" sz="1400" dirty="0" err="1"/>
+              <a:t>hyperparameters</a:t>
+            </a:r>
+            <a:r>
+              <a:rPr lang="it-IT" sz="1400" dirty="0"/>
+              <a:t>. </a:t>
+            </a:r>
+            <a:r>
+              <a:rPr lang="it-IT" sz="1400" dirty="0">
+                <a:solidFill>
+                  <a:srgbClr val="FF0000"/>
+                </a:solidFill>
+              </a:rPr>
+              <a:t>Precise </a:t>
+            </a:r>
+            <a:r>
+              <a:rPr lang="it-IT" sz="1400" dirty="0" err="1">
+                <a:solidFill>
+                  <a:srgbClr val="FF0000"/>
+                </a:solidFill>
+              </a:rPr>
+              <a:t>details</a:t>
+            </a:r>
+            <a:r>
+              <a:rPr lang="it-IT" sz="1400" dirty="0">
+                <a:solidFill>
+                  <a:srgbClr val="FF0000"/>
+                </a:solidFill>
+              </a:rPr>
+              <a:t> </a:t>
+            </a:r>
+            <a:r>
+              <a:rPr lang="it-IT" sz="1400" dirty="0" err="1">
+                <a:solidFill>
+                  <a:srgbClr val="FF0000"/>
+                </a:solidFill>
+              </a:rPr>
+              <a:t>will</a:t>
+            </a:r>
+            <a:r>
+              <a:rPr lang="it-IT" sz="1400" dirty="0">
+                <a:solidFill>
+                  <a:srgbClr val="FF0000"/>
+                </a:solidFill>
+              </a:rPr>
+              <a:t> be </a:t>
+            </a:r>
+            <a:r>
+              <a:rPr lang="it-IT" sz="1400" dirty="0" err="1">
+                <a:solidFill>
+                  <a:srgbClr val="FF0000"/>
+                </a:solidFill>
+              </a:rPr>
+              <a:t>given</a:t>
+            </a:r>
+            <a:r>
+              <a:rPr lang="it-IT" sz="1400" dirty="0">
+                <a:solidFill>
+                  <a:srgbClr val="FF0000"/>
+                </a:solidFill>
+              </a:rPr>
+              <a:t> </a:t>
+            </a:r>
+            <a:r>
+              <a:rPr lang="it-IT" sz="1400" dirty="0" err="1">
+                <a:solidFill>
+                  <a:srgbClr val="FF0000"/>
+                </a:solidFill>
+              </a:rPr>
+              <a:t>later</a:t>
+            </a:r>
+            <a:r>
+              <a:rPr lang="it-IT" sz="1400" dirty="0">
+                <a:solidFill>
+                  <a:srgbClr val="FF0000"/>
+                </a:solidFill>
+              </a:rPr>
+              <a:t>. </a:t>
+            </a:r>
+          </a:p>
+        </p:txBody>
+      </p:sp>
+      <p:sp>
+        <p:nvSpPr>
+          <p:cNvPr id="5" name="CasellaDiTesto 4">
+            <a:extLst>
+              <a:ext uri="{FF2B5EF4-FFF2-40B4-BE49-F238E27FC236}">
+                <a16:creationId xmlns:a16="http://schemas.microsoft.com/office/drawing/2014/main" id="{A25770F8-1FA1-1D5E-D768-E47CF7ED482A}"/>
+              </a:ext>
+            </a:extLst>
+          </p:cNvPr>
+          <p:cNvSpPr txBox="1"/>
+          <p:nvPr/>
+        </p:nvSpPr>
+        <p:spPr>
+          <a:xfrm>
+            <a:off x="311760" y="2802701"/>
+            <a:ext cx="8520120" cy="738664"/>
+          </a:xfrm>
+          <a:prstGeom prst="rect">
+            <a:avLst/>
+          </a:prstGeom>
+          <a:noFill/>
+        </p:spPr>
+        <p:txBody>
+          <a:bodyPr wrap="square" rtlCol="0">
+            <a:spAutoFit/>
+          </a:bodyPr>
+          <a:lstStyle/>
+          <a:p>
+            <a:r>
+              <a:rPr lang="it-IT" sz="1400" dirty="0" err="1"/>
+              <a:t>We</a:t>
+            </a:r>
+            <a:r>
+              <a:rPr lang="it-IT" sz="1400" dirty="0"/>
+              <a:t> </a:t>
+            </a:r>
+            <a:r>
+              <a:rPr lang="it-IT" sz="1400" dirty="0" err="1"/>
+              <a:t>used</a:t>
+            </a:r>
+            <a:r>
+              <a:rPr lang="it-IT" sz="1400" dirty="0"/>
+              <a:t> the </a:t>
+            </a:r>
+            <a:r>
+              <a:rPr lang="it-IT" sz="1400" b="1" dirty="0"/>
+              <a:t>Random </a:t>
+            </a:r>
+            <a:r>
+              <a:rPr lang="it-IT" sz="1400" b="1" dirty="0" err="1"/>
+              <a:t>Forests</a:t>
+            </a:r>
+            <a:r>
+              <a:rPr lang="it-IT" sz="1400" dirty="0"/>
+              <a:t> and </a:t>
+            </a:r>
+            <a:r>
+              <a:rPr lang="it-IT" sz="1400" b="1" dirty="0" err="1"/>
+              <a:t>SVM</a:t>
+            </a:r>
+            <a:r>
+              <a:rPr lang="it-IT" sz="1400" dirty="0" err="1"/>
+              <a:t>s</a:t>
+            </a:r>
+            <a:r>
+              <a:rPr lang="it-IT" sz="1400" dirty="0"/>
+              <a:t> from </a:t>
+            </a:r>
+            <a:r>
+              <a:rPr lang="it-IT" sz="1400" dirty="0" err="1"/>
+              <a:t>Scikit-Learn</a:t>
+            </a:r>
+            <a:r>
+              <a:rPr lang="it-IT" sz="1400" dirty="0"/>
+              <a:t>, and </a:t>
+            </a:r>
+            <a:r>
+              <a:rPr lang="it-IT" sz="1400" dirty="0" err="1"/>
+              <a:t>implemented</a:t>
+            </a:r>
+            <a:r>
+              <a:rPr lang="it-IT" sz="1400" dirty="0"/>
+              <a:t> a </a:t>
+            </a:r>
+            <a:r>
+              <a:rPr lang="it-IT" sz="1400" dirty="0" err="1"/>
+              <a:t>multilayer</a:t>
+            </a:r>
+            <a:r>
+              <a:rPr lang="it-IT" sz="1400" dirty="0"/>
+              <a:t> </a:t>
+            </a:r>
+            <a:r>
+              <a:rPr lang="it-IT" sz="1400" dirty="0" err="1"/>
+              <a:t>feedforward</a:t>
+            </a:r>
+            <a:r>
+              <a:rPr lang="it-IT" sz="1400" dirty="0"/>
+              <a:t> </a:t>
+            </a:r>
+            <a:r>
+              <a:rPr lang="it-IT" sz="1400" b="1" dirty="0" err="1"/>
+              <a:t>Neural</a:t>
+            </a:r>
+            <a:r>
+              <a:rPr lang="it-IT" sz="1400" b="1" dirty="0"/>
+              <a:t> Network</a:t>
+            </a:r>
+            <a:r>
+              <a:rPr lang="it-IT" sz="1400" dirty="0"/>
+              <a:t> </a:t>
+            </a:r>
+            <a:r>
+              <a:rPr lang="it-IT" sz="1400" dirty="0" err="1"/>
+              <a:t>using</a:t>
+            </a:r>
+            <a:r>
+              <a:rPr lang="it-IT" sz="1400" dirty="0"/>
+              <a:t> </a:t>
+            </a:r>
+            <a:r>
+              <a:rPr lang="it-IT" sz="1400" dirty="0" err="1"/>
+              <a:t>Keras</a:t>
+            </a:r>
+            <a:r>
+              <a:rPr lang="it-IT" sz="1400" dirty="0"/>
+              <a:t>. The </a:t>
+            </a:r>
+            <a:r>
+              <a:rPr lang="it-IT" sz="1400" dirty="0" err="1">
+                <a:latin typeface="Consolas" panose="020B0609020204030204" pitchFamily="49" charset="0"/>
+              </a:rPr>
+              <a:t>NeuralNetwork</a:t>
+            </a:r>
+            <a:r>
+              <a:rPr lang="it-IT" sz="1400" dirty="0"/>
+              <a:t> classes in </a:t>
+            </a:r>
+            <a:r>
+              <a:rPr lang="it-IT" sz="1400" dirty="0" err="1"/>
+              <a:t>our</a:t>
+            </a:r>
+            <a:r>
+              <a:rPr lang="it-IT" sz="1400" dirty="0"/>
+              <a:t> code </a:t>
+            </a:r>
+            <a:r>
+              <a:rPr lang="it-IT" sz="1400" dirty="0" err="1"/>
+              <a:t>is</a:t>
+            </a:r>
+            <a:r>
+              <a:rPr lang="it-IT" sz="1400" dirty="0"/>
+              <a:t> </a:t>
+            </a:r>
+            <a:r>
+              <a:rPr lang="it-IT" sz="1400" dirty="0" err="1"/>
+              <a:t>designed</a:t>
+            </a:r>
+            <a:r>
+              <a:rPr lang="it-IT" sz="1400" dirty="0"/>
+              <a:t> to be </a:t>
+            </a:r>
+            <a:r>
+              <a:rPr lang="it-IT" sz="1400" dirty="0" err="1"/>
+              <a:t>seamless</a:t>
+            </a:r>
+            <a:r>
+              <a:rPr lang="it-IT" sz="1400" dirty="0"/>
+              <a:t> </a:t>
+            </a:r>
+            <a:r>
+              <a:rPr lang="it-IT" sz="1400" dirty="0" err="1"/>
+              <a:t>integrated</a:t>
+            </a:r>
+            <a:r>
+              <a:rPr lang="it-IT" sz="1400" dirty="0"/>
+              <a:t> with </a:t>
+            </a:r>
+            <a:r>
+              <a:rPr lang="it-IT" sz="1400" dirty="0" err="1"/>
+              <a:t>Scikit-Learn</a:t>
+            </a:r>
+            <a:r>
+              <a:rPr lang="it-IT" sz="1400" dirty="0"/>
+              <a:t> </a:t>
+            </a:r>
+            <a:r>
+              <a:rPr lang="it-IT" sz="1400" dirty="0" err="1"/>
+              <a:t>while</a:t>
+            </a:r>
+            <a:r>
+              <a:rPr lang="it-IT" sz="1400" dirty="0"/>
+              <a:t> </a:t>
+            </a:r>
+            <a:r>
+              <a:rPr lang="it-IT" sz="1400" dirty="0" err="1"/>
+              <a:t>also</a:t>
+            </a:r>
+            <a:r>
+              <a:rPr lang="it-IT" sz="1400" dirty="0"/>
+              <a:t> be </a:t>
+            </a:r>
+            <a:r>
+              <a:rPr lang="it-IT" sz="1400" dirty="0" err="1"/>
+              <a:t>usable</a:t>
+            </a:r>
+            <a:r>
+              <a:rPr lang="it-IT" sz="1400" dirty="0"/>
+              <a:t> </a:t>
+            </a:r>
+            <a:r>
+              <a:rPr lang="it-IT" sz="1400" dirty="0" err="1"/>
+              <a:t>without</a:t>
+            </a:r>
+            <a:r>
+              <a:rPr lang="it-IT" sz="1400" dirty="0"/>
+              <a:t> </a:t>
+            </a:r>
+            <a:r>
+              <a:rPr lang="it-IT" sz="1400" dirty="0" err="1"/>
+              <a:t>it</a:t>
+            </a:r>
+            <a:r>
+              <a:rPr lang="it-IT" sz="1400" dirty="0"/>
+              <a:t>. </a:t>
+            </a:r>
+          </a:p>
+        </p:txBody>
+      </p:sp>
+    </p:spTree>
+    <p:extLst>
+      <p:ext uri="{BB962C8B-B14F-4D97-AF65-F5344CB8AC3E}">
+        <p14:creationId xmlns:p14="http://schemas.microsoft.com/office/powerpoint/2010/main" val="2850000877"/>
+      </p:ext>
+    </p:extLst>
+  </p:cSld>
+  <p:clrMapOvr>
+    <a:masterClrMapping/>
+  </p:clrMapOvr>
+</p:sld>
+</file>
+
+<file path=ppt/slides/slide30.xml><?xml version="1.0" encoding="utf-8"?>
+<p:sld xmlns:a="http://schemas.openxmlformats.org/drawingml/2006/main" xmlns:r="http://schemas.openxmlformats.org/officeDocument/2006/relationships" xmlns:p="http://schemas.openxmlformats.org/presentationml/2006/main">
+  <p:cSld>
+    <p:spTree>
+      <p:nvGrpSpPr>
+        <p:cNvPr id="1" name=""/>
+        <p:cNvGrpSpPr/>
+        <p:nvPr/>
+      </p:nvGrpSpPr>
+      <p:grpSpPr>
+        <a:xfrm>
+          <a:off x="0" y="0"/>
+          <a:ext cx="0" cy="0"/>
+          <a:chOff x="0" y="0"/>
+          <a:chExt cx="0" cy="0"/>
+        </a:xfrm>
+      </p:grpSpPr>
+      <p:sp>
+        <p:nvSpPr>
+          <p:cNvPr id="120" name="PlaceHolder 1"/>
+          <p:cNvSpPr>
+            <a:spLocks noGrp="1"/>
+          </p:cNvSpPr>
+          <p:nvPr>
+            <p:ph type="title"/>
+          </p:nvPr>
+        </p:nvSpPr>
+        <p:spPr>
+          <a:xfrm>
+            <a:off x="311760" y="0"/>
+            <a:ext cx="8520120" cy="792000"/>
+          </a:xfrm>
+          <a:prstGeom prst="rect">
+            <a:avLst/>
+          </a:prstGeom>
+          <a:noFill/>
+          <a:ln w="0">
+            <a:noFill/>
+          </a:ln>
+        </p:spPr>
+        <p:txBody>
+          <a:bodyPr tIns="91440" bIns="91440" anchor="t">
+            <a:normAutofit fontScale="90000"/>
+          </a:bodyPr>
+          <a:lstStyle/>
+          <a:p>
+            <a:pPr>
+              <a:lnSpc>
+                <a:spcPct val="100000"/>
+              </a:lnSpc>
+              <a:buNone/>
+              <a:tabLst>
+                <a:tab pos="0" algn="l"/>
+              </a:tabLst>
+            </a:pPr>
+            <a:r>
+              <a:rPr lang="it" sz="2400" b="0" strike="noStrike" spc="-1" dirty="0">
+                <a:solidFill>
+                  <a:srgbClr val="000000"/>
+                </a:solidFill>
+                <a:latin typeface="Arial"/>
+                <a:ea typeface="Arial"/>
+              </a:rPr>
+              <a:t>Appendix – 7</a:t>
+            </a:r>
+            <a:br>
+              <a:rPr lang="it" sz="2400" b="0" strike="noStrike" spc="-1" dirty="0">
+                <a:solidFill>
+                  <a:srgbClr val="000000"/>
+                </a:solidFill>
+                <a:latin typeface="Arial"/>
+                <a:ea typeface="Arial"/>
+              </a:rPr>
+            </a:br>
+            <a:r>
+              <a:rPr lang="it" sz="2000" spc="-1" dirty="0">
+                <a:solidFill>
+                  <a:srgbClr val="3F3F3F"/>
+                </a:solidFill>
+                <a:latin typeface="Arial"/>
+                <a:ea typeface="Arial"/>
+              </a:rPr>
+              <a:t>In-depth analysis of SVM’s performance on M</a:t>
+            </a:r>
+            <a:r>
+              <a:rPr lang="it" sz="2000" b="0" strike="noStrike" spc="-1" dirty="0">
+                <a:solidFill>
+                  <a:srgbClr val="3F3F3F"/>
+                </a:solidFill>
+                <a:latin typeface="Arial"/>
+                <a:ea typeface="Arial"/>
+              </a:rPr>
+              <a:t>onk 3 task</a:t>
+            </a:r>
+            <a:endParaRPr lang="it-IT" sz="2400" b="0" strike="noStrike" spc="-1" dirty="0">
+              <a:solidFill>
+                <a:srgbClr val="FF0000"/>
+              </a:solidFill>
+              <a:latin typeface="Arial"/>
+            </a:endParaRPr>
+          </a:p>
+        </p:txBody>
+      </p:sp>
+      <p:sp>
+        <p:nvSpPr>
+          <p:cNvPr id="122" name="PlaceHolder 3"/>
+          <p:cNvSpPr>
+            <a:spLocks noGrp="1"/>
+          </p:cNvSpPr>
+          <p:nvPr>
+            <p:ph type="sldNum" idx="14"/>
+          </p:nvPr>
+        </p:nvSpPr>
+        <p:spPr>
+          <a:xfrm>
+            <a:off x="8472600" y="4663080"/>
+            <a:ext cx="548280" cy="393120"/>
+          </a:xfrm>
+          <a:prstGeom prst="rect">
+            <a:avLst/>
+          </a:prstGeom>
+          <a:noFill/>
+          <a:ln w="0">
+            <a:noFill/>
+          </a:ln>
+        </p:spPr>
+        <p:txBody>
+          <a:bodyPr tIns="91440" bIns="91440" anchor="ctr">
+            <a:normAutofit/>
+          </a:bodyPr>
+          <a:lstStyle>
+            <a:lvl1pPr algn="r">
+              <a:lnSpc>
+                <a:spcPct val="100000"/>
+              </a:lnSpc>
+              <a:buNone/>
+              <a:tabLst>
+                <a:tab pos="0" algn="l"/>
+              </a:tabLst>
+              <a:defRPr lang="it" sz="1000" b="0" strike="noStrike" spc="-1">
+                <a:solidFill>
+                  <a:srgbClr val="595959"/>
+                </a:solidFill>
+                <a:latin typeface="Arial"/>
+                <a:ea typeface="Arial"/>
+              </a:defRPr>
+            </a:lvl1pPr>
+          </a:lstStyle>
+          <a:p>
+            <a:pPr algn="r">
+              <a:lnSpc>
+                <a:spcPct val="100000"/>
+              </a:lnSpc>
+              <a:buNone/>
+              <a:tabLst>
+                <a:tab pos="0" algn="l"/>
+              </a:tabLst>
+            </a:pPr>
+            <a:fld id="{25B94CD5-D627-49BE-818E-4A00F2BB16DF}" type="slidenum">
+              <a:rPr lang="it" sz="1000" b="0" strike="noStrike" spc="-1">
+                <a:solidFill>
+                  <a:srgbClr val="595959"/>
+                </a:solidFill>
+                <a:latin typeface="Arial"/>
+                <a:ea typeface="Arial"/>
+              </a:rPr>
+              <a:t>30</a:t>
+            </a:fld>
+            <a:endParaRPr lang="it-IT" sz="1000" b="0" strike="noStrike" spc="-1">
+              <a:latin typeface="Times New Roman"/>
+            </a:endParaRPr>
+          </a:p>
+        </p:txBody>
+      </p:sp>
+      <p:sp>
+        <p:nvSpPr>
+          <p:cNvPr id="16" name="CasellaDiTesto 15">
+            <a:extLst>
+              <a:ext uri="{FF2B5EF4-FFF2-40B4-BE49-F238E27FC236}">
+                <a16:creationId xmlns:a16="http://schemas.microsoft.com/office/drawing/2014/main" id="{34EA9030-D49A-946A-EE82-303EA4064980}"/>
+              </a:ext>
+            </a:extLst>
+          </p:cNvPr>
+          <p:cNvSpPr txBox="1"/>
+          <p:nvPr/>
+        </p:nvSpPr>
+        <p:spPr>
+          <a:xfrm>
+            <a:off x="308535" y="1057413"/>
+            <a:ext cx="8403175" cy="307777"/>
+          </a:xfrm>
+          <a:prstGeom prst="rect">
+            <a:avLst/>
+          </a:prstGeom>
+          <a:noFill/>
+        </p:spPr>
+        <p:txBody>
+          <a:bodyPr wrap="square" rtlCol="0">
+            <a:spAutoFit/>
+          </a:bodyPr>
+          <a:lstStyle/>
+          <a:p>
+            <a:r>
+              <a:rPr lang="it-IT" sz="1400" b="1" dirty="0"/>
+              <a:t>Figure</a:t>
+            </a:r>
+            <a:r>
+              <a:rPr lang="it-IT" sz="1400" b="1" dirty="0">
+                <a:solidFill>
+                  <a:srgbClr val="FF0000"/>
+                </a:solidFill>
+              </a:rPr>
+              <a:t> k+2</a:t>
+            </a:r>
+            <a:r>
+              <a:rPr lang="it-IT" sz="1400" dirty="0"/>
+              <a:t>: </a:t>
+            </a:r>
+            <a:r>
+              <a:rPr lang="it-IT" sz="1400" dirty="0" err="1"/>
+              <a:t>Confusion</a:t>
+            </a:r>
+            <a:r>
+              <a:rPr lang="it-IT" sz="1400" dirty="0"/>
+              <a:t> </a:t>
+            </a:r>
+            <a:r>
+              <a:rPr lang="it-IT" sz="1400" dirty="0" err="1"/>
+              <a:t>matrix</a:t>
+            </a:r>
+            <a:r>
+              <a:rPr lang="it-IT" sz="1400" dirty="0"/>
+              <a:t>, learning curve and ROC curve for the SVM, Monk 3 task</a:t>
+            </a:r>
+          </a:p>
+        </p:txBody>
+      </p:sp>
+      <p:sp>
+        <p:nvSpPr>
+          <p:cNvPr id="17" name="CasellaDiTesto 16">
+            <a:extLst>
+              <a:ext uri="{FF2B5EF4-FFF2-40B4-BE49-F238E27FC236}">
+                <a16:creationId xmlns:a16="http://schemas.microsoft.com/office/drawing/2014/main" id="{331140F4-4D7F-79F3-B32B-4E794EAB9ADE}"/>
+              </a:ext>
+            </a:extLst>
+          </p:cNvPr>
+          <p:cNvSpPr txBox="1"/>
+          <p:nvPr/>
+        </p:nvSpPr>
+        <p:spPr>
+          <a:xfrm>
+            <a:off x="308533" y="3943170"/>
+            <a:ext cx="8403175" cy="523220"/>
+          </a:xfrm>
+          <a:prstGeom prst="rect">
+            <a:avLst/>
+          </a:prstGeom>
+          <a:noFill/>
+        </p:spPr>
+        <p:txBody>
+          <a:bodyPr wrap="square" rtlCol="0">
+            <a:spAutoFit/>
+          </a:bodyPr>
+          <a:lstStyle/>
+          <a:p>
+            <a:r>
+              <a:rPr lang="it-IT" sz="1400" dirty="0" err="1"/>
+              <a:t>Neither</a:t>
+            </a:r>
+            <a:r>
+              <a:rPr lang="it-IT" sz="1400" dirty="0"/>
+              <a:t> model can </a:t>
+            </a:r>
+            <a:r>
+              <a:rPr lang="it-IT" sz="1400" dirty="0" err="1"/>
+              <a:t>reach</a:t>
+            </a:r>
+            <a:r>
+              <a:rPr lang="it-IT" sz="1400" dirty="0"/>
+              <a:t> 100% </a:t>
+            </a:r>
+            <a:r>
+              <a:rPr lang="it-IT" sz="1400" dirty="0" err="1"/>
+              <a:t>accuracy</a:t>
+            </a:r>
+            <a:r>
+              <a:rPr lang="it-IT" sz="1400" dirty="0"/>
+              <a:t> on </a:t>
+            </a:r>
+            <a:r>
+              <a:rPr lang="it-IT" sz="1400" dirty="0" err="1"/>
+              <a:t>this</a:t>
+            </a:r>
+            <a:r>
+              <a:rPr lang="it-IT" sz="1400" dirty="0"/>
+              <a:t> task. </a:t>
+            </a:r>
+            <a:r>
+              <a:rPr lang="it-IT" sz="1400" dirty="0" err="1"/>
+              <a:t>This</a:t>
+            </a:r>
+            <a:r>
+              <a:rPr lang="it-IT" sz="1400" dirty="0"/>
+              <a:t> </a:t>
+            </a:r>
+            <a:r>
+              <a:rPr lang="it-IT" sz="1400" dirty="0" err="1"/>
+              <a:t>is</a:t>
+            </a:r>
+            <a:r>
+              <a:rPr lang="it-IT" sz="1400" dirty="0"/>
+              <a:t> to be </a:t>
+            </a:r>
+            <a:r>
+              <a:rPr lang="it-IT" sz="1400" dirty="0" err="1"/>
+              <a:t>expected</a:t>
+            </a:r>
+            <a:r>
+              <a:rPr lang="it-IT" sz="1400" dirty="0"/>
+              <a:t>, </a:t>
+            </a:r>
+            <a:r>
+              <a:rPr lang="it-IT" sz="1400" dirty="0" err="1"/>
+              <a:t>as</a:t>
+            </a:r>
+            <a:r>
+              <a:rPr lang="it-IT" sz="1400" dirty="0"/>
+              <a:t> the in Monk 3 </a:t>
+            </a:r>
+            <a:r>
+              <a:rPr lang="it-IT" sz="1400" dirty="0" err="1"/>
+              <a:t>there</a:t>
+            </a:r>
+            <a:r>
+              <a:rPr lang="it-IT" sz="1400" dirty="0"/>
+              <a:t> </a:t>
+            </a:r>
+            <a:r>
+              <a:rPr lang="it-IT" sz="1400" dirty="0" err="1"/>
+              <a:t>is</a:t>
+            </a:r>
+            <a:r>
+              <a:rPr lang="it-IT" sz="1400" dirty="0"/>
+              <a:t> a 5% </a:t>
+            </a:r>
+            <a:r>
+              <a:rPr lang="it-IT" sz="1400" dirty="0" err="1"/>
+              <a:t>noise</a:t>
+            </a:r>
+            <a:r>
+              <a:rPr lang="it-IT" sz="1400" dirty="0"/>
+              <a:t> in TR set (</a:t>
+            </a:r>
+            <a:r>
+              <a:rPr lang="it-IT" sz="1400" dirty="0" err="1"/>
+              <a:t>aka</a:t>
+            </a:r>
+            <a:r>
+              <a:rPr lang="it-IT" sz="1400" dirty="0"/>
+              <a:t> 5% of patterns are </a:t>
+            </a:r>
+            <a:r>
+              <a:rPr lang="it-IT" sz="1400" dirty="0" err="1"/>
+              <a:t>misclassified</a:t>
+            </a:r>
+            <a:r>
+              <a:rPr lang="it-IT" sz="1400" dirty="0"/>
+              <a:t>) [</a:t>
+            </a:r>
+            <a:r>
+              <a:rPr lang="it-IT" sz="1400" dirty="0">
+                <a:hlinkClick r:id="rId2" action="ppaction://hlinksldjump"/>
+              </a:rPr>
+              <a:t>10</a:t>
+            </a:r>
+            <a:r>
+              <a:rPr lang="it-IT" sz="1400" dirty="0"/>
+              <a:t>].</a:t>
+            </a:r>
+          </a:p>
+        </p:txBody>
+      </p:sp>
+      <p:pic>
+        <p:nvPicPr>
+          <p:cNvPr id="3" name="Immagine 2">
+            <a:extLst>
+              <a:ext uri="{FF2B5EF4-FFF2-40B4-BE49-F238E27FC236}">
+                <a16:creationId xmlns:a16="http://schemas.microsoft.com/office/drawing/2014/main" id="{403A6694-F1C9-FBDA-0B6C-3AC3745FA3BF}"/>
+              </a:ext>
+            </a:extLst>
+          </p:cNvPr>
+          <p:cNvPicPr>
+            <a:picLocks noChangeAspect="1"/>
+          </p:cNvPicPr>
+          <p:nvPr/>
+        </p:nvPicPr>
+        <p:blipFill>
+          <a:blip r:embed="rId3"/>
+          <a:stretch>
+            <a:fillRect/>
+          </a:stretch>
+        </p:blipFill>
+        <p:spPr>
+          <a:xfrm>
+            <a:off x="308533" y="1365190"/>
+            <a:ext cx="1918861" cy="2051414"/>
+          </a:xfrm>
+          <a:prstGeom prst="rect">
+            <a:avLst/>
+          </a:prstGeom>
+          <a:ln>
+            <a:noFill/>
+          </a:ln>
+        </p:spPr>
+      </p:pic>
+      <p:pic>
+        <p:nvPicPr>
+          <p:cNvPr id="7" name="Immagine 6">
+            <a:extLst>
+              <a:ext uri="{FF2B5EF4-FFF2-40B4-BE49-F238E27FC236}">
+                <a16:creationId xmlns:a16="http://schemas.microsoft.com/office/drawing/2014/main" id="{BB2CF34C-D335-7583-FB07-420C10B95BF9}"/>
+              </a:ext>
+            </a:extLst>
+          </p:cNvPr>
+          <p:cNvPicPr>
+            <a:picLocks noChangeAspect="1"/>
+          </p:cNvPicPr>
+          <p:nvPr/>
+        </p:nvPicPr>
+        <p:blipFill>
+          <a:blip r:embed="rId4"/>
+          <a:stretch>
+            <a:fillRect/>
+          </a:stretch>
+        </p:blipFill>
+        <p:spPr>
+          <a:xfrm>
+            <a:off x="2227393" y="1365190"/>
+            <a:ext cx="3117814" cy="2265298"/>
+          </a:xfrm>
+          <a:prstGeom prst="rect">
+            <a:avLst/>
+          </a:prstGeom>
+          <a:ln>
+            <a:noFill/>
+          </a:ln>
+        </p:spPr>
+      </p:pic>
+      <p:pic>
+        <p:nvPicPr>
+          <p:cNvPr id="10" name="Immagine 9">
+            <a:extLst>
+              <a:ext uri="{FF2B5EF4-FFF2-40B4-BE49-F238E27FC236}">
+                <a16:creationId xmlns:a16="http://schemas.microsoft.com/office/drawing/2014/main" id="{1031203E-8148-B4C4-91F5-8CB5719D4E8E}"/>
+              </a:ext>
+            </a:extLst>
+          </p:cNvPr>
+          <p:cNvPicPr>
+            <a:picLocks noChangeAspect="1"/>
+          </p:cNvPicPr>
+          <p:nvPr/>
+        </p:nvPicPr>
+        <p:blipFill>
+          <a:blip r:embed="rId5"/>
+          <a:stretch>
+            <a:fillRect/>
+          </a:stretch>
+        </p:blipFill>
+        <p:spPr>
+          <a:xfrm>
+            <a:off x="5345207" y="1365190"/>
+            <a:ext cx="3127393" cy="2265298"/>
+          </a:xfrm>
+          <a:prstGeom prst="rect">
+            <a:avLst/>
+          </a:prstGeom>
+          <a:ln>
+            <a:noFill/>
+          </a:ln>
+        </p:spPr>
+      </p:pic>
+    </p:spTree>
+    <p:extLst>
+      <p:ext uri="{BB962C8B-B14F-4D97-AF65-F5344CB8AC3E}">
+        <p14:creationId xmlns:p14="http://schemas.microsoft.com/office/powerpoint/2010/main" val="2148261782"/>
+      </p:ext>
+    </p:extLst>
+  </p:cSld>
+  <p:clrMapOvr>
+    <a:masterClrMapping/>
+  </p:clrMapOvr>
+</p:sld>
+</file>
+
+<file path=ppt/slides/slide31.xml><?xml version="1.0" encoding="utf-8"?>
+<p:sld xmlns:a="http://schemas.openxmlformats.org/drawingml/2006/main" xmlns:r="http://schemas.openxmlformats.org/officeDocument/2006/relationships" xmlns:p="http://schemas.openxmlformats.org/presentationml/2006/main">
+  <p:cSld>
+    <p:spTree>
+      <p:nvGrpSpPr>
+        <p:cNvPr id="1" name=""/>
+        <p:cNvGrpSpPr/>
+        <p:nvPr/>
+      </p:nvGrpSpPr>
+      <p:grpSpPr>
+        <a:xfrm>
+          <a:off x="0" y="0"/>
+          <a:ext cx="0" cy="0"/>
+          <a:chOff x="0" y="0"/>
+          <a:chExt cx="0" cy="0"/>
+        </a:xfrm>
+      </p:grpSpPr>
+      <p:sp>
+        <p:nvSpPr>
+          <p:cNvPr id="120" name="PlaceHolder 1"/>
+          <p:cNvSpPr>
+            <a:spLocks noGrp="1"/>
+          </p:cNvSpPr>
+          <p:nvPr>
+            <p:ph type="title"/>
+          </p:nvPr>
+        </p:nvSpPr>
+        <p:spPr>
+          <a:xfrm>
+            <a:off x="311760" y="0"/>
+            <a:ext cx="8520120" cy="792000"/>
+          </a:xfrm>
+          <a:prstGeom prst="rect">
+            <a:avLst/>
+          </a:prstGeom>
+          <a:noFill/>
+          <a:ln w="0">
+            <a:noFill/>
+          </a:ln>
+        </p:spPr>
+        <p:txBody>
+          <a:bodyPr tIns="91440" bIns="91440" anchor="t">
+            <a:normAutofit fontScale="90000"/>
+          </a:bodyPr>
+          <a:lstStyle/>
+          <a:p>
+            <a:pPr>
+              <a:lnSpc>
+                <a:spcPct val="100000"/>
+              </a:lnSpc>
+              <a:buNone/>
+              <a:tabLst>
+                <a:tab pos="0" algn="l"/>
+              </a:tabLst>
+            </a:pPr>
+            <a:r>
+              <a:rPr lang="it" sz="2400" b="0" strike="noStrike" spc="-1" dirty="0">
+                <a:solidFill>
+                  <a:srgbClr val="000000"/>
+                </a:solidFill>
+                <a:latin typeface="Arial"/>
+                <a:ea typeface="Arial"/>
+              </a:rPr>
+              <a:t>Appendix – 8</a:t>
             </a:r>
             <a:br>
               <a:rPr lang="it" sz="2400" b="0" strike="noStrike" spc="-1" dirty="0">
@@ -23684,7 +25601,7 @@
                 <a:latin typeface="Arial"/>
                 <a:ea typeface="Arial"/>
               </a:rPr>
-              <a:t>29</a:t>
+              <a:t>31</a:t>
             </a:fld>
             <a:endParaRPr lang="it-IT" sz="1000" b="0" strike="noStrike" spc="-1">
               <a:latin typeface="Times New Roman"/>
@@ -24605,850 +26522,7 @@
 </p:sld>
 </file>
 
-<file path=ppt/slides/slide3.xml><?xml version="1.0" encoding="utf-8"?>
-<p:sld xmlns:a="http://schemas.openxmlformats.org/drawingml/2006/main" xmlns:r="http://schemas.openxmlformats.org/officeDocument/2006/relationships" xmlns:p="http://schemas.openxmlformats.org/presentationml/2006/main">
-  <p:cSld>
-    <p:spTree>
-      <p:nvGrpSpPr>
-        <p:cNvPr id="1" name=""/>
-        <p:cNvGrpSpPr/>
-        <p:nvPr/>
-      </p:nvGrpSpPr>
-      <p:grpSpPr>
-        <a:xfrm>
-          <a:off x="0" y="0"/>
-          <a:ext cx="0" cy="0"/>
-          <a:chOff x="0" y="0"/>
-          <a:chExt cx="0" cy="0"/>
-        </a:xfrm>
-      </p:grpSpPr>
-      <p:sp>
-        <p:nvSpPr>
-          <p:cNvPr id="83" name="PlaceHolder 3"/>
-          <p:cNvSpPr>
-            <a:spLocks noGrp="1"/>
-          </p:cNvSpPr>
-          <p:nvPr>
-            <p:ph type="sldNum" idx="3"/>
-          </p:nvPr>
-        </p:nvSpPr>
-        <p:spPr>
-          <a:xfrm>
-            <a:off x="8472600" y="4663080"/>
-            <a:ext cx="548280" cy="393120"/>
-          </a:xfrm>
-          <a:prstGeom prst="rect">
-            <a:avLst/>
-          </a:prstGeom>
-          <a:noFill/>
-          <a:ln w="0">
-            <a:noFill/>
-          </a:ln>
-        </p:spPr>
-        <p:txBody>
-          <a:bodyPr tIns="91440" bIns="91440" anchor="ctr">
-            <a:normAutofit/>
-          </a:bodyPr>
-          <a:lstStyle>
-            <a:lvl1pPr algn="r">
-              <a:lnSpc>
-                <a:spcPct val="100000"/>
-              </a:lnSpc>
-              <a:buNone/>
-              <a:tabLst>
-                <a:tab pos="0" algn="l"/>
-              </a:tabLst>
-              <a:defRPr lang="it" sz="1000" b="0" strike="noStrike" spc="-1">
-                <a:solidFill>
-                  <a:srgbClr val="595959"/>
-                </a:solidFill>
-                <a:latin typeface="Arial"/>
-                <a:ea typeface="Arial"/>
-              </a:defRPr>
-            </a:lvl1pPr>
-          </a:lstStyle>
-          <a:p>
-            <a:pPr algn="r">
-              <a:lnSpc>
-                <a:spcPct val="100000"/>
-              </a:lnSpc>
-              <a:buNone/>
-              <a:tabLst>
-                <a:tab pos="0" algn="l"/>
-              </a:tabLst>
-            </a:pPr>
-            <a:fld id="{CDE5831E-EF50-4AF8-82C3-EBDE88F03D8C}" type="slidenum">
-              <a:rPr lang="it" sz="1000" b="0" strike="noStrike" spc="-1">
-                <a:solidFill>
-                  <a:srgbClr val="595959"/>
-                </a:solidFill>
-                <a:latin typeface="Arial"/>
-                <a:ea typeface="Arial"/>
-              </a:rPr>
-              <a:t>3</a:t>
-            </a:fld>
-            <a:endParaRPr lang="it-IT" sz="1000" b="0" strike="noStrike" spc="-1" dirty="0">
-              <a:latin typeface="Times New Roman"/>
-            </a:endParaRPr>
-          </a:p>
-        </p:txBody>
-      </p:sp>
-      <p:sp>
-        <p:nvSpPr>
-          <p:cNvPr id="4" name="PlaceHolder 1">
-            <a:extLst>
-              <a:ext uri="{FF2B5EF4-FFF2-40B4-BE49-F238E27FC236}">
-                <a16:creationId xmlns:a16="http://schemas.microsoft.com/office/drawing/2014/main" id="{80C918E8-6CF7-0E0B-D3EF-88419C82AA81}"/>
-              </a:ext>
-            </a:extLst>
-          </p:cNvPr>
-          <p:cNvSpPr txBox="1">
-            <a:spLocks/>
-          </p:cNvSpPr>
-          <p:nvPr/>
-        </p:nvSpPr>
-        <p:spPr>
-          <a:xfrm>
-            <a:off x="311760" y="0"/>
-            <a:ext cx="8520120" cy="576000"/>
-          </a:xfrm>
-          <a:prstGeom prst="rect">
-            <a:avLst/>
-          </a:prstGeom>
-          <a:noFill/>
-          <a:ln w="0">
-            <a:noFill/>
-          </a:ln>
-        </p:spPr>
-        <p:txBody>
-          <a:bodyPr lIns="0" tIns="91440" rIns="0" bIns="91440" anchor="t">
-            <a:normAutofit fontScale="97500"/>
-          </a:bodyPr>
-          <a:lstStyle>
-            <a:lvl1pPr algn="l" defTabSz="914400" rtl="0" eaLnBrk="1" latinLnBrk="0" hangingPunct="1">
-              <a:lnSpc>
-                <a:spcPct val="90000"/>
-              </a:lnSpc>
-              <a:spcBef>
-                <a:spcPct val="0"/>
-              </a:spcBef>
-              <a:buNone/>
-              <a:defRPr sz="4400" kern="1200">
-                <a:solidFill>
-                  <a:schemeClr val="tx1"/>
-                </a:solidFill>
-                <a:latin typeface="+mj-lt"/>
-                <a:ea typeface="+mj-ea"/>
-                <a:cs typeface="+mj-cs"/>
-              </a:defRPr>
-            </a:lvl1pPr>
-          </a:lstStyle>
-          <a:p>
-            <a:pPr>
-              <a:lnSpc>
-                <a:spcPct val="100000"/>
-              </a:lnSpc>
-              <a:tabLst>
-                <a:tab pos="0" algn="l"/>
-              </a:tabLst>
-            </a:pPr>
-            <a:r>
-              <a:rPr lang="it" sz="2500" spc="-1" dirty="0">
-                <a:solidFill>
-                  <a:srgbClr val="000000"/>
-                </a:solidFill>
-                <a:latin typeface="Arial"/>
-                <a:ea typeface="Arial"/>
-              </a:rPr>
-              <a:t>Code structure, models overview </a:t>
-            </a:r>
-            <a:r>
-              <a:rPr lang="it" sz="2500" spc="-1" dirty="0">
-                <a:solidFill>
-                  <a:srgbClr val="FF0000"/>
-                </a:solidFill>
-                <a:latin typeface="Arial"/>
-                <a:ea typeface="Arial"/>
-              </a:rPr>
-              <a:t>da rivedere</a:t>
-            </a:r>
-            <a:endParaRPr lang="it-IT" sz="2400" spc="-1" dirty="0">
-              <a:solidFill>
-                <a:srgbClr val="FF0000"/>
-              </a:solidFill>
-              <a:latin typeface="Arial"/>
-            </a:endParaRPr>
-          </a:p>
-        </p:txBody>
-      </p:sp>
-      <p:sp>
-        <p:nvSpPr>
-          <p:cNvPr id="3" name="CasellaDiTesto 2">
-            <a:extLst>
-              <a:ext uri="{FF2B5EF4-FFF2-40B4-BE49-F238E27FC236}">
-                <a16:creationId xmlns:a16="http://schemas.microsoft.com/office/drawing/2014/main" id="{21F77B32-FB82-2079-F53B-1131754C4D18}"/>
-              </a:ext>
-            </a:extLst>
-          </p:cNvPr>
-          <p:cNvSpPr txBox="1"/>
-          <p:nvPr/>
-        </p:nvSpPr>
-        <p:spPr>
-          <a:xfrm>
-            <a:off x="311761" y="693013"/>
-            <a:ext cx="8520119" cy="1600438"/>
-          </a:xfrm>
-          <a:prstGeom prst="rect">
-            <a:avLst/>
-          </a:prstGeom>
-          <a:noFill/>
-        </p:spPr>
-        <p:txBody>
-          <a:bodyPr wrap="square" rtlCol="0">
-            <a:spAutoFit/>
-          </a:bodyPr>
-          <a:lstStyle/>
-          <a:p>
-            <a:r>
-              <a:rPr lang="it-IT" sz="1400" dirty="0"/>
-              <a:t>Basic </a:t>
-            </a:r>
-            <a:r>
-              <a:rPr lang="it-IT" sz="1400" dirty="0" err="1"/>
-              <a:t>structure</a:t>
-            </a:r>
-            <a:r>
-              <a:rPr lang="it-IT" sz="1400" dirty="0"/>
-              <a:t> of the code: </a:t>
-            </a:r>
-          </a:p>
-          <a:p>
-            <a:pPr marL="285750" indent="-285750">
-              <a:buFont typeface="Arial" panose="020B0604020202020204" pitchFamily="34" charset="0"/>
-              <a:buChar char="•"/>
-            </a:pPr>
-            <a:r>
-              <a:rPr lang="it-IT" sz="1400" dirty="0">
-                <a:hlinkClick r:id="rId2"/>
-              </a:rPr>
-              <a:t>GitHub repo</a:t>
-            </a:r>
-            <a:r>
-              <a:rPr lang="it-IT" sz="1400" dirty="0"/>
-              <a:t> in </a:t>
-            </a:r>
-            <a:r>
-              <a:rPr lang="it-IT" sz="1400" dirty="0" err="1"/>
-              <a:t>which</a:t>
-            </a:r>
-            <a:r>
-              <a:rPr lang="it-IT" sz="1400" dirty="0"/>
-              <a:t> </a:t>
-            </a:r>
-            <a:r>
-              <a:rPr lang="it-IT" sz="1400" dirty="0" err="1"/>
-              <a:t>we</a:t>
-            </a:r>
-            <a:r>
-              <a:rPr lang="it-IT" sz="1400" dirty="0"/>
-              <a:t> </a:t>
-            </a:r>
-            <a:r>
-              <a:rPr lang="it-IT" sz="1400" dirty="0" err="1"/>
-              <a:t>stored</a:t>
-            </a:r>
-            <a:r>
-              <a:rPr lang="it-IT" sz="1400" dirty="0"/>
-              <a:t> the datasets, images, notebooks and </a:t>
-            </a:r>
-            <a:r>
-              <a:rPr lang="it-IT" sz="1400" dirty="0" err="1"/>
-              <a:t>saved</a:t>
-            </a:r>
-            <a:r>
-              <a:rPr lang="it-IT" sz="1400" dirty="0"/>
-              <a:t> models. </a:t>
-            </a:r>
-          </a:p>
-          <a:p>
-            <a:pPr marL="285750" indent="-285750">
-              <a:buFont typeface="Arial" panose="020B0604020202020204" pitchFamily="34" charset="0"/>
-              <a:buChar char="•"/>
-            </a:pPr>
-            <a:r>
-              <a:rPr lang="it-IT" sz="1400" dirty="0"/>
-              <a:t>A notebook for </a:t>
-            </a:r>
-            <a:r>
-              <a:rPr lang="it-IT" sz="1400" dirty="0" err="1"/>
-              <a:t>each</a:t>
-            </a:r>
-            <a:r>
-              <a:rPr lang="it-IT" sz="1400" dirty="0"/>
-              <a:t> of the </a:t>
-            </a:r>
-            <a:r>
-              <a:rPr lang="it-IT" sz="1400" dirty="0" err="1"/>
-              <a:t>three</a:t>
-            </a:r>
-            <a:r>
-              <a:rPr lang="it-IT" sz="1400" dirty="0"/>
-              <a:t> classes of models, for </a:t>
-            </a:r>
-            <a:r>
-              <a:rPr lang="it-IT" sz="1400" dirty="0" err="1"/>
-              <a:t>each</a:t>
-            </a:r>
-            <a:r>
-              <a:rPr lang="it-IT" sz="1400" dirty="0"/>
-              <a:t> of the </a:t>
-            </a:r>
-            <a:r>
-              <a:rPr lang="it-IT" sz="1400" dirty="0" err="1"/>
-              <a:t>two</a:t>
-            </a:r>
-            <a:r>
-              <a:rPr lang="it-IT" sz="1400" dirty="0"/>
-              <a:t> tasks.</a:t>
-            </a:r>
-          </a:p>
-          <a:p>
-            <a:pPr marL="285750" indent="-285750">
-              <a:buFont typeface="Arial" panose="020B0604020202020204" pitchFamily="34" charset="0"/>
-              <a:buChar char="•"/>
-            </a:pPr>
-            <a:r>
-              <a:rPr lang="it-IT" sz="1400" dirty="0"/>
-              <a:t>In </a:t>
-            </a:r>
-            <a:r>
-              <a:rPr lang="it-IT" sz="1400" dirty="0" err="1"/>
-              <a:t>each</a:t>
-            </a:r>
-            <a:r>
-              <a:rPr lang="it-IT" sz="1400" dirty="0"/>
-              <a:t> notebook: import and </a:t>
-            </a:r>
-            <a:r>
-              <a:rPr lang="it-IT" sz="1400" dirty="0" err="1"/>
-              <a:t>process</a:t>
-            </a:r>
-            <a:r>
-              <a:rPr lang="it-IT" sz="1400" dirty="0"/>
-              <a:t> the data, create the model (</a:t>
-            </a:r>
-            <a:r>
-              <a:rPr lang="it-IT" sz="1400" dirty="0" err="1"/>
-              <a:t>often</a:t>
-            </a:r>
-            <a:r>
-              <a:rPr lang="it-IT" sz="1400" dirty="0"/>
-              <a:t> by </a:t>
-            </a:r>
-            <a:r>
-              <a:rPr lang="it-IT" sz="1400" dirty="0" err="1"/>
-              <a:t>calling</a:t>
-            </a:r>
-            <a:r>
-              <a:rPr lang="it-IT" sz="1400" dirty="0"/>
-              <a:t> a </a:t>
-            </a:r>
-            <a:r>
-              <a:rPr lang="it-IT" sz="1400" dirty="0" err="1"/>
-              <a:t>function</a:t>
-            </a:r>
-            <a:r>
-              <a:rPr lang="it-IT" sz="1400" dirty="0"/>
-              <a:t> </a:t>
-            </a:r>
-            <a:r>
-              <a:rPr lang="it-IT" sz="1400" dirty="0" err="1"/>
-              <a:t>provided</a:t>
-            </a:r>
-            <a:r>
-              <a:rPr lang="it-IT" sz="1400" dirty="0"/>
-              <a:t> by the library), set up the </a:t>
-            </a:r>
-            <a:r>
-              <a:rPr lang="it-IT" sz="1400" dirty="0" err="1"/>
-              <a:t>grid</a:t>
-            </a:r>
-            <a:r>
-              <a:rPr lang="it-IT" sz="1400" dirty="0"/>
-              <a:t> </a:t>
-            </a:r>
-            <a:r>
-              <a:rPr lang="it-IT" sz="1400" dirty="0" err="1"/>
-              <a:t>search</a:t>
-            </a:r>
-            <a:r>
-              <a:rPr lang="it-IT" sz="1400" dirty="0"/>
-              <a:t> and training </a:t>
-            </a:r>
-            <a:r>
-              <a:rPr lang="it-IT" sz="1400" dirty="0" err="1"/>
-              <a:t>process</a:t>
-            </a:r>
-            <a:r>
-              <a:rPr lang="it-IT" sz="1400" dirty="0"/>
-              <a:t>, </a:t>
-            </a:r>
-            <a:r>
-              <a:rPr lang="it-IT" sz="1400" dirty="0" err="1"/>
-              <a:t>select</a:t>
-            </a:r>
-            <a:r>
-              <a:rPr lang="it-IT" sz="1400" dirty="0"/>
-              <a:t> best </a:t>
-            </a:r>
-            <a:r>
-              <a:rPr lang="it-IT" sz="1400" dirty="0" err="1"/>
-              <a:t>hyperparameters</a:t>
-            </a:r>
-            <a:r>
-              <a:rPr lang="it-IT" sz="1400" dirty="0"/>
-              <a:t> and plot the learning curve, </a:t>
-            </a:r>
-            <a:r>
-              <a:rPr lang="it-IT" sz="1400" dirty="0" err="1"/>
-              <a:t>save</a:t>
-            </a:r>
-            <a:r>
-              <a:rPr lang="it-IT" sz="1400" dirty="0"/>
-              <a:t> the model</a:t>
-            </a:r>
-          </a:p>
-          <a:p>
-            <a:pPr marL="285750" indent="-285750">
-              <a:buFont typeface="Arial" panose="020B0604020202020204" pitchFamily="34" charset="0"/>
-              <a:buChar char="•"/>
-            </a:pPr>
-            <a:r>
-              <a:rPr lang="it-IT" sz="1400" dirty="0"/>
-              <a:t>Extra notebooks for data </a:t>
-            </a:r>
-            <a:r>
-              <a:rPr lang="it-IT" sz="1400" dirty="0" err="1"/>
-              <a:t>exploration</a:t>
-            </a:r>
-            <a:r>
-              <a:rPr lang="it-IT" sz="1400" dirty="0"/>
-              <a:t> and models </a:t>
-            </a:r>
-            <a:r>
-              <a:rPr lang="it-IT" sz="1400" dirty="0" err="1"/>
-              <a:t>comparison</a:t>
-            </a:r>
-            <a:endParaRPr lang="it-IT" sz="1400" dirty="0"/>
-          </a:p>
-        </p:txBody>
-      </p:sp>
-      <p:sp>
-        <p:nvSpPr>
-          <p:cNvPr id="11" name="CasellaDiTesto 10">
-            <a:extLst>
-              <a:ext uri="{FF2B5EF4-FFF2-40B4-BE49-F238E27FC236}">
-                <a16:creationId xmlns:a16="http://schemas.microsoft.com/office/drawing/2014/main" id="{003EBDB9-88F0-E455-63E2-1D1CE308D764}"/>
-              </a:ext>
-            </a:extLst>
-          </p:cNvPr>
-          <p:cNvSpPr txBox="1"/>
-          <p:nvPr/>
-        </p:nvSpPr>
-        <p:spPr>
-          <a:xfrm>
-            <a:off x="311760" y="3996932"/>
-            <a:ext cx="8520120" cy="523220"/>
-          </a:xfrm>
-          <a:prstGeom prst="rect">
-            <a:avLst/>
-          </a:prstGeom>
-          <a:noFill/>
-        </p:spPr>
-        <p:txBody>
-          <a:bodyPr wrap="square" rtlCol="0">
-            <a:spAutoFit/>
-          </a:bodyPr>
-          <a:lstStyle/>
-          <a:p>
-            <a:r>
-              <a:rPr lang="it-IT" sz="1400" dirty="0"/>
-              <a:t>For </a:t>
-            </a:r>
-            <a:r>
-              <a:rPr lang="it-IT" sz="1400" dirty="0" err="1"/>
-              <a:t>all</a:t>
-            </a:r>
-            <a:r>
-              <a:rPr lang="it-IT" sz="1400" dirty="0"/>
-              <a:t> </a:t>
-            </a:r>
-            <a:r>
-              <a:rPr lang="it-IT" sz="1400" dirty="0" err="1"/>
-              <a:t>these</a:t>
-            </a:r>
-            <a:r>
-              <a:rPr lang="it-IT" sz="1400" dirty="0"/>
-              <a:t> models </a:t>
-            </a:r>
-            <a:r>
-              <a:rPr lang="it-IT" sz="1400" dirty="0" err="1"/>
-              <a:t>we</a:t>
-            </a:r>
-            <a:r>
-              <a:rPr lang="it-IT" sz="1400" dirty="0"/>
-              <a:t> </a:t>
-            </a:r>
-            <a:r>
-              <a:rPr lang="it-IT" sz="1400" dirty="0" err="1"/>
-              <a:t>tried</a:t>
-            </a:r>
-            <a:r>
-              <a:rPr lang="it-IT" sz="1400" dirty="0"/>
-              <a:t> out </a:t>
-            </a:r>
-            <a:r>
-              <a:rPr lang="it-IT" sz="1400" dirty="0" err="1"/>
-              <a:t>many</a:t>
-            </a:r>
-            <a:r>
-              <a:rPr lang="it-IT" sz="1400" dirty="0"/>
-              <a:t> </a:t>
-            </a:r>
-            <a:r>
-              <a:rPr lang="it-IT" sz="1400" dirty="0" err="1"/>
-              <a:t>configurations</a:t>
-            </a:r>
-            <a:r>
-              <a:rPr lang="it-IT" sz="1400" dirty="0"/>
-              <a:t> of </a:t>
-            </a:r>
-            <a:r>
-              <a:rPr lang="it-IT" sz="1400" dirty="0" err="1"/>
-              <a:t>hyperparameters</a:t>
-            </a:r>
-            <a:r>
-              <a:rPr lang="it-IT" sz="1400" dirty="0"/>
-              <a:t>. </a:t>
-            </a:r>
-            <a:r>
-              <a:rPr lang="it-IT" sz="1400" dirty="0">
-                <a:solidFill>
-                  <a:srgbClr val="FF0000"/>
-                </a:solidFill>
-              </a:rPr>
-              <a:t>Precise </a:t>
-            </a:r>
-            <a:r>
-              <a:rPr lang="it-IT" sz="1400" dirty="0" err="1">
-                <a:solidFill>
-                  <a:srgbClr val="FF0000"/>
-                </a:solidFill>
-              </a:rPr>
-              <a:t>details</a:t>
-            </a:r>
-            <a:r>
-              <a:rPr lang="it-IT" sz="1400" dirty="0">
-                <a:solidFill>
-                  <a:srgbClr val="FF0000"/>
-                </a:solidFill>
-              </a:rPr>
-              <a:t> </a:t>
-            </a:r>
-            <a:r>
-              <a:rPr lang="it-IT" sz="1400" dirty="0" err="1">
-                <a:solidFill>
-                  <a:srgbClr val="FF0000"/>
-                </a:solidFill>
-              </a:rPr>
-              <a:t>will</a:t>
-            </a:r>
-            <a:r>
-              <a:rPr lang="it-IT" sz="1400" dirty="0">
-                <a:solidFill>
-                  <a:srgbClr val="FF0000"/>
-                </a:solidFill>
-              </a:rPr>
-              <a:t> be </a:t>
-            </a:r>
-            <a:r>
-              <a:rPr lang="it-IT" sz="1400" dirty="0" err="1">
-                <a:solidFill>
-                  <a:srgbClr val="FF0000"/>
-                </a:solidFill>
-              </a:rPr>
-              <a:t>given</a:t>
-            </a:r>
-            <a:r>
-              <a:rPr lang="it-IT" sz="1400" dirty="0">
-                <a:solidFill>
-                  <a:srgbClr val="FF0000"/>
-                </a:solidFill>
-              </a:rPr>
-              <a:t> </a:t>
-            </a:r>
-            <a:r>
-              <a:rPr lang="it-IT" sz="1400" dirty="0" err="1">
-                <a:solidFill>
-                  <a:srgbClr val="FF0000"/>
-                </a:solidFill>
-              </a:rPr>
-              <a:t>later</a:t>
-            </a:r>
-            <a:r>
-              <a:rPr lang="it-IT" sz="1400" dirty="0">
-                <a:solidFill>
-                  <a:srgbClr val="FF0000"/>
-                </a:solidFill>
-              </a:rPr>
-              <a:t>. </a:t>
-            </a:r>
-          </a:p>
-        </p:txBody>
-      </p:sp>
-      <p:sp>
-        <p:nvSpPr>
-          <p:cNvPr id="5" name="CasellaDiTesto 4">
-            <a:extLst>
-              <a:ext uri="{FF2B5EF4-FFF2-40B4-BE49-F238E27FC236}">
-                <a16:creationId xmlns:a16="http://schemas.microsoft.com/office/drawing/2014/main" id="{A25770F8-1FA1-1D5E-D768-E47CF7ED482A}"/>
-              </a:ext>
-            </a:extLst>
-          </p:cNvPr>
-          <p:cNvSpPr txBox="1"/>
-          <p:nvPr/>
-        </p:nvSpPr>
-        <p:spPr>
-          <a:xfrm>
-            <a:off x="311760" y="2802701"/>
-            <a:ext cx="8520120" cy="738664"/>
-          </a:xfrm>
-          <a:prstGeom prst="rect">
-            <a:avLst/>
-          </a:prstGeom>
-          <a:noFill/>
-        </p:spPr>
-        <p:txBody>
-          <a:bodyPr wrap="square" rtlCol="0">
-            <a:spAutoFit/>
-          </a:bodyPr>
-          <a:lstStyle/>
-          <a:p>
-            <a:r>
-              <a:rPr lang="it-IT" sz="1400" dirty="0" err="1"/>
-              <a:t>We</a:t>
-            </a:r>
-            <a:r>
-              <a:rPr lang="it-IT" sz="1400" dirty="0"/>
-              <a:t> </a:t>
-            </a:r>
-            <a:r>
-              <a:rPr lang="it-IT" sz="1400" dirty="0" err="1"/>
-              <a:t>used</a:t>
-            </a:r>
-            <a:r>
-              <a:rPr lang="it-IT" sz="1400" dirty="0"/>
-              <a:t> the </a:t>
-            </a:r>
-            <a:r>
-              <a:rPr lang="it-IT" sz="1400" b="1" dirty="0"/>
-              <a:t>Random </a:t>
-            </a:r>
-            <a:r>
-              <a:rPr lang="it-IT" sz="1400" b="1" dirty="0" err="1"/>
-              <a:t>Forests</a:t>
-            </a:r>
-            <a:r>
-              <a:rPr lang="it-IT" sz="1400" dirty="0"/>
-              <a:t> and </a:t>
-            </a:r>
-            <a:r>
-              <a:rPr lang="it-IT" sz="1400" b="1" dirty="0" err="1"/>
-              <a:t>SVM</a:t>
-            </a:r>
-            <a:r>
-              <a:rPr lang="it-IT" sz="1400" dirty="0" err="1"/>
-              <a:t>s</a:t>
-            </a:r>
-            <a:r>
-              <a:rPr lang="it-IT" sz="1400" dirty="0"/>
-              <a:t> from </a:t>
-            </a:r>
-            <a:r>
-              <a:rPr lang="it-IT" sz="1400" dirty="0" err="1"/>
-              <a:t>Scikit-Learn</a:t>
-            </a:r>
-            <a:r>
-              <a:rPr lang="it-IT" sz="1400" dirty="0"/>
-              <a:t>, and </a:t>
-            </a:r>
-            <a:r>
-              <a:rPr lang="it-IT" sz="1400" dirty="0" err="1"/>
-              <a:t>implemented</a:t>
-            </a:r>
-            <a:r>
-              <a:rPr lang="it-IT" sz="1400" dirty="0"/>
-              <a:t> a </a:t>
-            </a:r>
-            <a:r>
-              <a:rPr lang="it-IT" sz="1400" dirty="0" err="1"/>
-              <a:t>multilayer</a:t>
-            </a:r>
-            <a:r>
-              <a:rPr lang="it-IT" sz="1400" dirty="0"/>
-              <a:t> </a:t>
-            </a:r>
-            <a:r>
-              <a:rPr lang="it-IT" sz="1400" dirty="0" err="1"/>
-              <a:t>feedforward</a:t>
-            </a:r>
-            <a:r>
-              <a:rPr lang="it-IT" sz="1400" dirty="0"/>
-              <a:t> </a:t>
-            </a:r>
-            <a:r>
-              <a:rPr lang="it-IT" sz="1400" b="1" dirty="0" err="1"/>
-              <a:t>Neural</a:t>
-            </a:r>
-            <a:r>
-              <a:rPr lang="it-IT" sz="1400" b="1" dirty="0"/>
-              <a:t> Network</a:t>
-            </a:r>
-            <a:r>
-              <a:rPr lang="it-IT" sz="1400" dirty="0"/>
-              <a:t> </a:t>
-            </a:r>
-            <a:r>
-              <a:rPr lang="it-IT" sz="1400" dirty="0" err="1"/>
-              <a:t>using</a:t>
-            </a:r>
-            <a:r>
-              <a:rPr lang="it-IT" sz="1400" dirty="0"/>
-              <a:t> </a:t>
-            </a:r>
-            <a:r>
-              <a:rPr lang="it-IT" sz="1400" dirty="0" err="1"/>
-              <a:t>Keras</a:t>
-            </a:r>
-            <a:r>
-              <a:rPr lang="it-IT" sz="1400" dirty="0"/>
-              <a:t>. The </a:t>
-            </a:r>
-            <a:r>
-              <a:rPr lang="it-IT" sz="1400" dirty="0" err="1">
-                <a:latin typeface="Consolas" panose="020B0609020204030204" pitchFamily="49" charset="0"/>
-              </a:rPr>
-              <a:t>NeuralNetwork</a:t>
-            </a:r>
-            <a:r>
-              <a:rPr lang="it-IT" sz="1400" dirty="0"/>
-              <a:t> classes in </a:t>
-            </a:r>
-            <a:r>
-              <a:rPr lang="it-IT" sz="1400" dirty="0" err="1"/>
-              <a:t>our</a:t>
-            </a:r>
-            <a:r>
-              <a:rPr lang="it-IT" sz="1400" dirty="0"/>
-              <a:t> code </a:t>
-            </a:r>
-            <a:r>
-              <a:rPr lang="it-IT" sz="1400" dirty="0" err="1"/>
-              <a:t>is</a:t>
-            </a:r>
-            <a:r>
-              <a:rPr lang="it-IT" sz="1400" dirty="0"/>
-              <a:t> </a:t>
-            </a:r>
-            <a:r>
-              <a:rPr lang="it-IT" sz="1400" dirty="0" err="1"/>
-              <a:t>designed</a:t>
-            </a:r>
-            <a:r>
-              <a:rPr lang="it-IT" sz="1400" dirty="0"/>
-              <a:t> to be </a:t>
-            </a:r>
-            <a:r>
-              <a:rPr lang="it-IT" sz="1400" dirty="0" err="1"/>
-              <a:t>seamless</a:t>
-            </a:r>
-            <a:r>
-              <a:rPr lang="it-IT" sz="1400" dirty="0"/>
-              <a:t> </a:t>
-            </a:r>
-            <a:r>
-              <a:rPr lang="it-IT" sz="1400" dirty="0" err="1"/>
-              <a:t>integrated</a:t>
-            </a:r>
-            <a:r>
-              <a:rPr lang="it-IT" sz="1400" dirty="0"/>
-              <a:t> with </a:t>
-            </a:r>
-            <a:r>
-              <a:rPr lang="it-IT" sz="1400" dirty="0" err="1"/>
-              <a:t>Scikit-Learn</a:t>
-            </a:r>
-            <a:r>
-              <a:rPr lang="it-IT" sz="1400" dirty="0"/>
-              <a:t> </a:t>
-            </a:r>
-            <a:r>
-              <a:rPr lang="it-IT" sz="1400" dirty="0" err="1"/>
-              <a:t>while</a:t>
-            </a:r>
-            <a:r>
-              <a:rPr lang="it-IT" sz="1400" dirty="0"/>
-              <a:t> </a:t>
-            </a:r>
-            <a:r>
-              <a:rPr lang="it-IT" sz="1400" dirty="0" err="1"/>
-              <a:t>also</a:t>
-            </a:r>
-            <a:r>
-              <a:rPr lang="it-IT" sz="1400" dirty="0"/>
-              <a:t> be </a:t>
-            </a:r>
-            <a:r>
-              <a:rPr lang="it-IT" sz="1400" dirty="0" err="1"/>
-              <a:t>usable</a:t>
-            </a:r>
-            <a:r>
-              <a:rPr lang="it-IT" sz="1400" dirty="0"/>
-              <a:t> </a:t>
-            </a:r>
-            <a:r>
-              <a:rPr lang="it-IT" sz="1400" dirty="0" err="1"/>
-              <a:t>without</a:t>
-            </a:r>
-            <a:r>
-              <a:rPr lang="it-IT" sz="1400" dirty="0"/>
-              <a:t> </a:t>
-            </a:r>
-            <a:r>
-              <a:rPr lang="it-IT" sz="1400" dirty="0" err="1"/>
-              <a:t>it</a:t>
-            </a:r>
-            <a:r>
-              <a:rPr lang="it-IT" sz="1400" dirty="0"/>
-              <a:t>. </a:t>
-            </a:r>
-          </a:p>
-        </p:txBody>
-      </p:sp>
-    </p:spTree>
-    <p:extLst>
-      <p:ext uri="{BB962C8B-B14F-4D97-AF65-F5344CB8AC3E}">
-        <p14:creationId xmlns:p14="http://schemas.microsoft.com/office/powerpoint/2010/main" val="2850000877"/>
-      </p:ext>
-    </p:extLst>
-  </p:cSld>
-  <p:clrMapOvr>
-    <a:masterClrMapping/>
-  </p:clrMapOvr>
-</p:sld>
-</file>
-
-<file path=ppt/slides/slide30.xml><?xml version="1.0" encoding="utf-8"?>
+<file path=ppt/slides/slide32.xml><?xml version="1.0" encoding="utf-8"?>
 <p:sld xmlns:a="http://schemas.openxmlformats.org/drawingml/2006/main" xmlns:r="http://schemas.openxmlformats.org/officeDocument/2006/relationships" xmlns:p="http://schemas.openxmlformats.org/presentationml/2006/main">
   <p:cSld>
     <p:spTree>
@@ -25511,7 +26585,7 @@
                 <a:latin typeface="Arial"/>
                 <a:ea typeface="Arial"/>
               </a:rPr>
-              <a:t>Appendix – 6</a:t>
+              <a:t>Appendix – 9</a:t>
             </a:r>
             <a:br>
               <a:rPr lang="it" sz="2400" b="0" strike="noStrike" spc="-1" dirty="0">
@@ -25604,7 +26678,7 @@
                 <a:latin typeface="Arial"/>
                 <a:ea typeface="Arial"/>
               </a:rPr>
-              <a:t>30</a:t>
+              <a:t>32</a:t>
             </a:fld>
             <a:endParaRPr lang="it-IT" sz="1000" b="0" strike="noStrike" spc="-1">
               <a:latin typeface="Times New Roman"/>
@@ -26922,7 +27996,7 @@
 </p:sld>
 </file>
 
-<file path=ppt/slides/slide31.xml><?xml version="1.0" encoding="utf-8"?>
+<file path=ppt/slides/slide33.xml><?xml version="1.0" encoding="utf-8"?>
 <p:sld xmlns:a="http://schemas.openxmlformats.org/drawingml/2006/main" xmlns:r="http://schemas.openxmlformats.org/officeDocument/2006/relationships" xmlns:p="http://schemas.openxmlformats.org/presentationml/2006/main">
   <p:cSld>
     <p:spTree>
@@ -26985,7 +28059,17 @@
                 <a:latin typeface="Arial"/>
                 <a:ea typeface="Arial"/>
               </a:rPr>
-              <a:t>Appendix – 7</a:t>
+              <a:t>Appendix – </a:t>
+            </a:r>
+            <a:r>
+              <a:rPr lang="it" sz="2400" spc="-1" dirty="0">
+                <a:solidFill>
+                  <a:srgbClr val="000000"/>
+                </a:solidFill>
+                <a:latin typeface="Arial"/>
+                <a:ea typeface="Arial"/>
+              </a:rPr>
+              <a:t>10</a:t>
             </a:r>
             <a:br>
               <a:rPr lang="it" sz="2400" b="0" strike="noStrike" spc="-1" dirty="0">
@@ -27078,7 +28162,7 @@
                 <a:latin typeface="Arial"/>
                 <a:ea typeface="Arial"/>
               </a:rPr>
-              <a:t>31</a:t>
+              <a:t>33</a:t>
             </a:fld>
             <a:endParaRPr lang="it-IT" sz="1000" b="0" strike="noStrike" spc="-1">
               <a:latin typeface="Times New Roman"/>
@@ -30383,7 +31467,7 @@
           <p:nvPr>
             <p:extLst>
               <p:ext uri="{D42A27DB-BD31-4B8C-83A1-F6EECF244321}">
-                <p14:modId xmlns:p14="http://schemas.microsoft.com/office/powerpoint/2010/main" val="409618651"/>
+                <p14:modId xmlns:p14="http://schemas.microsoft.com/office/powerpoint/2010/main" val="1289451719"/>
               </p:ext>
             </p:extLst>
           </p:nvPr>
@@ -30750,7 +31834,7 @@
                       <a:pPr algn="ctr"/>
                       <a:r>
                         <a:rPr lang="it-IT" sz="1400" i="1" dirty="0"/>
-                        <a:t>0.066 </a:t>
+                        <a:t>0.060 </a:t>
                       </a:r>
                       <a:r>
                         <a:rPr lang="it-IT" sz="1400" i="0" dirty="0"/>
@@ -30758,7 +31842,7 @@
                       </a:r>
                       <a:r>
                         <a:rPr lang="it-IT" sz="1400" i="1" dirty="0"/>
-                        <a:t>  0.068</a:t>
+                        <a:t>  0.059</a:t>
                       </a:r>
                     </a:p>
                   </a:txBody>
@@ -30934,12 +32018,20 @@
           <a:lstStyle/>
           <a:p>
             <a:r>
+              <a:rPr lang="it-IT" sz="1400" b="1" dirty="0"/>
+              <a:t>Figure</a:t>
+            </a:r>
+            <a:r>
               <a:rPr lang="it-IT" sz="1400" b="1" dirty="0">
                 <a:solidFill>
                   <a:srgbClr val="FF0000"/>
                 </a:solidFill>
               </a:rPr>
-              <a:t>Figure 1</a:t>
+              <a:t> </a:t>
+            </a:r>
+            <a:r>
+              <a:rPr lang="it-IT" sz="1400" b="1" dirty="0"/>
+              <a:t>1</a:t>
             </a:r>
             <a:r>
               <a:rPr lang="it-IT" sz="1400" dirty="0"/>
@@ -30974,10 +32066,10 @@
       </p:sp>
       <p:pic>
         <p:nvPicPr>
-          <p:cNvPr id="12" name="Immagine 11" descr="Immagine che contiene testo, Diagramma, diagramma, linea&#10;&#10;Descrizione generata automaticamente">
+          <p:cNvPr id="3" name="Immagine 2" descr="Immagine che contiene testo, Diagramma, linea, diagramma&#10;&#10;Descrizione generata automaticamente">
             <a:extLst>
               <a:ext uri="{FF2B5EF4-FFF2-40B4-BE49-F238E27FC236}">
-                <a16:creationId xmlns:a16="http://schemas.microsoft.com/office/drawing/2014/main" id="{F15100DF-191E-2842-04EB-BADF6A272AB4}"/>
+                <a16:creationId xmlns:a16="http://schemas.microsoft.com/office/drawing/2014/main" id="{C38D1309-0DE1-9907-63EF-D7BF81EEE501}"/>
               </a:ext>
             </a:extLst>
           </p:cNvPr>
@@ -31001,7 +32093,7 @@
         <p:spPr>
           <a:xfrm>
             <a:off x="311757" y="2054586"/>
-            <a:ext cx="6607190" cy="2703195"/>
+            <a:ext cx="6596020" cy="2703195"/>
           </a:xfrm>
           <a:prstGeom prst="rect">
             <a:avLst/>
@@ -31285,11 +32377,7 @@
           <a:lstStyle/>
           <a:p>
             <a:r>
-              <a:rPr lang="it-IT" sz="1400" b="1" dirty="0">
-                <a:solidFill>
-                  <a:srgbClr val="FF0000"/>
-                </a:solidFill>
-              </a:rPr>
+              <a:rPr lang="it-IT" sz="1400" b="1" dirty="0"/>
               <a:t>Figure 2</a:t>
             </a:r>
             <a:r>
@@ -31338,7 +32426,7 @@
           <p:nvPr>
             <p:extLst>
               <p:ext uri="{D42A27DB-BD31-4B8C-83A1-F6EECF244321}">
-                <p14:modId xmlns:p14="http://schemas.microsoft.com/office/powerpoint/2010/main" val="2820201356"/>
+                <p14:modId xmlns:p14="http://schemas.microsoft.com/office/powerpoint/2010/main" val="198893623"/>
               </p:ext>
             </p:extLst>
           </p:nvPr>
@@ -31705,7 +32793,7 @@
                       <a:pPr algn="ctr"/>
                       <a:r>
                         <a:rPr lang="it-IT" sz="1400" i="1" dirty="0"/>
-                        <a:t>0.06 </a:t>
+                        <a:t>0.056 </a:t>
                       </a:r>
                       <a:r>
                         <a:rPr lang="it-IT" sz="1400" i="0" dirty="0"/>
@@ -31713,7 +32801,7 @@
                       </a:r>
                       <a:r>
                         <a:rPr lang="it-IT" sz="1400" i="1" dirty="0"/>
-                        <a:t>  0.06</a:t>
+                        <a:t>  0.054</a:t>
                       </a:r>
                     </a:p>
                   </a:txBody>
@@ -31767,10 +32855,10 @@
       </p:graphicFrame>
       <p:pic>
         <p:nvPicPr>
-          <p:cNvPr id="8" name="Immagine 7" descr="Immagine che contiene testo, Diagramma, diagramma, linea&#10;&#10;Descrizione generata automaticamente">
+          <p:cNvPr id="4" name="Immagine 3">
             <a:extLst>
               <a:ext uri="{FF2B5EF4-FFF2-40B4-BE49-F238E27FC236}">
-                <a16:creationId xmlns:a16="http://schemas.microsoft.com/office/drawing/2014/main" id="{EB5723A5-AB49-FF22-DED0-8523E1872E45}"/>
+                <a16:creationId xmlns:a16="http://schemas.microsoft.com/office/drawing/2014/main" id="{AB88A280-DCF5-47AA-1C86-CF7DBEC0E38A}"/>
               </a:ext>
             </a:extLst>
           </p:cNvPr>
@@ -31780,25 +32868,22 @@
           <p:nvPr/>
         </p:nvPicPr>
         <p:blipFill>
-          <a:blip r:embed="rId2">
-            <a:extLst>
-              <a:ext uri="{28A0092B-C50C-407E-A947-70E740481C1C}">
-                <a14:useLocalDpi xmlns:a14="http://schemas.microsoft.com/office/drawing/2010/main" val="0"/>
-              </a:ext>
-            </a:extLst>
-          </a:blip>
+          <a:blip r:embed="rId2"/>
           <a:stretch>
             <a:fillRect/>
           </a:stretch>
         </p:blipFill>
         <p:spPr>
           <a:xfrm>
-            <a:off x="311758" y="2054590"/>
-            <a:ext cx="6607189" cy="2703195"/>
+            <a:off x="311757" y="2059357"/>
+            <a:ext cx="6607190" cy="2693661"/>
           </a:xfrm>
           <a:prstGeom prst="rect">
             <a:avLst/>
           </a:prstGeom>
+          <a:ln>
+            <a:noFill/>
+          </a:ln>
         </p:spPr>
       </p:pic>
     </p:spTree>
@@ -31871,18 +32956,12 @@
             </a:pPr>
             <a:r>
               <a:rPr lang="it" sz="2700" b="0" strike="noStrike" spc="-1" dirty="0">
-                <a:solidFill>
-                  <a:srgbClr val="FF0000"/>
-                </a:solidFill>
                 <a:latin typeface="Arial"/>
                 <a:ea typeface="Arial"/>
               </a:rPr>
               <a:t>Monk 3 Results</a:t>
             </a:r>
             <a:endParaRPr lang="it-IT" sz="2800" b="0" strike="noStrike" spc="-1" dirty="0">
-              <a:solidFill>
-                <a:srgbClr val="FF0000"/>
-              </a:solidFill>
               <a:latin typeface="Arial"/>
             </a:endParaRPr>
           </a:p>
@@ -32083,73 +33162,37 @@
           <a:lstStyle/>
           <a:p>
             <a:r>
-              <a:rPr lang="it-IT" sz="1400" b="1" dirty="0">
-                <a:solidFill>
-                  <a:srgbClr val="FF0000"/>
-                </a:solidFill>
-              </a:rPr>
+              <a:rPr lang="it-IT" sz="1400" b="1" dirty="0"/>
               <a:t>Figure 3</a:t>
             </a:r>
             <a:r>
-              <a:rPr lang="it-IT" sz="1400" dirty="0">
-                <a:solidFill>
-                  <a:srgbClr val="FF0000"/>
-                </a:solidFill>
-              </a:rPr>
+              <a:rPr lang="it-IT" sz="1400" dirty="0"/>
               <a:t>: </a:t>
             </a:r>
             <a:br>
-              <a:rPr lang="it-IT" sz="1400" dirty="0">
-                <a:solidFill>
-                  <a:srgbClr val="FF0000"/>
-                </a:solidFill>
-              </a:rPr>
+              <a:rPr lang="it-IT" sz="1400" dirty="0"/>
             </a:br>
             <a:r>
-              <a:rPr lang="it-IT" sz="1400" dirty="0">
-                <a:solidFill>
-                  <a:srgbClr val="FF0000"/>
-                </a:solidFill>
-              </a:rPr>
+              <a:rPr lang="it-IT" sz="1400" dirty="0"/>
               <a:t>MSE and </a:t>
             </a:r>
             <a:r>
-              <a:rPr lang="it-IT" sz="1400" dirty="0" err="1">
-                <a:solidFill>
-                  <a:srgbClr val="FF0000"/>
-                </a:solidFill>
-              </a:rPr>
+              <a:rPr lang="it-IT" sz="1400" dirty="0" err="1"/>
               <a:t>accuracy</a:t>
             </a:r>
             <a:r>
-              <a:rPr lang="it-IT" sz="1400" dirty="0">
-                <a:solidFill>
-                  <a:srgbClr val="FF0000"/>
-                </a:solidFill>
-              </a:rPr>
+              <a:rPr lang="it-IT" sz="1400" dirty="0"/>
               <a:t>  plots for the model in </a:t>
             </a:r>
             <a:r>
-              <a:rPr lang="it-IT" sz="1400" dirty="0" err="1">
-                <a:solidFill>
-                  <a:srgbClr val="FF0000"/>
-                </a:solidFill>
-              </a:rPr>
+              <a:rPr lang="it-IT" sz="1400" dirty="0" err="1"/>
               <a:t>Table</a:t>
             </a:r>
             <a:r>
-              <a:rPr lang="it-IT" sz="1400" dirty="0">
-                <a:solidFill>
-                  <a:srgbClr val="FF0000"/>
-                </a:solidFill>
-              </a:rPr>
+              <a:rPr lang="it-IT" sz="1400" dirty="0"/>
               <a:t> 3, Monk3 task </a:t>
             </a:r>
-            <a:endParaRPr lang="it-IT" dirty="0">
-              <a:solidFill>
-                <a:srgbClr val="FF0000"/>
-              </a:solidFill>
-            </a:endParaRPr>
+            <a:endParaRPr lang="it-IT" dirty="0"/>
           </a:p>
         </p:txBody>
       </p:sp>
@@ -32168,14 +33211,14 @@
           <p:nvPr>
             <p:extLst>
               <p:ext uri="{D42A27DB-BD31-4B8C-83A1-F6EECF244321}">
-                <p14:modId xmlns:p14="http://schemas.microsoft.com/office/powerpoint/2010/main" val="1083268482"/>
+                <p14:modId xmlns:p14="http://schemas.microsoft.com/office/powerpoint/2010/main" val="4201206226"/>
               </p:ext>
             </p:extLst>
           </p:nvPr>
         </p:nvGraphicFramePr>
         <p:xfrm>
-          <a:off x="311760" y="853393"/>
-          <a:ext cx="8520116" cy="883920"/>
+          <a:off x="311752" y="853393"/>
+          <a:ext cx="8576753" cy="883920"/>
         </p:xfrm>
         <a:graphic>
           <a:graphicData uri="http://schemas.openxmlformats.org/drawingml/2006/table">
@@ -32184,35 +33227,35 @@
                 <a:tableStyleId>{0E3FDE45-AF77-4B5C-9715-49D594BDF05E}</a:tableStyleId>
               </a:tblPr>
               <a:tblGrid>
-                <a:gridCol w="770730">
+                <a:gridCol w="782620">
                   <a:extLst>
                     <a:ext uri="{9D8B030D-6E8A-4147-A177-3AD203B41FA5}">
                       <a16:colId xmlns:a16="http://schemas.microsoft.com/office/drawing/2014/main" val="935040320"/>
                     </a:ext>
                   </a:extLst>
                 </a:gridCol>
-                <a:gridCol w="3946712">
+                <a:gridCol w="3925570">
                   <a:extLst>
                     <a:ext uri="{9D8B030D-6E8A-4147-A177-3AD203B41FA5}">
                       <a16:colId xmlns:a16="http://schemas.microsoft.com/office/drawing/2014/main" val="1166905258"/>
                     </a:ext>
                   </a:extLst>
                 </a:gridCol>
-                <a:gridCol w="1264022">
+                <a:gridCol w="1313036">
                   <a:extLst>
                     <a:ext uri="{9D8B030D-6E8A-4147-A177-3AD203B41FA5}">
                       <a16:colId xmlns:a16="http://schemas.microsoft.com/office/drawing/2014/main" val="50107376"/>
                     </a:ext>
                   </a:extLst>
                 </a:gridCol>
-                <a:gridCol w="1411941">
+                <a:gridCol w="1570234">
                   <a:extLst>
                     <a:ext uri="{9D8B030D-6E8A-4147-A177-3AD203B41FA5}">
                       <a16:colId xmlns:a16="http://schemas.microsoft.com/office/drawing/2014/main" val="34889993"/>
                     </a:ext>
                   </a:extLst>
                 </a:gridCol>
-                <a:gridCol w="1126711">
+                <a:gridCol w="985293">
                   <a:extLst>
                     <a:ext uri="{9D8B030D-6E8A-4147-A177-3AD203B41FA5}">
                       <a16:colId xmlns:a16="http://schemas.microsoft.com/office/drawing/2014/main" val="2221366948"/>
@@ -32385,7 +33428,7 @@
                       </a:r>
                       <a:r>
                         <a:rPr lang="it-IT" sz="1400" dirty="0"/>
-                        <a:t>(DS)</a:t>
+                        <a:t>(TR/VL)</a:t>
                       </a:r>
                     </a:p>
                   </a:txBody>
@@ -32536,15 +33579,15 @@
                       <a:r>
                         <a:rPr lang="it-IT" sz="1400" i="1" dirty="0">
                           <a:solidFill>
-                            <a:srgbClr val="FF0000"/>
+                            <a:schemeClr val="tx1"/>
                           </a:solidFill>
                         </a:rPr>
-                        <a:t>0.06 </a:t>
+                        <a:t>0.093 </a:t>
                       </a:r>
                       <a:r>
                         <a:rPr lang="it-IT" sz="1400" i="0" dirty="0">
                           <a:solidFill>
-                            <a:srgbClr val="FF0000"/>
+                            <a:schemeClr val="tx1"/>
                           </a:solidFill>
                         </a:rPr>
                         <a:t>/</a:t>
@@ -32552,10 +33595,10 @@
                       <a:r>
                         <a:rPr lang="it-IT" sz="1400" i="1" dirty="0">
                           <a:solidFill>
-                            <a:srgbClr val="FF0000"/>
+                            <a:schemeClr val="tx1"/>
                           </a:solidFill>
                         </a:rPr>
-                        <a:t>  0.06</a:t>
+                        <a:t>  0.106</a:t>
                       </a:r>
                     </a:p>
                   </a:txBody>
@@ -32573,7 +33616,7 @@
                             <a:schemeClr val="tx1"/>
                           </a:solidFill>
                         </a:rPr>
-                        <a:t>93,40% </a:t>
+                        <a:t>93,32% / 91,83%</a:t>
                       </a:r>
                     </a:p>
                   </a:txBody>
@@ -32605,10 +33648,10 @@
       </p:graphicFrame>
       <p:pic>
         <p:nvPicPr>
-          <p:cNvPr id="8" name="Immagine 7" descr="Immagine che contiene testo, Diagramma, diagramma, linea&#10;&#10;Descrizione generata automaticamente">
+          <p:cNvPr id="4" name="Immagine 3">
             <a:extLst>
               <a:ext uri="{FF2B5EF4-FFF2-40B4-BE49-F238E27FC236}">
-                <a16:creationId xmlns:a16="http://schemas.microsoft.com/office/drawing/2014/main" id="{EB5723A5-AB49-FF22-DED0-8523E1872E45}"/>
+                <a16:creationId xmlns:a16="http://schemas.microsoft.com/office/drawing/2014/main" id="{0E9BFE46-65FD-590B-C7E5-2CC5440CE212}"/>
               </a:ext>
             </a:extLst>
           </p:cNvPr>
@@ -32618,25 +33661,22 @@
           <p:nvPr/>
         </p:nvPicPr>
         <p:blipFill>
-          <a:blip r:embed="rId2">
-            <a:extLst>
-              <a:ext uri="{28A0092B-C50C-407E-A947-70E740481C1C}">
-                <a14:useLocalDpi xmlns:a14="http://schemas.microsoft.com/office/drawing/2010/main" val="0"/>
-              </a:ext>
-            </a:extLst>
-          </a:blip>
+          <a:blip r:embed="rId2"/>
           <a:stretch>
             <a:fillRect/>
           </a:stretch>
         </p:blipFill>
         <p:spPr>
           <a:xfrm>
-            <a:off x="311758" y="2054590"/>
-            <a:ext cx="6607189" cy="2703195"/>
+            <a:off x="311752" y="2075868"/>
+            <a:ext cx="6555184" cy="2681918"/>
           </a:xfrm>
           <a:prstGeom prst="rect">
             <a:avLst/>
           </a:prstGeom>
+          <a:ln>
+            <a:noFill/>
+          </a:ln>
         </p:spPr>
       </p:pic>
     </p:spTree>

</xml_diff>

<commit_message>
Report update: imported correct data for MONK, added data for SVM & RF for the CUP
</commit_message>
<xml_diff>
--- a/relazione/ML-2023-PRJ-Slides-Demo.pptx
+++ b/relazione/ML-2023-PRJ-Slides-Demo.pptx
@@ -6,7 +6,7 @@
     <p:sldMasterId id="2147483661" r:id="rId2"/>
   </p:sldMasterIdLst>
   <p:notesMasterIdLst>
-    <p:notesMasterId r:id="rId38"/>
+    <p:notesMasterId r:id="rId39"/>
   </p:notesMasterIdLst>
   <p:sldIdLst>
     <p:sldId id="256" r:id="rId3"/>
@@ -44,6 +44,7 @@
     <p:sldId id="284" r:id="rId35"/>
     <p:sldId id="286" r:id="rId36"/>
     <p:sldId id="295" r:id="rId37"/>
+    <p:sldId id="296" r:id="rId38"/>
   </p:sldIdLst>
   <p:sldSz cx="9144000" cy="5143500" type="screen16x9"/>
   <p:notesSz cx="6858000" cy="9144000"/>
@@ -6141,9 +6142,22 @@
                 <a:latin typeface="Arial"/>
                 <a:ea typeface="Arial"/>
               </a:rPr>
-              <a:t>MONK 3 Results</a:t>
+              <a:t>MONK 3 Results </a:t>
+            </a:r>
+            <a:r>
+              <a:rPr lang="it" sz="2700" b="0" strike="noStrike" spc="-1" dirty="0">
+                <a:solidFill>
+                  <a:srgbClr val="FF0000"/>
+                </a:solidFill>
+                <a:latin typeface="Arial"/>
+                <a:ea typeface="Arial"/>
+              </a:rPr>
+              <a:t>STDEVS</a:t>
             </a:r>
             <a:endParaRPr lang="it-IT" sz="2800" b="0" strike="noStrike" spc="-1" dirty="0">
+              <a:solidFill>
+                <a:srgbClr val="FF0000"/>
+              </a:solidFill>
               <a:latin typeface="Arial"/>
             </a:endParaRPr>
           </a:p>
@@ -8898,17 +8912,7 @@
                 <a:latin typeface="Arial"/>
                 <a:ea typeface="Arial"/>
               </a:rPr>
-              <a:t>Random Forest </a:t>
-            </a:r>
-            <a:r>
-              <a:rPr lang="it" sz="2400" spc="-1" dirty="0">
-                <a:solidFill>
-                  <a:srgbClr val="FF0000"/>
-                </a:solidFill>
-                <a:latin typeface="Arial"/>
-                <a:ea typeface="Arial"/>
-              </a:rPr>
-              <a:t>hyperparameters’ values</a:t>
+              <a:t>Random Forest</a:t>
             </a:r>
             <a:endParaRPr lang="it-IT" sz="2400" b="0" strike="noStrike" spc="-1" dirty="0">
               <a:solidFill>
@@ -9005,7 +9009,7 @@
           <p:nvPr>
             <p:extLst>
               <p:ext uri="{D42A27DB-BD31-4B8C-83A1-F6EECF244321}">
-                <p14:modId xmlns:p14="http://schemas.microsoft.com/office/powerpoint/2010/main" val="950689823"/>
+                <p14:modId xmlns:p14="http://schemas.microsoft.com/office/powerpoint/2010/main" val="3769832544"/>
               </p:ext>
             </p:extLst>
           </p:nvPr>
@@ -9202,7 +9206,7 @@
                         <a:t>100, </a:t>
                       </a:r>
                       <a:r>
-                        <a:rPr lang="it-IT" sz="1400" u="sng" dirty="0"/>
+                        <a:rPr lang="it-IT" sz="1400" b="1" u="none" dirty="0"/>
                         <a:t>150</a:t>
                       </a:r>
                     </a:p>
@@ -9266,7 +9270,7 @@
                         <a:t>8, </a:t>
                       </a:r>
                       <a:r>
-                        <a:rPr lang="it-IT" sz="1400" u="sng" dirty="0"/>
+                        <a:rPr lang="it-IT" sz="1400" b="1" u="none" dirty="0"/>
                         <a:t>10</a:t>
                       </a:r>
                     </a:p>
@@ -9323,7 +9327,7 @@
                     <a:p>
                       <a:pPr algn="ctr"/>
                       <a:r>
-                        <a:rPr lang="it-IT" sz="1400" u="sng" dirty="0"/>
+                        <a:rPr lang="it-IT" sz="1400" b="1" u="none" dirty="0"/>
                         <a:t>2</a:t>
                       </a:r>
                       <a:r>
@@ -9413,7 +9417,7 @@
                     <a:p>
                       <a:pPr algn="ctr"/>
                       <a:r>
-                        <a:rPr lang="it-IT" sz="1400" u="sng" dirty="0"/>
+                        <a:rPr lang="it-IT" sz="1400" b="1" u="none" dirty="0"/>
                         <a:t>1</a:t>
                       </a:r>
                       <a:r>
@@ -9569,13 +9573,13 @@
                     <a:p>
                       <a:pPr algn="ctr"/>
                       <a:r>
-                        <a:rPr lang="it-IT" sz="1400" i="0" u="sng" dirty="0" err="1">
+                        <a:rPr lang="it-IT" sz="1400" b="1" i="0" u="none" dirty="0" err="1">
                           <a:latin typeface="Consolas" panose="020B0609020204030204" pitchFamily="49" charset="0"/>
                         </a:rPr>
                         <a:t>sqrt</a:t>
                       </a:r>
                       <a:r>
-                        <a:rPr lang="it-IT" sz="1400" i="0" u="sng" dirty="0">
+                        <a:rPr lang="it-IT" sz="1400" b="1" i="0" u="none" dirty="0">
                           <a:latin typeface="Consolas" panose="020B0609020204030204" pitchFamily="49" charset="0"/>
                         </a:rPr>
                         <a:t>()</a:t>
@@ -9712,8 +9716,8 @@
         </p:nvSpPr>
         <p:spPr>
           <a:xfrm>
-            <a:off x="396688" y="3280937"/>
-            <a:ext cx="3691218" cy="738664"/>
+            <a:off x="396687" y="3280937"/>
+            <a:ext cx="3960159" cy="1169551"/>
           </a:xfrm>
           <a:prstGeom prst="rect">
             <a:avLst/>
@@ -9727,140 +9731,104 @@
           <a:lstStyle/>
           <a:p>
             <a:r>
-              <a:rPr lang="it-IT" sz="1400" dirty="0">
-                <a:solidFill>
-                  <a:srgbClr val="FF0000"/>
-                </a:solidFill>
-              </a:rPr>
+              <a:rPr lang="it-IT" sz="1400" dirty="0"/>
               <a:t>The best </a:t>
             </a:r>
             <a:r>
+              <a:rPr lang="it-IT" sz="1400" dirty="0" err="1"/>
+              <a:t>hyperparameters</a:t>
+            </a:r>
+            <a:r>
+              <a:rPr lang="it-IT" sz="1400" dirty="0"/>
+              <a:t> </a:t>
+            </a:r>
+            <a:r>
+              <a:rPr lang="it-IT" sz="1400" dirty="0" err="1"/>
+              <a:t>found</a:t>
+            </a:r>
+            <a:r>
+              <a:rPr lang="it-IT" sz="1400" dirty="0"/>
+              <a:t> in the </a:t>
+            </a:r>
+            <a:r>
+              <a:rPr lang="it-IT" sz="1400" dirty="0" err="1"/>
+              <a:t>grid</a:t>
+            </a:r>
+            <a:r>
+              <a:rPr lang="it-IT" sz="1400" dirty="0"/>
+              <a:t> </a:t>
+            </a:r>
+            <a:r>
+              <a:rPr lang="it-IT" sz="1400" dirty="0" err="1"/>
+              <a:t>search</a:t>
+            </a:r>
+            <a:r>
+              <a:rPr lang="it-IT" sz="1400" dirty="0"/>
+              <a:t> are in </a:t>
+            </a:r>
+            <a:r>
+              <a:rPr lang="it-IT" sz="1400" dirty="0" err="1"/>
+              <a:t>bold</a:t>
+            </a:r>
+            <a:r>
+              <a:rPr lang="it-IT" sz="1400" dirty="0"/>
+              <a:t>. </a:t>
+            </a:r>
+            <a:r>
+              <a:rPr lang="it-IT" sz="1400" dirty="0" err="1"/>
+              <a:t>Table</a:t>
+            </a:r>
+            <a:r>
+              <a:rPr lang="it-IT" sz="1400" dirty="0"/>
+              <a:t> m shows the </a:t>
+            </a:r>
+            <a:r>
+              <a:rPr lang="it-IT" sz="1400" dirty="0" err="1"/>
+              <a:t>error</a:t>
+            </a:r>
+            <a:r>
+              <a:rPr lang="it-IT" sz="1400" dirty="0"/>
+              <a:t> of </a:t>
+            </a:r>
+            <a:r>
+              <a:rPr lang="it-IT" sz="1400" dirty="0" err="1"/>
+              <a:t>this</a:t>
+            </a:r>
+            <a:r>
+              <a:rPr lang="it-IT" sz="1400" dirty="0"/>
+              <a:t> model.</a:t>
+            </a:r>
+          </a:p>
+          <a:p>
+            <a:r>
+              <a:rPr lang="it-IT" sz="1400" dirty="0"/>
+              <a:t>The learning curve of the best Random </a:t>
+            </a:r>
+            <a:r>
+              <a:rPr lang="it-IT" sz="1400" dirty="0" err="1"/>
+              <a:t>Forest</a:t>
+            </a:r>
+            <a:r>
+              <a:rPr lang="it-IT" sz="1400" dirty="0"/>
+              <a:t> can be </a:t>
+            </a:r>
+            <a:r>
+              <a:rPr lang="it-IT" sz="1400" dirty="0" err="1"/>
+              <a:t>found</a:t>
+            </a:r>
+            <a:r>
+              <a:rPr lang="it-IT" sz="1400" dirty="0"/>
+              <a:t> in the </a:t>
+            </a:r>
+            <a:r>
               <a:rPr lang="it-IT" sz="1400" dirty="0" err="1">
-                <a:solidFill>
-                  <a:srgbClr val="FF0000"/>
-                </a:solidFill>
-              </a:rPr>
-              <a:t>hyperparameters</a:t>
-            </a:r>
-            <a:r>
-              <a:rPr lang="it-IT" sz="1400" dirty="0">
-                <a:solidFill>
-                  <a:srgbClr val="FF0000"/>
-                </a:solidFill>
-              </a:rPr>
-              <a:t> </a:t>
-            </a:r>
-            <a:r>
-              <a:rPr lang="it-IT" sz="1400" dirty="0" err="1">
-                <a:solidFill>
-                  <a:srgbClr val="FF0000"/>
-                </a:solidFill>
-              </a:rPr>
-              <a:t>found</a:t>
-            </a:r>
-            <a:r>
-              <a:rPr lang="it-IT" sz="1400" dirty="0">
-                <a:solidFill>
-                  <a:srgbClr val="FF0000"/>
-                </a:solidFill>
-              </a:rPr>
-              <a:t> in the </a:t>
-            </a:r>
-            <a:r>
-              <a:rPr lang="it-IT" sz="1400" dirty="0" err="1">
-                <a:solidFill>
-                  <a:srgbClr val="FF0000"/>
-                </a:solidFill>
-              </a:rPr>
-              <a:t>grid</a:t>
-            </a:r>
-            <a:r>
-              <a:rPr lang="it-IT" sz="1400" dirty="0">
-                <a:solidFill>
-                  <a:srgbClr val="FF0000"/>
-                </a:solidFill>
-              </a:rPr>
-              <a:t> </a:t>
-            </a:r>
-            <a:r>
-              <a:rPr lang="it-IT" sz="1400" dirty="0" err="1">
-                <a:solidFill>
-                  <a:srgbClr val="FF0000"/>
-                </a:solidFill>
-              </a:rPr>
-              <a:t>search</a:t>
-            </a:r>
-            <a:r>
-              <a:rPr lang="it-IT" sz="1400" dirty="0">
-                <a:solidFill>
-                  <a:srgbClr val="FF0000"/>
-                </a:solidFill>
-              </a:rPr>
-              <a:t> are </a:t>
-            </a:r>
-            <a:r>
-              <a:rPr lang="it-IT" sz="1400" dirty="0" err="1">
-                <a:solidFill>
-                  <a:srgbClr val="FF0000"/>
-                </a:solidFill>
-              </a:rPr>
-              <a:t>underlined</a:t>
-            </a:r>
-            <a:r>
-              <a:rPr lang="it-IT" sz="1400" dirty="0">
-                <a:solidFill>
-                  <a:srgbClr val="FF0000"/>
-                </a:solidFill>
-              </a:rPr>
-              <a:t>. </a:t>
-            </a:r>
-            <a:r>
-              <a:rPr lang="it-IT" sz="1400" dirty="0" err="1">
-                <a:solidFill>
-                  <a:srgbClr val="FF0000"/>
-                </a:solidFill>
-              </a:rPr>
-              <a:t>Table</a:t>
-            </a:r>
-            <a:r>
-              <a:rPr lang="it-IT" sz="1400" dirty="0">
-                <a:solidFill>
-                  <a:srgbClr val="FF0000"/>
-                </a:solidFill>
-              </a:rPr>
-              <a:t> m shows the </a:t>
-            </a:r>
-            <a:r>
-              <a:rPr lang="it-IT" sz="1400" dirty="0" err="1">
-                <a:solidFill>
-                  <a:srgbClr val="FF0000"/>
-                </a:solidFill>
-              </a:rPr>
-              <a:t>error</a:t>
-            </a:r>
-            <a:r>
-              <a:rPr lang="it-IT" sz="1400" dirty="0">
-                <a:solidFill>
-                  <a:srgbClr val="FF0000"/>
-                </a:solidFill>
-              </a:rPr>
-              <a:t> of </a:t>
-            </a:r>
-            <a:r>
-              <a:rPr lang="it-IT" sz="1400" dirty="0" err="1">
-                <a:solidFill>
-                  <a:srgbClr val="FF0000"/>
-                </a:solidFill>
-              </a:rPr>
-              <a:t>this</a:t>
-            </a:r>
-            <a:r>
-              <a:rPr lang="it-IT" sz="1400" dirty="0">
-                <a:solidFill>
-                  <a:srgbClr val="FF0000"/>
-                </a:solidFill>
-              </a:rPr>
-              <a:t> model.</a:t>
+                <a:hlinkClick r:id="rId2" action="ppaction://hlinksldjump"/>
+              </a:rPr>
+              <a:t>Appendix</a:t>
+            </a:r>
+            <a:r>
+              <a:rPr lang="it-IT" sz="1400" dirty="0"/>
+              <a:t>.</a:t>
             </a:r>
           </a:p>
         </p:txBody>
@@ -9880,14 +9848,14 @@
           <p:nvPr>
             <p:extLst>
               <p:ext uri="{D42A27DB-BD31-4B8C-83A1-F6EECF244321}">
-                <p14:modId xmlns:p14="http://schemas.microsoft.com/office/powerpoint/2010/main" val="3385198528"/>
+                <p14:modId xmlns:p14="http://schemas.microsoft.com/office/powerpoint/2010/main" val="1413645152"/>
               </p:ext>
             </p:extLst>
           </p:nvPr>
         </p:nvGraphicFramePr>
         <p:xfrm>
-          <a:off x="4911224" y="4053480"/>
-          <a:ext cx="3836660" cy="609600"/>
+          <a:off x="4911223" y="3807403"/>
+          <a:ext cx="3836660" cy="914400"/>
         </p:xfrm>
         <a:graphic>
           <a:graphicData uri="http://schemas.openxmlformats.org/drawingml/2006/table">
@@ -10039,7 +10007,10 @@
                     <a:lstStyle/>
                     <a:p>
                       <a:pPr algn="ctr"/>
-                      <a:endParaRPr lang="it-IT" sz="1400" dirty="0"/>
+                      <a:r>
+                        <a:rPr lang="it-IT" sz="1400" dirty="0"/>
+                        <a:t>1.266</a:t>
+                      </a:r>
                     </a:p>
                   </a:txBody>
                   <a:tcPr>
@@ -10060,7 +10031,10 @@
                     <a:lstStyle/>
                     <a:p>
                       <a:pPr algn="ctr"/>
-                      <a:endParaRPr lang="it-IT" sz="1400" dirty="0"/>
+                      <a:r>
+                        <a:rPr lang="it-IT" sz="1400" dirty="0"/>
+                        <a:t>2.885</a:t>
+                      </a:r>
                     </a:p>
                   </a:txBody>
                   <a:tcPr/>
@@ -10082,6 +10056,91 @@
                 <a:extLst>
                   <a:ext uri="{0D108BD9-81ED-4DB2-BD59-A6C34878D82A}">
                     <a16:rowId xmlns:a16="http://schemas.microsoft.com/office/drawing/2014/main" val="3685263719"/>
+                  </a:ext>
+                </a:extLst>
+              </a:tr>
+              <a:tr h="294067">
+                <a:tc>
+                  <a:txBody>
+                    <a:bodyPr/>
+                    <a:lstStyle/>
+                    <a:p>
+                      <a:pPr algn="ctr"/>
+                      <a:r>
+                        <a:rPr lang="it-IT" sz="1400" b="1" dirty="0" err="1"/>
+                        <a:t>stdev</a:t>
+                      </a:r>
+                      <a:endParaRPr lang="it-IT" sz="1400" b="1" dirty="0"/>
+                    </a:p>
+                  </a:txBody>
+                  <a:tcPr anchor="ctr">
+                    <a:lnR w="12700" cap="flat" cmpd="sng" algn="ctr">
+                      <a:solidFill>
+                        <a:srgbClr val="7B7B7B"/>
+                      </a:solidFill>
+                      <a:prstDash val="dash"/>
+                      <a:round/>
+                      <a:headEnd type="none" w="med" len="med"/>
+                      <a:tailEnd type="none" w="med" len="med"/>
+                    </a:lnR>
+                  </a:tcPr>
+                </a:tc>
+                <a:tc>
+                  <a:txBody>
+                    <a:bodyPr/>
+                    <a:lstStyle/>
+                    <a:p>
+                      <a:pPr algn="ctr"/>
+                      <a:r>
+                        <a:rPr lang="it-IT" sz="1400" dirty="0"/>
+                        <a:t>0.014</a:t>
+                      </a:r>
+                    </a:p>
+                  </a:txBody>
+                  <a:tcPr>
+                    <a:lnL w="12700" cap="flat" cmpd="sng" algn="ctr">
+                      <a:solidFill>
+                        <a:srgbClr val="7B7B7B"/>
+                      </a:solidFill>
+                      <a:prstDash val="dash"/>
+                      <a:round/>
+                      <a:headEnd type="none" w="med" len="med"/>
+                      <a:tailEnd type="none" w="med" len="med"/>
+                    </a:lnL>
+                  </a:tcPr>
+                </a:tc>
+                <a:tc>
+                  <a:txBody>
+                    <a:bodyPr/>
+                    <a:lstStyle/>
+                    <a:p>
+                      <a:pPr algn="ctr"/>
+                      <a:r>
+                        <a:rPr lang="it-IT" sz="1400" dirty="0"/>
+                        <a:t>0.104</a:t>
+                      </a:r>
+                    </a:p>
+                  </a:txBody>
+                  <a:tcPr/>
+                </a:tc>
+                <a:tc>
+                  <a:txBody>
+                    <a:bodyPr/>
+                    <a:lstStyle/>
+                    <a:p>
+                      <a:pPr algn="ctr"/>
+                      <a:r>
+                        <a:rPr lang="it-IT" sz="1400" dirty="0" err="1"/>
+                        <a:t>n.d.</a:t>
+                      </a:r>
+                      <a:endParaRPr lang="it-IT" sz="1400" dirty="0"/>
+                    </a:p>
+                  </a:txBody>
+                  <a:tcPr/>
+                </a:tc>
+                <a:extLst>
+                  <a:ext uri="{0D108BD9-81ED-4DB2-BD59-A6C34878D82A}">
+                    <a16:rowId xmlns:a16="http://schemas.microsoft.com/office/drawing/2014/main" val="2333860038"/>
                   </a:ext>
                 </a:extLst>
               </a:tr>
@@ -10103,8 +10162,8 @@
         </p:nvSpPr>
         <p:spPr>
           <a:xfrm>
-            <a:off x="4910655" y="3527014"/>
-            <a:ext cx="3836657" cy="523220"/>
+            <a:off x="4910652" y="3280937"/>
+            <a:ext cx="3836660" cy="523220"/>
           </a:xfrm>
           <a:prstGeom prst="rect">
             <a:avLst/>
@@ -10351,17 +10410,7 @@
                 <a:latin typeface="Arial"/>
                 <a:ea typeface="Arial"/>
               </a:rPr>
-              <a:t>Support Vector Regressors </a:t>
-            </a:r>
-            <a:r>
-              <a:rPr lang="it" sz="2400" spc="-1" dirty="0">
-                <a:solidFill>
-                  <a:srgbClr val="FF0000"/>
-                </a:solidFill>
-                <a:latin typeface="Arial"/>
-                <a:ea typeface="Arial"/>
-              </a:rPr>
-              <a:t>hyperparameters’ values</a:t>
+              <a:t>Support Vector Regressors</a:t>
             </a:r>
             <a:endParaRPr lang="it-IT" sz="2400" b="0" strike="noStrike" spc="-1" dirty="0">
               <a:solidFill>
@@ -10457,7 +10506,7 @@
         </p:nvSpPr>
         <p:spPr>
           <a:xfrm>
-            <a:off x="396686" y="798665"/>
+            <a:off x="396685" y="549035"/>
             <a:ext cx="8350628" cy="307777"/>
           </a:xfrm>
           <a:prstGeom prst="rect">
@@ -10536,13 +10585,13 @@
               <p:nvPr>
                 <p:extLst>
                   <p:ext uri="{D42A27DB-BD31-4B8C-83A1-F6EECF244321}">
-                    <p14:modId xmlns:p14="http://schemas.microsoft.com/office/powerpoint/2010/main" val="1873685383"/>
+                    <p14:modId xmlns:p14="http://schemas.microsoft.com/office/powerpoint/2010/main" val="349117455"/>
                   </p:ext>
                 </p:extLst>
               </p:nvPr>
             </p:nvGraphicFramePr>
             <p:xfrm>
-              <a:off x="396687" y="1106442"/>
+              <a:off x="396686" y="856812"/>
               <a:ext cx="8350627" cy="2814320"/>
             </p:xfrm>
             <a:graphic>
@@ -10566,14 +10615,14 @@
                         </a:ext>
                       </a:extLst>
                     </a:gridCol>
-                    <a:gridCol w="2981138">
+                    <a:gridCol w="3173506">
                       <a:extLst>
                         <a:ext uri="{9D8B030D-6E8A-4147-A177-3AD203B41FA5}">
                           <a16:colId xmlns:a16="http://schemas.microsoft.com/office/drawing/2014/main" val="476101989"/>
                         </a:ext>
                       </a:extLst>
                     </a:gridCol>
-                    <a:gridCol w="1194175">
+                    <a:gridCol w="1001807">
                       <a:extLst>
                         <a:ext uri="{9D8B030D-6E8A-4147-A177-3AD203B41FA5}">
                           <a16:colId xmlns:a16="http://schemas.microsoft.com/office/drawing/2014/main" val="1098860902"/>
@@ -10709,12 +10758,16 @@
                             <a:t>RBF, </a:t>
                           </a:r>
                           <a:r>
-                            <a:rPr lang="it-IT" sz="1400" dirty="0" err="1"/>
+                            <a:rPr lang="it-IT" sz="1400" b="1" dirty="0" err="1"/>
                             <a:t>poly</a:t>
                           </a:r>
                           <a:r>
+                            <a:rPr lang="it-IT" sz="1400" b="1" dirty="0"/>
+                            <a:t>.</a:t>
+                          </a:r>
+                          <a:r>
                             <a:rPr lang="it-IT" sz="1400" dirty="0"/>
-                            <a:t>., </a:t>
+                            <a:t>, </a:t>
                           </a:r>
                           <a:r>
                             <a:rPr lang="it-IT" sz="1400" dirty="0" err="1"/>
@@ -10906,7 +10959,11 @@
                           <a:pPr algn="ctr"/>
                           <a:r>
                             <a:rPr lang="it-IT" sz="1400" dirty="0"/>
-                            <a:t>0.1, 1, 10, 100</a:t>
+                            <a:t>0.1, 1, 10, </a:t>
+                          </a:r>
+                          <a:r>
+                            <a:rPr lang="it-IT" sz="1400" b="1" dirty="0"/>
+                            <a:t>100</a:t>
                           </a:r>
                         </a:p>
                       </a:txBody>
@@ -11113,7 +11170,11 @@
                           <a:pPr algn="ctr"/>
                           <a:r>
                             <a:rPr lang="it-IT" sz="1400" dirty="0"/>
-                            <a:t>0, 1, 2</a:t>
+                            <a:t>0, 1, </a:t>
+                          </a:r>
+                          <a:r>
+                            <a:rPr lang="it-IT" sz="1400" b="1" dirty="0"/>
+                            <a:t>2</a:t>
                           </a:r>
                         </a:p>
                       </a:txBody>
@@ -11165,7 +11226,15 @@
                           <a:pPr algn="ctr"/>
                           <a:r>
                             <a:rPr lang="it-IT" sz="1400" dirty="0"/>
-                            <a:t>0.01, 0.1, 1</a:t>
+                            <a:t>0.01, </a:t>
+                          </a:r>
+                          <a:r>
+                            <a:rPr lang="it-IT" sz="1400" b="1" dirty="0"/>
+                            <a:t>0.1</a:t>
+                          </a:r>
+                          <a:r>
+                            <a:rPr lang="it-IT" sz="1400" dirty="0"/>
+                            <a:t>, 1</a:t>
                           </a:r>
                         </a:p>
                       </a:txBody>
@@ -11260,7 +11329,11 @@
                           <a:pPr algn="ctr"/>
                           <a:r>
                             <a:rPr lang="it-IT" sz="1400" dirty="0"/>
-                            <a:t>2, 3, 4</a:t>
+                            <a:t>2, 3, </a:t>
+                          </a:r>
+                          <a:r>
+                            <a:rPr lang="it-IT" sz="1400" b="1" dirty="0"/>
+                            <a:t>4</a:t>
                           </a:r>
                         </a:p>
                       </a:txBody>
@@ -11587,8 +11660,12 @@
                         <a:p>
                           <a:pPr algn="ctr"/>
                           <a:r>
+                            <a:rPr lang="it-IT" sz="1400" b="1" i="0" dirty="0"/>
+                            <a:t>0.1</a:t>
+                          </a:r>
+                          <a:r>
                             <a:rPr lang="it-IT" sz="1400" i="0" dirty="0"/>
-                            <a:t>0.1, 0.01, 0.001</a:t>
+                            <a:t>, 0.01, 0.001</a:t>
                           </a:r>
                         </a:p>
                       </a:txBody>
@@ -11631,13 +11708,13 @@
               <p:nvPr>
                 <p:extLst>
                   <p:ext uri="{D42A27DB-BD31-4B8C-83A1-F6EECF244321}">
-                    <p14:modId xmlns:p14="http://schemas.microsoft.com/office/powerpoint/2010/main" val="1873685383"/>
+                    <p14:modId xmlns:p14="http://schemas.microsoft.com/office/powerpoint/2010/main" val="349117455"/>
                   </p:ext>
                 </p:extLst>
               </p:nvPr>
             </p:nvGraphicFramePr>
             <p:xfrm>
-              <a:off x="396687" y="1106442"/>
+              <a:off x="396686" y="856812"/>
               <a:ext cx="8350627" cy="2814320"/>
             </p:xfrm>
             <a:graphic>
@@ -11661,14 +11738,14 @@
                         </a:ext>
                       </a:extLst>
                     </a:gridCol>
-                    <a:gridCol w="2981138">
+                    <a:gridCol w="3173506">
                       <a:extLst>
                         <a:ext uri="{9D8B030D-6E8A-4147-A177-3AD203B41FA5}">
                           <a16:colId xmlns:a16="http://schemas.microsoft.com/office/drawing/2014/main" val="476101989"/>
                         </a:ext>
                       </a:extLst>
                     </a:gridCol>
-                    <a:gridCol w="1194175">
+                    <a:gridCol w="1001807">
                       <a:extLst>
                         <a:ext uri="{9D8B030D-6E8A-4147-A177-3AD203B41FA5}">
                           <a16:colId xmlns:a16="http://schemas.microsoft.com/office/drawing/2014/main" val="1098860902"/>
@@ -11804,12 +11881,16 @@
                             <a:t>RBF, </a:t>
                           </a:r>
                           <a:r>
-                            <a:rPr lang="it-IT" sz="1400" dirty="0" err="1"/>
+                            <a:rPr lang="it-IT" sz="1400" b="1" dirty="0" err="1"/>
                             <a:t>poly</a:t>
                           </a:r>
                           <a:r>
+                            <a:rPr lang="it-IT" sz="1400" b="1" dirty="0"/>
+                            <a:t>.</a:t>
+                          </a:r>
+                          <a:r>
                             <a:rPr lang="it-IT" sz="1400" dirty="0"/>
-                            <a:t>., </a:t>
+                            <a:t>, </a:t>
                           </a:r>
                           <a:r>
                             <a:rPr lang="it-IT" sz="1400" dirty="0" err="1"/>
@@ -11878,7 +11959,7 @@
                         <a:blipFill>
                           <a:blip r:embed="rId2"/>
                           <a:stretch>
-                            <a:fillRect l="-140082" t="-72941" r="-40286" b="-384706"/>
+                            <a:fillRect l="-131478" t="-72941" r="-31670" b="-384706"/>
                           </a:stretch>
                         </a:blipFill>
                       </a:tcPr>
@@ -11938,7 +12019,11 @@
                           <a:pPr algn="ctr"/>
                           <a:r>
                             <a:rPr lang="it-IT" sz="1400" dirty="0"/>
-                            <a:t>0.1, 1, 10, 100</a:t>
+                            <a:t>0.1, 1, 10, </a:t>
+                          </a:r>
+                          <a:r>
+                            <a:rPr lang="it-IT" sz="1400" b="1" dirty="0"/>
+                            <a:t>100</a:t>
                           </a:r>
                         </a:p>
                       </a:txBody>
@@ -11975,7 +12060,7 @@
                         <a:blipFill>
                           <a:blip r:embed="rId2"/>
                           <a:stretch>
-                            <a:fillRect l="-140082" t="-170930" r="-40286" b="-280233"/>
+                            <a:fillRect l="-131478" t="-170930" r="-31670" b="-280233"/>
                           </a:stretch>
                         </a:blipFill>
                       </a:tcPr>
@@ -11988,7 +12073,11 @@
                           <a:pPr algn="ctr"/>
                           <a:r>
                             <a:rPr lang="it-IT" sz="1400" dirty="0"/>
-                            <a:t>0, 1, 2</a:t>
+                            <a:t>0, 1, </a:t>
+                          </a:r>
+                          <a:r>
+                            <a:rPr lang="it-IT" sz="1400" b="1" dirty="0"/>
+                            <a:t>2</a:t>
                           </a:r>
                         </a:p>
                       </a:txBody>
@@ -12040,7 +12129,15 @@
                           <a:pPr algn="ctr"/>
                           <a:r>
                             <a:rPr lang="it-IT" sz="1400" dirty="0"/>
-                            <a:t>0.01, 0.1, 1</a:t>
+                            <a:t>0.01, </a:t>
+                          </a:r>
+                          <a:r>
+                            <a:rPr lang="it-IT" sz="1400" b="1" dirty="0"/>
+                            <a:t>0.1</a:t>
+                          </a:r>
+                          <a:r>
+                            <a:rPr lang="it-IT" sz="1400" dirty="0"/>
+                            <a:t>, 1</a:t>
                           </a:r>
                         </a:p>
                       </a:txBody>
@@ -12135,7 +12232,11 @@
                           <a:pPr algn="ctr"/>
                           <a:r>
                             <a:rPr lang="it-IT" sz="1400" dirty="0"/>
-                            <a:t>2, 3, 4</a:t>
+                            <a:t>2, 3, </a:t>
+                          </a:r>
+                          <a:r>
+                            <a:rPr lang="it-IT" sz="1400" b="1" dirty="0"/>
+                            <a:t>4</a:t>
                           </a:r>
                         </a:p>
                       </a:txBody>
@@ -12289,8 +12390,12 @@
                         <a:p>
                           <a:pPr algn="ctr"/>
                           <a:r>
+                            <a:rPr lang="it-IT" sz="1400" b="1" i="0" dirty="0"/>
+                            <a:t>0.1</a:t>
+                          </a:r>
+                          <a:r>
                             <a:rPr lang="it-IT" sz="1400" i="0" dirty="0"/>
-                            <a:t>0.1, 0.01, 0.001</a:t>
+                            <a:t>, 0.01, 0.001</a:t>
                           </a:r>
                         </a:p>
                       </a:txBody>
@@ -12318,6 +12423,534 @@
           </p:graphicFrame>
         </mc:Fallback>
       </mc:AlternateContent>
+      <p:graphicFrame>
+        <p:nvGraphicFramePr>
+          <p:cNvPr id="2" name="Tabella 1">
+            <a:extLst>
+              <a:ext uri="{FF2B5EF4-FFF2-40B4-BE49-F238E27FC236}">
+                <a16:creationId xmlns:a16="http://schemas.microsoft.com/office/drawing/2014/main" id="{74CB9270-40E1-6852-9B9E-F02A5B6F5E04}"/>
+              </a:ext>
+            </a:extLst>
+          </p:cNvPr>
+          <p:cNvGraphicFramePr>
+            <a:graphicFrameLocks noGrp="1"/>
+          </p:cNvGraphicFramePr>
+          <p:nvPr>
+            <p:extLst>
+              <p:ext uri="{D42A27DB-BD31-4B8C-83A1-F6EECF244321}">
+                <p14:modId xmlns:p14="http://schemas.microsoft.com/office/powerpoint/2010/main" val="595302077"/>
+              </p:ext>
+            </p:extLst>
+          </p:nvPr>
+        </p:nvGraphicFramePr>
+        <p:xfrm>
+          <a:off x="4910653" y="3984690"/>
+          <a:ext cx="3836660" cy="914400"/>
+        </p:xfrm>
+        <a:graphic>
+          <a:graphicData uri="http://schemas.openxmlformats.org/drawingml/2006/table">
+            <a:tbl>
+              <a:tblPr bandRow="1">
+                <a:tableStyleId>{0E3FDE45-AF77-4B5C-9715-49D594BDF05E}</a:tableStyleId>
+              </a:tblPr>
+              <a:tblGrid>
+                <a:gridCol w="959165">
+                  <a:extLst>
+                    <a:ext uri="{9D8B030D-6E8A-4147-A177-3AD203B41FA5}">
+                      <a16:colId xmlns:a16="http://schemas.microsoft.com/office/drawing/2014/main" val="1649054938"/>
+                    </a:ext>
+                  </a:extLst>
+                </a:gridCol>
+                <a:gridCol w="959165">
+                  <a:extLst>
+                    <a:ext uri="{9D8B030D-6E8A-4147-A177-3AD203B41FA5}">
+                      <a16:colId xmlns:a16="http://schemas.microsoft.com/office/drawing/2014/main" val="4019716620"/>
+                    </a:ext>
+                  </a:extLst>
+                </a:gridCol>
+                <a:gridCol w="959165">
+                  <a:extLst>
+                    <a:ext uri="{9D8B030D-6E8A-4147-A177-3AD203B41FA5}">
+                      <a16:colId xmlns:a16="http://schemas.microsoft.com/office/drawing/2014/main" val="1120584406"/>
+                    </a:ext>
+                  </a:extLst>
+                </a:gridCol>
+                <a:gridCol w="959165">
+                  <a:extLst>
+                    <a:ext uri="{9D8B030D-6E8A-4147-A177-3AD203B41FA5}">
+                      <a16:colId xmlns:a16="http://schemas.microsoft.com/office/drawing/2014/main" val="3881263521"/>
+                    </a:ext>
+                  </a:extLst>
+                </a:gridCol>
+              </a:tblGrid>
+              <a:tr h="294067">
+                <a:tc>
+                  <a:txBody>
+                    <a:bodyPr/>
+                    <a:lstStyle/>
+                    <a:p>
+                      <a:pPr algn="ctr"/>
+                      <a:r>
+                        <a:rPr lang="it-IT" sz="1400" b="1" dirty="0"/>
+                        <a:t>Dataset</a:t>
+                      </a:r>
+                    </a:p>
+                  </a:txBody>
+                  <a:tcPr anchor="ctr">
+                    <a:lnR w="12700" cap="flat" cmpd="sng" algn="ctr">
+                      <a:solidFill>
+                        <a:srgbClr val="7B7B7B"/>
+                      </a:solidFill>
+                      <a:prstDash val="dash"/>
+                      <a:round/>
+                      <a:headEnd type="none" w="med" len="med"/>
+                      <a:tailEnd type="none" w="med" len="med"/>
+                    </a:lnR>
+                  </a:tcPr>
+                </a:tc>
+                <a:tc>
+                  <a:txBody>
+                    <a:bodyPr/>
+                    <a:lstStyle/>
+                    <a:p>
+                      <a:pPr algn="ctr"/>
+                      <a:r>
+                        <a:rPr lang="it-IT" sz="1400" dirty="0"/>
+                        <a:t>TR</a:t>
+                      </a:r>
+                    </a:p>
+                  </a:txBody>
+                  <a:tcPr anchor="ctr">
+                    <a:lnL w="12700" cap="flat" cmpd="sng" algn="ctr">
+                      <a:solidFill>
+                        <a:srgbClr val="7B7B7B"/>
+                      </a:solidFill>
+                      <a:prstDash val="dash"/>
+                      <a:round/>
+                      <a:headEnd type="none" w="med" len="med"/>
+                      <a:tailEnd type="none" w="med" len="med"/>
+                    </a:lnL>
+                  </a:tcPr>
+                </a:tc>
+                <a:tc>
+                  <a:txBody>
+                    <a:bodyPr/>
+                    <a:lstStyle/>
+                    <a:p>
+                      <a:pPr algn="ctr"/>
+                      <a:r>
+                        <a:rPr lang="it-IT" sz="1400" dirty="0"/>
+                        <a:t>VL</a:t>
+                      </a:r>
+                    </a:p>
+                  </a:txBody>
+                  <a:tcPr anchor="ctr"/>
+                </a:tc>
+                <a:tc>
+                  <a:txBody>
+                    <a:bodyPr/>
+                    <a:lstStyle/>
+                    <a:p>
+                      <a:pPr algn="ctr"/>
+                      <a:r>
+                        <a:rPr lang="it-IT" sz="1400" dirty="0"/>
+                        <a:t>TS</a:t>
+                      </a:r>
+                    </a:p>
+                  </a:txBody>
+                  <a:tcPr anchor="ctr"/>
+                </a:tc>
+                <a:extLst>
+                  <a:ext uri="{0D108BD9-81ED-4DB2-BD59-A6C34878D82A}">
+                    <a16:rowId xmlns:a16="http://schemas.microsoft.com/office/drawing/2014/main" val="1134138711"/>
+                  </a:ext>
+                </a:extLst>
+              </a:tr>
+              <a:tr h="294067">
+                <a:tc>
+                  <a:txBody>
+                    <a:bodyPr/>
+                    <a:lstStyle/>
+                    <a:p>
+                      <a:pPr algn="ctr"/>
+                      <a:r>
+                        <a:rPr lang="it-IT" sz="1400" b="1" dirty="0"/>
+                        <a:t>MEE</a:t>
+                      </a:r>
+                    </a:p>
+                  </a:txBody>
+                  <a:tcPr anchor="ctr">
+                    <a:lnR w="12700" cap="flat" cmpd="sng" algn="ctr">
+                      <a:solidFill>
+                        <a:srgbClr val="7B7B7B"/>
+                      </a:solidFill>
+                      <a:prstDash val="dash"/>
+                      <a:round/>
+                      <a:headEnd type="none" w="med" len="med"/>
+                      <a:tailEnd type="none" w="med" len="med"/>
+                    </a:lnR>
+                  </a:tcPr>
+                </a:tc>
+                <a:tc>
+                  <a:txBody>
+                    <a:bodyPr/>
+                    <a:lstStyle/>
+                    <a:p>
+                      <a:pPr algn="ctr"/>
+                      <a:r>
+                        <a:rPr lang="it-IT" sz="1400" dirty="0"/>
+                        <a:t>0.472</a:t>
+                      </a:r>
+                    </a:p>
+                  </a:txBody>
+                  <a:tcPr>
+                    <a:lnL w="12700" cap="flat" cmpd="sng" algn="ctr">
+                      <a:solidFill>
+                        <a:srgbClr val="7B7B7B"/>
+                      </a:solidFill>
+                      <a:prstDash val="dash"/>
+                      <a:round/>
+                      <a:headEnd type="none" w="med" len="med"/>
+                      <a:tailEnd type="none" w="med" len="med"/>
+                    </a:lnL>
+                  </a:tcPr>
+                </a:tc>
+                <a:tc>
+                  <a:txBody>
+                    <a:bodyPr/>
+                    <a:lstStyle/>
+                    <a:p>
+                      <a:pPr algn="ctr"/>
+                      <a:r>
+                        <a:rPr lang="it-IT" sz="1400" dirty="0"/>
+                        <a:t>0.804</a:t>
+                      </a:r>
+                    </a:p>
+                  </a:txBody>
+                  <a:tcPr/>
+                </a:tc>
+                <a:tc>
+                  <a:txBody>
+                    <a:bodyPr/>
+                    <a:lstStyle/>
+                    <a:p>
+                      <a:pPr algn="ctr"/>
+                      <a:r>
+                        <a:rPr lang="it-IT" sz="1400" dirty="0"/>
+                        <a:t>0.832</a:t>
+                      </a:r>
+                    </a:p>
+                  </a:txBody>
+                  <a:tcPr/>
+                </a:tc>
+                <a:extLst>
+                  <a:ext uri="{0D108BD9-81ED-4DB2-BD59-A6C34878D82A}">
+                    <a16:rowId xmlns:a16="http://schemas.microsoft.com/office/drawing/2014/main" val="3685263719"/>
+                  </a:ext>
+                </a:extLst>
+              </a:tr>
+              <a:tr h="294067">
+                <a:tc>
+                  <a:txBody>
+                    <a:bodyPr/>
+                    <a:lstStyle/>
+                    <a:p>
+                      <a:pPr algn="ctr"/>
+                      <a:r>
+                        <a:rPr lang="it-IT" sz="1400" b="1" dirty="0" err="1"/>
+                        <a:t>stdev</a:t>
+                      </a:r>
+                      <a:endParaRPr lang="it-IT" sz="1400" b="1" dirty="0"/>
+                    </a:p>
+                  </a:txBody>
+                  <a:tcPr anchor="ctr">
+                    <a:lnR w="12700" cap="flat" cmpd="sng" algn="ctr">
+                      <a:solidFill>
+                        <a:srgbClr val="7B7B7B"/>
+                      </a:solidFill>
+                      <a:prstDash val="dash"/>
+                      <a:round/>
+                      <a:headEnd type="none" w="med" len="med"/>
+                      <a:tailEnd type="none" w="med" len="med"/>
+                    </a:lnR>
+                  </a:tcPr>
+                </a:tc>
+                <a:tc>
+                  <a:txBody>
+                    <a:bodyPr/>
+                    <a:lstStyle/>
+                    <a:p>
+                      <a:pPr algn="ctr"/>
+                      <a:r>
+                        <a:rPr lang="it-IT" sz="1400" dirty="0"/>
+                        <a:t>0.006</a:t>
+                      </a:r>
+                    </a:p>
+                  </a:txBody>
+                  <a:tcPr>
+                    <a:lnL w="12700" cap="flat" cmpd="sng" algn="ctr">
+                      <a:solidFill>
+                        <a:srgbClr val="7B7B7B"/>
+                      </a:solidFill>
+                      <a:prstDash val="dash"/>
+                      <a:round/>
+                      <a:headEnd type="none" w="med" len="med"/>
+                      <a:tailEnd type="none" w="med" len="med"/>
+                    </a:lnL>
+                  </a:tcPr>
+                </a:tc>
+                <a:tc>
+                  <a:txBody>
+                    <a:bodyPr/>
+                    <a:lstStyle/>
+                    <a:p>
+                      <a:pPr algn="ctr"/>
+                      <a:r>
+                        <a:rPr lang="it-IT" sz="1400" dirty="0"/>
+                        <a:t>0.031</a:t>
+                      </a:r>
+                    </a:p>
+                  </a:txBody>
+                  <a:tcPr/>
+                </a:tc>
+                <a:tc>
+                  <a:txBody>
+                    <a:bodyPr/>
+                    <a:lstStyle/>
+                    <a:p>
+                      <a:pPr algn="ctr"/>
+                      <a:r>
+                        <a:rPr lang="it-IT" sz="1400" dirty="0" err="1"/>
+                        <a:t>n.d.</a:t>
+                      </a:r>
+                      <a:endParaRPr lang="it-IT" sz="1400" dirty="0"/>
+                    </a:p>
+                  </a:txBody>
+                  <a:tcPr/>
+                </a:tc>
+                <a:extLst>
+                  <a:ext uri="{0D108BD9-81ED-4DB2-BD59-A6C34878D82A}">
+                    <a16:rowId xmlns:a16="http://schemas.microsoft.com/office/drawing/2014/main" val="2799838635"/>
+                  </a:ext>
+                </a:extLst>
+              </a:tr>
+            </a:tbl>
+          </a:graphicData>
+        </a:graphic>
+      </p:graphicFrame>
+      <p:sp>
+        <p:nvSpPr>
+          <p:cNvPr id="4" name="CasellaDiTesto 3">
+            <a:extLst>
+              <a:ext uri="{FF2B5EF4-FFF2-40B4-BE49-F238E27FC236}">
+                <a16:creationId xmlns:a16="http://schemas.microsoft.com/office/drawing/2014/main" id="{DD5CB74F-1E5A-0951-0F2A-FFFB1DFCC51D}"/>
+              </a:ext>
+            </a:extLst>
+          </p:cNvPr>
+          <p:cNvSpPr txBox="1"/>
+          <p:nvPr/>
+        </p:nvSpPr>
+        <p:spPr>
+          <a:xfrm>
+            <a:off x="4910653" y="3676913"/>
+            <a:ext cx="3836660" cy="307777"/>
+          </a:xfrm>
+          <a:prstGeom prst="rect">
+            <a:avLst/>
+          </a:prstGeom>
+          <a:noFill/>
+        </p:spPr>
+        <p:txBody>
+          <a:bodyPr wrap="square" rtlCol="0">
+            <a:spAutoFit/>
+          </a:bodyPr>
+          <a:lstStyle/>
+          <a:p>
+            <a:pPr marL="0" marR="0" indent="0" algn="ctr" rtl="0" eaLnBrk="1" fontAlgn="auto" latinLnBrk="0" hangingPunct="1">
+              <a:spcBef>
+                <a:spcPts val="0"/>
+              </a:spcBef>
+              <a:spcAft>
+                <a:spcPts val="0"/>
+              </a:spcAft>
+            </a:pPr>
+            <a:r>
+              <a:rPr lang="it-IT" sz="1400" b="1" kern="1200" dirty="0" err="1">
+                <a:solidFill>
+                  <a:srgbClr val="000000"/>
+                </a:solidFill>
+                <a:effectLst/>
+                <a:latin typeface="Arial" panose="020B0604020202020204" pitchFamily="34" charset="0"/>
+                <a:ea typeface="DejaVu Sans" panose="020B0603030804020204" pitchFamily="34" charset="0"/>
+                <a:cs typeface="DejaVu Sans" panose="020B0603030804020204" pitchFamily="34" charset="0"/>
+              </a:rPr>
+              <a:t>Table</a:t>
+            </a:r>
+            <a:r>
+              <a:rPr lang="it-IT" sz="1400" b="1" kern="1200" dirty="0">
+                <a:solidFill>
+                  <a:srgbClr val="000000"/>
+                </a:solidFill>
+                <a:effectLst/>
+                <a:latin typeface="Arial" panose="020B0604020202020204" pitchFamily="34" charset="0"/>
+                <a:ea typeface="DejaVu Sans" panose="020B0603030804020204" pitchFamily="34" charset="0"/>
+                <a:cs typeface="DejaVu Sans" panose="020B0603030804020204" pitchFamily="34" charset="0"/>
+              </a:rPr>
+              <a:t> </a:t>
+            </a:r>
+            <a:r>
+              <a:rPr lang="it-IT" sz="1400" b="1" kern="1200" dirty="0">
+                <a:solidFill>
+                  <a:srgbClr val="FF0000"/>
+                </a:solidFill>
+                <a:effectLst/>
+                <a:latin typeface="Arial" panose="020B0604020202020204" pitchFamily="34" charset="0"/>
+                <a:ea typeface="DejaVu Sans" panose="020B0603030804020204" pitchFamily="34" charset="0"/>
+                <a:cs typeface="DejaVu Sans" panose="020B0603030804020204" pitchFamily="34" charset="0"/>
+              </a:rPr>
+              <a:t>m</a:t>
+            </a:r>
+            <a:r>
+              <a:rPr lang="it-IT" sz="1400" kern="1200" dirty="0">
+                <a:solidFill>
+                  <a:srgbClr val="000000"/>
+                </a:solidFill>
+                <a:effectLst/>
+                <a:latin typeface="Arial" panose="020B0604020202020204" pitchFamily="34" charset="0"/>
+                <a:ea typeface="DejaVu Sans" panose="020B0603030804020204" pitchFamily="34" charset="0"/>
+                <a:cs typeface="DejaVu Sans" panose="020B0603030804020204" pitchFamily="34" charset="0"/>
+              </a:rPr>
+              <a:t>: MEE of the best SVM</a:t>
+            </a:r>
+            <a:endParaRPr lang="it-IT" sz="1100" dirty="0">
+              <a:effectLst/>
+            </a:endParaRPr>
+          </a:p>
+        </p:txBody>
+      </p:sp>
+      <p:sp>
+        <p:nvSpPr>
+          <p:cNvPr id="5" name="CasellaDiTesto 4">
+            <a:extLst>
+              <a:ext uri="{FF2B5EF4-FFF2-40B4-BE49-F238E27FC236}">
+                <a16:creationId xmlns:a16="http://schemas.microsoft.com/office/drawing/2014/main" id="{71A56CF6-D8A5-5F82-9CF5-EEA011AA670B}"/>
+              </a:ext>
+            </a:extLst>
+          </p:cNvPr>
+          <p:cNvSpPr txBox="1"/>
+          <p:nvPr/>
+        </p:nvSpPr>
+        <p:spPr>
+          <a:xfrm>
+            <a:off x="396685" y="3950461"/>
+            <a:ext cx="4356850" cy="954107"/>
+          </a:xfrm>
+          <a:prstGeom prst="rect">
+            <a:avLst/>
+          </a:prstGeom>
+          <a:noFill/>
+        </p:spPr>
+        <p:txBody>
+          <a:bodyPr wrap="square" rtlCol="0">
+            <a:spAutoFit/>
+          </a:bodyPr>
+          <a:lstStyle/>
+          <a:p>
+            <a:r>
+              <a:rPr lang="it-IT" sz="1400" dirty="0"/>
+              <a:t>The best </a:t>
+            </a:r>
+            <a:r>
+              <a:rPr lang="it-IT" sz="1400" dirty="0" err="1"/>
+              <a:t>hyperparameters</a:t>
+            </a:r>
+            <a:r>
+              <a:rPr lang="it-IT" sz="1400" dirty="0"/>
+              <a:t> </a:t>
+            </a:r>
+            <a:r>
+              <a:rPr lang="it-IT" sz="1400" dirty="0" err="1"/>
+              <a:t>found</a:t>
+            </a:r>
+            <a:r>
+              <a:rPr lang="it-IT" sz="1400" dirty="0"/>
+              <a:t> in the </a:t>
+            </a:r>
+            <a:r>
+              <a:rPr lang="it-IT" sz="1400" dirty="0" err="1"/>
+              <a:t>grid</a:t>
+            </a:r>
+            <a:r>
+              <a:rPr lang="it-IT" sz="1400" dirty="0"/>
+              <a:t> </a:t>
+            </a:r>
+            <a:r>
+              <a:rPr lang="it-IT" sz="1400" dirty="0" err="1"/>
+              <a:t>search</a:t>
+            </a:r>
+            <a:r>
+              <a:rPr lang="it-IT" sz="1400" dirty="0"/>
+              <a:t> are in </a:t>
+            </a:r>
+            <a:r>
+              <a:rPr lang="it-IT" sz="1400" dirty="0" err="1"/>
+              <a:t>bold</a:t>
+            </a:r>
+            <a:r>
+              <a:rPr lang="it-IT" sz="1400" dirty="0"/>
+              <a:t>. </a:t>
+            </a:r>
+            <a:r>
+              <a:rPr lang="it-IT" sz="1400" dirty="0" err="1"/>
+              <a:t>Table</a:t>
+            </a:r>
+            <a:r>
+              <a:rPr lang="it-IT" sz="1400" dirty="0"/>
+              <a:t> m shows the </a:t>
+            </a:r>
+            <a:r>
+              <a:rPr lang="it-IT" sz="1400" dirty="0" err="1"/>
+              <a:t>error</a:t>
+            </a:r>
+            <a:r>
+              <a:rPr lang="it-IT" sz="1400" dirty="0"/>
+              <a:t> of </a:t>
+            </a:r>
+            <a:r>
+              <a:rPr lang="it-IT" sz="1400" dirty="0" err="1"/>
+              <a:t>this</a:t>
+            </a:r>
+            <a:r>
+              <a:rPr lang="it-IT" sz="1400" dirty="0"/>
+              <a:t> model.</a:t>
+            </a:r>
+          </a:p>
+          <a:p>
+            <a:r>
+              <a:rPr lang="it-IT" sz="1400" dirty="0"/>
+              <a:t>The learning curve of the best SVM can be </a:t>
+            </a:r>
+            <a:r>
+              <a:rPr lang="it-IT" sz="1400" dirty="0" err="1"/>
+              <a:t>found</a:t>
+            </a:r>
+            <a:r>
+              <a:rPr lang="it-IT" sz="1400" dirty="0"/>
+              <a:t> in the </a:t>
+            </a:r>
+            <a:r>
+              <a:rPr lang="it-IT" sz="1400" dirty="0" err="1">
+                <a:hlinkClick r:id="rId3" action="ppaction://hlinksldjump"/>
+              </a:rPr>
+              <a:t>Appendix</a:t>
+            </a:r>
+            <a:r>
+              <a:rPr lang="it-IT" sz="1400" dirty="0"/>
+              <a:t>.</a:t>
+            </a:r>
+          </a:p>
+        </p:txBody>
+      </p:sp>
     </p:spTree>
     <p:extLst>
       <p:ext uri="{BB962C8B-B14F-4D97-AF65-F5344CB8AC3E}">
@@ -12394,17 +13027,7 @@
                 <a:latin typeface="Arial"/>
                 <a:ea typeface="Arial"/>
               </a:rPr>
-              <a:t>Neural Network </a:t>
-            </a:r>
-            <a:r>
-              <a:rPr lang="it" sz="2400" spc="-1" dirty="0">
-                <a:solidFill>
-                  <a:srgbClr val="FF0000"/>
-                </a:solidFill>
-                <a:latin typeface="Arial"/>
-                <a:ea typeface="Arial"/>
-              </a:rPr>
-              <a:t>hyperparameters’ values</a:t>
+              <a:t>Neural Network</a:t>
             </a:r>
             <a:endParaRPr lang="it-IT" sz="2400" b="0" strike="noStrike" spc="-1" dirty="0">
               <a:solidFill>
@@ -16241,14 +16864,14 @@
           <p:nvPr>
             <p:extLst>
               <p:ext uri="{D42A27DB-BD31-4B8C-83A1-F6EECF244321}">
-                <p14:modId xmlns:p14="http://schemas.microsoft.com/office/powerpoint/2010/main" val="1291602323"/>
+                <p14:modId xmlns:p14="http://schemas.microsoft.com/office/powerpoint/2010/main" val="4254632872"/>
               </p:ext>
             </p:extLst>
           </p:nvPr>
         </p:nvGraphicFramePr>
         <p:xfrm>
           <a:off x="4729118" y="1979043"/>
-          <a:ext cx="3836660" cy="609600"/>
+          <a:ext cx="3836660" cy="914400"/>
         </p:xfrm>
         <a:graphic>
           <a:graphicData uri="http://schemas.openxmlformats.org/drawingml/2006/table">
@@ -16437,6 +17060,78 @@
                 <a:extLst>
                   <a:ext uri="{0D108BD9-81ED-4DB2-BD59-A6C34878D82A}">
                     <a16:rowId xmlns:a16="http://schemas.microsoft.com/office/drawing/2014/main" val="3685263719"/>
+                  </a:ext>
+                </a:extLst>
+              </a:tr>
+              <a:tr h="294067">
+                <a:tc>
+                  <a:txBody>
+                    <a:bodyPr/>
+                    <a:lstStyle/>
+                    <a:p>
+                      <a:pPr algn="ctr"/>
+                      <a:r>
+                        <a:rPr lang="it-IT" sz="1400" b="1" dirty="0" err="1"/>
+                        <a:t>stdev</a:t>
+                      </a:r>
+                      <a:endParaRPr lang="it-IT" sz="1400" b="1" dirty="0"/>
+                    </a:p>
+                  </a:txBody>
+                  <a:tcPr anchor="ctr">
+                    <a:lnR w="12700" cap="flat" cmpd="sng" algn="ctr">
+                      <a:solidFill>
+                        <a:srgbClr val="7B7B7B"/>
+                      </a:solidFill>
+                      <a:prstDash val="dash"/>
+                      <a:round/>
+                      <a:headEnd type="none" w="med" len="med"/>
+                      <a:tailEnd type="none" w="med" len="med"/>
+                    </a:lnR>
+                  </a:tcPr>
+                </a:tc>
+                <a:tc>
+                  <a:txBody>
+                    <a:bodyPr/>
+                    <a:lstStyle/>
+                    <a:p>
+                      <a:endParaRPr lang="it-IT" sz="1400" dirty="0"/>
+                    </a:p>
+                  </a:txBody>
+                  <a:tcPr>
+                    <a:lnL w="12700" cap="flat" cmpd="sng" algn="ctr">
+                      <a:solidFill>
+                        <a:srgbClr val="7B7B7B"/>
+                      </a:solidFill>
+                      <a:prstDash val="dash"/>
+                      <a:round/>
+                      <a:headEnd type="none" w="med" len="med"/>
+                      <a:tailEnd type="none" w="med" len="med"/>
+                    </a:lnL>
+                  </a:tcPr>
+                </a:tc>
+                <a:tc>
+                  <a:txBody>
+                    <a:bodyPr/>
+                    <a:lstStyle/>
+                    <a:p>
+                      <a:endParaRPr lang="it-IT" sz="1400" dirty="0"/>
+                    </a:p>
+                  </a:txBody>
+                  <a:tcPr/>
+                </a:tc>
+                <a:tc>
+                  <a:txBody>
+                    <a:bodyPr/>
+                    <a:lstStyle/>
+                    <a:p>
+                      <a:endParaRPr lang="it-IT" sz="1400" dirty="0"/>
+                    </a:p>
+                  </a:txBody>
+                  <a:tcPr/>
+                </a:tc>
+                <a:extLst>
+                  <a:ext uri="{0D108BD9-81ED-4DB2-BD59-A6C34878D82A}">
+                    <a16:rowId xmlns:a16="http://schemas.microsoft.com/office/drawing/2014/main" val="783983544"/>
                   </a:ext>
                 </a:extLst>
               </a:tr>
@@ -23115,13 +23810,13 @@
           <p:nvPr>
             <p:extLst>
               <p:ext uri="{D42A27DB-BD31-4B8C-83A1-F6EECF244321}">
-                <p14:modId xmlns:p14="http://schemas.microsoft.com/office/powerpoint/2010/main" val="1776026863"/>
+                <p14:modId xmlns:p14="http://schemas.microsoft.com/office/powerpoint/2010/main" val="2379285593"/>
               </p:ext>
             </p:extLst>
           </p:nvPr>
         </p:nvGraphicFramePr>
         <p:xfrm>
-          <a:off x="311758" y="1374456"/>
+          <a:off x="311756" y="1130556"/>
           <a:ext cx="8160843" cy="1249680"/>
         </p:xfrm>
         <a:graphic>
@@ -23138,14 +23833,14 @@
                     </a:ext>
                   </a:extLst>
                 </a:gridCol>
-                <a:gridCol w="3657600">
+                <a:gridCol w="2756647">
                   <a:extLst>
                     <a:ext uri="{9D8B030D-6E8A-4147-A177-3AD203B41FA5}">
                       <a16:colId xmlns:a16="http://schemas.microsoft.com/office/drawing/2014/main" val="1166905258"/>
                     </a:ext>
                   </a:extLst>
                 </a:gridCol>
-                <a:gridCol w="1815830">
+                <a:gridCol w="2716783">
                   <a:extLst>
                     <a:ext uri="{9D8B030D-6E8A-4147-A177-3AD203B41FA5}">
                       <a16:colId xmlns:a16="http://schemas.microsoft.com/office/drawing/2014/main" val="34889993"/>
@@ -23272,7 +23967,7 @@
                       <a:pPr algn="ctr"/>
                       <a:r>
                         <a:rPr lang="it-IT" sz="1400" dirty="0"/>
-                        <a:t>Monk 1</a:t>
+                        <a:t>MONK 1</a:t>
                       </a:r>
                     </a:p>
                   </a:txBody>
@@ -23360,14 +24055,30 @@
                     <a:bodyPr/>
                     <a:lstStyle/>
                     <a:p>
-                      <a:pPr algn="ctr"/>
+                      <a:pPr marL="0" marR="0" lvl="0" indent="0" algn="ctr" defTabSz="914400" rtl="0" eaLnBrk="1" fontAlgn="auto" latinLnBrk="0" hangingPunct="1">
+                        <a:lnSpc>
+                          <a:spcPct val="100000"/>
+                        </a:lnSpc>
+                        <a:spcBef>
+                          <a:spcPts val="0"/>
+                        </a:spcBef>
+                        <a:spcAft>
+                          <a:spcPts val="0"/>
+                        </a:spcAft>
+                        <a:buClrTx/>
+                        <a:buSzTx/>
+                        <a:buFontTx/>
+                        <a:buNone/>
+                        <a:tabLst/>
+                        <a:defRPr/>
+                      </a:pPr>
                       <a:r>
                         <a:rPr lang="it-IT" sz="1400" i="1" dirty="0">
                           <a:solidFill>
                             <a:schemeClr val="tx1"/>
                           </a:solidFill>
                         </a:rPr>
-                        <a:t>100% </a:t>
+                        <a:t>100%±0% </a:t>
                       </a:r>
                       <a:r>
                         <a:rPr lang="it-IT" sz="1400" i="0" dirty="0">
@@ -23383,7 +24094,7 @@
                             <a:schemeClr val="tx1"/>
                           </a:solidFill>
                         </a:rPr>
-                        <a:t> 80,43%</a:t>
+                        <a:t> 80,43%±17,95%</a:t>
                       </a:r>
                     </a:p>
                   </a:txBody>
@@ -23422,7 +24133,7 @@
                       <a:pPr algn="ctr"/>
                       <a:r>
                         <a:rPr lang="it-IT" sz="1400" dirty="0"/>
-                        <a:t>Monk 2</a:t>
+                        <a:t>MONK 2</a:t>
                       </a:r>
                     </a:p>
                   </a:txBody>
@@ -23487,7 +24198,7 @@
                             <a:schemeClr val="tx1"/>
                           </a:solidFill>
                         </a:rPr>
-                        <a:t>71,71% </a:t>
+                        <a:t>100%±0% </a:t>
                       </a:r>
                       <a:r>
                         <a:rPr lang="it-IT" sz="1400" i="0" dirty="0">
@@ -23503,7 +24214,7 @@
                             <a:schemeClr val="tx1"/>
                           </a:solidFill>
                         </a:rPr>
-                        <a:t>100%</a:t>
+                        <a:t>71,71%±10,20%</a:t>
                       </a:r>
                     </a:p>
                   </a:txBody>
@@ -23542,7 +24253,7 @@
                       <a:pPr algn="ctr"/>
                       <a:r>
                         <a:rPr lang="it-IT" sz="1400" dirty="0"/>
-                        <a:t>Monk 3</a:t>
+                        <a:t>MONK 3</a:t>
                       </a:r>
                     </a:p>
                   </a:txBody>
@@ -23706,7 +24417,7 @@
         </p:nvSpPr>
         <p:spPr>
           <a:xfrm>
-            <a:off x="311757" y="1035900"/>
+            <a:off x="311755" y="792000"/>
             <a:ext cx="8160842" cy="338554"/>
           </a:xfrm>
           <a:prstGeom prst="rect">
@@ -23784,14 +24495,14 @@
           <p:nvPr>
             <p:extLst>
               <p:ext uri="{D42A27DB-BD31-4B8C-83A1-F6EECF244321}">
-                <p14:modId xmlns:p14="http://schemas.microsoft.com/office/powerpoint/2010/main" val="403741590"/>
+                <p14:modId xmlns:p14="http://schemas.microsoft.com/office/powerpoint/2010/main" val="4190525031"/>
               </p:ext>
             </p:extLst>
           </p:nvPr>
         </p:nvGraphicFramePr>
         <p:xfrm>
-          <a:off x="311758" y="3230520"/>
-          <a:ext cx="8160844" cy="1645920"/>
+          <a:off x="311753" y="2910306"/>
+          <a:ext cx="8160844" cy="1859280"/>
         </p:xfrm>
         <a:graphic>
           <a:graphicData uri="http://schemas.openxmlformats.org/drawingml/2006/table">
@@ -23800,28 +24511,28 @@
                 <a:tableStyleId>{0E3FDE45-AF77-4B5C-9715-49D594BDF05E}</a:tableStyleId>
               </a:tblPr>
               <a:tblGrid>
-                <a:gridCol w="911924">
+                <a:gridCol w="871588">
                   <a:extLst>
                     <a:ext uri="{9D8B030D-6E8A-4147-A177-3AD203B41FA5}">
                       <a16:colId xmlns:a16="http://schemas.microsoft.com/office/drawing/2014/main" val="935040320"/>
                     </a:ext>
                   </a:extLst>
                 </a:gridCol>
-                <a:gridCol w="4061012">
+                <a:gridCol w="3489512">
                   <a:extLst>
                     <a:ext uri="{9D8B030D-6E8A-4147-A177-3AD203B41FA5}">
                       <a16:colId xmlns:a16="http://schemas.microsoft.com/office/drawing/2014/main" val="1166905258"/>
                     </a:ext>
                   </a:extLst>
                 </a:gridCol>
-                <a:gridCol w="1593954">
+                <a:gridCol w="2723029">
                   <a:extLst>
                     <a:ext uri="{9D8B030D-6E8A-4147-A177-3AD203B41FA5}">
                       <a16:colId xmlns:a16="http://schemas.microsoft.com/office/drawing/2014/main" val="34889993"/>
                     </a:ext>
                   </a:extLst>
                 </a:gridCol>
-                <a:gridCol w="1593954">
+                <a:gridCol w="1076715">
                   <a:extLst>
                     <a:ext uri="{9D8B030D-6E8A-4147-A177-3AD203B41FA5}">
                       <a16:colId xmlns:a16="http://schemas.microsoft.com/office/drawing/2014/main" val="3320172478"/>
@@ -24106,7 +24817,7 @@
                       <a:pPr algn="ctr"/>
                       <a:r>
                         <a:rPr lang="it-IT" sz="1400" dirty="0"/>
-                        <a:t>Monk 1</a:t>
+                        <a:t>MONK 1</a:t>
                       </a:r>
                     </a:p>
                   </a:txBody>
@@ -24190,7 +24901,15 @@
                       <a:pPr algn="ctr"/>
                       <a:r>
                         <a:rPr lang="it-IT" sz="1400" i="1" dirty="0"/>
-                        <a:t>100% </a:t>
+                        <a:t>100%</a:t>
+                      </a:r>
+                      <a:r>
+                        <a:rPr lang="it-IT" sz="1400" i="1" dirty="0">
+                          <a:solidFill>
+                            <a:schemeClr val="tx1"/>
+                          </a:solidFill>
+                        </a:rPr>
+                        <a:t>±0% </a:t>
                       </a:r>
                       <a:r>
                         <a:rPr lang="it-IT" sz="1400" i="0" dirty="0"/>
@@ -24200,6 +24919,15 @@
                         <a:rPr lang="it-IT" sz="1400" i="1" dirty="0"/>
                         <a:t> 78,03%</a:t>
                       </a:r>
+                      <a:r>
+                        <a:rPr lang="it-IT" sz="1400" i="1" dirty="0">
+                          <a:solidFill>
+                            <a:schemeClr val="tx1"/>
+                          </a:solidFill>
+                        </a:rPr>
+                        <a:t>±15,44%</a:t>
+                      </a:r>
+                      <a:endParaRPr lang="it-IT" sz="1400" i="1" dirty="0"/>
                     </a:p>
                   </a:txBody>
                   <a:tcPr anchor="ctr"/>
@@ -24233,7 +24961,7 @@
                       <a:pPr algn="ctr"/>
                       <a:r>
                         <a:rPr lang="it-IT" sz="1400" dirty="0"/>
-                        <a:t>Monk 2</a:t>
+                        <a:t>MONK 2</a:t>
                       </a:r>
                     </a:p>
                   </a:txBody>
@@ -24317,7 +25045,7 @@
                             <a:schemeClr val="tx1"/>
                           </a:solidFill>
                         </a:rPr>
-                        <a:t>100% </a:t>
+                        <a:t>100%±0% </a:t>
                       </a:r>
                       <a:r>
                         <a:rPr lang="it-IT" sz="1400" i="0" dirty="0">
@@ -24333,7 +25061,7 @@
                             <a:schemeClr val="tx1"/>
                           </a:solidFill>
                         </a:rPr>
-                        <a:t> 65,17%</a:t>
+                        <a:t> 65,17%±9,91%</a:t>
                       </a:r>
                     </a:p>
                   </a:txBody>
@@ -24372,7 +25100,7 @@
                       <a:pPr algn="ctr"/>
                       <a:r>
                         <a:rPr lang="it-IT" sz="1400" dirty="0"/>
-                        <a:t>Monk 3</a:t>
+                        <a:t>MONK 3</a:t>
                       </a:r>
                     </a:p>
                   </a:txBody>
@@ -24480,7 +25208,7 @@
                             <a:schemeClr val="tx1"/>
                           </a:solidFill>
                         </a:rPr>
-                        <a:t>95,88% </a:t>
+                        <a:t>95,88%±1,13% </a:t>
                       </a:r>
                       <a:r>
                         <a:rPr lang="it-IT" sz="1400" i="0" dirty="0">
@@ -24496,7 +25224,7 @@
                             <a:schemeClr val="tx1"/>
                           </a:solidFill>
                         </a:rPr>
-                        <a:t> 92,57%</a:t>
+                        <a:t> 92,57%±4,07%</a:t>
                       </a:r>
                     </a:p>
                   </a:txBody>
@@ -24562,7 +25290,7 @@
         </p:nvSpPr>
         <p:spPr>
           <a:xfrm>
-            <a:off x="311757" y="2891964"/>
+            <a:off x="311752" y="2571750"/>
             <a:ext cx="8160842" cy="338554"/>
           </a:xfrm>
           <a:prstGeom prst="rect">
@@ -24861,8 +25589,8 @@
         </p:blipFill>
         <p:spPr>
           <a:xfrm>
-            <a:off x="2227394" y="1439101"/>
-            <a:ext cx="3242158" cy="2265298"/>
+            <a:off x="2476082" y="1366177"/>
+            <a:ext cx="3117812" cy="2265298"/>
           </a:xfrm>
           <a:prstGeom prst="rect">
             <a:avLst/>
@@ -24900,8 +25628,8 @@
         </p:blipFill>
         <p:spPr>
           <a:xfrm>
-            <a:off x="311760" y="1439101"/>
-            <a:ext cx="1915634" cy="1825751"/>
+            <a:off x="308533" y="1366177"/>
+            <a:ext cx="2164322" cy="2062770"/>
           </a:xfrm>
           <a:prstGeom prst="rect">
             <a:avLst/>
@@ -24939,8 +25667,8 @@
         </p:blipFill>
         <p:spPr>
           <a:xfrm>
-            <a:off x="5469552" y="1439101"/>
-            <a:ext cx="3242158" cy="2265298"/>
+            <a:off x="5593894" y="1366177"/>
+            <a:ext cx="3117812" cy="2265298"/>
           </a:xfrm>
           <a:prstGeom prst="rect">
             <a:avLst/>
@@ -24964,7 +25692,7 @@
         </p:nvSpPr>
         <p:spPr>
           <a:xfrm>
-            <a:off x="308534" y="1131324"/>
+            <a:off x="308533" y="1058400"/>
             <a:ext cx="8403175" cy="307777"/>
           </a:xfrm>
           <a:prstGeom prst="rect">
@@ -29700,7 +30428,17 @@
                 <a:latin typeface="Arial"/>
                 <a:ea typeface="Arial"/>
               </a:rPr>
-              <a:t>10</a:t>
+              <a:t>10 </a:t>
+            </a:r>
+            <a:r>
+              <a:rPr lang="it" sz="2400" spc="-1" dirty="0">
+                <a:solidFill>
+                  <a:srgbClr val="FF0000"/>
+                </a:solidFill>
+                <a:latin typeface="Arial"/>
+                <a:ea typeface="Arial"/>
+              </a:rPr>
+              <a:t>To assess</a:t>
             </a:r>
             <a:br>
               <a:rPr lang="it" sz="2400" b="0" strike="noStrike" spc="-1" dirty="0">
@@ -31500,6 +32238,564 @@
     <p:extLst>
       <p:ext uri="{BB962C8B-B14F-4D97-AF65-F5344CB8AC3E}">
         <p14:creationId xmlns:p14="http://schemas.microsoft.com/office/powerpoint/2010/main" val="3039551750"/>
+      </p:ext>
+    </p:extLst>
+  </p:cSld>
+  <p:clrMapOvr>
+    <a:masterClrMapping/>
+  </p:clrMapOvr>
+</p:sld>
+</file>
+
+<file path=ppt/slides/slide36.xml><?xml version="1.0" encoding="utf-8"?>
+<p:sld xmlns:a="http://schemas.openxmlformats.org/drawingml/2006/main" xmlns:r="http://schemas.openxmlformats.org/officeDocument/2006/relationships" xmlns:p="http://schemas.openxmlformats.org/presentationml/2006/main">
+  <p:cSld>
+    <p:spTree>
+      <p:nvGrpSpPr>
+        <p:cNvPr id="1" name=""/>
+        <p:cNvGrpSpPr/>
+        <p:nvPr/>
+      </p:nvGrpSpPr>
+      <p:grpSpPr>
+        <a:xfrm>
+          <a:off x="0" y="0"/>
+          <a:ext cx="0" cy="0"/>
+          <a:chOff x="0" y="0"/>
+          <a:chExt cx="0" cy="0"/>
+        </a:xfrm>
+      </p:grpSpPr>
+      <p:sp>
+        <p:nvSpPr>
+          <p:cNvPr id="120" name="PlaceHolder 1"/>
+          <p:cNvSpPr>
+            <a:spLocks noGrp="1"/>
+          </p:cNvSpPr>
+          <p:nvPr>
+            <p:ph type="title"/>
+          </p:nvPr>
+        </p:nvSpPr>
+        <p:spPr>
+          <a:xfrm>
+            <a:off x="311760" y="0"/>
+            <a:ext cx="8520120" cy="792000"/>
+          </a:xfrm>
+          <a:prstGeom prst="rect">
+            <a:avLst/>
+          </a:prstGeom>
+          <a:noFill/>
+          <a:ln w="0">
+            <a:noFill/>
+          </a:ln>
+        </p:spPr>
+        <p:txBody>
+          <a:bodyPr tIns="91440" bIns="91440" anchor="t">
+            <a:normAutofit fontScale="90000"/>
+          </a:bodyPr>
+          <a:lstStyle/>
+          <a:p>
+            <a:pPr>
+              <a:lnSpc>
+                <a:spcPct val="100000"/>
+              </a:lnSpc>
+              <a:buNone/>
+              <a:tabLst>
+                <a:tab pos="0" algn="l"/>
+              </a:tabLst>
+            </a:pPr>
+            <a:r>
+              <a:rPr lang="it" sz="2400" b="0" strike="noStrike" spc="-1" dirty="0">
+                <a:solidFill>
+                  <a:srgbClr val="000000"/>
+                </a:solidFill>
+                <a:latin typeface="Arial"/>
+                <a:ea typeface="Arial"/>
+              </a:rPr>
+              <a:t>Appendix – </a:t>
+            </a:r>
+            <a:r>
+              <a:rPr lang="it" sz="2400" spc="-1" dirty="0">
+                <a:solidFill>
+                  <a:srgbClr val="000000"/>
+                </a:solidFill>
+                <a:latin typeface="Arial"/>
+                <a:ea typeface="Arial"/>
+              </a:rPr>
+              <a:t>12</a:t>
+            </a:r>
+            <a:br>
+              <a:rPr lang="it" sz="2400" b="0" strike="noStrike" spc="-1" dirty="0">
+                <a:solidFill>
+                  <a:srgbClr val="000000"/>
+                </a:solidFill>
+                <a:latin typeface="Arial"/>
+                <a:ea typeface="Arial"/>
+              </a:rPr>
+            </a:br>
+            <a:r>
+              <a:rPr lang="it" sz="2000" b="0" strike="noStrike" spc="-1" dirty="0">
+                <a:solidFill>
+                  <a:srgbClr val="3F3F3F"/>
+                </a:solidFill>
+                <a:latin typeface="Arial"/>
+                <a:ea typeface="Arial"/>
+              </a:rPr>
+              <a:t>Learning curves for best SVM and best Random Forest</a:t>
+            </a:r>
+            <a:endParaRPr lang="it-IT" sz="2400" b="0" strike="noStrike" spc="-1" dirty="0">
+              <a:solidFill>
+                <a:srgbClr val="3F3F3F"/>
+              </a:solidFill>
+              <a:latin typeface="Arial"/>
+            </a:endParaRPr>
+          </a:p>
+        </p:txBody>
+      </p:sp>
+      <p:sp>
+        <p:nvSpPr>
+          <p:cNvPr id="122" name="PlaceHolder 3"/>
+          <p:cNvSpPr>
+            <a:spLocks noGrp="1"/>
+          </p:cNvSpPr>
+          <p:nvPr>
+            <p:ph type="sldNum" idx="14"/>
+          </p:nvPr>
+        </p:nvSpPr>
+        <p:spPr>
+          <a:xfrm>
+            <a:off x="8472600" y="4663080"/>
+            <a:ext cx="548280" cy="393120"/>
+          </a:xfrm>
+          <a:prstGeom prst="rect">
+            <a:avLst/>
+          </a:prstGeom>
+          <a:noFill/>
+          <a:ln w="0">
+            <a:noFill/>
+          </a:ln>
+        </p:spPr>
+        <p:txBody>
+          <a:bodyPr tIns="91440" bIns="91440" anchor="ctr">
+            <a:normAutofit/>
+          </a:bodyPr>
+          <a:lstStyle>
+            <a:lvl1pPr algn="r">
+              <a:lnSpc>
+                <a:spcPct val="100000"/>
+              </a:lnSpc>
+              <a:buNone/>
+              <a:tabLst>
+                <a:tab pos="0" algn="l"/>
+              </a:tabLst>
+              <a:defRPr lang="it" sz="1000" b="0" strike="noStrike" spc="-1">
+                <a:solidFill>
+                  <a:srgbClr val="595959"/>
+                </a:solidFill>
+                <a:latin typeface="Arial"/>
+                <a:ea typeface="Arial"/>
+              </a:defRPr>
+            </a:lvl1pPr>
+          </a:lstStyle>
+          <a:p>
+            <a:pPr algn="r">
+              <a:lnSpc>
+                <a:spcPct val="100000"/>
+              </a:lnSpc>
+              <a:buNone/>
+              <a:tabLst>
+                <a:tab pos="0" algn="l"/>
+              </a:tabLst>
+            </a:pPr>
+            <a:fld id="{25B94CD5-D627-49BE-818E-4A00F2BB16DF}" type="slidenum">
+              <a:rPr lang="it" sz="1000" b="0" strike="noStrike" spc="-1">
+                <a:solidFill>
+                  <a:srgbClr val="595959"/>
+                </a:solidFill>
+                <a:latin typeface="Arial"/>
+                <a:ea typeface="Arial"/>
+              </a:rPr>
+              <a:t>36</a:t>
+            </a:fld>
+            <a:endParaRPr lang="it-IT" sz="1000" b="0" strike="noStrike" spc="-1">
+              <a:latin typeface="Times New Roman"/>
+            </a:endParaRPr>
+          </a:p>
+        </p:txBody>
+      </p:sp>
+      <p:sp>
+        <p:nvSpPr>
+          <p:cNvPr id="7" name="CasellaDiTesto 6">
+            <a:extLst>
+              <a:ext uri="{FF2B5EF4-FFF2-40B4-BE49-F238E27FC236}">
+                <a16:creationId xmlns:a16="http://schemas.microsoft.com/office/drawing/2014/main" id="{3AB702D8-9198-F185-BAA8-23304A23522E}"/>
+              </a:ext>
+            </a:extLst>
+          </p:cNvPr>
+          <p:cNvSpPr txBox="1"/>
+          <p:nvPr/>
+        </p:nvSpPr>
+        <p:spPr>
+          <a:xfrm>
+            <a:off x="1063027" y="844449"/>
+            <a:ext cx="7017946" cy="523220"/>
+          </a:xfrm>
+          <a:prstGeom prst="rect">
+            <a:avLst/>
+          </a:prstGeom>
+          <a:noFill/>
+        </p:spPr>
+        <p:txBody>
+          <a:bodyPr wrap="square" rtlCol="0">
+            <a:spAutoFit/>
+          </a:bodyPr>
+          <a:lstStyle/>
+          <a:p>
+            <a:pPr algn="ctr"/>
+            <a:r>
+              <a:rPr lang="it-IT" sz="1400" b="1" dirty="0"/>
+              <a:t>Figure</a:t>
+            </a:r>
+            <a:r>
+              <a:rPr lang="it-IT" sz="1400" b="1" dirty="0">
+                <a:solidFill>
+                  <a:srgbClr val="FF0000"/>
+                </a:solidFill>
+              </a:rPr>
+              <a:t> h</a:t>
+            </a:r>
+            <a:r>
+              <a:rPr lang="it-IT" sz="1400" b="1" dirty="0"/>
+              <a:t>: </a:t>
+            </a:r>
+            <a:r>
+              <a:rPr lang="it-IT" sz="1400" dirty="0"/>
+              <a:t>learning </a:t>
+            </a:r>
+            <a:r>
+              <a:rPr lang="it-IT" sz="1400" dirty="0" err="1"/>
+              <a:t>curves</a:t>
+            </a:r>
+            <a:r>
+              <a:rPr lang="it-IT" sz="1400" dirty="0"/>
+              <a:t> for the SVM (</a:t>
+            </a:r>
+            <a:r>
+              <a:rPr lang="it-IT" sz="1400" dirty="0" err="1"/>
+              <a:t>right</a:t>
+            </a:r>
+            <a:r>
+              <a:rPr lang="it-IT" sz="1400" dirty="0"/>
+              <a:t>) and RF (</a:t>
+            </a:r>
+            <a:r>
+              <a:rPr lang="it-IT" sz="1400" dirty="0" err="1"/>
+              <a:t>left</a:t>
+            </a:r>
+            <a:r>
+              <a:rPr lang="it-IT" sz="1400" dirty="0"/>
+              <a:t>) with the best </a:t>
+            </a:r>
+            <a:r>
+              <a:rPr lang="it-IT" sz="1400" dirty="0" err="1"/>
+              <a:t>hyperparameters</a:t>
+            </a:r>
+            <a:r>
+              <a:rPr lang="it-IT" sz="1400" dirty="0"/>
+              <a:t> </a:t>
+            </a:r>
+            <a:r>
+              <a:rPr lang="it-IT" sz="1400" dirty="0" err="1"/>
+              <a:t>found</a:t>
+            </a:r>
+            <a:r>
+              <a:rPr lang="it-IT" sz="1400" dirty="0"/>
+              <a:t> in </a:t>
+            </a:r>
+            <a:r>
+              <a:rPr lang="it-IT" sz="1400" dirty="0" err="1"/>
+              <a:t>their</a:t>
+            </a:r>
+            <a:r>
+              <a:rPr lang="it-IT" sz="1400" dirty="0"/>
+              <a:t> </a:t>
+            </a:r>
+            <a:r>
+              <a:rPr lang="it-IT" sz="1400" dirty="0" err="1"/>
+              <a:t>respective</a:t>
+            </a:r>
+            <a:r>
+              <a:rPr lang="it-IT" sz="1400" dirty="0"/>
+              <a:t> </a:t>
+            </a:r>
+            <a:r>
+              <a:rPr lang="it-IT" sz="1400" dirty="0" err="1"/>
+              <a:t>grid</a:t>
+            </a:r>
+            <a:r>
+              <a:rPr lang="it-IT" sz="1400" dirty="0"/>
+              <a:t> </a:t>
+            </a:r>
+            <a:r>
+              <a:rPr lang="it-IT" sz="1400" dirty="0" err="1"/>
+              <a:t>searches</a:t>
+            </a:r>
+            <a:r>
+              <a:rPr lang="it-IT" sz="1400" dirty="0"/>
+              <a:t>.</a:t>
+            </a:r>
+          </a:p>
+        </p:txBody>
+      </p:sp>
+      <p:sp>
+        <p:nvSpPr>
+          <p:cNvPr id="8" name="CasellaDiTesto 7">
+            <a:extLst>
+              <a:ext uri="{FF2B5EF4-FFF2-40B4-BE49-F238E27FC236}">
+                <a16:creationId xmlns:a16="http://schemas.microsoft.com/office/drawing/2014/main" id="{228AE065-2317-BB0F-4DA3-99B9C7F859AF}"/>
+              </a:ext>
+            </a:extLst>
+          </p:cNvPr>
+          <p:cNvSpPr txBox="1"/>
+          <p:nvPr/>
+        </p:nvSpPr>
+        <p:spPr>
+          <a:xfrm>
+            <a:off x="357406" y="3805518"/>
+            <a:ext cx="8428828" cy="738664"/>
+          </a:xfrm>
+          <a:prstGeom prst="rect">
+            <a:avLst/>
+          </a:prstGeom>
+          <a:noFill/>
+        </p:spPr>
+        <p:txBody>
+          <a:bodyPr wrap="square" rtlCol="0">
+            <a:spAutoFit/>
+          </a:bodyPr>
+          <a:lstStyle/>
+          <a:p>
+            <a:r>
+              <a:rPr lang="it-IT" sz="1400" dirty="0"/>
+              <a:t>The learning </a:t>
+            </a:r>
+            <a:r>
+              <a:rPr lang="it-IT" sz="1400" dirty="0" err="1"/>
+              <a:t>curves</a:t>
+            </a:r>
+            <a:r>
+              <a:rPr lang="it-IT" sz="1400" dirty="0"/>
+              <a:t> are </a:t>
+            </a:r>
+            <a:r>
+              <a:rPr lang="it-IT" sz="1400" dirty="0" err="1"/>
+              <a:t>obtained</a:t>
+            </a:r>
+            <a:r>
+              <a:rPr lang="it-IT" sz="1400" dirty="0"/>
+              <a:t> </a:t>
+            </a:r>
+            <a:r>
+              <a:rPr lang="it-IT" sz="1400" dirty="0" err="1"/>
+              <a:t>through</a:t>
+            </a:r>
+            <a:r>
+              <a:rPr lang="it-IT" sz="1400" dirty="0"/>
+              <a:t> </a:t>
+            </a:r>
+            <a:r>
+              <a:rPr lang="it-IT" sz="1400" dirty="0" err="1"/>
+              <a:t>Scikit-Learn’s</a:t>
+            </a:r>
+            <a:r>
+              <a:rPr lang="it-IT" sz="1400" dirty="0"/>
+              <a:t> </a:t>
+            </a:r>
+            <a:r>
+              <a:rPr lang="it-IT" sz="1400" dirty="0" err="1">
+                <a:latin typeface="Consolas" panose="020B0609020204030204" pitchFamily="49" charset="0"/>
+              </a:rPr>
+              <a:t>learning_curve</a:t>
+            </a:r>
+            <a:r>
+              <a:rPr lang="it-IT" sz="1400" dirty="0"/>
+              <a:t> </a:t>
+            </a:r>
+            <a:r>
+              <a:rPr lang="it-IT" sz="1400" dirty="0" err="1"/>
+              <a:t>function</a:t>
+            </a:r>
+            <a:r>
+              <a:rPr lang="en-US" sz="1400" dirty="0"/>
+              <a:t>. The function performs 5-fold CV on increasingly big portions of the design set, to determine cross-validated training and validation scores. The curve tells how well the model scales as the amount of data increases.</a:t>
+            </a:r>
+            <a:endParaRPr lang="it-IT" sz="1400" dirty="0"/>
+          </a:p>
+        </p:txBody>
+      </p:sp>
+      <p:pic>
+        <p:nvPicPr>
+          <p:cNvPr id="10" name="Immagine 9" descr="Immagine che contiene testo, schermata, linea, Diagramma&#10;&#10;Descrizione generata automaticamente">
+            <a:extLst>
+              <a:ext uri="{FF2B5EF4-FFF2-40B4-BE49-F238E27FC236}">
+                <a16:creationId xmlns:a16="http://schemas.microsoft.com/office/drawing/2014/main" id="{1B1134FF-7FDA-0381-70C1-E91BCC6DFBF9}"/>
+              </a:ext>
+            </a:extLst>
+          </p:cNvPr>
+          <p:cNvPicPr>
+            <a:picLocks noChangeAspect="1"/>
+          </p:cNvPicPr>
+          <p:nvPr/>
+        </p:nvPicPr>
+        <p:blipFill>
+          <a:blip r:embed="rId2">
+            <a:extLst>
+              <a:ext uri="{28A0092B-C50C-407E-A947-70E740481C1C}">
+                <a14:useLocalDpi xmlns:a14="http://schemas.microsoft.com/office/drawing/2010/main" val="0"/>
+              </a:ext>
+            </a:extLst>
+          </a:blip>
+          <a:stretch>
+            <a:fillRect/>
+          </a:stretch>
+        </p:blipFill>
+        <p:spPr>
+          <a:xfrm>
+            <a:off x="4800786" y="1363116"/>
+            <a:ext cx="3091932" cy="2318950"/>
+          </a:xfrm>
+          <a:prstGeom prst="rect">
+            <a:avLst/>
+          </a:prstGeom>
+          <a:ln>
+            <a:noFill/>
+          </a:ln>
+        </p:spPr>
+      </p:pic>
+      <p:pic>
+        <p:nvPicPr>
+          <p:cNvPr id="12" name="Immagine 11" descr="Immagine che contiene testo, linea, Diagramma, schermata&#10;&#10;Descrizione generata automaticamente">
+            <a:extLst>
+              <a:ext uri="{FF2B5EF4-FFF2-40B4-BE49-F238E27FC236}">
+                <a16:creationId xmlns:a16="http://schemas.microsoft.com/office/drawing/2014/main" id="{ED04E057-F57F-7FCD-2324-CA66AC089C84}"/>
+              </a:ext>
+            </a:extLst>
+          </p:cNvPr>
+          <p:cNvPicPr>
+            <a:picLocks noChangeAspect="1"/>
+          </p:cNvPicPr>
+          <p:nvPr/>
+        </p:nvPicPr>
+        <p:blipFill>
+          <a:blip r:embed="rId3">
+            <a:extLst>
+              <a:ext uri="{28A0092B-C50C-407E-A947-70E740481C1C}">
+                <a14:useLocalDpi xmlns:a14="http://schemas.microsoft.com/office/drawing/2010/main" val="0"/>
+              </a:ext>
+            </a:extLst>
+          </a:blip>
+          <a:stretch>
+            <a:fillRect/>
+          </a:stretch>
+        </p:blipFill>
+        <p:spPr>
+          <a:xfrm>
+            <a:off x="1251286" y="1363116"/>
+            <a:ext cx="3091930" cy="2318948"/>
+          </a:xfrm>
+          <a:prstGeom prst="rect">
+            <a:avLst/>
+          </a:prstGeom>
+          <a:ln>
+            <a:noFill/>
+          </a:ln>
+        </p:spPr>
+      </p:pic>
+      <p:sp>
+        <p:nvSpPr>
+          <p:cNvPr id="13" name="CasellaDiTesto 12">
+            <a:extLst>
+              <a:ext uri="{FF2B5EF4-FFF2-40B4-BE49-F238E27FC236}">
+                <a16:creationId xmlns:a16="http://schemas.microsoft.com/office/drawing/2014/main" id="{1ADA2139-9605-20F2-7D00-C7CECABC50B7}"/>
+              </a:ext>
+            </a:extLst>
+          </p:cNvPr>
+          <p:cNvSpPr txBox="1"/>
+          <p:nvPr/>
+        </p:nvSpPr>
+        <p:spPr>
+          <a:xfrm>
+            <a:off x="357406" y="4544182"/>
+            <a:ext cx="6851277" cy="307777"/>
+          </a:xfrm>
+          <a:prstGeom prst="rect">
+            <a:avLst/>
+          </a:prstGeom>
+          <a:noFill/>
+        </p:spPr>
+        <p:txBody>
+          <a:bodyPr wrap="square" rtlCol="0">
+            <a:spAutoFit/>
+          </a:bodyPr>
+          <a:lstStyle/>
+          <a:p>
+            <a:r>
+              <a:rPr lang="it-IT" sz="1400" dirty="0"/>
+              <a:t>In </a:t>
+            </a:r>
+            <a:r>
+              <a:rPr lang="it-IT" sz="1400" dirty="0" err="1"/>
+              <a:t>our</a:t>
+            </a:r>
+            <a:r>
+              <a:rPr lang="it-IT" sz="1400" dirty="0"/>
+              <a:t> notebooks, </a:t>
+            </a:r>
+            <a:r>
+              <a:rPr lang="it-IT" sz="1400" dirty="0" err="1"/>
+              <a:t>alsoother</a:t>
+            </a:r>
+            <a:r>
+              <a:rPr lang="it-IT" sz="1400" dirty="0"/>
+              <a:t> </a:t>
+            </a:r>
+            <a:r>
+              <a:rPr lang="it-IT" sz="1400" dirty="0" err="1"/>
+              <a:t>metrics</a:t>
+            </a:r>
+            <a:r>
+              <a:rPr lang="it-IT" sz="1400" dirty="0"/>
+              <a:t> to </a:t>
+            </a:r>
+            <a:r>
+              <a:rPr lang="it-IT" sz="1400" dirty="0" err="1"/>
+              <a:t>measure</a:t>
+            </a:r>
+            <a:r>
+              <a:rPr lang="it-IT" sz="1400" dirty="0"/>
+              <a:t> the </a:t>
+            </a:r>
+            <a:r>
+              <a:rPr lang="it-IT" sz="1400" dirty="0" err="1"/>
+              <a:t>error</a:t>
+            </a:r>
+            <a:r>
+              <a:rPr lang="it-IT" sz="1400" dirty="0"/>
+              <a:t> are </a:t>
+            </a:r>
+            <a:r>
+              <a:rPr lang="it-IT" sz="1400" dirty="0" err="1"/>
+              <a:t>used</a:t>
+            </a:r>
+            <a:r>
+              <a:rPr lang="it-IT" sz="1400" dirty="0"/>
+              <a:t>.</a:t>
+            </a:r>
+          </a:p>
+        </p:txBody>
+      </p:sp>
+    </p:spTree>
+    <p:extLst>
+      <p:ext uri="{BB962C8B-B14F-4D97-AF65-F5344CB8AC3E}">
+        <p14:creationId xmlns:p14="http://schemas.microsoft.com/office/powerpoint/2010/main" val="1867238118"/>
       </p:ext>
     </p:extLst>
   </p:cSld>
@@ -34247,7 +35543,17 @@
                 <a:latin typeface="Arial"/>
                 <a:ea typeface="Arial"/>
               </a:rPr>
-              <a:t>MONK 1 Results</a:t>
+              <a:t>MONK 1 Results </a:t>
+            </a:r>
+            <a:r>
+              <a:rPr lang="it" sz="2700" b="0" strike="noStrike" spc="-1" dirty="0">
+                <a:solidFill>
+                  <a:srgbClr val="FF0000"/>
+                </a:solidFill>
+                <a:latin typeface="Arial"/>
+                <a:ea typeface="Arial"/>
+              </a:rPr>
+              <a:t>STDEVS</a:t>
             </a:r>
             <a:endParaRPr lang="it-IT" sz="2800" b="0" strike="noStrike" spc="-1" dirty="0">
               <a:solidFill>
@@ -34344,14 +35650,14 @@
           <p:nvPr>
             <p:extLst>
               <p:ext uri="{D42A27DB-BD31-4B8C-83A1-F6EECF244321}">
-                <p14:modId xmlns:p14="http://schemas.microsoft.com/office/powerpoint/2010/main" val="1289451719"/>
+                <p14:modId xmlns:p14="http://schemas.microsoft.com/office/powerpoint/2010/main" val="1181397262"/>
               </p:ext>
             </p:extLst>
           </p:nvPr>
         </p:nvGraphicFramePr>
         <p:xfrm>
           <a:off x="311758" y="853397"/>
-          <a:ext cx="8520116" cy="883920"/>
+          <a:ext cx="8520116" cy="1097280"/>
         </p:xfrm>
         <a:graphic>
           <a:graphicData uri="http://schemas.openxmlformats.org/drawingml/2006/table">
@@ -34711,7 +36017,7 @@
                       <a:pPr algn="ctr"/>
                       <a:r>
                         <a:rPr lang="it-IT" sz="1400" i="1" dirty="0"/>
-                        <a:t>0.060 </a:t>
+                        <a:t>0.060± </a:t>
                       </a:r>
                       <a:r>
                         <a:rPr lang="it-IT" sz="1400" i="0" dirty="0"/>
@@ -34719,7 +36025,7 @@
                       </a:r>
                       <a:r>
                         <a:rPr lang="it-IT" sz="1400" i="1" dirty="0"/>
-                        <a:t>  0.059</a:t>
+                        <a:t>  0.059±</a:t>
                       </a:r>
                     </a:p>
                   </a:txBody>
@@ -34733,7 +36039,7 @@
                       <a:pPr algn="ctr"/>
                       <a:r>
                         <a:rPr lang="it-IT" sz="1400" i="1" dirty="0"/>
-                        <a:t>100% </a:t>
+                        <a:t>100%±0% </a:t>
                       </a:r>
                       <a:r>
                         <a:rPr lang="it-IT" sz="1400" i="0" dirty="0"/>
@@ -34741,7 +36047,7 @@
                       </a:r>
                       <a:r>
                         <a:rPr lang="it-IT" sz="1400" i="1" dirty="0"/>
-                        <a:t> 100% </a:t>
+                        <a:t> 100%±0%</a:t>
                       </a:r>
                     </a:p>
                   </a:txBody>
@@ -35048,7 +36354,17 @@
                 <a:latin typeface="Arial"/>
                 <a:ea typeface="Arial"/>
               </a:rPr>
-              <a:t>MONK 2 Results</a:t>
+              <a:t>MONK 2 Results </a:t>
+            </a:r>
+            <a:r>
+              <a:rPr lang="it" sz="2700" b="0" strike="noStrike" spc="-1" dirty="0">
+                <a:solidFill>
+                  <a:srgbClr val="FF0000"/>
+                </a:solidFill>
+                <a:latin typeface="Arial"/>
+                <a:ea typeface="Arial"/>
+              </a:rPr>
+              <a:t>STDEVS</a:t>
             </a:r>
             <a:endParaRPr lang="it-IT" sz="2800" b="0" strike="noStrike" spc="-1" dirty="0">
               <a:solidFill>

</xml_diff>

<commit_message>
Added data exploration in the presentation
</commit_message>
<xml_diff>
--- a/relazione/ML-2023-PRJ-Slides-Demo.pptx
+++ b/relazione/ML-2023-PRJ-Slides-Demo.pptx
@@ -6,7 +6,7 @@
     <p:sldMasterId id="2147483661" r:id="rId2"/>
   </p:sldMasterIdLst>
   <p:notesMasterIdLst>
-    <p:notesMasterId r:id="rId40"/>
+    <p:notesMasterId r:id="rId42"/>
   </p:notesMasterIdLst>
   <p:sldIdLst>
     <p:sldId id="256" r:id="rId3"/>
@@ -45,7 +45,9 @@
     <p:sldId id="284" r:id="rId36"/>
     <p:sldId id="286" r:id="rId37"/>
     <p:sldId id="295" r:id="rId38"/>
-    <p:sldId id="296" r:id="rId39"/>
+    <p:sldId id="298" r:id="rId39"/>
+    <p:sldId id="299" r:id="rId40"/>
+    <p:sldId id="296" r:id="rId41"/>
   </p:sldIdLst>
   <p:sldSz cx="9144000" cy="5143500" type="screen16x9"/>
   <p:notesSz cx="6858000" cy="9144000"/>
@@ -234,7 +236,7 @@
           <a:p>
             <a:fld id="{6A71CC8E-465E-46C0-91CA-2080D1264305}" type="datetimeFigureOut">
               <a:rPr lang="it-IT" smtClean="0"/>
-              <a:t>25/01/2024</a:t>
+              <a:t>26/01/2024</a:t>
             </a:fld>
             <a:endParaRPr lang="it-IT"/>
           </a:p>
@@ -7032,6 +7034,422 @@
           </a:p>
         </p:txBody>
       </p:sp>
+      <p:sp>
+        <p:nvSpPr>
+          <p:cNvPr id="2" name="CasellaDiTesto 1">
+            <a:extLst>
+              <a:ext uri="{FF2B5EF4-FFF2-40B4-BE49-F238E27FC236}">
+                <a16:creationId xmlns:a16="http://schemas.microsoft.com/office/drawing/2014/main" id="{892468B4-F8AC-F0EF-CDC6-32B6FE85A30B}"/>
+              </a:ext>
+            </a:extLst>
+          </p:cNvPr>
+          <p:cNvSpPr txBox="1"/>
+          <p:nvPr/>
+        </p:nvSpPr>
+        <p:spPr>
+          <a:xfrm>
+            <a:off x="311188" y="578700"/>
+            <a:ext cx="8520120" cy="307777"/>
+          </a:xfrm>
+          <a:prstGeom prst="rect">
+            <a:avLst/>
+          </a:prstGeom>
+          <a:noFill/>
+        </p:spPr>
+        <p:txBody>
+          <a:bodyPr wrap="square" rtlCol="0">
+            <a:spAutoFit/>
+          </a:bodyPr>
+          <a:lstStyle/>
+          <a:p>
+            <a:r>
+              <a:rPr lang="it-IT" sz="1400" dirty="0" err="1"/>
+              <a:t>It</a:t>
+            </a:r>
+            <a:r>
+              <a:rPr lang="it-IT" sz="1400" dirty="0"/>
+              <a:t> </a:t>
+            </a:r>
+            <a:r>
+              <a:rPr lang="it-IT" sz="1400" dirty="0" err="1"/>
+              <a:t>is</a:t>
+            </a:r>
+            <a:r>
+              <a:rPr lang="it-IT" sz="1400" dirty="0"/>
+              <a:t> a good practice to </a:t>
+            </a:r>
+            <a:r>
+              <a:rPr lang="it-IT" sz="1400" dirty="0" err="1"/>
+              <a:t>explore</a:t>
+            </a:r>
+            <a:r>
+              <a:rPr lang="it-IT" sz="1400" dirty="0"/>
+              <a:t> the dataset </a:t>
+            </a:r>
+            <a:r>
+              <a:rPr lang="it-IT" sz="1400" dirty="0" err="1"/>
+              <a:t>before</a:t>
+            </a:r>
+            <a:r>
+              <a:rPr lang="it-IT" sz="1400" dirty="0"/>
+              <a:t> making </a:t>
+            </a:r>
+            <a:r>
+              <a:rPr lang="it-IT" sz="1400" dirty="0" err="1"/>
+              <a:t>choices</a:t>
+            </a:r>
+            <a:r>
+              <a:rPr lang="it-IT" sz="1400" dirty="0"/>
+              <a:t> </a:t>
+            </a:r>
+            <a:r>
+              <a:rPr lang="it-IT" sz="1400" dirty="0" err="1"/>
+              <a:t>that</a:t>
+            </a:r>
+            <a:r>
+              <a:rPr lang="it-IT" sz="1400" dirty="0"/>
+              <a:t> </a:t>
+            </a:r>
+            <a:r>
+              <a:rPr lang="it-IT" sz="1400" dirty="0" err="1"/>
+              <a:t>concern</a:t>
+            </a:r>
+            <a:r>
+              <a:rPr lang="it-IT" sz="1400" dirty="0"/>
+              <a:t> ML models.</a:t>
+            </a:r>
+          </a:p>
+        </p:txBody>
+      </p:sp>
+      <p:sp>
+        <p:nvSpPr>
+          <p:cNvPr id="3" name="CasellaDiTesto 2">
+            <a:extLst>
+              <a:ext uri="{FF2B5EF4-FFF2-40B4-BE49-F238E27FC236}">
+                <a16:creationId xmlns:a16="http://schemas.microsoft.com/office/drawing/2014/main" id="{D1281169-C640-1A5B-FD30-9A9BA132BEBF}"/>
+              </a:ext>
+            </a:extLst>
+          </p:cNvPr>
+          <p:cNvSpPr txBox="1"/>
+          <p:nvPr/>
+        </p:nvSpPr>
+        <p:spPr>
+          <a:xfrm>
+            <a:off x="311187" y="3826136"/>
+            <a:ext cx="8520120" cy="954107"/>
+          </a:xfrm>
+          <a:prstGeom prst="rect">
+            <a:avLst/>
+          </a:prstGeom>
+          <a:noFill/>
+        </p:spPr>
+        <p:txBody>
+          <a:bodyPr wrap="square" rtlCol="0">
+            <a:spAutoFit/>
+          </a:bodyPr>
+          <a:lstStyle/>
+          <a:p>
+            <a:r>
+              <a:rPr lang="it-IT" sz="1400" dirty="0"/>
+              <a:t>The test set and the training set show </a:t>
+            </a:r>
+            <a:r>
+              <a:rPr lang="it-IT" sz="1400" dirty="0" err="1"/>
+              <a:t>similar</a:t>
+            </a:r>
+            <a:r>
+              <a:rPr lang="it-IT" sz="1400" dirty="0"/>
+              <a:t> features </a:t>
+            </a:r>
+            <a:r>
+              <a:rPr lang="it-IT" sz="1400" dirty="0" err="1"/>
+              <a:t>distribution</a:t>
+            </a:r>
+            <a:r>
+              <a:rPr lang="it-IT" sz="1400" dirty="0"/>
+              <a:t>, </a:t>
+            </a:r>
+            <a:r>
+              <a:rPr lang="it-IT" sz="1400" dirty="0" err="1"/>
+              <a:t>as</a:t>
+            </a:r>
+            <a:r>
+              <a:rPr lang="it-IT" sz="1400" dirty="0"/>
+              <a:t> Figure 4 shows. </a:t>
+            </a:r>
+            <a:r>
+              <a:rPr lang="it-IT" sz="1400" dirty="0" err="1"/>
+              <a:t>Furthermore</a:t>
+            </a:r>
+            <a:r>
+              <a:rPr lang="it-IT" sz="1400" dirty="0"/>
+              <a:t>, </a:t>
+            </a:r>
+            <a:r>
+              <a:rPr lang="it-IT" sz="1400" dirty="0" err="1"/>
+              <a:t>there</a:t>
+            </a:r>
+            <a:r>
+              <a:rPr lang="it-IT" sz="1400" dirty="0"/>
+              <a:t> </a:t>
+            </a:r>
+            <a:r>
+              <a:rPr lang="it-IT" sz="1400" dirty="0" err="1"/>
+              <a:t>aren’t</a:t>
+            </a:r>
+            <a:r>
+              <a:rPr lang="it-IT" sz="1400" dirty="0"/>
+              <a:t> cluster of test </a:t>
+            </a:r>
+            <a:r>
+              <a:rPr lang="it-IT" sz="1400" dirty="0" err="1"/>
+              <a:t>datapoints</a:t>
+            </a:r>
+            <a:r>
+              <a:rPr lang="it-IT" sz="1400" dirty="0"/>
+              <a:t> </a:t>
+            </a:r>
+            <a:r>
+              <a:rPr lang="it-IT" sz="1400" dirty="0" err="1"/>
+              <a:t>that</a:t>
+            </a:r>
+            <a:r>
+              <a:rPr lang="it-IT" sz="1400" dirty="0"/>
+              <a:t> are </a:t>
+            </a:r>
+            <a:r>
+              <a:rPr lang="it-IT" sz="1400" dirty="0" err="1"/>
+              <a:t>separated</a:t>
+            </a:r>
+            <a:r>
+              <a:rPr lang="it-IT" sz="1400" dirty="0"/>
+              <a:t> from the test set. </a:t>
+            </a:r>
+            <a:r>
+              <a:rPr lang="it-IT" sz="1400" dirty="0" err="1"/>
+              <a:t>That</a:t>
+            </a:r>
+            <a:r>
+              <a:rPr lang="it-IT" sz="1400" dirty="0"/>
+              <a:t> </a:t>
+            </a:r>
+            <a:r>
+              <a:rPr lang="it-IT" sz="1400" dirty="0" err="1"/>
+              <a:t>is</a:t>
+            </a:r>
+            <a:r>
+              <a:rPr lang="it-IT" sz="1400" dirty="0"/>
+              <a:t>, the test set </a:t>
+            </a:r>
+            <a:r>
+              <a:rPr lang="it-IT" sz="1400" dirty="0" err="1"/>
+              <a:t>is</a:t>
+            </a:r>
+            <a:r>
+              <a:rPr lang="it-IT" sz="1400" dirty="0"/>
+              <a:t> </a:t>
+            </a:r>
+            <a:r>
+              <a:rPr lang="it-IT" sz="1400" dirty="0" err="1"/>
+              <a:t>well</a:t>
+            </a:r>
+            <a:r>
+              <a:rPr lang="it-IT" sz="1400" dirty="0"/>
+              <a:t> </a:t>
+            </a:r>
+            <a:r>
+              <a:rPr lang="it-IT" sz="1400" dirty="0" err="1"/>
+              <a:t>represented</a:t>
+            </a:r>
+            <a:r>
+              <a:rPr lang="it-IT" sz="1400" dirty="0"/>
+              <a:t> by the training set.</a:t>
+            </a:r>
+          </a:p>
+          <a:p>
+            <a:r>
+              <a:rPr lang="it-IT" sz="1400" dirty="0" err="1"/>
+              <a:t>Our</a:t>
+            </a:r>
+            <a:r>
+              <a:rPr lang="it-IT" sz="1400" dirty="0"/>
+              <a:t> </a:t>
+            </a:r>
+            <a:r>
+              <a:rPr lang="it-IT" sz="1400" dirty="0" err="1"/>
+              <a:t>exploration</a:t>
+            </a:r>
+            <a:r>
+              <a:rPr lang="it-IT" sz="1400" dirty="0"/>
+              <a:t> </a:t>
+            </a:r>
+            <a:r>
+              <a:rPr lang="it-IT" sz="1400" dirty="0" err="1"/>
+              <a:t>also</a:t>
+            </a:r>
+            <a:r>
+              <a:rPr lang="it-IT" sz="1400" dirty="0"/>
+              <a:t> </a:t>
+            </a:r>
+            <a:r>
+              <a:rPr lang="it-IT" sz="1400" dirty="0" err="1"/>
+              <a:t>focused</a:t>
+            </a:r>
+            <a:r>
+              <a:rPr lang="it-IT" sz="1400" dirty="0"/>
+              <a:t> on the </a:t>
+            </a:r>
+            <a:r>
+              <a:rPr lang="it-IT" sz="1400" dirty="0" err="1"/>
+              <a:t>detection</a:t>
+            </a:r>
+            <a:r>
+              <a:rPr lang="it-IT" sz="1400" dirty="0"/>
+              <a:t> of </a:t>
+            </a:r>
+            <a:r>
+              <a:rPr lang="it-IT" sz="1400" dirty="0" err="1"/>
+              <a:t>eventual</a:t>
+            </a:r>
+            <a:r>
+              <a:rPr lang="it-IT" sz="1400" dirty="0"/>
+              <a:t> </a:t>
+            </a:r>
+            <a:r>
+              <a:rPr lang="it-IT" sz="1400" dirty="0" err="1"/>
+              <a:t>outliers</a:t>
+            </a:r>
+            <a:r>
+              <a:rPr lang="it-IT" sz="1400" dirty="0"/>
+              <a:t> (</a:t>
+            </a:r>
+            <a:r>
+              <a:rPr lang="it-IT" sz="1400" dirty="0" err="1"/>
+              <a:t>see</a:t>
+            </a:r>
+            <a:r>
+              <a:rPr lang="it-IT" sz="1400" dirty="0"/>
+              <a:t> </a:t>
+            </a:r>
+            <a:r>
+              <a:rPr lang="it-IT" sz="1400" dirty="0" err="1"/>
+              <a:t>Appendix</a:t>
+            </a:r>
+            <a:r>
+              <a:rPr lang="it-IT" sz="1400" dirty="0"/>
+              <a:t> for </a:t>
+            </a:r>
+            <a:r>
+              <a:rPr lang="it-IT" sz="1400" dirty="0" err="1"/>
+              <a:t>all</a:t>
+            </a:r>
+            <a:r>
+              <a:rPr lang="it-IT" sz="1400" dirty="0"/>
+              <a:t> the </a:t>
+            </a:r>
+            <a:r>
+              <a:rPr lang="it-IT" sz="1400" dirty="0" err="1"/>
+              <a:t>details</a:t>
+            </a:r>
+            <a:r>
+              <a:rPr lang="it-IT" sz="1400" dirty="0"/>
+              <a:t>). </a:t>
+            </a:r>
+          </a:p>
+        </p:txBody>
+      </p:sp>
+      <p:pic>
+        <p:nvPicPr>
+          <p:cNvPr id="9" name="Immagine 8" descr="Immagine che contiene testo, diagramma, schermata, Diagramma&#10;&#10;Descrizione generata automaticamente">
+            <a:extLst>
+              <a:ext uri="{FF2B5EF4-FFF2-40B4-BE49-F238E27FC236}">
+                <a16:creationId xmlns:a16="http://schemas.microsoft.com/office/drawing/2014/main" id="{192A5668-F2C8-2AE6-316D-B645720E65AC}"/>
+              </a:ext>
+            </a:extLst>
+          </p:cNvPr>
+          <p:cNvPicPr>
+            <a:picLocks noChangeAspect="1"/>
+          </p:cNvPicPr>
+          <p:nvPr/>
+        </p:nvPicPr>
+        <p:blipFill>
+          <a:blip r:embed="rId2" cstate="print">
+            <a:extLst>
+              <a:ext uri="{28A0092B-C50C-407E-A947-70E740481C1C}">
+                <a14:useLocalDpi xmlns:a14="http://schemas.microsoft.com/office/drawing/2010/main" val="0"/>
+              </a:ext>
+            </a:extLst>
+          </a:blip>
+          <a:stretch>
+            <a:fillRect/>
+          </a:stretch>
+        </p:blipFill>
+        <p:spPr>
+          <a:xfrm>
+            <a:off x="311187" y="1048189"/>
+            <a:ext cx="5049370" cy="2524685"/>
+          </a:xfrm>
+          <a:prstGeom prst="rect">
+            <a:avLst/>
+          </a:prstGeom>
+          <a:ln>
+            <a:noFill/>
+          </a:ln>
+        </p:spPr>
+      </p:pic>
+      <p:sp>
+        <p:nvSpPr>
+          <p:cNvPr id="10" name="CasellaDiTesto 9">
+            <a:extLst>
+              <a:ext uri="{FF2B5EF4-FFF2-40B4-BE49-F238E27FC236}">
+                <a16:creationId xmlns:a16="http://schemas.microsoft.com/office/drawing/2014/main" id="{A25D934A-12BE-9720-E07D-D7D645509474}"/>
+              </a:ext>
+            </a:extLst>
+          </p:cNvPr>
+          <p:cNvSpPr txBox="1"/>
+          <p:nvPr/>
+        </p:nvSpPr>
+        <p:spPr>
+          <a:xfrm>
+            <a:off x="5360557" y="1154018"/>
+            <a:ext cx="1946642" cy="954107"/>
+          </a:xfrm>
+          <a:prstGeom prst="rect">
+            <a:avLst/>
+          </a:prstGeom>
+          <a:noFill/>
+        </p:spPr>
+        <p:txBody>
+          <a:bodyPr wrap="square" rtlCol="0">
+            <a:spAutoFit/>
+          </a:bodyPr>
+          <a:lstStyle/>
+          <a:p>
+            <a:r>
+              <a:rPr lang="it-IT" sz="1400" b="1" dirty="0"/>
+              <a:t>Figure 4</a:t>
+            </a:r>
+            <a:r>
+              <a:rPr lang="it-IT" sz="1400" dirty="0"/>
+              <a:t>: </a:t>
+            </a:r>
+          </a:p>
+          <a:p>
+            <a:r>
+              <a:rPr lang="it-IT" sz="1400" dirty="0"/>
+              <a:t>Features </a:t>
+            </a:r>
+            <a:r>
+              <a:rPr lang="it-IT" sz="1400" dirty="0" err="1"/>
+              <a:t>distribution</a:t>
+            </a:r>
+            <a:r>
+              <a:rPr lang="it-IT" sz="1400" dirty="0"/>
+              <a:t> for training and test data</a:t>
+            </a:r>
+          </a:p>
+        </p:txBody>
+      </p:sp>
     </p:spTree>
     <p:extLst>
       <p:ext uri="{BB962C8B-B14F-4D97-AF65-F5344CB8AC3E}">
@@ -13318,7 +13736,17 @@
                 <a:latin typeface="Arial"/>
                 <a:ea typeface="Arial"/>
               </a:rPr>
-              <a:t>Neural Network</a:t>
+              <a:t>Neural Network </a:t>
+            </a:r>
+            <a:r>
+              <a:rPr lang="it" sz="2400" spc="-1" dirty="0">
+                <a:solidFill>
+                  <a:srgbClr val="FF0000"/>
+                </a:solidFill>
+                <a:latin typeface="Arial"/>
+                <a:ea typeface="Arial"/>
+              </a:rPr>
+              <a:t>REVIEW</a:t>
             </a:r>
             <a:endParaRPr lang="it-IT" sz="2400" b="0" strike="noStrike" spc="-1" dirty="0">
               <a:solidFill>
@@ -13415,7 +13843,7 @@
           <p:nvPr>
             <p:extLst>
               <p:ext uri="{D42A27DB-BD31-4B8C-83A1-F6EECF244321}">
-                <p14:modId xmlns:p14="http://schemas.microsoft.com/office/powerpoint/2010/main" val="3595945855"/>
+                <p14:modId xmlns:p14="http://schemas.microsoft.com/office/powerpoint/2010/main" val="880572683"/>
               </p:ext>
             </p:extLst>
           </p:nvPr>
@@ -14293,7 +14721,7 @@
                       </a:r>
                       <a:r>
                         <a:rPr lang="it-IT" sz="1400" i="0" dirty="0"/>
-                        <a:t>( </a:t>
+                        <a:t>(</a:t>
                       </a:r>
                       <a:r>
                         <a:rPr lang="it-IT" sz="1400" i="1" dirty="0"/>
@@ -30898,7 +31326,7 @@
                 <a:latin typeface="Arial"/>
                 <a:ea typeface="Arial"/>
               </a:rPr>
-              <a:t>To assess</a:t>
+              <a:t>To assess: add ES in Optuna</a:t>
             </a:r>
             <a:br>
               <a:rPr lang="it" sz="2400" b="0" strike="noStrike" spc="-1" dirty="0">
@@ -33053,14 +33481,14 @@
               </a:rPr>
             </a:br>
             <a:r>
-              <a:rPr lang="it" sz="2000" b="0" strike="noStrike" spc="-1" dirty="0">
+              <a:rPr lang="it" sz="2000" spc="-1" dirty="0">
                 <a:solidFill>
                   <a:srgbClr val="3F3F3F"/>
                 </a:solidFill>
                 <a:latin typeface="Arial"/>
                 <a:ea typeface="Arial"/>
               </a:rPr>
-              <a:t>Learning curves for best SVM and best Random Forest</a:t>
+              <a:t>Further details on data exploration – 1</a:t>
             </a:r>
             <a:endParaRPr lang="it-IT" sz="2400" b="0" strike="noStrike" spc="-1" dirty="0">
               <a:solidFill>
@@ -33135,6 +33563,963 @@
                 <a:ea typeface="Arial"/>
               </a:rPr>
               <a:t>37</a:t>
+            </a:fld>
+            <a:endParaRPr lang="it-IT" sz="1000" b="0" strike="noStrike" spc="-1">
+              <a:latin typeface="Times New Roman"/>
+            </a:endParaRPr>
+          </a:p>
+        </p:txBody>
+      </p:sp>
+      <p:pic>
+        <p:nvPicPr>
+          <p:cNvPr id="3" name="Immagine 2">
+            <a:extLst>
+              <a:ext uri="{FF2B5EF4-FFF2-40B4-BE49-F238E27FC236}">
+                <a16:creationId xmlns:a16="http://schemas.microsoft.com/office/drawing/2014/main" id="{9AC73114-4B6A-15E8-F647-06D048B33640}"/>
+              </a:ext>
+            </a:extLst>
+          </p:cNvPr>
+          <p:cNvPicPr>
+            <a:picLocks noChangeAspect="1"/>
+          </p:cNvPicPr>
+          <p:nvPr/>
+        </p:nvPicPr>
+        <p:blipFill>
+          <a:blip r:embed="rId2"/>
+          <a:stretch>
+            <a:fillRect/>
+          </a:stretch>
+        </p:blipFill>
+        <p:spPr>
+          <a:xfrm>
+            <a:off x="5299900" y="2302001"/>
+            <a:ext cx="3172700" cy="2361079"/>
+          </a:xfrm>
+          <a:prstGeom prst="rect">
+            <a:avLst/>
+          </a:prstGeom>
+        </p:spPr>
+      </p:pic>
+      <p:sp>
+        <p:nvSpPr>
+          <p:cNvPr id="6" name="CasellaDiTesto 5">
+            <a:extLst>
+              <a:ext uri="{FF2B5EF4-FFF2-40B4-BE49-F238E27FC236}">
+                <a16:creationId xmlns:a16="http://schemas.microsoft.com/office/drawing/2014/main" id="{63283031-06F9-BAE2-5DC7-584BB5F3844C}"/>
+              </a:ext>
+            </a:extLst>
+          </p:cNvPr>
+          <p:cNvSpPr txBox="1"/>
+          <p:nvPr/>
+        </p:nvSpPr>
+        <p:spPr>
+          <a:xfrm>
+            <a:off x="311760" y="792000"/>
+            <a:ext cx="8520120" cy="954107"/>
+          </a:xfrm>
+          <a:prstGeom prst="rect">
+            <a:avLst/>
+          </a:prstGeom>
+          <a:noFill/>
+        </p:spPr>
+        <p:txBody>
+          <a:bodyPr wrap="square" rtlCol="0">
+            <a:spAutoFit/>
+          </a:bodyPr>
+          <a:lstStyle/>
+          <a:p>
+            <a:r>
+              <a:rPr lang="it-IT" sz="1400" dirty="0"/>
+              <a:t>Figure </a:t>
+            </a:r>
+            <a:r>
+              <a:rPr lang="it-IT" sz="1400" dirty="0">
+                <a:solidFill>
+                  <a:srgbClr val="FF0000"/>
+                </a:solidFill>
+              </a:rPr>
+              <a:t>t</a:t>
+            </a:r>
+            <a:r>
+              <a:rPr lang="it-IT" sz="1400" dirty="0"/>
+              <a:t> shows the </a:t>
+            </a:r>
+            <a:r>
+              <a:rPr lang="it-IT" sz="1400" dirty="0" err="1"/>
+              <a:t>effect</a:t>
+            </a:r>
+            <a:r>
+              <a:rPr lang="it-IT" sz="1400" dirty="0"/>
+              <a:t> of </a:t>
+            </a:r>
+            <a:r>
+              <a:rPr lang="it-IT" sz="1400" dirty="0" err="1"/>
+              <a:t>applying</a:t>
+            </a:r>
+            <a:r>
+              <a:rPr lang="it-IT" sz="1400" dirty="0"/>
+              <a:t> the UMAP </a:t>
+            </a:r>
+            <a:r>
+              <a:rPr lang="it-IT" sz="1400" dirty="0" err="1"/>
+              <a:t>dimensionality</a:t>
+            </a:r>
+            <a:r>
+              <a:rPr lang="it-IT" sz="1400" dirty="0"/>
+              <a:t> </a:t>
+            </a:r>
+            <a:r>
+              <a:rPr lang="it-IT" sz="1400" dirty="0" err="1"/>
+              <a:t>reduction</a:t>
+            </a:r>
+            <a:r>
+              <a:rPr lang="it-IT" sz="1400" dirty="0"/>
+              <a:t> technique to the ML23 training and blind test sets. </a:t>
+            </a:r>
+          </a:p>
+          <a:p>
+            <a:r>
+              <a:rPr lang="it-IT" sz="1400" dirty="0" err="1"/>
+              <a:t>This</a:t>
+            </a:r>
+            <a:r>
+              <a:rPr lang="it-IT" sz="1400" dirty="0"/>
+              <a:t> technique </a:t>
+            </a:r>
+            <a:r>
+              <a:rPr lang="it-IT" sz="1400" dirty="0" err="1"/>
+              <a:t>preserves</a:t>
+            </a:r>
+            <a:r>
+              <a:rPr lang="it-IT" sz="1400" dirty="0"/>
+              <a:t> data </a:t>
+            </a:r>
+            <a:r>
+              <a:rPr lang="it-IT" sz="1400" dirty="0" err="1"/>
+              <a:t>locality</a:t>
+            </a:r>
+            <a:r>
+              <a:rPr lang="it-IT" sz="1400" dirty="0"/>
+              <a:t>, </a:t>
+            </a:r>
+            <a:r>
+              <a:rPr lang="it-IT" sz="1400" dirty="0" err="1"/>
+              <a:t>therefore</a:t>
+            </a:r>
+            <a:r>
+              <a:rPr lang="it-IT" sz="1400" dirty="0"/>
+              <a:t> </a:t>
+            </a:r>
+            <a:r>
+              <a:rPr lang="it-IT" sz="1400" dirty="0" err="1"/>
+              <a:t>we</a:t>
+            </a:r>
+            <a:r>
+              <a:rPr lang="it-IT" sz="1400" dirty="0"/>
+              <a:t> can </a:t>
+            </a:r>
+            <a:r>
+              <a:rPr lang="it-IT" sz="1400" dirty="0" err="1"/>
+              <a:t>safely</a:t>
+            </a:r>
+            <a:r>
+              <a:rPr lang="it-IT" sz="1400" dirty="0"/>
+              <a:t> conclude </a:t>
+            </a:r>
+            <a:r>
+              <a:rPr lang="it-IT" sz="1400" dirty="0" err="1"/>
+              <a:t>that</a:t>
+            </a:r>
+            <a:r>
+              <a:rPr lang="it-IT" sz="1400" dirty="0"/>
+              <a:t> </a:t>
+            </a:r>
+            <a:r>
+              <a:rPr lang="it-IT" sz="1400" dirty="0" err="1"/>
+              <a:t>there</a:t>
+            </a:r>
+            <a:r>
+              <a:rPr lang="it-IT" sz="1400" dirty="0"/>
+              <a:t> </a:t>
+            </a:r>
+            <a:r>
+              <a:rPr lang="it-IT" sz="1400" dirty="0" err="1"/>
+              <a:t>aren’t</a:t>
+            </a:r>
+            <a:r>
+              <a:rPr lang="it-IT" sz="1400" dirty="0"/>
+              <a:t> clusters of data in the test set </a:t>
+            </a:r>
+            <a:r>
+              <a:rPr lang="it-IT" sz="1400" dirty="0" err="1"/>
+              <a:t>that</a:t>
+            </a:r>
+            <a:r>
+              <a:rPr lang="it-IT" sz="1400" dirty="0"/>
+              <a:t> are </a:t>
+            </a:r>
+            <a:r>
+              <a:rPr lang="it-IT" sz="1400" dirty="0" err="1"/>
+              <a:t>separated</a:t>
+            </a:r>
+            <a:r>
+              <a:rPr lang="it-IT" sz="1400" dirty="0"/>
+              <a:t> from the training data (</a:t>
+            </a:r>
+            <a:r>
+              <a:rPr lang="it-IT" sz="1400" dirty="0" err="1"/>
+              <a:t>since</a:t>
+            </a:r>
+            <a:r>
+              <a:rPr lang="it-IT" sz="1400" dirty="0"/>
+              <a:t> </a:t>
+            </a:r>
+            <a:r>
+              <a:rPr lang="it-IT" sz="1400" dirty="0" err="1"/>
+              <a:t>there</a:t>
+            </a:r>
+            <a:r>
+              <a:rPr lang="it-IT" sz="1400" dirty="0"/>
+              <a:t> are none in the mapping). </a:t>
+            </a:r>
+          </a:p>
+        </p:txBody>
+      </p:sp>
+      <p:sp>
+        <p:nvSpPr>
+          <p:cNvPr id="7" name="CasellaDiTesto 6">
+            <a:extLst>
+              <a:ext uri="{FF2B5EF4-FFF2-40B4-BE49-F238E27FC236}">
+                <a16:creationId xmlns:a16="http://schemas.microsoft.com/office/drawing/2014/main" id="{912E61AA-51EE-5798-9315-1F9CF65A6986}"/>
+              </a:ext>
+            </a:extLst>
+          </p:cNvPr>
+          <p:cNvSpPr txBox="1"/>
+          <p:nvPr/>
+        </p:nvSpPr>
+        <p:spPr>
+          <a:xfrm>
+            <a:off x="311760" y="1746107"/>
+            <a:ext cx="3917340" cy="738664"/>
+          </a:xfrm>
+          <a:prstGeom prst="rect">
+            <a:avLst/>
+          </a:prstGeom>
+          <a:noFill/>
+        </p:spPr>
+        <p:txBody>
+          <a:bodyPr wrap="square" rtlCol="0">
+            <a:spAutoFit/>
+          </a:bodyPr>
+          <a:lstStyle/>
+          <a:p>
+            <a:pPr algn="just"/>
+            <a:r>
+              <a:rPr lang="it-IT" sz="1400" dirty="0" err="1"/>
+              <a:t>This</a:t>
+            </a:r>
+            <a:r>
+              <a:rPr lang="it-IT" sz="1400" dirty="0"/>
+              <a:t> </a:t>
+            </a:r>
+            <a:r>
+              <a:rPr lang="it-IT" sz="1400" dirty="0" err="1"/>
+              <a:t>property</a:t>
+            </a:r>
+            <a:r>
+              <a:rPr lang="it-IT" sz="1400" dirty="0"/>
+              <a:t> </a:t>
+            </a:r>
+            <a:r>
+              <a:rPr lang="it-IT" sz="1400" dirty="0" err="1"/>
+              <a:t>motivates</a:t>
+            </a:r>
+            <a:r>
+              <a:rPr lang="it-IT" sz="1400" dirty="0"/>
+              <a:t> </a:t>
+            </a:r>
+            <a:r>
+              <a:rPr lang="it-IT" sz="1400" dirty="0" err="1"/>
+              <a:t>our</a:t>
+            </a:r>
+            <a:r>
+              <a:rPr lang="it-IT" sz="1400" dirty="0"/>
+              <a:t> </a:t>
+            </a:r>
+            <a:r>
+              <a:rPr lang="it-IT" sz="1400" dirty="0" err="1"/>
+              <a:t>choice</a:t>
+            </a:r>
+            <a:r>
+              <a:rPr lang="it-IT" sz="1400" dirty="0"/>
+              <a:t> of </a:t>
+            </a:r>
+            <a:r>
+              <a:rPr lang="it-IT" sz="1400" dirty="0" err="1"/>
+              <a:t>retraining</a:t>
+            </a:r>
+            <a:r>
+              <a:rPr lang="it-IT" sz="1400" dirty="0"/>
+              <a:t> the </a:t>
+            </a:r>
+            <a:r>
+              <a:rPr lang="it-IT" sz="1400" dirty="0" err="1"/>
+              <a:t>final</a:t>
+            </a:r>
+            <a:r>
+              <a:rPr lang="it-IT" sz="1400" dirty="0"/>
+              <a:t> model on the </a:t>
+            </a:r>
+            <a:r>
+              <a:rPr lang="it-IT" sz="1400" dirty="0" err="1"/>
+              <a:t>whole</a:t>
+            </a:r>
+            <a:r>
+              <a:rPr lang="it-IT" sz="1400" dirty="0"/>
+              <a:t> training dataset, </a:t>
+            </a:r>
+            <a:r>
+              <a:rPr lang="it-IT" sz="1400" dirty="0" err="1"/>
+              <a:t>as</a:t>
+            </a:r>
+            <a:r>
+              <a:rPr lang="it-IT" sz="1400" dirty="0"/>
+              <a:t> </a:t>
+            </a:r>
+            <a:r>
+              <a:rPr lang="it-IT" sz="1400" dirty="0" err="1"/>
+              <a:t>it</a:t>
+            </a:r>
+            <a:r>
+              <a:rPr lang="it-IT" sz="1400" dirty="0"/>
+              <a:t> </a:t>
+            </a:r>
+            <a:r>
+              <a:rPr lang="it-IT" sz="1400" dirty="0" err="1"/>
+              <a:t>well</a:t>
+            </a:r>
+            <a:r>
+              <a:rPr lang="it-IT" sz="1400" dirty="0"/>
+              <a:t> </a:t>
+            </a:r>
+            <a:r>
+              <a:rPr lang="it-IT" sz="1400" dirty="0" err="1"/>
+              <a:t>represents</a:t>
+            </a:r>
+            <a:r>
+              <a:rPr lang="it-IT" sz="1400" dirty="0"/>
+              <a:t> the test data.</a:t>
+            </a:r>
+          </a:p>
+        </p:txBody>
+      </p:sp>
+      <p:sp>
+        <p:nvSpPr>
+          <p:cNvPr id="8" name="CasellaDiTesto 7">
+            <a:extLst>
+              <a:ext uri="{FF2B5EF4-FFF2-40B4-BE49-F238E27FC236}">
+                <a16:creationId xmlns:a16="http://schemas.microsoft.com/office/drawing/2014/main" id="{C7962BC5-7284-E387-DC11-760CDFC998E0}"/>
+              </a:ext>
+            </a:extLst>
+          </p:cNvPr>
+          <p:cNvSpPr txBox="1"/>
+          <p:nvPr/>
+        </p:nvSpPr>
+        <p:spPr>
+          <a:xfrm>
+            <a:off x="5299900" y="1994224"/>
+            <a:ext cx="3172700" cy="307777"/>
+          </a:xfrm>
+          <a:prstGeom prst="rect">
+            <a:avLst/>
+          </a:prstGeom>
+          <a:noFill/>
+        </p:spPr>
+        <p:txBody>
+          <a:bodyPr wrap="square" rtlCol="0">
+            <a:spAutoFit/>
+          </a:bodyPr>
+          <a:lstStyle/>
+          <a:p>
+            <a:r>
+              <a:rPr lang="it-IT" sz="1400" b="1" dirty="0"/>
+              <a:t>Figure </a:t>
+            </a:r>
+            <a:r>
+              <a:rPr lang="it-IT" sz="1400" b="1" dirty="0">
+                <a:solidFill>
+                  <a:srgbClr val="FF0000"/>
+                </a:solidFill>
+              </a:rPr>
+              <a:t>t</a:t>
+            </a:r>
+            <a:r>
+              <a:rPr lang="it-IT" sz="1400" dirty="0"/>
+              <a:t>: UMAP of the training </a:t>
+            </a:r>
+          </a:p>
+        </p:txBody>
+      </p:sp>
+    </p:spTree>
+    <p:extLst>
+      <p:ext uri="{BB962C8B-B14F-4D97-AF65-F5344CB8AC3E}">
+        <p14:creationId xmlns:p14="http://schemas.microsoft.com/office/powerpoint/2010/main" val="1056653833"/>
+      </p:ext>
+    </p:extLst>
+  </p:cSld>
+  <p:clrMapOvr>
+    <a:masterClrMapping/>
+  </p:clrMapOvr>
+</p:sld>
+</file>
+
+<file path=ppt/slides/slide38.xml><?xml version="1.0" encoding="utf-8"?>
+<p:sld xmlns:a="http://schemas.openxmlformats.org/drawingml/2006/main" xmlns:r="http://schemas.openxmlformats.org/officeDocument/2006/relationships" xmlns:p="http://schemas.openxmlformats.org/presentationml/2006/main">
+  <p:cSld>
+    <p:spTree>
+      <p:nvGrpSpPr>
+        <p:cNvPr id="1" name=""/>
+        <p:cNvGrpSpPr/>
+        <p:nvPr/>
+      </p:nvGrpSpPr>
+      <p:grpSpPr>
+        <a:xfrm>
+          <a:off x="0" y="0"/>
+          <a:ext cx="0" cy="0"/>
+          <a:chOff x="0" y="0"/>
+          <a:chExt cx="0" cy="0"/>
+        </a:xfrm>
+      </p:grpSpPr>
+      <p:sp>
+        <p:nvSpPr>
+          <p:cNvPr id="120" name="PlaceHolder 1"/>
+          <p:cNvSpPr>
+            <a:spLocks noGrp="1"/>
+          </p:cNvSpPr>
+          <p:nvPr>
+            <p:ph type="title"/>
+          </p:nvPr>
+        </p:nvSpPr>
+        <p:spPr>
+          <a:xfrm>
+            <a:off x="311760" y="0"/>
+            <a:ext cx="8520120" cy="792000"/>
+          </a:xfrm>
+          <a:prstGeom prst="rect">
+            <a:avLst/>
+          </a:prstGeom>
+          <a:noFill/>
+          <a:ln w="0">
+            <a:noFill/>
+          </a:ln>
+        </p:spPr>
+        <p:txBody>
+          <a:bodyPr tIns="91440" bIns="91440" anchor="t">
+            <a:normAutofit fontScale="90000"/>
+          </a:bodyPr>
+          <a:lstStyle/>
+          <a:p>
+            <a:pPr>
+              <a:lnSpc>
+                <a:spcPct val="100000"/>
+              </a:lnSpc>
+              <a:buNone/>
+              <a:tabLst>
+                <a:tab pos="0" algn="l"/>
+              </a:tabLst>
+            </a:pPr>
+            <a:r>
+              <a:rPr lang="it" sz="2400" b="0" strike="noStrike" spc="-1" dirty="0">
+                <a:solidFill>
+                  <a:srgbClr val="FF0000"/>
+                </a:solidFill>
+                <a:latin typeface="Arial"/>
+                <a:ea typeface="Arial"/>
+              </a:rPr>
+              <a:t>Appendix – </a:t>
+            </a:r>
+            <a:r>
+              <a:rPr lang="it" sz="2400" spc="-1" dirty="0">
+                <a:solidFill>
+                  <a:srgbClr val="FF0000"/>
+                </a:solidFill>
+                <a:latin typeface="Arial"/>
+                <a:ea typeface="Arial"/>
+              </a:rPr>
+              <a:t>13</a:t>
+            </a:r>
+            <a:br>
+              <a:rPr lang="it" sz="2400" b="0" strike="noStrike" spc="-1" dirty="0">
+                <a:solidFill>
+                  <a:srgbClr val="000000"/>
+                </a:solidFill>
+                <a:latin typeface="Arial"/>
+                <a:ea typeface="Arial"/>
+              </a:rPr>
+            </a:br>
+            <a:r>
+              <a:rPr lang="it" sz="2000" spc="-1" dirty="0">
+                <a:solidFill>
+                  <a:srgbClr val="3F3F3F"/>
+                </a:solidFill>
+                <a:latin typeface="Arial"/>
+                <a:ea typeface="Arial"/>
+              </a:rPr>
+              <a:t>Further details on data exploration – 2</a:t>
+            </a:r>
+            <a:endParaRPr lang="it-IT" sz="2400" b="0" strike="noStrike" spc="-1" dirty="0">
+              <a:solidFill>
+                <a:srgbClr val="3F3F3F"/>
+              </a:solidFill>
+              <a:latin typeface="Arial"/>
+            </a:endParaRPr>
+          </a:p>
+        </p:txBody>
+      </p:sp>
+      <p:sp>
+        <p:nvSpPr>
+          <p:cNvPr id="122" name="PlaceHolder 3"/>
+          <p:cNvSpPr>
+            <a:spLocks noGrp="1"/>
+          </p:cNvSpPr>
+          <p:nvPr>
+            <p:ph type="sldNum" idx="14"/>
+          </p:nvPr>
+        </p:nvSpPr>
+        <p:spPr>
+          <a:xfrm>
+            <a:off x="8472600" y="4663080"/>
+            <a:ext cx="548280" cy="393120"/>
+          </a:xfrm>
+          <a:prstGeom prst="rect">
+            <a:avLst/>
+          </a:prstGeom>
+          <a:noFill/>
+          <a:ln w="0">
+            <a:noFill/>
+          </a:ln>
+        </p:spPr>
+        <p:txBody>
+          <a:bodyPr tIns="91440" bIns="91440" anchor="ctr">
+            <a:normAutofit/>
+          </a:bodyPr>
+          <a:lstStyle>
+            <a:lvl1pPr algn="r">
+              <a:lnSpc>
+                <a:spcPct val="100000"/>
+              </a:lnSpc>
+              <a:buNone/>
+              <a:tabLst>
+                <a:tab pos="0" algn="l"/>
+              </a:tabLst>
+              <a:defRPr lang="it" sz="1000" b="0" strike="noStrike" spc="-1">
+                <a:solidFill>
+                  <a:srgbClr val="595959"/>
+                </a:solidFill>
+                <a:latin typeface="Arial"/>
+                <a:ea typeface="Arial"/>
+              </a:defRPr>
+            </a:lvl1pPr>
+          </a:lstStyle>
+          <a:p>
+            <a:pPr algn="r">
+              <a:lnSpc>
+                <a:spcPct val="100000"/>
+              </a:lnSpc>
+              <a:buNone/>
+              <a:tabLst>
+                <a:tab pos="0" algn="l"/>
+              </a:tabLst>
+            </a:pPr>
+            <a:fld id="{25B94CD5-D627-49BE-818E-4A00F2BB16DF}" type="slidenum">
+              <a:rPr lang="it" sz="1000" b="0" strike="noStrike" spc="-1">
+                <a:solidFill>
+                  <a:srgbClr val="595959"/>
+                </a:solidFill>
+                <a:latin typeface="Arial"/>
+                <a:ea typeface="Arial"/>
+              </a:rPr>
+              <a:t>38</a:t>
+            </a:fld>
+            <a:endParaRPr lang="it-IT" sz="1000" b="0" strike="noStrike" spc="-1">
+              <a:latin typeface="Times New Roman"/>
+            </a:endParaRPr>
+          </a:p>
+        </p:txBody>
+      </p:sp>
+      <p:sp>
+        <p:nvSpPr>
+          <p:cNvPr id="7" name="CasellaDiTesto 6">
+            <a:extLst>
+              <a:ext uri="{FF2B5EF4-FFF2-40B4-BE49-F238E27FC236}">
+                <a16:creationId xmlns:a16="http://schemas.microsoft.com/office/drawing/2014/main" id="{912E61AA-51EE-5798-9315-1F9CF65A6986}"/>
+              </a:ext>
+            </a:extLst>
+          </p:cNvPr>
+          <p:cNvSpPr txBox="1"/>
+          <p:nvPr/>
+        </p:nvSpPr>
+        <p:spPr>
+          <a:xfrm>
+            <a:off x="311760" y="792000"/>
+            <a:ext cx="8520120" cy="307777"/>
+          </a:xfrm>
+          <a:prstGeom prst="rect">
+            <a:avLst/>
+          </a:prstGeom>
+          <a:noFill/>
+        </p:spPr>
+        <p:txBody>
+          <a:bodyPr wrap="square" rtlCol="0">
+            <a:spAutoFit/>
+          </a:bodyPr>
+          <a:lstStyle/>
+          <a:p>
+            <a:pPr algn="just"/>
+            <a:r>
+              <a:rPr lang="it-IT" sz="1400" dirty="0" err="1">
+                <a:solidFill>
+                  <a:srgbClr val="FF0000"/>
+                </a:solidFill>
+              </a:rPr>
+              <a:t>We</a:t>
+            </a:r>
+            <a:r>
+              <a:rPr lang="it-IT" sz="1400" dirty="0">
+                <a:solidFill>
+                  <a:srgbClr val="FF0000"/>
+                </a:solidFill>
+              </a:rPr>
+              <a:t> </a:t>
+            </a:r>
+            <a:r>
+              <a:rPr lang="it-IT" sz="1400" dirty="0" err="1">
+                <a:solidFill>
+                  <a:srgbClr val="FF0000"/>
+                </a:solidFill>
+              </a:rPr>
+              <a:t>also</a:t>
+            </a:r>
+            <a:r>
+              <a:rPr lang="it-IT" sz="1400" dirty="0">
+                <a:solidFill>
+                  <a:srgbClr val="FF0000"/>
+                </a:solidFill>
+              </a:rPr>
+              <a:t> </a:t>
+            </a:r>
+            <a:r>
+              <a:rPr lang="it-IT" sz="1400" dirty="0" err="1">
+                <a:solidFill>
+                  <a:srgbClr val="FF0000"/>
+                </a:solidFill>
+              </a:rPr>
+              <a:t>looked</a:t>
+            </a:r>
+            <a:r>
+              <a:rPr lang="it-IT" sz="1400" dirty="0">
+                <a:solidFill>
+                  <a:srgbClr val="FF0000"/>
+                </a:solidFill>
+              </a:rPr>
+              <a:t> for the </a:t>
+            </a:r>
+            <a:r>
+              <a:rPr lang="it-IT" sz="1400" dirty="0" err="1">
+                <a:solidFill>
+                  <a:srgbClr val="FF0000"/>
+                </a:solidFill>
+              </a:rPr>
+              <a:t>presence</a:t>
+            </a:r>
+            <a:r>
+              <a:rPr lang="it-IT" sz="1400" dirty="0">
+                <a:solidFill>
+                  <a:srgbClr val="FF0000"/>
+                </a:solidFill>
+              </a:rPr>
+              <a:t> of </a:t>
+            </a:r>
+            <a:r>
+              <a:rPr lang="it-IT" sz="1400" dirty="0" err="1">
+                <a:solidFill>
+                  <a:srgbClr val="FF0000"/>
+                </a:solidFill>
+              </a:rPr>
+              <a:t>outliers</a:t>
+            </a:r>
+            <a:r>
+              <a:rPr lang="it-IT" sz="1400" dirty="0">
+                <a:solidFill>
+                  <a:srgbClr val="FF0000"/>
+                </a:solidFill>
+              </a:rPr>
+              <a:t>.</a:t>
+            </a:r>
+          </a:p>
+        </p:txBody>
+      </p:sp>
+      <p:sp>
+        <p:nvSpPr>
+          <p:cNvPr id="8" name="CasellaDiTesto 7">
+            <a:extLst>
+              <a:ext uri="{FF2B5EF4-FFF2-40B4-BE49-F238E27FC236}">
+                <a16:creationId xmlns:a16="http://schemas.microsoft.com/office/drawing/2014/main" id="{C7962BC5-7284-E387-DC11-760CDFC998E0}"/>
+              </a:ext>
+            </a:extLst>
+          </p:cNvPr>
+          <p:cNvSpPr txBox="1"/>
+          <p:nvPr/>
+        </p:nvSpPr>
+        <p:spPr>
+          <a:xfrm>
+            <a:off x="5572853" y="1757977"/>
+            <a:ext cx="3172700" cy="307777"/>
+          </a:xfrm>
+          <a:prstGeom prst="rect">
+            <a:avLst/>
+          </a:prstGeom>
+          <a:noFill/>
+        </p:spPr>
+        <p:txBody>
+          <a:bodyPr wrap="square" rtlCol="0">
+            <a:spAutoFit/>
+          </a:bodyPr>
+          <a:lstStyle/>
+          <a:p>
+            <a:r>
+              <a:rPr lang="it-IT" sz="1400" b="1" dirty="0"/>
+              <a:t>Figure </a:t>
+            </a:r>
+            <a:r>
+              <a:rPr lang="it-IT" sz="1400" b="1" dirty="0">
+                <a:solidFill>
+                  <a:srgbClr val="FF0000"/>
+                </a:solidFill>
+              </a:rPr>
+              <a:t>t</a:t>
+            </a:r>
+            <a:r>
+              <a:rPr lang="it-IT" sz="1400" dirty="0"/>
+              <a:t>:</a:t>
+            </a:r>
+          </a:p>
+        </p:txBody>
+      </p:sp>
+      <p:pic>
+        <p:nvPicPr>
+          <p:cNvPr id="4" name="Immagine 3">
+            <a:extLst>
+              <a:ext uri="{FF2B5EF4-FFF2-40B4-BE49-F238E27FC236}">
+                <a16:creationId xmlns:a16="http://schemas.microsoft.com/office/drawing/2014/main" id="{9C867E41-FF66-774D-213E-DB81167F0140}"/>
+              </a:ext>
+            </a:extLst>
+          </p:cNvPr>
+          <p:cNvPicPr>
+            <a:picLocks noChangeAspect="1"/>
+          </p:cNvPicPr>
+          <p:nvPr/>
+        </p:nvPicPr>
+        <p:blipFill rotWithShape="1">
+          <a:blip r:embed="rId2"/>
+          <a:srcRect l="4653" t="4616" r="10841" b="3142"/>
+          <a:stretch/>
+        </p:blipFill>
+        <p:spPr>
+          <a:xfrm>
+            <a:off x="5572853" y="2065753"/>
+            <a:ext cx="3172700" cy="2597327"/>
+          </a:xfrm>
+          <a:prstGeom prst="rect">
+            <a:avLst/>
+          </a:prstGeom>
+          <a:ln>
+            <a:solidFill>
+              <a:schemeClr val="accent1"/>
+            </a:solidFill>
+          </a:ln>
+        </p:spPr>
+      </p:pic>
+    </p:spTree>
+    <p:extLst>
+      <p:ext uri="{BB962C8B-B14F-4D97-AF65-F5344CB8AC3E}">
+        <p14:creationId xmlns:p14="http://schemas.microsoft.com/office/powerpoint/2010/main" val="1306286986"/>
+      </p:ext>
+    </p:extLst>
+  </p:cSld>
+  <p:clrMapOvr>
+    <a:masterClrMapping/>
+  </p:clrMapOvr>
+</p:sld>
+</file>
+
+<file path=ppt/slides/slide39.xml><?xml version="1.0" encoding="utf-8"?>
+<p:sld xmlns:a="http://schemas.openxmlformats.org/drawingml/2006/main" xmlns:r="http://schemas.openxmlformats.org/officeDocument/2006/relationships" xmlns:p="http://schemas.openxmlformats.org/presentationml/2006/main">
+  <p:cSld>
+    <p:spTree>
+      <p:nvGrpSpPr>
+        <p:cNvPr id="1" name=""/>
+        <p:cNvGrpSpPr/>
+        <p:nvPr/>
+      </p:nvGrpSpPr>
+      <p:grpSpPr>
+        <a:xfrm>
+          <a:off x="0" y="0"/>
+          <a:ext cx="0" cy="0"/>
+          <a:chOff x="0" y="0"/>
+          <a:chExt cx="0" cy="0"/>
+        </a:xfrm>
+      </p:grpSpPr>
+      <p:sp>
+        <p:nvSpPr>
+          <p:cNvPr id="120" name="PlaceHolder 1"/>
+          <p:cNvSpPr>
+            <a:spLocks noGrp="1"/>
+          </p:cNvSpPr>
+          <p:nvPr>
+            <p:ph type="title"/>
+          </p:nvPr>
+        </p:nvSpPr>
+        <p:spPr>
+          <a:xfrm>
+            <a:off x="311760" y="0"/>
+            <a:ext cx="8520120" cy="792000"/>
+          </a:xfrm>
+          <a:prstGeom prst="rect">
+            <a:avLst/>
+          </a:prstGeom>
+          <a:noFill/>
+          <a:ln w="0">
+            <a:noFill/>
+          </a:ln>
+        </p:spPr>
+        <p:txBody>
+          <a:bodyPr tIns="91440" bIns="91440" anchor="t">
+            <a:normAutofit fontScale="90000"/>
+          </a:bodyPr>
+          <a:lstStyle/>
+          <a:p>
+            <a:pPr>
+              <a:lnSpc>
+                <a:spcPct val="100000"/>
+              </a:lnSpc>
+              <a:buNone/>
+              <a:tabLst>
+                <a:tab pos="0" algn="l"/>
+              </a:tabLst>
+            </a:pPr>
+            <a:r>
+              <a:rPr lang="it" sz="2400" b="0" strike="noStrike" spc="-1" dirty="0">
+                <a:solidFill>
+                  <a:srgbClr val="000000"/>
+                </a:solidFill>
+                <a:latin typeface="Arial"/>
+                <a:ea typeface="Arial"/>
+              </a:rPr>
+              <a:t>Appendix – </a:t>
+            </a:r>
+            <a:r>
+              <a:rPr lang="it" sz="2400" spc="-1" dirty="0">
+                <a:solidFill>
+                  <a:srgbClr val="000000"/>
+                </a:solidFill>
+                <a:latin typeface="Arial"/>
+                <a:ea typeface="Arial"/>
+              </a:rPr>
+              <a:t>14</a:t>
+            </a:r>
+            <a:br>
+              <a:rPr lang="it" sz="2400" b="0" strike="noStrike" spc="-1" dirty="0">
+                <a:solidFill>
+                  <a:srgbClr val="000000"/>
+                </a:solidFill>
+                <a:latin typeface="Arial"/>
+                <a:ea typeface="Arial"/>
+              </a:rPr>
+            </a:br>
+            <a:r>
+              <a:rPr lang="it" sz="2000" b="0" strike="noStrike" spc="-1" dirty="0">
+                <a:solidFill>
+                  <a:srgbClr val="3F3F3F"/>
+                </a:solidFill>
+                <a:latin typeface="Arial"/>
+                <a:ea typeface="Arial"/>
+              </a:rPr>
+              <a:t>Learning curves for best SVM and best Random Forest</a:t>
+            </a:r>
+            <a:endParaRPr lang="it-IT" sz="2400" b="0" strike="noStrike" spc="-1" dirty="0">
+              <a:solidFill>
+                <a:srgbClr val="3F3F3F"/>
+              </a:solidFill>
+              <a:latin typeface="Arial"/>
+            </a:endParaRPr>
+          </a:p>
+        </p:txBody>
+      </p:sp>
+      <p:sp>
+        <p:nvSpPr>
+          <p:cNvPr id="122" name="PlaceHolder 3"/>
+          <p:cNvSpPr>
+            <a:spLocks noGrp="1"/>
+          </p:cNvSpPr>
+          <p:nvPr>
+            <p:ph type="sldNum" idx="14"/>
+          </p:nvPr>
+        </p:nvSpPr>
+        <p:spPr>
+          <a:xfrm>
+            <a:off x="8472600" y="4663080"/>
+            <a:ext cx="548280" cy="393120"/>
+          </a:xfrm>
+          <a:prstGeom prst="rect">
+            <a:avLst/>
+          </a:prstGeom>
+          <a:noFill/>
+          <a:ln w="0">
+            <a:noFill/>
+          </a:ln>
+        </p:spPr>
+        <p:txBody>
+          <a:bodyPr tIns="91440" bIns="91440" anchor="ctr">
+            <a:normAutofit/>
+          </a:bodyPr>
+          <a:lstStyle>
+            <a:lvl1pPr algn="r">
+              <a:lnSpc>
+                <a:spcPct val="100000"/>
+              </a:lnSpc>
+              <a:buNone/>
+              <a:tabLst>
+                <a:tab pos="0" algn="l"/>
+              </a:tabLst>
+              <a:defRPr lang="it" sz="1000" b="0" strike="noStrike" spc="-1">
+                <a:solidFill>
+                  <a:srgbClr val="595959"/>
+                </a:solidFill>
+                <a:latin typeface="Arial"/>
+                <a:ea typeface="Arial"/>
+              </a:defRPr>
+            </a:lvl1pPr>
+          </a:lstStyle>
+          <a:p>
+            <a:pPr algn="r">
+              <a:lnSpc>
+                <a:spcPct val="100000"/>
+              </a:lnSpc>
+              <a:buNone/>
+              <a:tabLst>
+                <a:tab pos="0" algn="l"/>
+              </a:tabLst>
+            </a:pPr>
+            <a:fld id="{25B94CD5-D627-49BE-818E-4A00F2BB16DF}" type="slidenum">
+              <a:rPr lang="it" sz="1000" b="0" strike="noStrike" spc="-1">
+                <a:solidFill>
+                  <a:srgbClr val="595959"/>
+                </a:solidFill>
+                <a:latin typeface="Arial"/>
+                <a:ea typeface="Arial"/>
+              </a:rPr>
+              <a:t>39</a:t>
             </a:fld>
             <a:endParaRPr lang="it-IT" sz="1000" b="0" strike="noStrike" spc="-1">
               <a:latin typeface="Times New Roman"/>

</xml_diff>

<commit_message>
Updated report, with experimental schema on the validation schema for the CUP + removing references to MEE
</commit_message>
<xml_diff>
--- a/relazione/ML-2023-PRJ-Slides-Demo.pptx
+++ b/relazione/ML-2023-PRJ-Slides-Demo.pptx
@@ -6,7 +6,7 @@
     <p:sldMasterId id="2147483661" r:id="rId2"/>
   </p:sldMasterIdLst>
   <p:notesMasterIdLst>
-    <p:notesMasterId r:id="rId44"/>
+    <p:notesMasterId r:id="rId43"/>
   </p:notesMasterIdLst>
   <p:sldIdLst>
     <p:sldId id="256" r:id="rId3"/>
@@ -22,17 +22,17 @@
     <p:sldId id="303" r:id="rId13"/>
     <p:sldId id="262" r:id="rId14"/>
     <p:sldId id="287" r:id="rId15"/>
-    <p:sldId id="269" r:id="rId16"/>
-    <p:sldId id="278" r:id="rId17"/>
-    <p:sldId id="270" r:id="rId18"/>
-    <p:sldId id="264" r:id="rId19"/>
-    <p:sldId id="274" r:id="rId20"/>
-    <p:sldId id="272" r:id="rId21"/>
-    <p:sldId id="275" r:id="rId22"/>
-    <p:sldId id="265" r:id="rId23"/>
-    <p:sldId id="266" r:id="rId24"/>
-    <p:sldId id="273" r:id="rId25"/>
-    <p:sldId id="277" r:id="rId26"/>
+    <p:sldId id="305" r:id="rId16"/>
+    <p:sldId id="269" r:id="rId17"/>
+    <p:sldId id="278" r:id="rId18"/>
+    <p:sldId id="270" r:id="rId19"/>
+    <p:sldId id="264" r:id="rId20"/>
+    <p:sldId id="274" r:id="rId21"/>
+    <p:sldId id="272" r:id="rId22"/>
+    <p:sldId id="275" r:id="rId23"/>
+    <p:sldId id="265" r:id="rId24"/>
+    <p:sldId id="266" r:id="rId25"/>
+    <p:sldId id="273" r:id="rId26"/>
     <p:sldId id="302" r:id="rId27"/>
     <p:sldId id="268" r:id="rId28"/>
     <p:sldId id="282" r:id="rId29"/>
@@ -49,7 +49,6 @@
     <p:sldId id="299" r:id="rId40"/>
     <p:sldId id="300" r:id="rId41"/>
     <p:sldId id="296" r:id="rId42"/>
-    <p:sldId id="304" r:id="rId43"/>
   </p:sldIdLst>
   <p:sldSz cx="9144000" cy="5143500" type="screen16x9"/>
   <p:notesSz cx="6858000" cy="9144000"/>
@@ -238,7 +237,7 @@
           <a:p>
             <a:fld id="{6A71CC8E-465E-46C0-91CA-2080D1264305}" type="datetimeFigureOut">
               <a:rPr lang="it-IT" smtClean="0"/>
-              <a:t>27/01/2024</a:t>
+              <a:t>28/01/2024</a:t>
             </a:fld>
             <a:endParaRPr lang="it-IT"/>
           </a:p>
@@ -8621,7 +8620,7 @@
             </a:r>
             <a:r>
               <a:rPr lang="it-IT" sz="1400" dirty="0">
-                <a:hlinkClick r:id="rId6" action="ppaction://hlinksldjump"/>
+                <a:hlinkClick r:id="rId3" action="ppaction://hlinksldjump"/>
               </a:rPr>
               <a:t>9</a:t>
             </a:r>
@@ -9547,6 +9546,954 @@
       </p:grpSpPr>
       <p:sp>
         <p:nvSpPr>
+          <p:cNvPr id="105" name="PlaceHolder 1"/>
+          <p:cNvSpPr>
+            <a:spLocks noGrp="1"/>
+          </p:cNvSpPr>
+          <p:nvPr>
+            <p:ph type="title"/>
+          </p:nvPr>
+        </p:nvSpPr>
+        <p:spPr>
+          <a:xfrm>
+            <a:off x="358825" y="2700"/>
+            <a:ext cx="8520120" cy="576000"/>
+          </a:xfrm>
+          <a:prstGeom prst="rect">
+            <a:avLst/>
+          </a:prstGeom>
+          <a:noFill/>
+          <a:ln w="0">
+            <a:noFill/>
+          </a:ln>
+        </p:spPr>
+        <p:txBody>
+          <a:bodyPr tIns="91440" bIns="91440" anchor="t">
+            <a:normAutofit fontScale="91000"/>
+          </a:bodyPr>
+          <a:lstStyle/>
+          <a:p>
+            <a:pPr>
+              <a:lnSpc>
+                <a:spcPct val="100000"/>
+              </a:lnSpc>
+              <a:buNone/>
+              <a:tabLst>
+                <a:tab pos="0" algn="l"/>
+              </a:tabLst>
+            </a:pPr>
+            <a:r>
+              <a:rPr lang="it" sz="2600" b="0" strike="noStrike" spc="-1" dirty="0">
+                <a:solidFill>
+                  <a:srgbClr val="000000"/>
+                </a:solidFill>
+                <a:latin typeface="Arial"/>
+                <a:ea typeface="Arial"/>
+              </a:rPr>
+              <a:t>CUP</a:t>
+            </a:r>
+            <a:r>
+              <a:rPr lang="it" sz="2400" b="0" strike="noStrike" spc="-1" dirty="0">
+                <a:solidFill>
+                  <a:srgbClr val="000000"/>
+                </a:solidFill>
+                <a:latin typeface="Arial"/>
+                <a:ea typeface="Arial"/>
+              </a:rPr>
+              <a:t> </a:t>
+            </a:r>
+            <a:r>
+              <a:rPr lang="it" sz="2600" b="0" strike="noStrike" spc="-1" dirty="0">
+                <a:solidFill>
+                  <a:srgbClr val="000000"/>
+                </a:solidFill>
+                <a:latin typeface="Arial"/>
+                <a:ea typeface="Arial"/>
+              </a:rPr>
+              <a:t>Validation schema [</a:t>
+            </a:r>
+            <a:r>
+              <a:rPr lang="it" sz="2600" b="0" strike="noStrike" spc="-1" dirty="0">
+                <a:solidFill>
+                  <a:srgbClr val="FF0000"/>
+                </a:solidFill>
+                <a:latin typeface="Arial"/>
+                <a:ea typeface="Arial"/>
+              </a:rPr>
+              <a:t>da riempire</a:t>
+            </a:r>
+            <a:r>
+              <a:rPr lang="it" sz="2600" b="0" strike="noStrike" spc="-1" dirty="0">
+                <a:solidFill>
+                  <a:srgbClr val="000000"/>
+                </a:solidFill>
+                <a:latin typeface="Arial"/>
+                <a:ea typeface="Arial"/>
+              </a:rPr>
+              <a:t>]</a:t>
+            </a:r>
+            <a:endParaRPr lang="it-IT" sz="2400" b="0" strike="noStrike" spc="-1" dirty="0">
+              <a:solidFill>
+                <a:srgbClr val="000000"/>
+              </a:solidFill>
+              <a:latin typeface="Arial"/>
+            </a:endParaRPr>
+          </a:p>
+        </p:txBody>
+      </p:sp>
+      <p:sp>
+        <p:nvSpPr>
+          <p:cNvPr id="107" name="PlaceHolder 3"/>
+          <p:cNvSpPr>
+            <a:spLocks noGrp="1"/>
+          </p:cNvSpPr>
+          <p:nvPr>
+            <p:ph type="sldNum" idx="9"/>
+          </p:nvPr>
+        </p:nvSpPr>
+        <p:spPr>
+          <a:xfrm>
+            <a:off x="8472600" y="4663080"/>
+            <a:ext cx="548280" cy="393120"/>
+          </a:xfrm>
+          <a:prstGeom prst="rect">
+            <a:avLst/>
+          </a:prstGeom>
+          <a:noFill/>
+          <a:ln w="0">
+            <a:noFill/>
+          </a:ln>
+        </p:spPr>
+        <p:txBody>
+          <a:bodyPr tIns="91440" bIns="91440" anchor="ctr">
+            <a:normAutofit/>
+          </a:bodyPr>
+          <a:lstStyle>
+            <a:lvl1pPr algn="r">
+              <a:lnSpc>
+                <a:spcPct val="100000"/>
+              </a:lnSpc>
+              <a:buNone/>
+              <a:tabLst>
+                <a:tab pos="0" algn="l"/>
+              </a:tabLst>
+              <a:defRPr lang="it" sz="1000" b="0" strike="noStrike" spc="-1">
+                <a:solidFill>
+                  <a:srgbClr val="595959"/>
+                </a:solidFill>
+                <a:latin typeface="Arial"/>
+                <a:ea typeface="Arial"/>
+              </a:defRPr>
+            </a:lvl1pPr>
+          </a:lstStyle>
+          <a:p>
+            <a:pPr algn="r">
+              <a:lnSpc>
+                <a:spcPct val="100000"/>
+              </a:lnSpc>
+              <a:buNone/>
+              <a:tabLst>
+                <a:tab pos="0" algn="l"/>
+              </a:tabLst>
+            </a:pPr>
+            <a:fld id="{A33BCEE6-A49C-4B73-BD56-E47521C0CF2F}" type="slidenum">
+              <a:rPr lang="it" sz="1000" b="0" strike="noStrike" spc="-1">
+                <a:solidFill>
+                  <a:srgbClr val="595959"/>
+                </a:solidFill>
+                <a:latin typeface="Arial"/>
+                <a:ea typeface="Arial"/>
+              </a:rPr>
+              <a:t>14</a:t>
+            </a:fld>
+            <a:endParaRPr lang="it-IT" sz="1000" b="0" strike="noStrike" spc="-1">
+              <a:latin typeface="Times New Roman"/>
+            </a:endParaRPr>
+          </a:p>
+        </p:txBody>
+      </p:sp>
+      <p:sp>
+        <p:nvSpPr>
+          <p:cNvPr id="2" name="CasellaDiTesto 1">
+            <a:extLst>
+              <a:ext uri="{FF2B5EF4-FFF2-40B4-BE49-F238E27FC236}">
+                <a16:creationId xmlns:a16="http://schemas.microsoft.com/office/drawing/2014/main" id="{EBD80CD8-4514-2C43-279E-DF953129990E}"/>
+              </a:ext>
+            </a:extLst>
+          </p:cNvPr>
+          <p:cNvSpPr txBox="1"/>
+          <p:nvPr/>
+        </p:nvSpPr>
+        <p:spPr>
+          <a:xfrm>
+            <a:off x="358825" y="1356855"/>
+            <a:ext cx="1317812" cy="738664"/>
+          </a:xfrm>
+          <a:prstGeom prst="rect">
+            <a:avLst/>
+          </a:prstGeom>
+          <a:noFill/>
+          <a:ln>
+            <a:solidFill>
+              <a:schemeClr val="accent1"/>
+            </a:solidFill>
+          </a:ln>
+        </p:spPr>
+        <p:txBody>
+          <a:bodyPr wrap="square" rtlCol="0">
+            <a:spAutoFit/>
+          </a:bodyPr>
+          <a:lstStyle/>
+          <a:p>
+            <a:r>
+              <a:rPr lang="it-IT" sz="1400" dirty="0" err="1"/>
+              <a:t>Hold</a:t>
+            </a:r>
+            <a:r>
+              <a:rPr lang="it-IT" sz="1400" dirty="0"/>
+              <a:t> out 20% of the dataset </a:t>
+            </a:r>
+            <a:r>
+              <a:rPr lang="it-IT" sz="1400" dirty="0" err="1"/>
+              <a:t>as</a:t>
+            </a:r>
+            <a:r>
+              <a:rPr lang="it-IT" sz="1400" dirty="0"/>
+              <a:t> TS</a:t>
+            </a:r>
+          </a:p>
+        </p:txBody>
+      </p:sp>
+      <p:sp>
+        <p:nvSpPr>
+          <p:cNvPr id="4" name="Freccia a destra 3">
+            <a:extLst>
+              <a:ext uri="{FF2B5EF4-FFF2-40B4-BE49-F238E27FC236}">
+                <a16:creationId xmlns:a16="http://schemas.microsoft.com/office/drawing/2014/main" id="{21E0F93C-4AB8-3ECF-71CA-ADF8476E0FE6}"/>
+              </a:ext>
+            </a:extLst>
+          </p:cNvPr>
+          <p:cNvSpPr/>
+          <p:nvPr/>
+        </p:nvSpPr>
+        <p:spPr>
+          <a:xfrm>
+            <a:off x="1676637" y="1578269"/>
+            <a:ext cx="539651" cy="295835"/>
+          </a:xfrm>
+          <a:prstGeom prst="rightArrow">
+            <a:avLst/>
+          </a:prstGeom>
+          <a:solidFill>
+            <a:srgbClr val="D3D3D3"/>
+          </a:solidFill>
+          <a:ln w="19050">
+            <a:solidFill>
+              <a:srgbClr val="636363"/>
+            </a:solidFill>
+          </a:ln>
+        </p:spPr>
+        <p:style>
+          <a:lnRef idx="2">
+            <a:schemeClr val="accent1">
+              <a:shade val="15000"/>
+            </a:schemeClr>
+          </a:lnRef>
+          <a:fillRef idx="1">
+            <a:schemeClr val="accent1"/>
+          </a:fillRef>
+          <a:effectRef idx="0">
+            <a:schemeClr val="accent1"/>
+          </a:effectRef>
+          <a:fontRef idx="minor">
+            <a:schemeClr val="lt1"/>
+          </a:fontRef>
+        </p:style>
+        <p:txBody>
+          <a:bodyPr rtlCol="0" anchor="ctr"/>
+          <a:lstStyle/>
+          <a:p>
+            <a:pPr algn="ctr"/>
+            <a:endParaRPr lang="it-IT">
+              <a:solidFill>
+                <a:srgbClr val="636363"/>
+              </a:solidFill>
+            </a:endParaRPr>
+          </a:p>
+        </p:txBody>
+      </p:sp>
+      <p:sp>
+        <p:nvSpPr>
+          <p:cNvPr id="5" name="CasellaDiTesto 4">
+            <a:extLst>
+              <a:ext uri="{FF2B5EF4-FFF2-40B4-BE49-F238E27FC236}">
+                <a16:creationId xmlns:a16="http://schemas.microsoft.com/office/drawing/2014/main" id="{1F79DB59-F67A-98D5-B892-57B17AC42BD1}"/>
+              </a:ext>
+            </a:extLst>
+          </p:cNvPr>
+          <p:cNvSpPr txBox="1"/>
+          <p:nvPr/>
+        </p:nvSpPr>
+        <p:spPr>
+          <a:xfrm>
+            <a:off x="2216288" y="1356855"/>
+            <a:ext cx="1196788" cy="738664"/>
+          </a:xfrm>
+          <a:prstGeom prst="rect">
+            <a:avLst/>
+          </a:prstGeom>
+          <a:noFill/>
+          <a:ln>
+            <a:solidFill>
+              <a:schemeClr val="accent1"/>
+            </a:solidFill>
+          </a:ln>
+        </p:spPr>
+        <p:txBody>
+          <a:bodyPr wrap="square" rtlCol="0">
+            <a:spAutoFit/>
+          </a:bodyPr>
+          <a:lstStyle/>
+          <a:p>
+            <a:r>
+              <a:rPr lang="it-IT" sz="1400" dirty="0" err="1"/>
+              <a:t>Grid</a:t>
+            </a:r>
+            <a:r>
+              <a:rPr lang="it-IT" sz="1400" dirty="0"/>
+              <a:t> </a:t>
+            </a:r>
+            <a:r>
+              <a:rPr lang="it-IT" sz="1400" dirty="0" err="1"/>
+              <a:t>search</a:t>
+            </a:r>
+            <a:r>
+              <a:rPr lang="it-IT" sz="1400" dirty="0"/>
+              <a:t> </a:t>
+            </a:r>
+            <a:r>
+              <a:rPr lang="it-IT" sz="1400" dirty="0" err="1"/>
+              <a:t>using</a:t>
+            </a:r>
+            <a:r>
+              <a:rPr lang="it-IT" sz="1400" dirty="0"/>
+              <a:t> 5-fold CV</a:t>
+            </a:r>
+          </a:p>
+        </p:txBody>
+      </p:sp>
+      <p:sp>
+        <p:nvSpPr>
+          <p:cNvPr id="7" name="CasellaDiTesto 6">
+            <a:extLst>
+              <a:ext uri="{FF2B5EF4-FFF2-40B4-BE49-F238E27FC236}">
+                <a16:creationId xmlns:a16="http://schemas.microsoft.com/office/drawing/2014/main" id="{0AA84227-9C4B-E703-3505-836B4BC02AD4}"/>
+              </a:ext>
+            </a:extLst>
+          </p:cNvPr>
+          <p:cNvSpPr txBox="1"/>
+          <p:nvPr/>
+        </p:nvSpPr>
+        <p:spPr>
+          <a:xfrm>
+            <a:off x="3949339" y="1356855"/>
+            <a:ext cx="2662517" cy="738664"/>
+          </a:xfrm>
+          <a:prstGeom prst="rect">
+            <a:avLst/>
+          </a:prstGeom>
+          <a:noFill/>
+          <a:ln>
+            <a:solidFill>
+              <a:schemeClr val="accent1"/>
+            </a:solidFill>
+          </a:ln>
+        </p:spPr>
+        <p:txBody>
+          <a:bodyPr wrap="square" rtlCol="0">
+            <a:spAutoFit/>
+          </a:bodyPr>
+          <a:lstStyle/>
+          <a:p>
+            <a:r>
+              <a:rPr lang="it-IT" sz="1400" dirty="0" err="1"/>
+              <a:t>Retrain</a:t>
+            </a:r>
+            <a:r>
+              <a:rPr lang="it-IT" sz="1400" dirty="0"/>
+              <a:t> the model with the best </a:t>
+            </a:r>
+            <a:r>
+              <a:rPr lang="it-IT" sz="1400" dirty="0" err="1"/>
+              <a:t>hyperparameters</a:t>
+            </a:r>
+            <a:r>
+              <a:rPr lang="it-IT" sz="1400" dirty="0"/>
+              <a:t>, </a:t>
+            </a:r>
+            <a:r>
+              <a:rPr lang="it-IT" sz="1400" dirty="0" err="1"/>
+              <a:t>using</a:t>
+            </a:r>
+            <a:r>
+              <a:rPr lang="it-IT" sz="1400" dirty="0"/>
+              <a:t> a 5-fold CV schema</a:t>
+            </a:r>
+          </a:p>
+        </p:txBody>
+      </p:sp>
+      <p:sp>
+        <p:nvSpPr>
+          <p:cNvPr id="9" name="Freccia a destra 8">
+            <a:extLst>
+              <a:ext uri="{FF2B5EF4-FFF2-40B4-BE49-F238E27FC236}">
+                <a16:creationId xmlns:a16="http://schemas.microsoft.com/office/drawing/2014/main" id="{105F0E06-8037-0C54-BEDA-1501F1037624}"/>
+              </a:ext>
+            </a:extLst>
+          </p:cNvPr>
+          <p:cNvSpPr/>
+          <p:nvPr/>
+        </p:nvSpPr>
+        <p:spPr>
+          <a:xfrm rot="19052562">
+            <a:off x="6771627" y="1350366"/>
+            <a:ext cx="685800" cy="295835"/>
+          </a:xfrm>
+          <a:prstGeom prst="rightArrow">
+            <a:avLst/>
+          </a:prstGeom>
+        </p:spPr>
+        <p:style>
+          <a:lnRef idx="2">
+            <a:schemeClr val="accent1">
+              <a:shade val="15000"/>
+            </a:schemeClr>
+          </a:lnRef>
+          <a:fillRef idx="1">
+            <a:schemeClr val="accent1"/>
+          </a:fillRef>
+          <a:effectRef idx="0">
+            <a:schemeClr val="accent1"/>
+          </a:effectRef>
+          <a:fontRef idx="minor">
+            <a:schemeClr val="lt1"/>
+          </a:fontRef>
+        </p:style>
+        <p:txBody>
+          <a:bodyPr rtlCol="0" anchor="ctr"/>
+          <a:lstStyle/>
+          <a:p>
+            <a:pPr algn="ctr"/>
+            <a:endParaRPr lang="it-IT"/>
+          </a:p>
+        </p:txBody>
+      </p:sp>
+      <p:sp>
+        <p:nvSpPr>
+          <p:cNvPr id="10" name="Freccia a destra 9">
+            <a:extLst>
+              <a:ext uri="{FF2B5EF4-FFF2-40B4-BE49-F238E27FC236}">
+                <a16:creationId xmlns:a16="http://schemas.microsoft.com/office/drawing/2014/main" id="{63AB8152-8994-55DA-5836-5A80508A1D92}"/>
+              </a:ext>
+            </a:extLst>
+          </p:cNvPr>
+          <p:cNvSpPr/>
+          <p:nvPr/>
+        </p:nvSpPr>
+        <p:spPr>
+          <a:xfrm rot="2869199">
+            <a:off x="6758648" y="1819285"/>
+            <a:ext cx="685800" cy="295835"/>
+          </a:xfrm>
+          <a:prstGeom prst="rightArrow">
+            <a:avLst/>
+          </a:prstGeom>
+        </p:spPr>
+        <p:style>
+          <a:lnRef idx="2">
+            <a:schemeClr val="accent1">
+              <a:shade val="15000"/>
+            </a:schemeClr>
+          </a:lnRef>
+          <a:fillRef idx="1">
+            <a:schemeClr val="accent1"/>
+          </a:fillRef>
+          <a:effectRef idx="0">
+            <a:schemeClr val="accent1"/>
+          </a:effectRef>
+          <a:fontRef idx="minor">
+            <a:schemeClr val="lt1"/>
+          </a:fontRef>
+        </p:style>
+        <p:txBody>
+          <a:bodyPr rtlCol="0" anchor="ctr"/>
+          <a:lstStyle/>
+          <a:p>
+            <a:pPr algn="ctr"/>
+            <a:endParaRPr lang="it-IT"/>
+          </a:p>
+        </p:txBody>
+      </p:sp>
+      <p:sp>
+        <p:nvSpPr>
+          <p:cNvPr id="11" name="CasellaDiTesto 10">
+            <a:extLst>
+              <a:ext uri="{FF2B5EF4-FFF2-40B4-BE49-F238E27FC236}">
+                <a16:creationId xmlns:a16="http://schemas.microsoft.com/office/drawing/2014/main" id="{34838675-F0CC-A784-853E-A569B4AEB89F}"/>
+              </a:ext>
+            </a:extLst>
+          </p:cNvPr>
+          <p:cNvSpPr txBox="1"/>
+          <p:nvPr/>
+        </p:nvSpPr>
+        <p:spPr>
+          <a:xfrm>
+            <a:off x="7467363" y="1021977"/>
+            <a:ext cx="1064796" cy="338554"/>
+          </a:xfrm>
+          <a:prstGeom prst="rect">
+            <a:avLst/>
+          </a:prstGeom>
+          <a:noFill/>
+        </p:spPr>
+        <p:txBody>
+          <a:bodyPr wrap="square" rtlCol="0">
+            <a:spAutoFit/>
+          </a:bodyPr>
+          <a:lstStyle/>
+          <a:p>
+            <a:r>
+              <a:rPr lang="it-IT" sz="1600" dirty="0"/>
+              <a:t>NN</a:t>
+            </a:r>
+          </a:p>
+        </p:txBody>
+      </p:sp>
+      <p:sp>
+        <p:nvSpPr>
+          <p:cNvPr id="12" name="CasellaDiTesto 11">
+            <a:extLst>
+              <a:ext uri="{FF2B5EF4-FFF2-40B4-BE49-F238E27FC236}">
+                <a16:creationId xmlns:a16="http://schemas.microsoft.com/office/drawing/2014/main" id="{1CF8F36C-7CFA-EA2B-F656-C4B5754EACC8}"/>
+              </a:ext>
+            </a:extLst>
+          </p:cNvPr>
+          <p:cNvSpPr txBox="1"/>
+          <p:nvPr/>
+        </p:nvSpPr>
+        <p:spPr>
+          <a:xfrm>
+            <a:off x="7407804" y="2022200"/>
+            <a:ext cx="1124356" cy="338554"/>
+          </a:xfrm>
+          <a:prstGeom prst="rect">
+            <a:avLst/>
+          </a:prstGeom>
+          <a:noFill/>
+        </p:spPr>
+        <p:txBody>
+          <a:bodyPr wrap="square" rtlCol="0">
+            <a:spAutoFit/>
+          </a:bodyPr>
+          <a:lstStyle/>
+          <a:p>
+            <a:r>
+              <a:rPr lang="it-IT" sz="1600" dirty="0"/>
+              <a:t>SVM, RF</a:t>
+            </a:r>
+          </a:p>
+        </p:txBody>
+      </p:sp>
+      <p:sp>
+        <p:nvSpPr>
+          <p:cNvPr id="13" name="CasellaDiTesto 12">
+            <a:extLst>
+              <a:ext uri="{FF2B5EF4-FFF2-40B4-BE49-F238E27FC236}">
+                <a16:creationId xmlns:a16="http://schemas.microsoft.com/office/drawing/2014/main" id="{9227CAAA-B387-E4DF-3E35-20103885724D}"/>
+              </a:ext>
+            </a:extLst>
+          </p:cNvPr>
+          <p:cNvSpPr txBox="1"/>
+          <p:nvPr/>
+        </p:nvSpPr>
+        <p:spPr>
+          <a:xfrm>
+            <a:off x="358825" y="2792343"/>
+            <a:ext cx="1732193" cy="1384995"/>
+          </a:xfrm>
+          <a:prstGeom prst="rect">
+            <a:avLst/>
+          </a:prstGeom>
+          <a:noFill/>
+          <a:ln>
+            <a:solidFill>
+              <a:schemeClr val="accent1"/>
+            </a:solidFill>
+          </a:ln>
+        </p:spPr>
+        <p:txBody>
+          <a:bodyPr wrap="square" rtlCol="0">
+            <a:spAutoFit/>
+          </a:bodyPr>
+          <a:lstStyle/>
+          <a:p>
+            <a:r>
+              <a:rPr lang="it-IT" sz="1400" dirty="0"/>
+              <a:t>5 models are </a:t>
+            </a:r>
+            <a:r>
+              <a:rPr lang="it-IT" sz="1400" dirty="0" err="1"/>
+              <a:t>created</a:t>
+            </a:r>
+            <a:r>
+              <a:rPr lang="it-IT" sz="1400" dirty="0"/>
+              <a:t>, </a:t>
+            </a:r>
+            <a:r>
+              <a:rPr lang="it-IT" sz="1400" dirty="0" err="1"/>
+              <a:t>each</a:t>
+            </a:r>
+            <a:r>
+              <a:rPr lang="it-IT" sz="1400" dirty="0"/>
+              <a:t> </a:t>
+            </a:r>
+            <a:r>
+              <a:rPr lang="it-IT" sz="1400" dirty="0" err="1"/>
+              <a:t>trained</a:t>
+            </a:r>
+            <a:r>
+              <a:rPr lang="it-IT" sz="1400" dirty="0"/>
+              <a:t> on a </a:t>
+            </a:r>
+            <a:r>
+              <a:rPr lang="it-IT" sz="1400" dirty="0" err="1"/>
+              <a:t>portion</a:t>
+            </a:r>
+            <a:r>
+              <a:rPr lang="it-IT" sz="1400" dirty="0"/>
+              <a:t> of the TS (and </a:t>
+            </a:r>
+            <a:r>
+              <a:rPr lang="it-IT" sz="1400" dirty="0" err="1"/>
+              <a:t>uses</a:t>
+            </a:r>
+            <a:r>
+              <a:rPr lang="it-IT" sz="1400" dirty="0"/>
+              <a:t> the </a:t>
+            </a:r>
+            <a:r>
+              <a:rPr lang="it-IT" sz="1400" dirty="0" err="1"/>
+              <a:t>rest</a:t>
+            </a:r>
+            <a:r>
+              <a:rPr lang="it-IT" sz="1400" dirty="0"/>
+              <a:t> to monitor the </a:t>
+            </a:r>
+            <a:r>
+              <a:rPr lang="it-IT" sz="1400" dirty="0" err="1"/>
+              <a:t>loss</a:t>
+            </a:r>
+            <a:r>
+              <a:rPr lang="it-IT" sz="1400" dirty="0"/>
+              <a:t> for ES)</a:t>
+            </a:r>
+          </a:p>
+        </p:txBody>
+      </p:sp>
+      <p:sp>
+        <p:nvSpPr>
+          <p:cNvPr id="15" name="CasellaDiTesto 14">
+            <a:extLst>
+              <a:ext uri="{FF2B5EF4-FFF2-40B4-BE49-F238E27FC236}">
+                <a16:creationId xmlns:a16="http://schemas.microsoft.com/office/drawing/2014/main" id="{EAF2DE35-9FAC-C061-95D6-A3A5D974CA32}"/>
+              </a:ext>
+            </a:extLst>
+          </p:cNvPr>
+          <p:cNvSpPr txBox="1"/>
+          <p:nvPr/>
+        </p:nvSpPr>
+        <p:spPr>
+          <a:xfrm>
+            <a:off x="2630669" y="3218581"/>
+            <a:ext cx="1290918" cy="523220"/>
+          </a:xfrm>
+          <a:prstGeom prst="rect">
+            <a:avLst/>
+          </a:prstGeom>
+          <a:noFill/>
+          <a:ln>
+            <a:solidFill>
+              <a:schemeClr val="accent1"/>
+            </a:solidFill>
+          </a:ln>
+        </p:spPr>
+        <p:txBody>
+          <a:bodyPr wrap="square" rtlCol="0">
+            <a:spAutoFit/>
+          </a:bodyPr>
+          <a:lstStyle/>
+          <a:p>
+            <a:r>
+              <a:rPr lang="it-IT" sz="1400" dirty="0"/>
+              <a:t>An ensemble </a:t>
+            </a:r>
+            <a:r>
+              <a:rPr lang="it-IT" sz="1400" dirty="0" err="1"/>
+              <a:t>is</a:t>
+            </a:r>
+            <a:r>
+              <a:rPr lang="it-IT" sz="1400" dirty="0"/>
+              <a:t> </a:t>
+            </a:r>
+            <a:r>
+              <a:rPr lang="it-IT" sz="1400" dirty="0" err="1"/>
+              <a:t>created</a:t>
+            </a:r>
+            <a:r>
+              <a:rPr lang="it-IT" sz="1400" dirty="0"/>
+              <a:t>. </a:t>
+            </a:r>
+          </a:p>
+        </p:txBody>
+      </p:sp>
+      <p:sp>
+        <p:nvSpPr>
+          <p:cNvPr id="17" name="CasellaDiTesto 16">
+            <a:extLst>
+              <a:ext uri="{FF2B5EF4-FFF2-40B4-BE49-F238E27FC236}">
+                <a16:creationId xmlns:a16="http://schemas.microsoft.com/office/drawing/2014/main" id="{E2354FF5-2606-D4F7-1CFA-083C06F68371}"/>
+              </a:ext>
+            </a:extLst>
+          </p:cNvPr>
+          <p:cNvSpPr txBox="1"/>
+          <p:nvPr/>
+        </p:nvSpPr>
+        <p:spPr>
+          <a:xfrm>
+            <a:off x="4461238" y="3003137"/>
+            <a:ext cx="1815353" cy="954107"/>
+          </a:xfrm>
+          <a:prstGeom prst="rect">
+            <a:avLst/>
+          </a:prstGeom>
+          <a:noFill/>
+          <a:ln>
+            <a:solidFill>
+              <a:schemeClr val="accent1"/>
+            </a:solidFill>
+          </a:ln>
+        </p:spPr>
+        <p:txBody>
+          <a:bodyPr wrap="square" rtlCol="0">
+            <a:spAutoFit/>
+          </a:bodyPr>
+          <a:lstStyle/>
+          <a:p>
+            <a:r>
+              <a:rPr lang="it-IT" sz="1400" dirty="0"/>
+              <a:t>Print learning curve of the ensemble (</a:t>
+            </a:r>
+            <a:r>
+              <a:rPr lang="it-IT" sz="1400" dirty="0" err="1"/>
+              <a:t>average</a:t>
+            </a:r>
+            <a:r>
+              <a:rPr lang="it-IT" sz="1400" dirty="0"/>
+              <a:t> over the </a:t>
+            </a:r>
+            <a:r>
+              <a:rPr lang="it-IT" sz="1400" dirty="0" err="1"/>
+              <a:t>epochs</a:t>
+            </a:r>
+            <a:r>
+              <a:rPr lang="it-IT" sz="1400" dirty="0"/>
+              <a:t>)</a:t>
+            </a:r>
+          </a:p>
+        </p:txBody>
+      </p:sp>
+      <p:sp>
+        <p:nvSpPr>
+          <p:cNvPr id="19" name="CasellaDiTesto 18">
+            <a:extLst>
+              <a:ext uri="{FF2B5EF4-FFF2-40B4-BE49-F238E27FC236}">
+                <a16:creationId xmlns:a16="http://schemas.microsoft.com/office/drawing/2014/main" id="{0B9BA1A6-54D4-6384-495A-7F9C05C14C56}"/>
+              </a:ext>
+            </a:extLst>
+          </p:cNvPr>
+          <p:cNvSpPr txBox="1"/>
+          <p:nvPr/>
+        </p:nvSpPr>
+        <p:spPr>
+          <a:xfrm>
+            <a:off x="6831458" y="3022423"/>
+            <a:ext cx="1815353" cy="954107"/>
+          </a:xfrm>
+          <a:prstGeom prst="rect">
+            <a:avLst/>
+          </a:prstGeom>
+          <a:noFill/>
+          <a:ln>
+            <a:solidFill>
+              <a:schemeClr val="accent1"/>
+            </a:solidFill>
+          </a:ln>
+        </p:spPr>
+        <p:txBody>
+          <a:bodyPr wrap="square" rtlCol="0">
+            <a:spAutoFit/>
+          </a:bodyPr>
+          <a:lstStyle/>
+          <a:p>
+            <a:r>
+              <a:rPr lang="it-IT" sz="1400" dirty="0" err="1"/>
+              <a:t>Assess</a:t>
+            </a:r>
+            <a:r>
+              <a:rPr lang="it-IT" sz="1400" dirty="0"/>
+              <a:t> test </a:t>
+            </a:r>
+            <a:r>
+              <a:rPr lang="it-IT" sz="1400" dirty="0" err="1"/>
+              <a:t>error</a:t>
+            </a:r>
+            <a:r>
+              <a:rPr lang="it-IT" sz="1400" dirty="0"/>
+              <a:t> of </a:t>
+            </a:r>
+            <a:r>
+              <a:rPr lang="it-IT" sz="1400" dirty="0" err="1"/>
+              <a:t>this</a:t>
+            </a:r>
+            <a:r>
+              <a:rPr lang="it-IT" sz="1400" dirty="0"/>
+              <a:t> ensemble on the TS </a:t>
+            </a:r>
+            <a:r>
+              <a:rPr lang="it-IT" sz="1400" dirty="0" err="1"/>
+              <a:t>that</a:t>
+            </a:r>
+            <a:r>
+              <a:rPr lang="it-IT" sz="1400" dirty="0"/>
+              <a:t> </a:t>
+            </a:r>
+            <a:r>
+              <a:rPr lang="it-IT" sz="1400" dirty="0" err="1"/>
+              <a:t>was</a:t>
+            </a:r>
+            <a:r>
+              <a:rPr lang="it-IT" sz="1400" dirty="0"/>
+              <a:t> </a:t>
+            </a:r>
+            <a:r>
+              <a:rPr lang="it-IT" sz="1400" dirty="0" err="1"/>
+              <a:t>held</a:t>
+            </a:r>
+            <a:r>
+              <a:rPr lang="it-IT" sz="1400" dirty="0"/>
+              <a:t> out (</a:t>
+            </a:r>
+            <a:r>
+              <a:rPr lang="it-IT" sz="1400" dirty="0" err="1"/>
+              <a:t>average</a:t>
+            </a:r>
+            <a:r>
+              <a:rPr lang="it-IT" sz="1400" dirty="0"/>
+              <a:t>)</a:t>
+            </a:r>
+          </a:p>
+        </p:txBody>
+      </p:sp>
+      <p:sp>
+        <p:nvSpPr>
+          <p:cNvPr id="24" name="Freccia a destra 23">
+            <a:extLst>
+              <a:ext uri="{FF2B5EF4-FFF2-40B4-BE49-F238E27FC236}">
+                <a16:creationId xmlns:a16="http://schemas.microsoft.com/office/drawing/2014/main" id="{FF28B8D2-1122-6E0E-0A43-831A42C6837D}"/>
+              </a:ext>
+            </a:extLst>
+          </p:cNvPr>
+          <p:cNvSpPr/>
+          <p:nvPr/>
+        </p:nvSpPr>
+        <p:spPr>
+          <a:xfrm>
+            <a:off x="3418802" y="1578268"/>
+            <a:ext cx="539651" cy="295835"/>
+          </a:xfrm>
+          <a:prstGeom prst="rightArrow">
+            <a:avLst/>
+          </a:prstGeom>
+          <a:solidFill>
+            <a:srgbClr val="D3D3D3"/>
+          </a:solidFill>
+          <a:ln w="19050">
+            <a:solidFill>
+              <a:srgbClr val="636363"/>
+            </a:solidFill>
+          </a:ln>
+        </p:spPr>
+        <p:style>
+          <a:lnRef idx="2">
+            <a:schemeClr val="accent1">
+              <a:shade val="15000"/>
+            </a:schemeClr>
+          </a:lnRef>
+          <a:fillRef idx="1">
+            <a:schemeClr val="accent1"/>
+          </a:fillRef>
+          <a:effectRef idx="0">
+            <a:schemeClr val="accent1"/>
+          </a:effectRef>
+          <a:fontRef idx="minor">
+            <a:schemeClr val="lt1"/>
+          </a:fontRef>
+        </p:style>
+        <p:txBody>
+          <a:bodyPr rtlCol="0" anchor="ctr"/>
+          <a:lstStyle/>
+          <a:p>
+            <a:pPr algn="ctr"/>
+            <a:endParaRPr lang="it-IT">
+              <a:solidFill>
+                <a:srgbClr val="636363"/>
+              </a:solidFill>
+            </a:endParaRPr>
+          </a:p>
+        </p:txBody>
+      </p:sp>
+    </p:spTree>
+    <p:extLst>
+      <p:ext uri="{BB962C8B-B14F-4D97-AF65-F5344CB8AC3E}">
+        <p14:creationId xmlns:p14="http://schemas.microsoft.com/office/powerpoint/2010/main" val="2949012985"/>
+      </p:ext>
+    </p:extLst>
+  </p:cSld>
+  <p:clrMapOvr>
+    <a:masterClrMapping/>
+  </p:clrMapOvr>
+</p:sld>
+</file>
+
+<file path=ppt/slides/slide15.xml><?xml version="1.0" encoding="utf-8"?>
+<p:sld xmlns:a="http://schemas.openxmlformats.org/drawingml/2006/main" xmlns:r="http://schemas.openxmlformats.org/officeDocument/2006/relationships" xmlns:p="http://schemas.openxmlformats.org/presentationml/2006/main">
+  <p:cSld>
+    <p:spTree>
+      <p:nvGrpSpPr>
+        <p:cNvPr id="1" name=""/>
+        <p:cNvGrpSpPr/>
+        <p:nvPr/>
+      </p:nvGrpSpPr>
+      <p:grpSpPr>
+        <a:xfrm>
+          <a:off x="0" y="0"/>
+          <a:ext cx="0" cy="0"/>
+          <a:chOff x="0" y="0"/>
+          <a:chExt cx="0" cy="0"/>
+        </a:xfrm>
+      </p:grpSpPr>
+      <p:sp>
+        <p:nvSpPr>
           <p:cNvPr id="84" name="PlaceHolder 1"/>
           <p:cNvSpPr>
             <a:spLocks noGrp="1"/>
@@ -9665,7 +10612,7 @@
                 <a:latin typeface="Arial"/>
                 <a:ea typeface="Arial"/>
               </a:rPr>
-              <a:t>14</a:t>
+              <a:t>15</a:t>
             </a:fld>
             <a:endParaRPr lang="it-IT" sz="1000" b="0" strike="noStrike" spc="-1">
               <a:latin typeface="Times New Roman"/>
@@ -11026,7 +11973,7 @@
 </p:sld>
 </file>
 
-<file path=ppt/slides/slide15.xml><?xml version="1.0" encoding="utf-8"?>
+<file path=ppt/slides/slide16.xml><?xml version="1.0" encoding="utf-8"?>
 <p:sld xmlns:a="http://schemas.openxmlformats.org/drawingml/2006/main" xmlns:r="http://schemas.openxmlformats.org/officeDocument/2006/relationships" xmlns:p="http://schemas.openxmlformats.org/presentationml/2006/main">
   <p:cSld>
     <p:spTree>
@@ -11163,7 +12110,7 @@
                 <a:latin typeface="Arial"/>
                 <a:ea typeface="Arial"/>
               </a:rPr>
-              <a:t>15</a:t>
+              <a:t>16</a:t>
             </a:fld>
             <a:endParaRPr lang="it-IT" sz="1000" b="0" strike="noStrike" spc="-1">
               <a:latin typeface="Times New Roman"/>
@@ -13643,7 +14590,7 @@
 </p:sld>
 </file>
 
-<file path=ppt/slides/slide16.xml><?xml version="1.0" encoding="utf-8"?>
+<file path=ppt/slides/slide17.xml><?xml version="1.0" encoding="utf-8"?>
 <p:sld xmlns:a="http://schemas.openxmlformats.org/drawingml/2006/main" xmlns:r="http://schemas.openxmlformats.org/officeDocument/2006/relationships" xmlns:p="http://schemas.openxmlformats.org/presentationml/2006/main">
   <p:cSld>
     <p:spTree>
@@ -13790,7 +14737,7 @@
                 <a:latin typeface="Arial"/>
                 <a:ea typeface="Arial"/>
               </a:rPr>
-              <a:t>16</a:t>
+              <a:t>17</a:t>
             </a:fld>
             <a:endParaRPr lang="it-IT" sz="1000" b="0" strike="noStrike" spc="-1">
               <a:latin typeface="Times New Roman"/>
@@ -15329,7 +16276,7 @@
 </p:sld>
 </file>
 
-<file path=ppt/slides/slide17.xml><?xml version="1.0" encoding="utf-8"?>
+<file path=ppt/slides/slide18.xml><?xml version="1.0" encoding="utf-8"?>
 <p:sld xmlns:a="http://schemas.openxmlformats.org/drawingml/2006/main" xmlns:r="http://schemas.openxmlformats.org/officeDocument/2006/relationships" xmlns:p="http://schemas.openxmlformats.org/presentationml/2006/main">
   <p:cSld>
     <p:spTree>
@@ -15560,7 +16507,7 @@
                 <a:latin typeface="Arial"/>
                 <a:ea typeface="Arial"/>
               </a:rPr>
-              <a:t>17</a:t>
+              <a:t>18</a:t>
             </a:fld>
             <a:endParaRPr lang="it-IT" sz="1000" b="0" strike="noStrike" spc="-1">
               <a:latin typeface="Times New Roman"/>
@@ -15576,7 +16523,7 @@
 </p:sld>
 </file>
 
-<file path=ppt/slides/slide18.xml><?xml version="1.0" encoding="utf-8"?>
+<file path=ppt/slides/slide19.xml><?xml version="1.0" encoding="utf-8"?>
 <p:sld xmlns:a="http://schemas.openxmlformats.org/drawingml/2006/main" xmlns:r="http://schemas.openxmlformats.org/officeDocument/2006/relationships" xmlns:p="http://schemas.openxmlformats.org/presentationml/2006/main">
   <p:cSld>
     <p:spTree>
@@ -15792,7 +16739,7 @@
                 <a:latin typeface="Arial"/>
                 <a:ea typeface="Arial"/>
               </a:rPr>
-              <a:t>18</a:t>
+              <a:t>19</a:t>
             </a:fld>
             <a:endParaRPr lang="it-IT" sz="1000" b="0" strike="noStrike" spc="-1">
               <a:latin typeface="Times New Roman"/>
@@ -15804,425 +16751,6 @@
     <p:extLst>
       <p:ext uri="{BB962C8B-B14F-4D97-AF65-F5344CB8AC3E}">
         <p14:creationId xmlns:p14="http://schemas.microsoft.com/office/powerpoint/2010/main" val="3854778879"/>
-      </p:ext>
-    </p:extLst>
-  </p:cSld>
-  <p:clrMapOvr>
-    <a:masterClrMapping/>
-  </p:clrMapOvr>
-</p:sld>
-</file>
-
-<file path=ppt/slides/slide19.xml><?xml version="1.0" encoding="utf-8"?>
-<p:sld xmlns:a="http://schemas.openxmlformats.org/drawingml/2006/main" xmlns:r="http://schemas.openxmlformats.org/officeDocument/2006/relationships" xmlns:p="http://schemas.openxmlformats.org/presentationml/2006/main">
-  <p:cSld>
-    <p:spTree>
-      <p:nvGrpSpPr>
-        <p:cNvPr id="1" name=""/>
-        <p:cNvGrpSpPr/>
-        <p:nvPr/>
-      </p:nvGrpSpPr>
-      <p:grpSpPr>
-        <a:xfrm>
-          <a:off x="0" y="0"/>
-          <a:ext cx="0" cy="0"/>
-          <a:chOff x="0" y="0"/>
-          <a:chExt cx="0" cy="0"/>
-        </a:xfrm>
-      </p:grpSpPr>
-      <p:sp>
-        <p:nvSpPr>
-          <p:cNvPr id="108" name="PlaceHolder 1"/>
-          <p:cNvSpPr>
-            <a:spLocks noGrp="1"/>
-          </p:cNvSpPr>
-          <p:nvPr>
-            <p:ph type="title"/>
-          </p:nvPr>
-        </p:nvSpPr>
-        <p:spPr>
-          <a:xfrm>
-            <a:off x="311760" y="0"/>
-            <a:ext cx="8520120" cy="576000"/>
-          </a:xfrm>
-          <a:prstGeom prst="rect">
-            <a:avLst/>
-          </a:prstGeom>
-          <a:noFill/>
-          <a:ln w="0">
-            <a:noFill/>
-          </a:ln>
-        </p:spPr>
-        <p:txBody>
-          <a:bodyPr tIns="91440" bIns="91440" anchor="t">
-            <a:normAutofit fontScale="91000"/>
-          </a:bodyPr>
-          <a:lstStyle/>
-          <a:p>
-            <a:pPr>
-              <a:lnSpc>
-                <a:spcPct val="100000"/>
-              </a:lnSpc>
-              <a:buNone/>
-              <a:tabLst>
-                <a:tab pos="0" algn="l"/>
-              </a:tabLst>
-            </a:pPr>
-            <a:r>
-              <a:rPr lang="it" sz="2600" b="0" strike="noStrike" spc="-1" dirty="0">
-                <a:solidFill>
-                  <a:srgbClr val="000000"/>
-                </a:solidFill>
-                <a:latin typeface="Arial"/>
-                <a:ea typeface="Arial"/>
-              </a:rPr>
-              <a:t>CUP</a:t>
-            </a:r>
-            <a:r>
-              <a:rPr lang="it" sz="2400" b="0" strike="noStrike" spc="-1" dirty="0">
-                <a:solidFill>
-                  <a:srgbClr val="000000"/>
-                </a:solidFill>
-                <a:latin typeface="Arial"/>
-                <a:ea typeface="Arial"/>
-              </a:rPr>
-              <a:t> </a:t>
-            </a:r>
-            <a:r>
-              <a:rPr lang="it" sz="2600" b="0" strike="noStrike" spc="-1" dirty="0">
-                <a:solidFill>
-                  <a:srgbClr val="000000"/>
-                </a:solidFill>
-                <a:latin typeface="Arial"/>
-                <a:ea typeface="Arial"/>
-              </a:rPr>
-              <a:t>Results: final model – 1 </a:t>
-            </a:r>
-            <a:endParaRPr lang="it-IT" sz="2400" b="0" strike="noStrike" spc="-1" dirty="0">
-              <a:solidFill>
-                <a:srgbClr val="000000"/>
-              </a:solidFill>
-              <a:latin typeface="Arial"/>
-            </a:endParaRPr>
-          </a:p>
-        </p:txBody>
-      </p:sp>
-      <p:sp>
-        <p:nvSpPr>
-          <p:cNvPr id="110" name="PlaceHolder 3"/>
-          <p:cNvSpPr>
-            <a:spLocks noGrp="1"/>
-          </p:cNvSpPr>
-          <p:nvPr>
-            <p:ph type="sldNum" idx="10"/>
-          </p:nvPr>
-        </p:nvSpPr>
-        <p:spPr>
-          <a:xfrm>
-            <a:off x="8472600" y="4663080"/>
-            <a:ext cx="548280" cy="393120"/>
-          </a:xfrm>
-          <a:prstGeom prst="rect">
-            <a:avLst/>
-          </a:prstGeom>
-          <a:noFill/>
-          <a:ln w="0">
-            <a:noFill/>
-          </a:ln>
-        </p:spPr>
-        <p:txBody>
-          <a:bodyPr tIns="91440" bIns="91440" anchor="ctr">
-            <a:normAutofit/>
-          </a:bodyPr>
-          <a:lstStyle>
-            <a:lvl1pPr algn="r">
-              <a:lnSpc>
-                <a:spcPct val="100000"/>
-              </a:lnSpc>
-              <a:buNone/>
-              <a:tabLst>
-                <a:tab pos="0" algn="l"/>
-              </a:tabLst>
-              <a:defRPr lang="it" sz="1000" b="0" strike="noStrike" spc="-1">
-                <a:solidFill>
-                  <a:srgbClr val="595959"/>
-                </a:solidFill>
-                <a:latin typeface="Arial"/>
-                <a:ea typeface="Arial"/>
-              </a:defRPr>
-            </a:lvl1pPr>
-          </a:lstStyle>
-          <a:p>
-            <a:pPr algn="r">
-              <a:lnSpc>
-                <a:spcPct val="100000"/>
-              </a:lnSpc>
-              <a:buNone/>
-              <a:tabLst>
-                <a:tab pos="0" algn="l"/>
-              </a:tabLst>
-            </a:pPr>
-            <a:fld id="{70083C99-8290-44C9-AB12-6D72EC62BA1C}" type="slidenum">
-              <a:rPr lang="it" sz="1000" b="0" strike="noStrike" spc="-1">
-                <a:solidFill>
-                  <a:srgbClr val="595959"/>
-                </a:solidFill>
-                <a:latin typeface="Arial"/>
-                <a:ea typeface="Arial"/>
-              </a:rPr>
-              <a:t>19</a:t>
-            </a:fld>
-            <a:endParaRPr lang="it-IT" sz="1000" b="0" strike="noStrike" spc="-1">
-              <a:latin typeface="Times New Roman"/>
-            </a:endParaRPr>
-          </a:p>
-        </p:txBody>
-      </p:sp>
-      <p:sp>
-        <p:nvSpPr>
-          <p:cNvPr id="2" name="Rettangolo 1">
-            <a:extLst>
-              <a:ext uri="{FF2B5EF4-FFF2-40B4-BE49-F238E27FC236}">
-                <a16:creationId xmlns:a16="http://schemas.microsoft.com/office/drawing/2014/main" id="{A84D9135-3616-EE45-ECF4-129488406C5F}"/>
-              </a:ext>
-            </a:extLst>
-          </p:cNvPr>
-          <p:cNvSpPr/>
-          <p:nvPr/>
-        </p:nvSpPr>
-        <p:spPr>
-          <a:xfrm>
-            <a:off x="311760" y="1748230"/>
-            <a:ext cx="3836658" cy="2566564"/>
-          </a:xfrm>
-          <a:prstGeom prst="rect">
-            <a:avLst/>
-          </a:prstGeom>
-        </p:spPr>
-        <p:style>
-          <a:lnRef idx="2">
-            <a:schemeClr val="accent3">
-              <a:shade val="15000"/>
-            </a:schemeClr>
-          </a:lnRef>
-          <a:fillRef idx="1">
-            <a:schemeClr val="accent3"/>
-          </a:fillRef>
-          <a:effectRef idx="0">
-            <a:schemeClr val="accent3"/>
-          </a:effectRef>
-          <a:fontRef idx="minor">
-            <a:schemeClr val="lt1"/>
-          </a:fontRef>
-        </p:style>
-        <p:txBody>
-          <a:bodyPr rtlCol="0" anchor="ctr"/>
-          <a:lstStyle/>
-          <a:p>
-            <a:pPr algn="ctr"/>
-            <a:r>
-              <a:rPr lang="it-IT" dirty="0"/>
-              <a:t>Learning curve plot for the </a:t>
-            </a:r>
-            <a:r>
-              <a:rPr lang="it-IT" dirty="0" err="1"/>
-              <a:t>final</a:t>
-            </a:r>
-            <a:r>
-              <a:rPr lang="it-IT" dirty="0"/>
-              <a:t> model</a:t>
-            </a:r>
-          </a:p>
-        </p:txBody>
-      </p:sp>
-      <p:sp>
-        <p:nvSpPr>
-          <p:cNvPr id="4" name="CasellaDiTesto 3">
-            <a:extLst>
-              <a:ext uri="{FF2B5EF4-FFF2-40B4-BE49-F238E27FC236}">
-                <a16:creationId xmlns:a16="http://schemas.microsoft.com/office/drawing/2014/main" id="{A2C03CD9-5D4B-7181-8758-3C5F98479B49}"/>
-              </a:ext>
-            </a:extLst>
-          </p:cNvPr>
-          <p:cNvSpPr txBox="1"/>
-          <p:nvPr/>
-        </p:nvSpPr>
-        <p:spPr>
-          <a:xfrm>
-            <a:off x="311760" y="920686"/>
-            <a:ext cx="8832240" cy="307777"/>
-          </a:xfrm>
-          <a:prstGeom prst="rect">
-            <a:avLst/>
-          </a:prstGeom>
-          <a:noFill/>
-        </p:spPr>
-        <p:txBody>
-          <a:bodyPr wrap="square" rtlCol="0">
-            <a:spAutoFit/>
-          </a:bodyPr>
-          <a:lstStyle/>
-          <a:p>
-            <a:r>
-              <a:rPr lang="it-IT" sz="1400" dirty="0" err="1"/>
-              <a:t>We</a:t>
-            </a:r>
-            <a:r>
-              <a:rPr lang="it-IT" sz="1400" dirty="0"/>
-              <a:t> </a:t>
-            </a:r>
-            <a:r>
-              <a:rPr lang="it-IT" sz="1400" dirty="0" err="1"/>
-              <a:t>chose</a:t>
-            </a:r>
-            <a:r>
-              <a:rPr lang="it-IT" sz="1400" dirty="0"/>
-              <a:t> XYZ </a:t>
-            </a:r>
-            <a:r>
-              <a:rPr lang="it-IT" sz="1400" dirty="0" err="1"/>
-              <a:t>as</a:t>
-            </a:r>
-            <a:r>
-              <a:rPr lang="it-IT" sz="1400" dirty="0"/>
-              <a:t> the </a:t>
-            </a:r>
-            <a:r>
-              <a:rPr lang="it-IT" sz="1400" dirty="0" err="1"/>
-              <a:t>final</a:t>
-            </a:r>
-            <a:r>
-              <a:rPr lang="it-IT" sz="1400" dirty="0"/>
-              <a:t> model. </a:t>
-            </a:r>
-            <a:r>
-              <a:rPr lang="it-IT" sz="1400" dirty="0" err="1">
-                <a:solidFill>
-                  <a:srgbClr val="FF0000"/>
-                </a:solidFill>
-              </a:rPr>
-              <a:t>We</a:t>
-            </a:r>
-            <a:r>
-              <a:rPr lang="it-IT" sz="1400" dirty="0">
-                <a:solidFill>
-                  <a:srgbClr val="FF0000"/>
-                </a:solidFill>
-              </a:rPr>
-              <a:t> </a:t>
-            </a:r>
-            <a:r>
-              <a:rPr lang="it-IT" sz="1400" dirty="0" err="1">
-                <a:solidFill>
-                  <a:srgbClr val="FF0000"/>
-                </a:solidFill>
-              </a:rPr>
-              <a:t>chose</a:t>
-            </a:r>
-            <a:r>
-              <a:rPr lang="it-IT" sz="1400" dirty="0">
-                <a:solidFill>
-                  <a:srgbClr val="FF0000"/>
-                </a:solidFill>
-              </a:rPr>
-              <a:t> </a:t>
-            </a:r>
-            <a:r>
-              <a:rPr lang="it-IT" sz="1400" dirty="0" err="1">
-                <a:solidFill>
-                  <a:srgbClr val="FF0000"/>
-                </a:solidFill>
-              </a:rPr>
-              <a:t>this</a:t>
-            </a:r>
-            <a:r>
-              <a:rPr lang="it-IT" sz="1400" dirty="0">
-                <a:solidFill>
-                  <a:srgbClr val="FF0000"/>
-                </a:solidFill>
-              </a:rPr>
-              <a:t> model </a:t>
-            </a:r>
-            <a:r>
-              <a:rPr lang="it-IT" sz="1400" dirty="0" err="1">
-                <a:solidFill>
-                  <a:srgbClr val="FF0000"/>
-                </a:solidFill>
-              </a:rPr>
-              <a:t>because</a:t>
-            </a:r>
-            <a:r>
-              <a:rPr lang="it-IT" sz="1400" dirty="0"/>
-              <a:t>… </a:t>
-            </a:r>
-          </a:p>
-        </p:txBody>
-      </p:sp>
-      <p:sp>
-        <p:nvSpPr>
-          <p:cNvPr id="3" name="Rettangolo 2">
-            <a:extLst>
-              <a:ext uri="{FF2B5EF4-FFF2-40B4-BE49-F238E27FC236}">
-                <a16:creationId xmlns:a16="http://schemas.microsoft.com/office/drawing/2014/main" id="{C6A2D120-85CC-4BB3-0D21-B25E88A6BDC8}"/>
-              </a:ext>
-            </a:extLst>
-          </p:cNvPr>
-          <p:cNvSpPr/>
-          <p:nvPr/>
-        </p:nvSpPr>
-        <p:spPr>
-          <a:xfrm>
-            <a:off x="4910082" y="1748230"/>
-            <a:ext cx="3836658" cy="2566564"/>
-          </a:xfrm>
-          <a:prstGeom prst="rect">
-            <a:avLst/>
-          </a:prstGeom>
-        </p:spPr>
-        <p:style>
-          <a:lnRef idx="2">
-            <a:schemeClr val="accent3">
-              <a:shade val="15000"/>
-            </a:schemeClr>
-          </a:lnRef>
-          <a:fillRef idx="1">
-            <a:schemeClr val="accent3"/>
-          </a:fillRef>
-          <a:effectRef idx="0">
-            <a:schemeClr val="accent3"/>
-          </a:effectRef>
-          <a:fontRef idx="minor">
-            <a:schemeClr val="lt1"/>
-          </a:fontRef>
-        </p:style>
-        <p:txBody>
-          <a:bodyPr rtlCol="0" anchor="ctr"/>
-          <a:lstStyle/>
-          <a:p>
-            <a:pPr algn="ctr"/>
-            <a:r>
-              <a:rPr lang="it-IT" dirty="0" err="1"/>
-              <a:t>Other</a:t>
-            </a:r>
-            <a:r>
-              <a:rPr lang="it-IT" dirty="0"/>
-              <a:t> cool plot for the </a:t>
-            </a:r>
-            <a:r>
-              <a:rPr lang="it-IT" dirty="0" err="1"/>
-              <a:t>final</a:t>
-            </a:r>
-            <a:r>
-              <a:rPr lang="it-IT" dirty="0"/>
-              <a:t> model</a:t>
-            </a:r>
-          </a:p>
-        </p:txBody>
-      </p:sp>
-    </p:spTree>
-    <p:extLst>
-      <p:ext uri="{BB962C8B-B14F-4D97-AF65-F5344CB8AC3E}">
-        <p14:creationId xmlns:p14="http://schemas.microsoft.com/office/powerpoint/2010/main" val="479709121"/>
       </p:ext>
     </p:extLst>
   </p:cSld>
@@ -16896,17 +17424,7 @@
                 <a:latin typeface="Arial"/>
                 <a:ea typeface="Arial"/>
               </a:rPr>
-              <a:t>Results: final model</a:t>
-            </a:r>
-            <a:r>
-              <a:rPr lang="it" sz="2600" spc="-1" dirty="0">
-                <a:solidFill>
-                  <a:srgbClr val="000000"/>
-                </a:solidFill>
-                <a:latin typeface="Arial"/>
-                <a:ea typeface="Arial"/>
-              </a:rPr>
-              <a:t> – 2</a:t>
+              <a:t>Results: final model – 1 </a:t>
             </a:r>
             <a:endParaRPr lang="it-IT" sz="2400" b="0" strike="noStrike" spc="-1" dirty="0">
               <a:solidFill>
@@ -16981,6 +17499,435 @@
                 <a:ea typeface="Arial"/>
               </a:rPr>
               <a:t>20</a:t>
+            </a:fld>
+            <a:endParaRPr lang="it-IT" sz="1000" b="0" strike="noStrike" spc="-1">
+              <a:latin typeface="Times New Roman"/>
+            </a:endParaRPr>
+          </a:p>
+        </p:txBody>
+      </p:sp>
+      <p:sp>
+        <p:nvSpPr>
+          <p:cNvPr id="2" name="Rettangolo 1">
+            <a:extLst>
+              <a:ext uri="{FF2B5EF4-FFF2-40B4-BE49-F238E27FC236}">
+                <a16:creationId xmlns:a16="http://schemas.microsoft.com/office/drawing/2014/main" id="{A84D9135-3616-EE45-ECF4-129488406C5F}"/>
+              </a:ext>
+            </a:extLst>
+          </p:cNvPr>
+          <p:cNvSpPr/>
+          <p:nvPr/>
+        </p:nvSpPr>
+        <p:spPr>
+          <a:xfrm>
+            <a:off x="311760" y="1748230"/>
+            <a:ext cx="3836658" cy="2566564"/>
+          </a:xfrm>
+          <a:prstGeom prst="rect">
+            <a:avLst/>
+          </a:prstGeom>
+        </p:spPr>
+        <p:style>
+          <a:lnRef idx="2">
+            <a:schemeClr val="accent3">
+              <a:shade val="15000"/>
+            </a:schemeClr>
+          </a:lnRef>
+          <a:fillRef idx="1">
+            <a:schemeClr val="accent3"/>
+          </a:fillRef>
+          <a:effectRef idx="0">
+            <a:schemeClr val="accent3"/>
+          </a:effectRef>
+          <a:fontRef idx="minor">
+            <a:schemeClr val="lt1"/>
+          </a:fontRef>
+        </p:style>
+        <p:txBody>
+          <a:bodyPr rtlCol="0" anchor="ctr"/>
+          <a:lstStyle/>
+          <a:p>
+            <a:pPr algn="ctr"/>
+            <a:r>
+              <a:rPr lang="it-IT" dirty="0"/>
+              <a:t>Learning curve plot for the </a:t>
+            </a:r>
+            <a:r>
+              <a:rPr lang="it-IT" dirty="0" err="1"/>
+              <a:t>final</a:t>
+            </a:r>
+            <a:r>
+              <a:rPr lang="it-IT" dirty="0"/>
+              <a:t> model</a:t>
+            </a:r>
+          </a:p>
+        </p:txBody>
+      </p:sp>
+      <p:sp>
+        <p:nvSpPr>
+          <p:cNvPr id="4" name="CasellaDiTesto 3">
+            <a:extLst>
+              <a:ext uri="{FF2B5EF4-FFF2-40B4-BE49-F238E27FC236}">
+                <a16:creationId xmlns:a16="http://schemas.microsoft.com/office/drawing/2014/main" id="{A2C03CD9-5D4B-7181-8758-3C5F98479B49}"/>
+              </a:ext>
+            </a:extLst>
+          </p:cNvPr>
+          <p:cNvSpPr txBox="1"/>
+          <p:nvPr/>
+        </p:nvSpPr>
+        <p:spPr>
+          <a:xfrm>
+            <a:off x="311760" y="920686"/>
+            <a:ext cx="8832240" cy="307777"/>
+          </a:xfrm>
+          <a:prstGeom prst="rect">
+            <a:avLst/>
+          </a:prstGeom>
+          <a:noFill/>
+        </p:spPr>
+        <p:txBody>
+          <a:bodyPr wrap="square" rtlCol="0">
+            <a:spAutoFit/>
+          </a:bodyPr>
+          <a:lstStyle/>
+          <a:p>
+            <a:r>
+              <a:rPr lang="it-IT" sz="1400" dirty="0" err="1"/>
+              <a:t>We</a:t>
+            </a:r>
+            <a:r>
+              <a:rPr lang="it-IT" sz="1400" dirty="0"/>
+              <a:t> </a:t>
+            </a:r>
+            <a:r>
+              <a:rPr lang="it-IT" sz="1400" dirty="0" err="1"/>
+              <a:t>chose</a:t>
+            </a:r>
+            <a:r>
+              <a:rPr lang="it-IT" sz="1400" dirty="0"/>
+              <a:t> XYZ </a:t>
+            </a:r>
+            <a:r>
+              <a:rPr lang="it-IT" sz="1400" dirty="0" err="1"/>
+              <a:t>as</a:t>
+            </a:r>
+            <a:r>
+              <a:rPr lang="it-IT" sz="1400" dirty="0"/>
+              <a:t> the </a:t>
+            </a:r>
+            <a:r>
+              <a:rPr lang="it-IT" sz="1400" dirty="0" err="1"/>
+              <a:t>final</a:t>
+            </a:r>
+            <a:r>
+              <a:rPr lang="it-IT" sz="1400" dirty="0"/>
+              <a:t> model. </a:t>
+            </a:r>
+            <a:r>
+              <a:rPr lang="it-IT" sz="1400" dirty="0" err="1">
+                <a:solidFill>
+                  <a:srgbClr val="FF0000"/>
+                </a:solidFill>
+              </a:rPr>
+              <a:t>We</a:t>
+            </a:r>
+            <a:r>
+              <a:rPr lang="it-IT" sz="1400" dirty="0">
+                <a:solidFill>
+                  <a:srgbClr val="FF0000"/>
+                </a:solidFill>
+              </a:rPr>
+              <a:t> </a:t>
+            </a:r>
+            <a:r>
+              <a:rPr lang="it-IT" sz="1400" dirty="0" err="1">
+                <a:solidFill>
+                  <a:srgbClr val="FF0000"/>
+                </a:solidFill>
+              </a:rPr>
+              <a:t>chose</a:t>
+            </a:r>
+            <a:r>
+              <a:rPr lang="it-IT" sz="1400" dirty="0">
+                <a:solidFill>
+                  <a:srgbClr val="FF0000"/>
+                </a:solidFill>
+              </a:rPr>
+              <a:t> </a:t>
+            </a:r>
+            <a:r>
+              <a:rPr lang="it-IT" sz="1400" dirty="0" err="1">
+                <a:solidFill>
+                  <a:srgbClr val="FF0000"/>
+                </a:solidFill>
+              </a:rPr>
+              <a:t>this</a:t>
+            </a:r>
+            <a:r>
+              <a:rPr lang="it-IT" sz="1400" dirty="0">
+                <a:solidFill>
+                  <a:srgbClr val="FF0000"/>
+                </a:solidFill>
+              </a:rPr>
+              <a:t> model </a:t>
+            </a:r>
+            <a:r>
+              <a:rPr lang="it-IT" sz="1400" dirty="0" err="1">
+                <a:solidFill>
+                  <a:srgbClr val="FF0000"/>
+                </a:solidFill>
+              </a:rPr>
+              <a:t>because</a:t>
+            </a:r>
+            <a:r>
+              <a:rPr lang="it-IT" sz="1400" dirty="0"/>
+              <a:t>… </a:t>
+            </a:r>
+          </a:p>
+        </p:txBody>
+      </p:sp>
+      <p:sp>
+        <p:nvSpPr>
+          <p:cNvPr id="3" name="Rettangolo 2">
+            <a:extLst>
+              <a:ext uri="{FF2B5EF4-FFF2-40B4-BE49-F238E27FC236}">
+                <a16:creationId xmlns:a16="http://schemas.microsoft.com/office/drawing/2014/main" id="{C6A2D120-85CC-4BB3-0D21-B25E88A6BDC8}"/>
+              </a:ext>
+            </a:extLst>
+          </p:cNvPr>
+          <p:cNvSpPr/>
+          <p:nvPr/>
+        </p:nvSpPr>
+        <p:spPr>
+          <a:xfrm>
+            <a:off x="4910082" y="1748230"/>
+            <a:ext cx="3836658" cy="2566564"/>
+          </a:xfrm>
+          <a:prstGeom prst="rect">
+            <a:avLst/>
+          </a:prstGeom>
+        </p:spPr>
+        <p:style>
+          <a:lnRef idx="2">
+            <a:schemeClr val="accent3">
+              <a:shade val="15000"/>
+            </a:schemeClr>
+          </a:lnRef>
+          <a:fillRef idx="1">
+            <a:schemeClr val="accent3"/>
+          </a:fillRef>
+          <a:effectRef idx="0">
+            <a:schemeClr val="accent3"/>
+          </a:effectRef>
+          <a:fontRef idx="minor">
+            <a:schemeClr val="lt1"/>
+          </a:fontRef>
+        </p:style>
+        <p:txBody>
+          <a:bodyPr rtlCol="0" anchor="ctr"/>
+          <a:lstStyle/>
+          <a:p>
+            <a:pPr algn="ctr"/>
+            <a:r>
+              <a:rPr lang="it-IT" dirty="0" err="1"/>
+              <a:t>Other</a:t>
+            </a:r>
+            <a:r>
+              <a:rPr lang="it-IT" dirty="0"/>
+              <a:t> cool plot for the </a:t>
+            </a:r>
+            <a:r>
+              <a:rPr lang="it-IT" dirty="0" err="1"/>
+              <a:t>final</a:t>
+            </a:r>
+            <a:r>
+              <a:rPr lang="it-IT" dirty="0"/>
+              <a:t> model</a:t>
+            </a:r>
+          </a:p>
+        </p:txBody>
+      </p:sp>
+    </p:spTree>
+    <p:extLst>
+      <p:ext uri="{BB962C8B-B14F-4D97-AF65-F5344CB8AC3E}">
+        <p14:creationId xmlns:p14="http://schemas.microsoft.com/office/powerpoint/2010/main" val="479709121"/>
+      </p:ext>
+    </p:extLst>
+  </p:cSld>
+  <p:clrMapOvr>
+    <a:masterClrMapping/>
+  </p:clrMapOvr>
+</p:sld>
+</file>
+
+<file path=ppt/slides/slide21.xml><?xml version="1.0" encoding="utf-8"?>
+<p:sld xmlns:a="http://schemas.openxmlformats.org/drawingml/2006/main" xmlns:r="http://schemas.openxmlformats.org/officeDocument/2006/relationships" xmlns:p="http://schemas.openxmlformats.org/presentationml/2006/main">
+  <p:cSld>
+    <p:spTree>
+      <p:nvGrpSpPr>
+        <p:cNvPr id="1" name=""/>
+        <p:cNvGrpSpPr/>
+        <p:nvPr/>
+      </p:nvGrpSpPr>
+      <p:grpSpPr>
+        <a:xfrm>
+          <a:off x="0" y="0"/>
+          <a:ext cx="0" cy="0"/>
+          <a:chOff x="0" y="0"/>
+          <a:chExt cx="0" cy="0"/>
+        </a:xfrm>
+      </p:grpSpPr>
+      <p:sp>
+        <p:nvSpPr>
+          <p:cNvPr id="108" name="PlaceHolder 1"/>
+          <p:cNvSpPr>
+            <a:spLocks noGrp="1"/>
+          </p:cNvSpPr>
+          <p:nvPr>
+            <p:ph type="title"/>
+          </p:nvPr>
+        </p:nvSpPr>
+        <p:spPr>
+          <a:xfrm>
+            <a:off x="311760" y="0"/>
+            <a:ext cx="8520120" cy="576000"/>
+          </a:xfrm>
+          <a:prstGeom prst="rect">
+            <a:avLst/>
+          </a:prstGeom>
+          <a:noFill/>
+          <a:ln w="0">
+            <a:noFill/>
+          </a:ln>
+        </p:spPr>
+        <p:txBody>
+          <a:bodyPr tIns="91440" bIns="91440" anchor="t">
+            <a:normAutofit fontScale="91000"/>
+          </a:bodyPr>
+          <a:lstStyle/>
+          <a:p>
+            <a:pPr>
+              <a:lnSpc>
+                <a:spcPct val="100000"/>
+              </a:lnSpc>
+              <a:buNone/>
+              <a:tabLst>
+                <a:tab pos="0" algn="l"/>
+              </a:tabLst>
+            </a:pPr>
+            <a:r>
+              <a:rPr lang="it" sz="2600" b="0" strike="noStrike" spc="-1" dirty="0">
+                <a:solidFill>
+                  <a:srgbClr val="000000"/>
+                </a:solidFill>
+                <a:latin typeface="Arial"/>
+                <a:ea typeface="Arial"/>
+              </a:rPr>
+              <a:t>CUP</a:t>
+            </a:r>
+            <a:r>
+              <a:rPr lang="it" sz="2400" b="0" strike="noStrike" spc="-1" dirty="0">
+                <a:solidFill>
+                  <a:srgbClr val="000000"/>
+                </a:solidFill>
+                <a:latin typeface="Arial"/>
+                <a:ea typeface="Arial"/>
+              </a:rPr>
+              <a:t> </a:t>
+            </a:r>
+            <a:r>
+              <a:rPr lang="it" sz="2600" b="0" strike="noStrike" spc="-1" dirty="0">
+                <a:solidFill>
+                  <a:srgbClr val="000000"/>
+                </a:solidFill>
+                <a:latin typeface="Arial"/>
+                <a:ea typeface="Arial"/>
+              </a:rPr>
+              <a:t>Results: final model</a:t>
+            </a:r>
+            <a:r>
+              <a:rPr lang="it" sz="2600" spc="-1" dirty="0">
+                <a:solidFill>
+                  <a:srgbClr val="000000"/>
+                </a:solidFill>
+                <a:latin typeface="Arial"/>
+                <a:ea typeface="Arial"/>
+              </a:rPr>
+              <a:t> – 2</a:t>
+            </a:r>
+            <a:endParaRPr lang="it-IT" sz="2400" b="0" strike="noStrike" spc="-1" dirty="0">
+              <a:solidFill>
+                <a:srgbClr val="000000"/>
+              </a:solidFill>
+              <a:latin typeface="Arial"/>
+            </a:endParaRPr>
+          </a:p>
+        </p:txBody>
+      </p:sp>
+      <p:sp>
+        <p:nvSpPr>
+          <p:cNvPr id="110" name="PlaceHolder 3"/>
+          <p:cNvSpPr>
+            <a:spLocks noGrp="1"/>
+          </p:cNvSpPr>
+          <p:nvPr>
+            <p:ph type="sldNum" idx="10"/>
+          </p:nvPr>
+        </p:nvSpPr>
+        <p:spPr>
+          <a:xfrm>
+            <a:off x="8472600" y="4663080"/>
+            <a:ext cx="548280" cy="393120"/>
+          </a:xfrm>
+          <a:prstGeom prst="rect">
+            <a:avLst/>
+          </a:prstGeom>
+          <a:noFill/>
+          <a:ln w="0">
+            <a:noFill/>
+          </a:ln>
+        </p:spPr>
+        <p:txBody>
+          <a:bodyPr tIns="91440" bIns="91440" anchor="ctr">
+            <a:normAutofit/>
+          </a:bodyPr>
+          <a:lstStyle>
+            <a:lvl1pPr algn="r">
+              <a:lnSpc>
+                <a:spcPct val="100000"/>
+              </a:lnSpc>
+              <a:buNone/>
+              <a:tabLst>
+                <a:tab pos="0" algn="l"/>
+              </a:tabLst>
+              <a:defRPr lang="it" sz="1000" b="0" strike="noStrike" spc="-1">
+                <a:solidFill>
+                  <a:srgbClr val="595959"/>
+                </a:solidFill>
+                <a:latin typeface="Arial"/>
+                <a:ea typeface="Arial"/>
+              </a:defRPr>
+            </a:lvl1pPr>
+          </a:lstStyle>
+          <a:p>
+            <a:pPr algn="r">
+              <a:lnSpc>
+                <a:spcPct val="100000"/>
+              </a:lnSpc>
+              <a:buNone/>
+              <a:tabLst>
+                <a:tab pos="0" algn="l"/>
+              </a:tabLst>
+            </a:pPr>
+            <a:fld id="{70083C99-8290-44C9-AB12-6D72EC62BA1C}" type="slidenum">
+              <a:rPr lang="it" sz="1000" b="0" strike="noStrike" spc="-1">
+                <a:solidFill>
+                  <a:srgbClr val="595959"/>
+                </a:solidFill>
+                <a:latin typeface="Arial"/>
+                <a:ea typeface="Arial"/>
+              </a:rPr>
+              <a:t>21</a:t>
             </a:fld>
             <a:endParaRPr lang="it-IT" sz="1000" b="0" strike="noStrike" spc="-1">
               <a:latin typeface="Times New Roman"/>
@@ -17967,7 +18914,7 @@
 </p:sld>
 </file>
 
-<file path=ppt/slides/slide21.xml><?xml version="1.0" encoding="utf-8"?>
+<file path=ppt/slides/slide22.xml><?xml version="1.0" encoding="utf-8"?>
 <p:sld xmlns:a="http://schemas.openxmlformats.org/drawingml/2006/main" xmlns:r="http://schemas.openxmlformats.org/officeDocument/2006/relationships" xmlns:p="http://schemas.openxmlformats.org/presentationml/2006/main">
   <p:cSld>
     <p:spTree>
@@ -18114,7 +19061,7 @@
                 <a:latin typeface="Arial"/>
                 <a:ea typeface="Arial"/>
               </a:rPr>
-              <a:t>21</a:t>
+              <a:t>22</a:t>
             </a:fld>
             <a:endParaRPr lang="it-IT" sz="1000" b="0" strike="noStrike" spc="-1">
               <a:latin typeface="Times New Roman"/>
@@ -18855,7 +19802,7 @@
 </p:sld>
 </file>
 
-<file path=ppt/slides/slide22.xml><?xml version="1.0" encoding="utf-8"?>
+<file path=ppt/slides/slide23.xml><?xml version="1.0" encoding="utf-8"?>
 <p:sld xmlns:a="http://schemas.openxmlformats.org/drawingml/2006/main" xmlns:r="http://schemas.openxmlformats.org/officeDocument/2006/relationships" xmlns:p="http://schemas.openxmlformats.org/presentationml/2006/main">
   <p:cSld>
     <p:spTree>
@@ -19125,7 +20072,7 @@
                 <a:latin typeface="Arial"/>
                 <a:ea typeface="Arial"/>
               </a:rPr>
-              <a:t>22</a:t>
+              <a:t>23</a:t>
             </a:fld>
             <a:endParaRPr lang="it-IT" sz="1000" b="0" strike="noStrike" spc="-1">
               <a:latin typeface="Times New Roman"/>
@@ -19141,7 +20088,7 @@
 </p:sld>
 </file>
 
-<file path=ppt/slides/slide23.xml><?xml version="1.0" encoding="utf-8"?>
+<file path=ppt/slides/slide24.xml><?xml version="1.0" encoding="utf-8"?>
 <p:sld xmlns:a="http://schemas.openxmlformats.org/drawingml/2006/main" xmlns:r="http://schemas.openxmlformats.org/officeDocument/2006/relationships" xmlns:p="http://schemas.openxmlformats.org/presentationml/2006/main">
   <p:cSld>
     <p:spTree>
@@ -19288,794 +20235,6 @@
                 <a:latin typeface="Arial"/>
                 <a:ea typeface="Arial"/>
               </a:rPr>
-              <a:t>23</a:t>
-            </a:fld>
-            <a:endParaRPr lang="it-IT" sz="1000" b="0" strike="noStrike" spc="-1">
-              <a:latin typeface="Times New Roman"/>
-            </a:endParaRPr>
-          </a:p>
-        </p:txBody>
-      </p:sp>
-      <p:sp>
-        <p:nvSpPr>
-          <p:cNvPr id="5" name="CasellaDiTesto 4">
-            <a:extLst>
-              <a:ext uri="{FF2B5EF4-FFF2-40B4-BE49-F238E27FC236}">
-                <a16:creationId xmlns:a16="http://schemas.microsoft.com/office/drawing/2014/main" id="{654DC5D3-954B-DA47-8F5D-D2825032294C}"/>
-              </a:ext>
-            </a:extLst>
-          </p:cNvPr>
-          <p:cNvSpPr txBox="1"/>
-          <p:nvPr/>
-        </p:nvSpPr>
-        <p:spPr>
-          <a:xfrm>
-            <a:off x="702427" y="944432"/>
-            <a:ext cx="7738783" cy="1600438"/>
-          </a:xfrm>
-          <a:prstGeom prst="rect">
-            <a:avLst/>
-          </a:prstGeom>
-          <a:noFill/>
-        </p:spPr>
-        <p:txBody>
-          <a:bodyPr wrap="square" rtlCol="0">
-            <a:spAutoFit/>
-          </a:bodyPr>
-          <a:lstStyle/>
-          <a:p>
-            <a:pPr marL="342900" indent="-342900">
-              <a:buFont typeface="+mj-lt"/>
-              <a:buAutoNum type="arabicPeriod"/>
-            </a:pPr>
-            <a:r>
-              <a:rPr lang="it-IT" sz="1400" dirty="0"/>
-              <a:t>F. </a:t>
-            </a:r>
-            <a:r>
-              <a:rPr lang="it-IT" sz="1400" dirty="0" err="1"/>
-              <a:t>Chollet</a:t>
-            </a:r>
-            <a:r>
-              <a:rPr lang="it-IT" sz="1400" dirty="0"/>
-              <a:t>, </a:t>
-            </a:r>
-            <a:r>
-              <a:rPr lang="it-IT" sz="1400" i="1" dirty="0" err="1"/>
-              <a:t>Keras</a:t>
-            </a:r>
-            <a:r>
-              <a:rPr lang="it-IT" sz="1400" dirty="0"/>
-              <a:t>, GitHub,</a:t>
-            </a:r>
-            <a:r>
-              <a:rPr lang="it-IT" sz="1400" spc="-1" dirty="0">
-                <a:solidFill>
-                  <a:srgbClr val="000000"/>
-                </a:solidFill>
-                <a:latin typeface="Arial"/>
-              </a:rPr>
-              <a:t> </a:t>
-            </a:r>
-            <a:r>
-              <a:rPr lang="it-IT" sz="1400" spc="-1" dirty="0">
-                <a:solidFill>
-                  <a:srgbClr val="000000"/>
-                </a:solidFill>
-                <a:latin typeface="Arial"/>
-                <a:hlinkClick r:id="rId2"/>
-              </a:rPr>
-              <a:t>GitHub Repository</a:t>
-            </a:r>
-            <a:r>
-              <a:rPr lang="it-IT" sz="1400" dirty="0"/>
-              <a:t>, (2015) </a:t>
-            </a:r>
-            <a:r>
-              <a:rPr lang="it-IT" sz="1400" dirty="0" err="1"/>
-              <a:t>version</a:t>
-            </a:r>
-            <a:r>
-              <a:rPr lang="it-IT" sz="1400" dirty="0"/>
-              <a:t> </a:t>
-            </a:r>
-            <a:r>
-              <a:rPr lang="it-IT" sz="1400" dirty="0">
-                <a:hlinkClick r:id="rId3"/>
-              </a:rPr>
-              <a:t>3.0.2</a:t>
-            </a:r>
-            <a:endParaRPr lang="it-IT" sz="1400" dirty="0"/>
-          </a:p>
-          <a:p>
-            <a:pPr marL="342900" indent="-342900">
-              <a:buFont typeface="+mj-lt"/>
-              <a:buAutoNum type="arabicPeriod"/>
-            </a:pPr>
-            <a:r>
-              <a:rPr lang="it-IT" sz="1400" spc="-1" dirty="0">
-                <a:solidFill>
-                  <a:srgbClr val="000000"/>
-                </a:solidFill>
-                <a:latin typeface="Arial"/>
-              </a:rPr>
-              <a:t>M. Abadi, A. </a:t>
-            </a:r>
-            <a:r>
-              <a:rPr lang="it-IT" sz="1400" spc="-1" dirty="0" err="1">
-                <a:solidFill>
-                  <a:srgbClr val="000000"/>
-                </a:solidFill>
-                <a:latin typeface="Arial"/>
-              </a:rPr>
-              <a:t>Agarwal</a:t>
-            </a:r>
-            <a:r>
-              <a:rPr lang="it-IT" sz="1400" spc="-1" dirty="0">
-                <a:solidFill>
-                  <a:srgbClr val="000000"/>
-                </a:solidFill>
-                <a:latin typeface="Arial"/>
-              </a:rPr>
-              <a:t> et al., 2015, </a:t>
-            </a:r>
-            <a:r>
-              <a:rPr lang="it-IT" sz="1400" i="1" spc="-1" dirty="0" err="1">
-                <a:solidFill>
-                  <a:srgbClr val="000000"/>
-                </a:solidFill>
-                <a:latin typeface="Arial"/>
-              </a:rPr>
-              <a:t>Ten</a:t>
-            </a:r>
-            <a:r>
-              <a:rPr kumimoji="0" lang="it-IT" altLang="it-IT" sz="1400" b="0" i="1" u="none" strike="noStrike" cap="none" normalizeH="0" baseline="0" dirty="0" err="1">
-                <a:ln>
-                  <a:noFill/>
-                </a:ln>
-                <a:solidFill>
-                  <a:schemeClr val="tx1"/>
-                </a:solidFill>
-                <a:effectLst/>
-                <a:latin typeface="Arial Unicode MS"/>
-              </a:rPr>
-              <a:t>sorFlow</a:t>
-            </a:r>
-            <a:r>
-              <a:rPr kumimoji="0" lang="it-IT" altLang="it-IT" sz="1400" b="0" i="1" u="none" strike="noStrike" cap="none" normalizeH="0" baseline="0" dirty="0">
-                <a:ln>
-                  <a:noFill/>
-                </a:ln>
-                <a:solidFill>
-                  <a:schemeClr val="tx1"/>
-                </a:solidFill>
-                <a:effectLst/>
-                <a:latin typeface="Arial Unicode MS"/>
-              </a:rPr>
-              <a:t>: Large-scale machine learning on </a:t>
-            </a:r>
-            <a:r>
-              <a:rPr kumimoji="0" lang="it-IT" altLang="it-IT" sz="1400" b="0" i="1" u="none" strike="noStrike" cap="none" normalizeH="0" baseline="0" dirty="0" err="1">
-                <a:ln>
-                  <a:noFill/>
-                </a:ln>
-                <a:solidFill>
-                  <a:schemeClr val="tx1"/>
-                </a:solidFill>
-                <a:effectLst/>
-                <a:latin typeface="Arial Unicode MS"/>
-              </a:rPr>
-              <a:t>heterogeneous</a:t>
-            </a:r>
-            <a:r>
-              <a:rPr kumimoji="0" lang="it-IT" altLang="it-IT" sz="1400" b="0" i="1" u="none" strike="noStrike" cap="none" normalizeH="0" baseline="0" dirty="0">
-                <a:ln>
-                  <a:noFill/>
-                </a:ln>
-                <a:solidFill>
-                  <a:schemeClr val="tx1"/>
-                </a:solidFill>
-                <a:effectLst/>
-                <a:latin typeface="Arial Unicode MS"/>
-              </a:rPr>
-              <a:t> systems</a:t>
-            </a:r>
-            <a:r>
-              <a:rPr kumimoji="0" lang="it-IT" altLang="it-IT" sz="1400" b="0" i="0" u="none" strike="noStrike" cap="none" normalizeH="0" baseline="0" dirty="0">
-                <a:ln>
-                  <a:noFill/>
-                </a:ln>
-                <a:solidFill>
-                  <a:schemeClr val="tx1"/>
-                </a:solidFill>
-                <a:effectLst/>
-                <a:latin typeface="Arial Unicode MS"/>
-              </a:rPr>
-              <a:t>. </a:t>
-            </a:r>
-            <a:r>
-              <a:rPr kumimoji="0" lang="it-IT" altLang="it-IT" sz="1400" b="0" i="0" u="none" strike="noStrike" cap="none" normalizeH="0" baseline="0" dirty="0">
-                <a:ln>
-                  <a:noFill/>
-                </a:ln>
-                <a:solidFill>
-                  <a:schemeClr val="tx1"/>
-                </a:solidFill>
-                <a:effectLst/>
-                <a:latin typeface="Arial Unicode MS"/>
-                <a:hlinkClick r:id="rId4"/>
-              </a:rPr>
-              <a:t>www.tensorflow.org</a:t>
-            </a:r>
-            <a:endParaRPr kumimoji="0" lang="it-IT" altLang="it-IT" sz="1400" b="0" i="0" u="none" strike="noStrike" cap="none" spc="-1" normalizeH="0" baseline="0" dirty="0">
-              <a:ln>
-                <a:noFill/>
-              </a:ln>
-              <a:solidFill>
-                <a:srgbClr val="000000"/>
-              </a:solidFill>
-              <a:effectLst/>
-              <a:latin typeface="Arial"/>
-            </a:endParaRPr>
-          </a:p>
-          <a:p>
-            <a:pPr marL="342900" indent="-342900">
-              <a:buFont typeface="+mj-lt"/>
-              <a:buAutoNum type="arabicPeriod"/>
-            </a:pPr>
-            <a:r>
-              <a:rPr lang="it-IT" sz="1400" spc="-1" dirty="0">
-                <a:solidFill>
-                  <a:srgbClr val="000000"/>
-                </a:solidFill>
-                <a:latin typeface="Arial"/>
-              </a:rPr>
-              <a:t>F. </a:t>
-            </a:r>
-            <a:r>
-              <a:rPr lang="it-IT" sz="1400" spc="-1" dirty="0" err="1">
-                <a:solidFill>
-                  <a:srgbClr val="000000"/>
-                </a:solidFill>
-                <a:latin typeface="Arial"/>
-              </a:rPr>
-              <a:t>Pedergosa</a:t>
-            </a:r>
-            <a:r>
-              <a:rPr lang="it-IT" sz="1400" spc="-1" dirty="0">
-                <a:solidFill>
-                  <a:srgbClr val="000000"/>
-                </a:solidFill>
-                <a:latin typeface="Arial"/>
-              </a:rPr>
-              <a:t>, G. </a:t>
-            </a:r>
-            <a:r>
-              <a:rPr lang="it-IT" sz="1400" spc="-1" dirty="0" err="1">
-                <a:solidFill>
-                  <a:srgbClr val="000000"/>
-                </a:solidFill>
-                <a:latin typeface="Arial"/>
-              </a:rPr>
-              <a:t>Varoquaux</a:t>
-            </a:r>
-            <a:r>
-              <a:rPr lang="it-IT" sz="1400" spc="-1" dirty="0">
-                <a:solidFill>
-                  <a:srgbClr val="000000"/>
-                </a:solidFill>
-                <a:latin typeface="Arial"/>
-              </a:rPr>
-              <a:t> et al, </a:t>
-            </a:r>
-            <a:r>
-              <a:rPr lang="it-IT" sz="1400" i="1" spc="-1" dirty="0" err="1">
-                <a:solidFill>
-                  <a:srgbClr val="000000"/>
-                </a:solidFill>
-                <a:latin typeface="Arial"/>
-              </a:rPr>
-              <a:t>Scikit-learn</a:t>
-            </a:r>
-            <a:r>
-              <a:rPr lang="it-IT" sz="1400" i="1" spc="-1" dirty="0">
-                <a:solidFill>
-                  <a:srgbClr val="000000"/>
-                </a:solidFill>
-                <a:latin typeface="Arial"/>
-              </a:rPr>
-              <a:t>: Machine Learning in Python</a:t>
-            </a:r>
-            <a:r>
-              <a:rPr lang="it-IT" sz="1400" spc="-1" dirty="0">
-                <a:solidFill>
-                  <a:srgbClr val="000000"/>
-                </a:solidFill>
-                <a:latin typeface="Arial"/>
-              </a:rPr>
-              <a:t>, JMLR, 12(</a:t>
-            </a:r>
-            <a:r>
-              <a:rPr lang="it-IT" sz="1400" spc="-1" dirty="0" err="1">
-                <a:solidFill>
-                  <a:srgbClr val="000000"/>
-                </a:solidFill>
-                <a:latin typeface="Arial"/>
-              </a:rPr>
-              <a:t>Oct</a:t>
-            </a:r>
-            <a:r>
-              <a:rPr lang="it-IT" sz="1400" spc="-1" dirty="0">
-                <a:solidFill>
-                  <a:srgbClr val="000000"/>
-                </a:solidFill>
-                <a:latin typeface="Arial"/>
-              </a:rPr>
-              <a:t>), (2011), pp.2825-2830 </a:t>
-            </a:r>
-          </a:p>
-          <a:p>
-            <a:pPr marL="342900" indent="-342900">
-              <a:buFont typeface="+mj-lt"/>
-              <a:buAutoNum type="arabicPeriod"/>
-            </a:pPr>
-            <a:r>
-              <a:rPr lang="it-IT" sz="1400" dirty="0"/>
-              <a:t>T. </a:t>
-            </a:r>
-            <a:r>
-              <a:rPr lang="it-IT" sz="1400" dirty="0" err="1"/>
-              <a:t>Akiba</a:t>
-            </a:r>
-            <a:r>
-              <a:rPr lang="it-IT" sz="1400" dirty="0"/>
-              <a:t>, S. Sano, T. </a:t>
-            </a:r>
-            <a:r>
-              <a:rPr lang="it-IT" sz="1400" dirty="0" err="1"/>
-              <a:t>Yanase</a:t>
-            </a:r>
-            <a:r>
-              <a:rPr lang="it-IT" sz="1400" dirty="0"/>
-              <a:t>, T. </a:t>
-            </a:r>
-            <a:r>
-              <a:rPr lang="it-IT" sz="1400" dirty="0" err="1"/>
-              <a:t>Ohta</a:t>
-            </a:r>
-            <a:r>
-              <a:rPr lang="it-IT" sz="1400" dirty="0"/>
-              <a:t>, M. </a:t>
-            </a:r>
-            <a:r>
-              <a:rPr lang="it-IT" sz="1400" dirty="0" err="1"/>
-              <a:t>Koyama</a:t>
-            </a:r>
-            <a:r>
-              <a:rPr lang="it-IT" sz="1400" dirty="0"/>
-              <a:t>, </a:t>
-            </a:r>
-            <a:r>
-              <a:rPr lang="it-IT" sz="1400" i="1" dirty="0" err="1"/>
-              <a:t>Optuna</a:t>
-            </a:r>
-            <a:r>
-              <a:rPr lang="it-IT" sz="1400" i="1" dirty="0"/>
-              <a:t>: A Next-generation </a:t>
-            </a:r>
-            <a:r>
-              <a:rPr lang="it-IT" sz="1400" i="1" dirty="0" err="1"/>
-              <a:t>Hyperparameter</a:t>
-            </a:r>
-            <a:r>
-              <a:rPr lang="it-IT" sz="1400" i="1" dirty="0"/>
-              <a:t> </a:t>
-            </a:r>
-            <a:r>
-              <a:rPr lang="it-IT" sz="1400" i="1" dirty="0" err="1"/>
-              <a:t>Optimization</a:t>
-            </a:r>
-            <a:r>
-              <a:rPr lang="it-IT" sz="1400" i="1" dirty="0"/>
-              <a:t> Framework</a:t>
-            </a:r>
-            <a:r>
-              <a:rPr lang="it-IT" sz="1400" dirty="0"/>
-              <a:t>, KDD, (2019), pp.2623-2631</a:t>
-            </a:r>
-          </a:p>
-        </p:txBody>
-      </p:sp>
-      <p:sp>
-        <p:nvSpPr>
-          <p:cNvPr id="6" name="CasellaDiTesto 5">
-            <a:extLst>
-              <a:ext uri="{FF2B5EF4-FFF2-40B4-BE49-F238E27FC236}">
-                <a16:creationId xmlns:a16="http://schemas.microsoft.com/office/drawing/2014/main" id="{304B3224-8AD6-EBFB-578E-76DA67AAD1D4}"/>
-              </a:ext>
-            </a:extLst>
-          </p:cNvPr>
-          <p:cNvSpPr txBox="1"/>
-          <p:nvPr/>
-        </p:nvSpPr>
-        <p:spPr>
-          <a:xfrm>
-            <a:off x="702427" y="575100"/>
-            <a:ext cx="7738783" cy="369332"/>
-          </a:xfrm>
-          <a:prstGeom prst="rect">
-            <a:avLst/>
-          </a:prstGeom>
-          <a:noFill/>
-        </p:spPr>
-        <p:txBody>
-          <a:bodyPr wrap="square" rtlCol="0">
-            <a:spAutoFit/>
-          </a:bodyPr>
-          <a:lstStyle/>
-          <a:p>
-            <a:r>
-              <a:rPr lang="it-IT" dirty="0" err="1"/>
-              <a:t>Main</a:t>
-            </a:r>
-            <a:r>
-              <a:rPr lang="it-IT" dirty="0"/>
-              <a:t> libraries and software tools </a:t>
-            </a:r>
-            <a:r>
-              <a:rPr lang="it-IT" dirty="0" err="1"/>
-              <a:t>used</a:t>
-            </a:r>
-            <a:r>
-              <a:rPr lang="it-IT" dirty="0"/>
-              <a:t> for </a:t>
-            </a:r>
-            <a:r>
-              <a:rPr lang="it-IT" dirty="0" err="1"/>
-              <a:t>this</a:t>
-            </a:r>
-            <a:r>
-              <a:rPr lang="it-IT" dirty="0"/>
-              <a:t> project:</a:t>
-            </a:r>
-          </a:p>
-        </p:txBody>
-      </p:sp>
-      <p:sp>
-        <p:nvSpPr>
-          <p:cNvPr id="2" name="CasellaDiTesto 1">
-            <a:extLst>
-              <a:ext uri="{FF2B5EF4-FFF2-40B4-BE49-F238E27FC236}">
-                <a16:creationId xmlns:a16="http://schemas.microsoft.com/office/drawing/2014/main" id="{F04819BF-A96F-A9B0-EADB-B6E080EAD083}"/>
-              </a:ext>
-            </a:extLst>
-          </p:cNvPr>
-          <p:cNvSpPr txBox="1"/>
-          <p:nvPr/>
-        </p:nvSpPr>
-        <p:spPr>
-          <a:xfrm>
-            <a:off x="702426" y="3244638"/>
-            <a:ext cx="7738783" cy="369332"/>
-          </a:xfrm>
-          <a:prstGeom prst="rect">
-            <a:avLst/>
-          </a:prstGeom>
-          <a:noFill/>
-        </p:spPr>
-        <p:txBody>
-          <a:bodyPr wrap="square" rtlCol="0">
-            <a:spAutoFit/>
-          </a:bodyPr>
-          <a:lstStyle/>
-          <a:p>
-            <a:r>
-              <a:rPr lang="it-IT" dirty="0" err="1"/>
-              <a:t>Documentation</a:t>
-            </a:r>
-            <a:r>
-              <a:rPr lang="it-IT" dirty="0"/>
-              <a:t> of </a:t>
-            </a:r>
-            <a:r>
-              <a:rPr lang="it-IT" dirty="0" err="1"/>
-              <a:t>main</a:t>
-            </a:r>
-            <a:r>
-              <a:rPr lang="it-IT" dirty="0"/>
-              <a:t> libraries and software tools </a:t>
-            </a:r>
-            <a:r>
-              <a:rPr lang="it-IT" dirty="0" err="1"/>
-              <a:t>used</a:t>
-            </a:r>
-            <a:r>
-              <a:rPr lang="it-IT" dirty="0"/>
-              <a:t> for </a:t>
-            </a:r>
-            <a:r>
-              <a:rPr lang="it-IT" dirty="0" err="1"/>
-              <a:t>this</a:t>
-            </a:r>
-            <a:r>
-              <a:rPr lang="it-IT" dirty="0"/>
-              <a:t> project:</a:t>
-            </a:r>
-          </a:p>
-        </p:txBody>
-      </p:sp>
-      <p:sp>
-        <p:nvSpPr>
-          <p:cNvPr id="3" name="CasellaDiTesto 2">
-            <a:extLst>
-              <a:ext uri="{FF2B5EF4-FFF2-40B4-BE49-F238E27FC236}">
-                <a16:creationId xmlns:a16="http://schemas.microsoft.com/office/drawing/2014/main" id="{C6FDCFC4-2D63-71BA-90AE-2B88AEF84FF3}"/>
-              </a:ext>
-            </a:extLst>
-          </p:cNvPr>
-          <p:cNvSpPr txBox="1"/>
-          <p:nvPr/>
-        </p:nvSpPr>
-        <p:spPr>
-          <a:xfrm>
-            <a:off x="702425" y="3613970"/>
-            <a:ext cx="7738783" cy="738664"/>
-          </a:xfrm>
-          <a:prstGeom prst="rect">
-            <a:avLst/>
-          </a:prstGeom>
-          <a:noFill/>
-        </p:spPr>
-        <p:txBody>
-          <a:bodyPr wrap="square" numCol="2" rtlCol="0">
-            <a:spAutoFit/>
-          </a:bodyPr>
-          <a:lstStyle/>
-          <a:p>
-            <a:pPr marL="342900" indent="-342900">
-              <a:buFont typeface="+mj-lt"/>
-              <a:buAutoNum type="arabicPeriod" startAt="5"/>
-            </a:pPr>
-            <a:r>
-              <a:rPr lang="it-IT" sz="1400" dirty="0" err="1"/>
-              <a:t>Keras</a:t>
-            </a:r>
-            <a:r>
-              <a:rPr lang="it-IT" sz="1400" dirty="0"/>
-              <a:t> 3 </a:t>
-            </a:r>
-            <a:r>
-              <a:rPr lang="it-IT" sz="1400" dirty="0" err="1">
-                <a:hlinkClick r:id="rId5"/>
-              </a:rPr>
-              <a:t>documentation</a:t>
-            </a:r>
-            <a:endParaRPr lang="it-IT" sz="1400" dirty="0"/>
-          </a:p>
-          <a:p>
-            <a:pPr marL="342900" indent="-342900">
-              <a:buFont typeface="+mj-lt"/>
-              <a:buAutoNum type="arabicPeriod" startAt="5"/>
-            </a:pPr>
-            <a:r>
-              <a:rPr lang="it-IT" sz="1400" dirty="0" err="1"/>
-              <a:t>Scikit-learn</a:t>
-            </a:r>
-            <a:r>
-              <a:rPr lang="it-IT" sz="1400" dirty="0"/>
-              <a:t> </a:t>
-            </a:r>
-            <a:r>
-              <a:rPr lang="it-IT" sz="1400" dirty="0">
-                <a:hlinkClick r:id="rId6"/>
-              </a:rPr>
-              <a:t>API </a:t>
-            </a:r>
-            <a:r>
-              <a:rPr lang="it-IT" sz="1400" dirty="0" err="1">
-                <a:hlinkClick r:id="rId6"/>
-              </a:rPr>
-              <a:t>reference</a:t>
-            </a:r>
-            <a:endParaRPr lang="it-IT" sz="1400" dirty="0"/>
-          </a:p>
-          <a:p>
-            <a:pPr marL="342900" indent="-342900">
-              <a:buFont typeface="+mj-lt"/>
-              <a:buAutoNum type="arabicPeriod" startAt="5"/>
-            </a:pPr>
-            <a:r>
-              <a:rPr lang="it-IT" sz="1400" dirty="0" err="1"/>
-              <a:t>SciKeras</a:t>
-            </a:r>
-            <a:r>
-              <a:rPr lang="it-IT" sz="1400" dirty="0"/>
-              <a:t> 0.12 </a:t>
-            </a:r>
-            <a:r>
-              <a:rPr lang="it-IT" sz="1400" dirty="0" err="1">
-                <a:hlinkClick r:id="rId7"/>
-              </a:rPr>
-              <a:t>documentation</a:t>
-            </a:r>
-            <a:endParaRPr lang="it-IT" sz="1400" dirty="0"/>
-          </a:p>
-          <a:p>
-            <a:pPr marL="342900" indent="-342900">
-              <a:buFont typeface="+mj-lt"/>
-              <a:buAutoNum type="arabicPeriod" startAt="5"/>
-            </a:pPr>
-            <a:endParaRPr lang="it-IT" sz="1400" dirty="0"/>
-          </a:p>
-          <a:p>
-            <a:pPr marL="342900" indent="-342900">
-              <a:buFont typeface="+mj-lt"/>
-              <a:buAutoNum type="arabicPeriod" startAt="5"/>
-            </a:pPr>
-            <a:endParaRPr lang="it-IT" sz="1400" dirty="0"/>
-          </a:p>
-        </p:txBody>
-      </p:sp>
-    </p:spTree>
-    <p:extLst>
-      <p:ext uri="{BB962C8B-B14F-4D97-AF65-F5344CB8AC3E}">
-        <p14:creationId xmlns:p14="http://schemas.microsoft.com/office/powerpoint/2010/main" val="3814474243"/>
-      </p:ext>
-    </p:extLst>
-  </p:cSld>
-  <p:clrMapOvr>
-    <a:masterClrMapping/>
-  </p:clrMapOvr>
-</p:sld>
-</file>
-
-<file path=ppt/slides/slide24.xml><?xml version="1.0" encoding="utf-8"?>
-<p:sld xmlns:a="http://schemas.openxmlformats.org/drawingml/2006/main" xmlns:r="http://schemas.openxmlformats.org/officeDocument/2006/relationships" xmlns:p="http://schemas.openxmlformats.org/presentationml/2006/main">
-  <p:cSld>
-    <p:spTree>
-      <p:nvGrpSpPr>
-        <p:cNvPr id="1" name=""/>
-        <p:cNvGrpSpPr/>
-        <p:nvPr/>
-      </p:nvGrpSpPr>
-      <p:grpSpPr>
-        <a:xfrm>
-          <a:off x="0" y="0"/>
-          <a:ext cx="0" cy="0"/>
-          <a:chOff x="0" y="0"/>
-          <a:chExt cx="0" cy="0"/>
-        </a:xfrm>
-      </p:grpSpPr>
-      <p:sp>
-        <p:nvSpPr>
-          <p:cNvPr id="117" name="PlaceHolder 1"/>
-          <p:cNvSpPr>
-            <a:spLocks noGrp="1"/>
-          </p:cNvSpPr>
-          <p:nvPr>
-            <p:ph type="title"/>
-          </p:nvPr>
-        </p:nvSpPr>
-        <p:spPr>
-          <a:xfrm>
-            <a:off x="311760" y="2700"/>
-            <a:ext cx="8520120" cy="576000"/>
-          </a:xfrm>
-          <a:prstGeom prst="rect">
-            <a:avLst/>
-          </a:prstGeom>
-          <a:noFill/>
-          <a:ln w="0">
-            <a:noFill/>
-          </a:ln>
-        </p:spPr>
-        <p:txBody>
-          <a:bodyPr tIns="91440" bIns="91440" anchor="t">
-            <a:normAutofit fontScale="91000"/>
-          </a:bodyPr>
-          <a:lstStyle/>
-          <a:p>
-            <a:pPr>
-              <a:lnSpc>
-                <a:spcPct val="100000"/>
-              </a:lnSpc>
-              <a:buNone/>
-              <a:tabLst>
-                <a:tab pos="0" algn="l"/>
-              </a:tabLst>
-            </a:pPr>
-            <a:r>
-              <a:rPr lang="it" sz="2600" b="0" strike="noStrike" spc="-1" dirty="0">
-                <a:solidFill>
-                  <a:srgbClr val="000000"/>
-                </a:solidFill>
-                <a:latin typeface="Arial"/>
-                <a:ea typeface="Arial"/>
-              </a:rPr>
-              <a:t>Bibliography</a:t>
-            </a:r>
-            <a:r>
-              <a:rPr lang="it" sz="2600" spc="-1" dirty="0">
-                <a:solidFill>
-                  <a:srgbClr val="000000"/>
-                </a:solidFill>
-                <a:latin typeface="Arial"/>
-                <a:ea typeface="Arial"/>
-              </a:rPr>
-              <a:t> – 2 </a:t>
-            </a:r>
-            <a:endParaRPr lang="it-IT" sz="2800" b="0" strike="noStrike" spc="-1" dirty="0">
-              <a:solidFill>
-                <a:srgbClr val="000000"/>
-              </a:solidFill>
-              <a:latin typeface="Arial"/>
-            </a:endParaRPr>
-          </a:p>
-        </p:txBody>
-      </p:sp>
-      <p:sp>
-        <p:nvSpPr>
-          <p:cNvPr id="119" name="PlaceHolder 3"/>
-          <p:cNvSpPr>
-            <a:spLocks noGrp="1"/>
-          </p:cNvSpPr>
-          <p:nvPr>
-            <p:ph type="sldNum" idx="13"/>
-          </p:nvPr>
-        </p:nvSpPr>
-        <p:spPr>
-          <a:xfrm>
-            <a:off x="8472600" y="4663080"/>
-            <a:ext cx="548280" cy="393120"/>
-          </a:xfrm>
-          <a:prstGeom prst="rect">
-            <a:avLst/>
-          </a:prstGeom>
-          <a:noFill/>
-          <a:ln w="0">
-            <a:noFill/>
-          </a:ln>
-        </p:spPr>
-        <p:txBody>
-          <a:bodyPr tIns="91440" bIns="91440" anchor="ctr">
-            <a:normAutofit/>
-          </a:bodyPr>
-          <a:lstStyle>
-            <a:lvl1pPr algn="r">
-              <a:lnSpc>
-                <a:spcPct val="100000"/>
-              </a:lnSpc>
-              <a:buNone/>
-              <a:tabLst>
-                <a:tab pos="0" algn="l"/>
-              </a:tabLst>
-              <a:defRPr lang="it" sz="1000" b="0" strike="noStrike" spc="-1">
-                <a:solidFill>
-                  <a:srgbClr val="595959"/>
-                </a:solidFill>
-                <a:latin typeface="Arial"/>
-                <a:ea typeface="Arial"/>
-              </a:defRPr>
-            </a:lvl1pPr>
-          </a:lstStyle>
-          <a:p>
-            <a:pPr algn="r">
-              <a:lnSpc>
-                <a:spcPct val="100000"/>
-              </a:lnSpc>
-              <a:buNone/>
-              <a:tabLst>
-                <a:tab pos="0" algn="l"/>
-              </a:tabLst>
-            </a:pPr>
-            <a:fld id="{F1974EC4-68EB-45C8-A197-A860EB4D25E8}" type="slidenum">
-              <a:rPr lang="it" sz="1000" b="0" strike="noStrike" spc="-1">
-                <a:solidFill>
-                  <a:srgbClr val="595959"/>
-                </a:solidFill>
-                <a:latin typeface="Arial"/>
-                <a:ea typeface="Arial"/>
-              </a:rPr>
               <a:t>24</a:t>
             </a:fld>
             <a:endParaRPr lang="it-IT" sz="1000" b="0" strike="noStrike" spc="-1">
@@ -20098,8 +20257,8 @@
         </p:nvSpPr>
         <p:spPr>
           <a:xfrm>
-            <a:off x="490817" y="1452282"/>
-            <a:ext cx="7738783" cy="2246769"/>
+            <a:off x="702426" y="911149"/>
+            <a:ext cx="7738783" cy="2031325"/>
           </a:xfrm>
           <a:prstGeom prst="rect">
             <a:avLst/>
@@ -20114,283 +20273,416 @@
           <a:p>
             <a:pPr marL="342900" indent="-342900">
               <a:buFont typeface="+mj-lt"/>
-              <a:buAutoNum type="arabicPeriod" startAt="8"/>
+              <a:buAutoNum type="arabicPeriod"/>
             </a:pPr>
             <a:r>
               <a:rPr lang="it-IT" sz="1400" dirty="0"/>
-              <a:t>K. He, X. Zhang, S. </a:t>
-            </a:r>
-            <a:r>
-              <a:rPr lang="it-IT" sz="1400" dirty="0" err="1"/>
-              <a:t>Ren</a:t>
-            </a:r>
-            <a:r>
-              <a:rPr lang="it-IT" sz="1400" dirty="0"/>
-              <a:t>, J. Sun, </a:t>
+              <a:t>F. </a:t>
+            </a:r>
+            <a:r>
+              <a:rPr lang="it-IT" sz="1400" dirty="0" err="1"/>
+              <a:t>Chollet</a:t>
+            </a:r>
+            <a:r>
+              <a:rPr lang="it-IT" sz="1400" dirty="0"/>
+              <a:t>, </a:t>
             </a:r>
             <a:r>
               <a:rPr lang="it-IT" sz="1400" i="1" dirty="0" err="1"/>
-              <a:t>Delving</a:t>
-            </a:r>
-            <a:r>
-              <a:rPr lang="it-IT" sz="1400" i="1" dirty="0"/>
-              <a:t> Deep </a:t>
-            </a:r>
-            <a:r>
-              <a:rPr lang="it-IT" sz="1400" i="1" dirty="0" err="1"/>
-              <a:t>into</a:t>
-            </a:r>
-            <a:r>
-              <a:rPr lang="it-IT" sz="1400" i="1" dirty="0"/>
+              <a:t>Keras</a:t>
+            </a:r>
+            <a:r>
+              <a:rPr lang="it-IT" sz="1400" dirty="0"/>
+              <a:t>, GitHub,</a:t>
+            </a:r>
+            <a:r>
+              <a:rPr lang="it-IT" sz="1400" spc="-1" dirty="0">
+                <a:solidFill>
+                  <a:srgbClr val="000000"/>
+                </a:solidFill>
+                <a:latin typeface="Arial"/>
+              </a:rPr>
               <a:t> </a:t>
             </a:r>
             <a:r>
-              <a:rPr lang="it-IT" sz="1400" i="1" dirty="0" err="1"/>
-              <a:t>Rectifiers</a:t>
-            </a:r>
-            <a:r>
-              <a:rPr lang="it-IT" sz="1400" i="1" dirty="0"/>
-              <a:t>: </a:t>
-            </a:r>
-            <a:r>
-              <a:rPr lang="it-IT" sz="1400" i="1" dirty="0" err="1"/>
-              <a:t>Surpassing</a:t>
-            </a:r>
-            <a:r>
-              <a:rPr lang="it-IT" sz="1400" i="1" dirty="0"/>
-              <a:t> Human-Level Performance on </a:t>
-            </a:r>
-            <a:r>
-              <a:rPr lang="it-IT" sz="1400" i="1" dirty="0" err="1"/>
-              <a:t>ImageNet</a:t>
-            </a:r>
-            <a:r>
-              <a:rPr lang="it-IT" sz="1400" i="1" dirty="0"/>
+              <a:rPr lang="it-IT" sz="1400" spc="-1" dirty="0">
+                <a:solidFill>
+                  <a:srgbClr val="000000"/>
+                </a:solidFill>
+                <a:latin typeface="Arial"/>
+                <a:hlinkClick r:id="rId2"/>
+              </a:rPr>
+              <a:t>GitHub Repository</a:t>
+            </a:r>
+            <a:r>
+              <a:rPr lang="it-IT" sz="1400" dirty="0"/>
+              <a:t>, (2015) </a:t>
+            </a:r>
+            <a:r>
+              <a:rPr lang="it-IT" sz="1400" dirty="0" err="1"/>
+              <a:t>version</a:t>
+            </a:r>
+            <a:r>
+              <a:rPr lang="it-IT" sz="1400" dirty="0"/>
               <a:t> </a:t>
             </a:r>
             <a:r>
-              <a:rPr lang="it-IT" sz="1400" i="1" dirty="0" err="1"/>
-              <a:t>Classification</a:t>
-            </a:r>
-            <a:r>
-              <a:rPr lang="it-IT" sz="1400" dirty="0"/>
-              <a:t>, </a:t>
-            </a:r>
-            <a:r>
-              <a:rPr lang="it-IT" sz="1400" i="1" dirty="0"/>
-              <a:t>2015 IEEE International Conference on Computer Vision (ICCV)</a:t>
-            </a:r>
-            <a:r>
-              <a:rPr lang="it-IT" sz="1400" dirty="0"/>
-              <a:t>, Santiago, Chile, 2015, pp. 1026-1034,</a:t>
-            </a:r>
+              <a:rPr lang="it-IT" sz="1400" dirty="0">
+                <a:hlinkClick r:id="rId3"/>
+              </a:rPr>
+              <a:t>3.0.2</a:t>
+            </a:r>
+            <a:endParaRPr lang="it-IT" sz="1400" dirty="0"/>
           </a:p>
           <a:p>
             <a:pPr marL="342900" indent="-342900">
               <a:buFont typeface="+mj-lt"/>
-              <a:buAutoNum type="arabicPeriod" startAt="8"/>
+              <a:buAutoNum type="arabicPeriod"/>
             </a:pPr>
             <a:r>
               <a:rPr lang="it-IT" sz="1400" dirty="0" err="1"/>
-              <a:t>Bengio</a:t>
-            </a:r>
-            <a:r>
-              <a:rPr lang="it-IT" sz="1400" dirty="0"/>
-              <a:t>, Y. </a:t>
-            </a:r>
-            <a:r>
-              <a:rPr lang="it-IT" sz="1400" i="1" dirty="0" err="1"/>
-              <a:t>Practical</a:t>
-            </a:r>
-            <a:r>
-              <a:rPr lang="it-IT" sz="1400" i="1" dirty="0"/>
-              <a:t> </a:t>
-            </a:r>
-            <a:r>
-              <a:rPr lang="it-IT" sz="1400" i="1" dirty="0" err="1"/>
-              <a:t>Recommendations</a:t>
-            </a:r>
-            <a:r>
-              <a:rPr lang="it-IT" sz="1400" i="1" dirty="0"/>
-              <a:t> for </a:t>
-            </a:r>
-            <a:r>
-              <a:rPr lang="it-IT" sz="1400" i="1" dirty="0" err="1"/>
-              <a:t>Gradient-Based</a:t>
-            </a:r>
-            <a:r>
-              <a:rPr lang="it-IT" sz="1400" i="1" dirty="0"/>
-              <a:t> Training of Deep </a:t>
-            </a:r>
-            <a:r>
-              <a:rPr lang="it-IT" sz="1400" i="1" dirty="0" err="1"/>
-              <a:t>Architectures</a:t>
-            </a:r>
-            <a:r>
-              <a:rPr lang="it-IT" sz="1400" dirty="0"/>
-              <a:t>. In: </a:t>
-            </a:r>
-            <a:r>
-              <a:rPr lang="it-IT" sz="1400" dirty="0" err="1"/>
-              <a:t>Montavon</a:t>
-            </a:r>
-            <a:r>
-              <a:rPr lang="it-IT" sz="1400" dirty="0"/>
-              <a:t>, G., </a:t>
-            </a:r>
-            <a:r>
-              <a:rPr lang="it-IT" sz="1400" dirty="0" err="1"/>
-              <a:t>Orr</a:t>
-            </a:r>
-            <a:r>
-              <a:rPr lang="it-IT" sz="1400" dirty="0"/>
-              <a:t>, G.B., Müller, KR. (</a:t>
-            </a:r>
-            <a:r>
-              <a:rPr lang="it-IT" sz="1400" dirty="0" err="1"/>
-              <a:t>eds</a:t>
-            </a:r>
-            <a:r>
-              <a:rPr lang="it-IT" sz="1400" dirty="0"/>
-              <a:t>) </a:t>
-            </a:r>
-            <a:r>
-              <a:rPr lang="it-IT" sz="1400" dirty="0" err="1"/>
-              <a:t>Neural</a:t>
-            </a:r>
-            <a:r>
-              <a:rPr lang="it-IT" sz="1400" dirty="0"/>
-              <a:t> Networks: </a:t>
-            </a:r>
-            <a:r>
-              <a:rPr lang="it-IT" sz="1400" dirty="0" err="1"/>
-              <a:t>Tricks</a:t>
-            </a:r>
-            <a:r>
-              <a:rPr lang="it-IT" sz="1400" dirty="0"/>
-              <a:t> of the Trade. </a:t>
-            </a:r>
-            <a:r>
-              <a:rPr lang="it-IT" sz="1400" dirty="0" err="1"/>
-              <a:t>Lecture</a:t>
-            </a:r>
-            <a:r>
-              <a:rPr lang="it-IT" sz="1400" dirty="0"/>
-              <a:t> Notes in Computer Science, </a:t>
-            </a:r>
-            <a:r>
-              <a:rPr lang="it-IT" sz="1400" dirty="0" err="1"/>
-              <a:t>vol</a:t>
-            </a:r>
-            <a:r>
-              <a:rPr lang="it-IT" sz="1400" dirty="0"/>
-              <a:t> 7700 (2012).   Springer, </a:t>
-            </a:r>
-            <a:r>
-              <a:rPr lang="it-IT" sz="1400" dirty="0" err="1"/>
-              <a:t>Berlin</a:t>
-            </a:r>
-            <a:r>
-              <a:rPr lang="it-IT" sz="1400" dirty="0"/>
-              <a:t>, Heidelberg.</a:t>
-            </a:r>
+              <a:t>Keras</a:t>
+            </a:r>
+            <a:r>
+              <a:rPr lang="it-IT" sz="1400" dirty="0"/>
+              <a:t> 3 </a:t>
+            </a:r>
+            <a:r>
+              <a:rPr lang="it-IT" sz="1400" dirty="0" err="1">
+                <a:hlinkClick r:id="rId4"/>
+              </a:rPr>
+              <a:t>documentation</a:t>
+            </a:r>
+            <a:endParaRPr lang="it-IT" sz="1400" dirty="0"/>
           </a:p>
           <a:p>
             <a:pPr marL="342900" indent="-342900">
               <a:buFont typeface="+mj-lt"/>
-              <a:buAutoNum type="arabicPeriod" startAt="8"/>
+              <a:buAutoNum type="arabicPeriod"/>
             </a:pPr>
             <a:r>
-              <a:rPr lang="it-IT" sz="1400" dirty="0"/>
-              <a:t>S. </a:t>
-            </a:r>
-            <a:r>
-              <a:rPr lang="it-IT" sz="1400" dirty="0" err="1"/>
-              <a:t>Thrun</a:t>
-            </a:r>
-            <a:r>
-              <a:rPr lang="it-IT" sz="1400" dirty="0"/>
-              <a:t>. J. Bala, E. </a:t>
-            </a:r>
-            <a:r>
-              <a:rPr lang="it-IT" sz="1400" dirty="0" err="1"/>
-              <a:t>Bloedorn</a:t>
-            </a:r>
-            <a:r>
-              <a:rPr lang="it-IT" sz="1400" dirty="0"/>
-              <a:t>, I. </a:t>
-            </a:r>
-            <a:r>
-              <a:rPr lang="it-IT" sz="1400" dirty="0" err="1"/>
-              <a:t>Bratko</a:t>
-            </a:r>
-            <a:r>
-              <a:rPr lang="it-IT" sz="1400" dirty="0"/>
-              <a:t> et al. (1992). </a:t>
-            </a:r>
-            <a:r>
-              <a:rPr lang="it-IT" sz="1400" i="1" dirty="0"/>
-              <a:t>The </a:t>
-            </a:r>
-            <a:r>
-              <a:rPr lang="it-IT" sz="1400" i="1" dirty="0" err="1"/>
-              <a:t>MONK's</a:t>
-            </a:r>
-            <a:r>
-              <a:rPr lang="it-IT" sz="1400" i="1" dirty="0"/>
-              <a:t> </a:t>
-            </a:r>
-            <a:r>
-              <a:rPr lang="it-IT" sz="1400" i="1" dirty="0" err="1"/>
-              <a:t>Problems</a:t>
-            </a:r>
-            <a:r>
-              <a:rPr lang="it-IT" sz="1400" i="1" dirty="0"/>
-              <a:t>: A Performance </a:t>
-            </a:r>
-            <a:r>
-              <a:rPr lang="it-IT" sz="1400" i="1" dirty="0" err="1"/>
-              <a:t>Comparison</a:t>
-            </a:r>
-            <a:r>
-              <a:rPr lang="it-IT" sz="1400" i="1" dirty="0"/>
-              <a:t> of </a:t>
-            </a:r>
-            <a:r>
-              <a:rPr lang="it-IT" sz="1400" i="1" dirty="0" err="1"/>
-              <a:t>Different</a:t>
-            </a:r>
-            <a:r>
-              <a:rPr lang="it-IT" sz="1400" i="1" dirty="0"/>
-              <a:t> Learning </a:t>
-            </a:r>
-            <a:r>
-              <a:rPr lang="it-IT" sz="1400" i="1" dirty="0" err="1"/>
-              <a:t>Algorithms</a:t>
-            </a:r>
-            <a:r>
-              <a:rPr lang="it-IT" sz="1400" dirty="0"/>
-              <a:t>.</a:t>
-            </a:r>
-            <a:endParaRPr lang="it-IT" sz="1400" dirty="0">
+              <a:rPr lang="it-IT" sz="1400" spc="-1" dirty="0">
+                <a:solidFill>
+                  <a:srgbClr val="000000"/>
+                </a:solidFill>
+                <a:latin typeface="Arial"/>
+              </a:rPr>
+              <a:t>M. Abadi, A. </a:t>
+            </a:r>
+            <a:r>
+              <a:rPr lang="it-IT" sz="1400" spc="-1" dirty="0" err="1">
+                <a:solidFill>
+                  <a:srgbClr val="000000"/>
+                </a:solidFill>
+                <a:latin typeface="Arial"/>
+              </a:rPr>
+              <a:t>Agarwal</a:t>
+            </a:r>
+            <a:r>
+              <a:rPr lang="it-IT" sz="1400" spc="-1" dirty="0">
+                <a:solidFill>
+                  <a:srgbClr val="000000"/>
+                </a:solidFill>
+                <a:latin typeface="Arial"/>
+              </a:rPr>
+              <a:t> et al., 2015, </a:t>
+            </a:r>
+            <a:r>
+              <a:rPr lang="it-IT" sz="1400" i="1" spc="-1" dirty="0" err="1">
+                <a:solidFill>
+                  <a:srgbClr val="000000"/>
+                </a:solidFill>
+                <a:latin typeface="Arial"/>
+              </a:rPr>
+              <a:t>Ten</a:t>
+            </a:r>
+            <a:r>
+              <a:rPr kumimoji="0" lang="it-IT" altLang="it-IT" sz="1400" b="0" i="1" u="none" strike="noStrike" cap="none" normalizeH="0" baseline="0" dirty="0" err="1">
+                <a:ln>
+                  <a:noFill/>
+                </a:ln>
+                <a:solidFill>
+                  <a:schemeClr val="tx1"/>
+                </a:solidFill>
+                <a:effectLst/>
+                <a:latin typeface="Arial Unicode MS"/>
+              </a:rPr>
+              <a:t>sorFlow</a:t>
+            </a:r>
+            <a:r>
+              <a:rPr kumimoji="0" lang="it-IT" altLang="it-IT" sz="1400" b="0" i="1" u="none" strike="noStrike" cap="none" normalizeH="0" baseline="0" dirty="0">
+                <a:ln>
+                  <a:noFill/>
+                </a:ln>
+                <a:solidFill>
+                  <a:schemeClr val="tx1"/>
+                </a:solidFill>
+                <a:effectLst/>
+                <a:latin typeface="Arial Unicode MS"/>
+              </a:rPr>
+              <a:t>: Large-scale machine learning on </a:t>
+            </a:r>
+            <a:r>
+              <a:rPr kumimoji="0" lang="it-IT" altLang="it-IT" sz="1400" b="0" i="1" u="none" strike="noStrike" cap="none" normalizeH="0" baseline="0" dirty="0" err="1">
+                <a:ln>
+                  <a:noFill/>
+                </a:ln>
+                <a:solidFill>
+                  <a:schemeClr val="tx1"/>
+                </a:solidFill>
+                <a:effectLst/>
+                <a:latin typeface="Arial Unicode MS"/>
+              </a:rPr>
+              <a:t>heterogeneous</a:t>
+            </a:r>
+            <a:r>
+              <a:rPr kumimoji="0" lang="it-IT" altLang="it-IT" sz="1400" b="0" i="1" u="none" strike="noStrike" cap="none" normalizeH="0" baseline="0" dirty="0">
+                <a:ln>
+                  <a:noFill/>
+                </a:ln>
+                <a:solidFill>
+                  <a:schemeClr val="tx1"/>
+                </a:solidFill>
+                <a:effectLst/>
+                <a:latin typeface="Arial Unicode MS"/>
+              </a:rPr>
+              <a:t> systems</a:t>
+            </a:r>
+            <a:r>
+              <a:rPr kumimoji="0" lang="it-IT" altLang="it-IT" sz="1400" b="0" i="0" u="none" strike="noStrike" cap="none" normalizeH="0" baseline="0" dirty="0">
+                <a:ln>
+                  <a:noFill/>
+                </a:ln>
+                <a:solidFill>
+                  <a:schemeClr val="tx1"/>
+                </a:solidFill>
+                <a:effectLst/>
+                <a:latin typeface="Arial Unicode MS"/>
+              </a:rPr>
+              <a:t>. </a:t>
+            </a:r>
+            <a:r>
+              <a:rPr kumimoji="0" lang="it-IT" altLang="it-IT" sz="1400" b="0" i="0" u="none" strike="noStrike" cap="none" normalizeH="0" baseline="0" dirty="0">
+                <a:ln>
+                  <a:noFill/>
+                </a:ln>
+                <a:solidFill>
+                  <a:schemeClr val="tx1"/>
+                </a:solidFill>
+                <a:effectLst/>
+                <a:latin typeface="Arial Unicode MS"/>
+                <a:hlinkClick r:id="rId5"/>
+              </a:rPr>
+              <a:t>www.tensorflow.org</a:t>
+            </a:r>
+            <a:endParaRPr kumimoji="0" lang="it-IT" altLang="it-IT" sz="1400" b="0" i="0" u="none" strike="noStrike" cap="none" spc="-1" normalizeH="0" baseline="0" dirty="0">
+              <a:ln>
+                <a:noFill/>
+              </a:ln>
               <a:solidFill>
-                <a:srgbClr val="FF0000"/>
+                <a:srgbClr val="000000"/>
               </a:solidFill>
+              <a:effectLst/>
+              <a:latin typeface="Arial"/>
             </a:endParaRPr>
           </a:p>
           <a:p>
             <a:pPr marL="342900" indent="-342900">
               <a:buFont typeface="+mj-lt"/>
-              <a:buAutoNum type="arabicPeriod" startAt="8"/>
+              <a:buAutoNum type="arabicPeriod"/>
             </a:pPr>
-            <a:endParaRPr lang="it-IT" sz="1400" dirty="0"/>
+            <a:r>
+              <a:rPr lang="it-IT" sz="1400" spc="-1" dirty="0">
+                <a:solidFill>
+                  <a:srgbClr val="000000"/>
+                </a:solidFill>
+                <a:latin typeface="Arial"/>
+              </a:rPr>
+              <a:t>F. </a:t>
+            </a:r>
+            <a:r>
+              <a:rPr lang="it-IT" sz="1400" spc="-1" dirty="0" err="1">
+                <a:solidFill>
+                  <a:srgbClr val="000000"/>
+                </a:solidFill>
+                <a:latin typeface="Arial"/>
+              </a:rPr>
+              <a:t>Pedergosa</a:t>
+            </a:r>
+            <a:r>
+              <a:rPr lang="it-IT" sz="1400" spc="-1" dirty="0">
+                <a:solidFill>
+                  <a:srgbClr val="000000"/>
+                </a:solidFill>
+                <a:latin typeface="Arial"/>
+              </a:rPr>
+              <a:t>, G. </a:t>
+            </a:r>
+            <a:r>
+              <a:rPr lang="it-IT" sz="1400" spc="-1" dirty="0" err="1">
+                <a:solidFill>
+                  <a:srgbClr val="000000"/>
+                </a:solidFill>
+                <a:latin typeface="Arial"/>
+              </a:rPr>
+              <a:t>Varoquaux</a:t>
+            </a:r>
+            <a:r>
+              <a:rPr lang="it-IT" sz="1400" spc="-1" dirty="0">
+                <a:solidFill>
+                  <a:srgbClr val="000000"/>
+                </a:solidFill>
+                <a:latin typeface="Arial"/>
+              </a:rPr>
+              <a:t> et al, </a:t>
+            </a:r>
+            <a:r>
+              <a:rPr lang="it-IT" sz="1400" i="1" spc="-1" dirty="0" err="1">
+                <a:solidFill>
+                  <a:srgbClr val="000000"/>
+                </a:solidFill>
+                <a:latin typeface="Arial"/>
+              </a:rPr>
+              <a:t>Scikit-learn</a:t>
+            </a:r>
+            <a:r>
+              <a:rPr lang="it-IT" sz="1400" i="1" spc="-1" dirty="0">
+                <a:solidFill>
+                  <a:srgbClr val="000000"/>
+                </a:solidFill>
+                <a:latin typeface="Arial"/>
+              </a:rPr>
+              <a:t>: Machine Learning in Python</a:t>
+            </a:r>
+            <a:r>
+              <a:rPr lang="it-IT" sz="1400" spc="-1" dirty="0">
+                <a:solidFill>
+                  <a:srgbClr val="000000"/>
+                </a:solidFill>
+                <a:latin typeface="Arial"/>
+              </a:rPr>
+              <a:t>, JMLR, 12(</a:t>
+            </a:r>
+            <a:r>
+              <a:rPr lang="it-IT" sz="1400" spc="-1" dirty="0" err="1">
+                <a:solidFill>
+                  <a:srgbClr val="000000"/>
+                </a:solidFill>
+                <a:latin typeface="Arial"/>
+              </a:rPr>
+              <a:t>Oct</a:t>
+            </a:r>
+            <a:r>
+              <a:rPr lang="it-IT" sz="1400" spc="-1" dirty="0">
+                <a:solidFill>
+                  <a:srgbClr val="000000"/>
+                </a:solidFill>
+                <a:latin typeface="Arial"/>
+              </a:rPr>
+              <a:t>), (2011), pp.2825-2830 </a:t>
+            </a:r>
           </a:p>
           <a:p>
             <a:pPr marL="342900" indent="-342900">
               <a:buFont typeface="+mj-lt"/>
-              <a:buAutoNum type="arabicPeriod" startAt="8"/>
+              <a:buAutoNum type="arabicPeriod"/>
             </a:pPr>
-            <a:endParaRPr lang="it-IT" sz="1400" dirty="0"/>
+            <a:r>
+              <a:rPr lang="it-IT" sz="1400" dirty="0" err="1"/>
+              <a:t>Scikit-learn</a:t>
+            </a:r>
+            <a:r>
+              <a:rPr lang="it-IT" sz="1400" dirty="0"/>
+              <a:t> </a:t>
+            </a:r>
+            <a:r>
+              <a:rPr lang="it-IT" sz="1400" dirty="0">
+                <a:hlinkClick r:id="rId6"/>
+              </a:rPr>
+              <a:t>API </a:t>
+            </a:r>
+            <a:r>
+              <a:rPr lang="it-IT" sz="1400" dirty="0" err="1">
+                <a:hlinkClick r:id="rId6"/>
+              </a:rPr>
+              <a:t>reference</a:t>
+            </a:r>
+            <a:endParaRPr lang="it-IT" sz="1400" spc="-1" dirty="0">
+              <a:solidFill>
+                <a:srgbClr val="000000"/>
+              </a:solidFill>
+              <a:latin typeface="Arial"/>
+            </a:endParaRPr>
+          </a:p>
+          <a:p>
+            <a:pPr marL="342900" indent="-342900">
+              <a:buFont typeface="+mj-lt"/>
+              <a:buAutoNum type="arabicPeriod"/>
+            </a:pPr>
+            <a:r>
+              <a:rPr lang="it-IT" sz="1400" dirty="0"/>
+              <a:t>T. </a:t>
+            </a:r>
+            <a:r>
+              <a:rPr lang="it-IT" sz="1400" dirty="0" err="1"/>
+              <a:t>Akiba</a:t>
+            </a:r>
+            <a:r>
+              <a:rPr lang="it-IT" sz="1400" dirty="0"/>
+              <a:t>, S. Sano, T. </a:t>
+            </a:r>
+            <a:r>
+              <a:rPr lang="it-IT" sz="1400" dirty="0" err="1"/>
+              <a:t>Yanase</a:t>
+            </a:r>
+            <a:r>
+              <a:rPr lang="it-IT" sz="1400" dirty="0"/>
+              <a:t>, T. </a:t>
+            </a:r>
+            <a:r>
+              <a:rPr lang="it-IT" sz="1400" dirty="0" err="1"/>
+              <a:t>Ohta</a:t>
+            </a:r>
+            <a:r>
+              <a:rPr lang="it-IT" sz="1400" dirty="0"/>
+              <a:t>, M. </a:t>
+            </a:r>
+            <a:r>
+              <a:rPr lang="it-IT" sz="1400" dirty="0" err="1"/>
+              <a:t>Koyama</a:t>
+            </a:r>
+            <a:r>
+              <a:rPr lang="it-IT" sz="1400" dirty="0"/>
+              <a:t>, </a:t>
+            </a:r>
+            <a:r>
+              <a:rPr lang="it-IT" sz="1400" i="1" dirty="0" err="1"/>
+              <a:t>Optuna</a:t>
+            </a:r>
+            <a:r>
+              <a:rPr lang="it-IT" sz="1400" i="1" dirty="0"/>
+              <a:t>: A Next-generation </a:t>
+            </a:r>
+            <a:r>
+              <a:rPr lang="it-IT" sz="1400" i="1" dirty="0" err="1"/>
+              <a:t>Hyperparameter</a:t>
+            </a:r>
+            <a:r>
+              <a:rPr lang="it-IT" sz="1400" i="1" dirty="0"/>
+              <a:t> </a:t>
+            </a:r>
+            <a:r>
+              <a:rPr lang="it-IT" sz="1400" i="1" dirty="0" err="1"/>
+              <a:t>Optimization</a:t>
+            </a:r>
+            <a:r>
+              <a:rPr lang="it-IT" sz="1400" i="1" dirty="0"/>
+              <a:t> Framework</a:t>
+            </a:r>
+            <a:r>
+              <a:rPr lang="it-IT" sz="1400" dirty="0"/>
+              <a:t>, KDD, (2019), pp.2623-2631</a:t>
+            </a:r>
           </a:p>
         </p:txBody>
       </p:sp>
@@ -20408,8 +20700,8 @@
         </p:nvSpPr>
         <p:spPr>
           <a:xfrm>
-            <a:off x="490817" y="1082950"/>
-            <a:ext cx="7738783" cy="369332"/>
+            <a:off x="702426" y="572595"/>
+            <a:ext cx="7738783" cy="338554"/>
           </a:xfrm>
           <a:prstGeom prst="rect">
             <a:avLst/>
@@ -20423,11 +20715,370 @@
           <a:lstStyle/>
           <a:p>
             <a:r>
-              <a:rPr lang="it-IT" dirty="0" err="1"/>
+              <a:rPr lang="it-IT" sz="1600" dirty="0" err="1"/>
+              <a:t>Main</a:t>
+            </a:r>
+            <a:r>
+              <a:rPr lang="it-IT" sz="1600" dirty="0"/>
+              <a:t> libraries and software tools </a:t>
+            </a:r>
+            <a:r>
+              <a:rPr lang="it-IT" sz="1600" dirty="0" err="1"/>
+              <a:t>used</a:t>
+            </a:r>
+            <a:r>
+              <a:rPr lang="it-IT" sz="1600" dirty="0"/>
+              <a:t> for </a:t>
+            </a:r>
+            <a:r>
+              <a:rPr lang="it-IT" sz="1600" dirty="0" err="1"/>
+              <a:t>this</a:t>
+            </a:r>
+            <a:r>
+              <a:rPr lang="it-IT" sz="1600" dirty="0"/>
+              <a:t> project, with </a:t>
+            </a:r>
+            <a:r>
+              <a:rPr lang="it-IT" sz="1600" dirty="0" err="1"/>
+              <a:t>documentation</a:t>
+            </a:r>
+            <a:r>
+              <a:rPr lang="it-IT" sz="1600" dirty="0"/>
+              <a:t>:</a:t>
+            </a:r>
+          </a:p>
+        </p:txBody>
+      </p:sp>
+      <p:sp>
+        <p:nvSpPr>
+          <p:cNvPr id="7" name="CasellaDiTesto 6">
+            <a:extLst>
+              <a:ext uri="{FF2B5EF4-FFF2-40B4-BE49-F238E27FC236}">
+                <a16:creationId xmlns:a16="http://schemas.microsoft.com/office/drawing/2014/main" id="{491951CC-852D-3998-1B25-1E283453A104}"/>
+              </a:ext>
+            </a:extLst>
+          </p:cNvPr>
+          <p:cNvSpPr txBox="1"/>
+          <p:nvPr/>
+        </p:nvSpPr>
+        <p:spPr>
+          <a:xfrm>
+            <a:off x="702427" y="3240318"/>
+            <a:ext cx="7738783" cy="1815882"/>
+          </a:xfrm>
+          <a:prstGeom prst="rect">
+            <a:avLst/>
+          </a:prstGeom>
+          <a:noFill/>
+        </p:spPr>
+        <p:txBody>
+          <a:bodyPr wrap="square" rtlCol="0">
+            <a:spAutoFit/>
+          </a:bodyPr>
+          <a:lstStyle/>
+          <a:p>
+            <a:pPr marL="342900" indent="-342900">
+              <a:buFont typeface="+mj-lt"/>
+              <a:buAutoNum type="arabicPeriod" startAt="7"/>
+            </a:pPr>
+            <a:r>
+              <a:rPr lang="it-IT" sz="1400" dirty="0"/>
+              <a:t>K. He, X. Zhang, S. </a:t>
+            </a:r>
+            <a:r>
+              <a:rPr lang="it-IT" sz="1400" dirty="0" err="1"/>
+              <a:t>Ren</a:t>
+            </a:r>
+            <a:r>
+              <a:rPr lang="it-IT" sz="1400" dirty="0"/>
+              <a:t>, J. Sun, </a:t>
+            </a:r>
+            <a:r>
+              <a:rPr lang="it-IT" sz="1400" i="1" dirty="0" err="1"/>
+              <a:t>Delving</a:t>
+            </a:r>
+            <a:r>
+              <a:rPr lang="it-IT" sz="1400" i="1" dirty="0"/>
+              <a:t> Deep </a:t>
+            </a:r>
+            <a:r>
+              <a:rPr lang="it-IT" sz="1400" i="1" dirty="0" err="1"/>
+              <a:t>into</a:t>
+            </a:r>
+            <a:r>
+              <a:rPr lang="it-IT" sz="1400" i="1" dirty="0"/>
+              <a:t> </a:t>
+            </a:r>
+            <a:r>
+              <a:rPr lang="it-IT" sz="1400" i="1" dirty="0" err="1"/>
+              <a:t>Rectifiers</a:t>
+            </a:r>
+            <a:r>
+              <a:rPr lang="it-IT" sz="1400" i="1" dirty="0"/>
+              <a:t>: </a:t>
+            </a:r>
+            <a:r>
+              <a:rPr lang="it-IT" sz="1400" i="1" dirty="0" err="1"/>
+              <a:t>Surpassing</a:t>
+            </a:r>
+            <a:r>
+              <a:rPr lang="it-IT" sz="1400" i="1" dirty="0"/>
+              <a:t> Human-Level Performance on </a:t>
+            </a:r>
+            <a:r>
+              <a:rPr lang="it-IT" sz="1400" i="1" dirty="0" err="1"/>
+              <a:t>ImageNet</a:t>
+            </a:r>
+            <a:r>
+              <a:rPr lang="it-IT" sz="1400" i="1" dirty="0"/>
+              <a:t> </a:t>
+            </a:r>
+            <a:r>
+              <a:rPr lang="it-IT" sz="1400" i="1" dirty="0" err="1"/>
+              <a:t>Classification</a:t>
+            </a:r>
+            <a:r>
+              <a:rPr lang="it-IT" sz="1400" dirty="0"/>
+              <a:t>, </a:t>
+            </a:r>
+            <a:r>
+              <a:rPr lang="it-IT" sz="1400" i="1" dirty="0"/>
+              <a:t>2015 IEEE International Conference on Computer Vision (ICCV)</a:t>
+            </a:r>
+            <a:r>
+              <a:rPr lang="it-IT" sz="1400" dirty="0"/>
+              <a:t>, Santiago, Chile, 2015, pp. 1026-1034,</a:t>
+            </a:r>
+          </a:p>
+          <a:p>
+            <a:pPr marL="342900" indent="-342900">
+              <a:buFont typeface="+mj-lt"/>
+              <a:buAutoNum type="arabicPeriod" startAt="7"/>
+            </a:pPr>
+            <a:r>
+              <a:rPr lang="it-IT" sz="1400" dirty="0" err="1"/>
+              <a:t>Bengio</a:t>
+            </a:r>
+            <a:r>
+              <a:rPr lang="it-IT" sz="1400" dirty="0"/>
+              <a:t>, Y. </a:t>
+            </a:r>
+            <a:r>
+              <a:rPr lang="it-IT" sz="1400" i="1" dirty="0" err="1"/>
+              <a:t>Practical</a:t>
+            </a:r>
+            <a:r>
+              <a:rPr lang="it-IT" sz="1400" i="1" dirty="0"/>
+              <a:t> </a:t>
+            </a:r>
+            <a:r>
+              <a:rPr lang="it-IT" sz="1400" i="1" dirty="0" err="1"/>
+              <a:t>Recommendations</a:t>
+            </a:r>
+            <a:r>
+              <a:rPr lang="it-IT" sz="1400" i="1" dirty="0"/>
+              <a:t> for </a:t>
+            </a:r>
+            <a:r>
+              <a:rPr lang="it-IT" sz="1400" i="1" dirty="0" err="1"/>
+              <a:t>Gradient-Based</a:t>
+            </a:r>
+            <a:r>
+              <a:rPr lang="it-IT" sz="1400" i="1" dirty="0"/>
+              <a:t> Training of Deep </a:t>
+            </a:r>
+            <a:r>
+              <a:rPr lang="it-IT" sz="1400" i="1" dirty="0" err="1"/>
+              <a:t>Architectures</a:t>
+            </a:r>
+            <a:r>
+              <a:rPr lang="it-IT" sz="1400" dirty="0"/>
+              <a:t>. In: </a:t>
+            </a:r>
+            <a:r>
+              <a:rPr lang="it-IT" sz="1400" dirty="0" err="1"/>
+              <a:t>Montavon</a:t>
+            </a:r>
+            <a:r>
+              <a:rPr lang="it-IT" sz="1400" dirty="0"/>
+              <a:t>, G., </a:t>
+            </a:r>
+            <a:r>
+              <a:rPr lang="it-IT" sz="1400" dirty="0" err="1"/>
+              <a:t>Orr</a:t>
+            </a:r>
+            <a:r>
+              <a:rPr lang="it-IT" sz="1400" dirty="0"/>
+              <a:t>, G.B., Müller, KR. (</a:t>
+            </a:r>
+            <a:r>
+              <a:rPr lang="it-IT" sz="1400" dirty="0" err="1"/>
+              <a:t>eds</a:t>
+            </a:r>
+            <a:r>
+              <a:rPr lang="it-IT" sz="1400" dirty="0"/>
+              <a:t>) </a:t>
+            </a:r>
+            <a:r>
+              <a:rPr lang="it-IT" sz="1400" dirty="0" err="1"/>
+              <a:t>Neural</a:t>
+            </a:r>
+            <a:r>
+              <a:rPr lang="it-IT" sz="1400" dirty="0"/>
+              <a:t> Networks: </a:t>
+            </a:r>
+            <a:r>
+              <a:rPr lang="it-IT" sz="1400" dirty="0" err="1"/>
+              <a:t>Tricks</a:t>
+            </a:r>
+            <a:r>
+              <a:rPr lang="it-IT" sz="1400" dirty="0"/>
+              <a:t> of the Trade. </a:t>
+            </a:r>
+            <a:r>
+              <a:rPr lang="it-IT" sz="1400" dirty="0" err="1"/>
+              <a:t>Lecture</a:t>
+            </a:r>
+            <a:r>
+              <a:rPr lang="it-IT" sz="1400" dirty="0"/>
+              <a:t> Notes in Computer Science, </a:t>
+            </a:r>
+            <a:r>
+              <a:rPr lang="it-IT" sz="1400" dirty="0" err="1"/>
+              <a:t>vol</a:t>
+            </a:r>
+            <a:r>
+              <a:rPr lang="it-IT" sz="1400" dirty="0"/>
+              <a:t> 7700 (2012).   Springer, </a:t>
+            </a:r>
+            <a:r>
+              <a:rPr lang="it-IT" sz="1400" dirty="0" err="1"/>
+              <a:t>Berlin</a:t>
+            </a:r>
+            <a:r>
+              <a:rPr lang="it-IT" sz="1400" dirty="0"/>
+              <a:t>, Heidelberg.</a:t>
+            </a:r>
+          </a:p>
+          <a:p>
+            <a:pPr marL="342900" indent="-342900">
+              <a:buFont typeface="+mj-lt"/>
+              <a:buAutoNum type="arabicPeriod" startAt="7"/>
+            </a:pPr>
+            <a:r>
+              <a:rPr lang="it-IT" sz="1400" dirty="0"/>
+              <a:t>S. </a:t>
+            </a:r>
+            <a:r>
+              <a:rPr lang="it-IT" sz="1400" dirty="0" err="1"/>
+              <a:t>Thrun</a:t>
+            </a:r>
+            <a:r>
+              <a:rPr lang="it-IT" sz="1400" dirty="0"/>
+              <a:t>. J. Bala, E. </a:t>
+            </a:r>
+            <a:r>
+              <a:rPr lang="it-IT" sz="1400" dirty="0" err="1"/>
+              <a:t>Bloedorn</a:t>
+            </a:r>
+            <a:r>
+              <a:rPr lang="it-IT" sz="1400" dirty="0"/>
+              <a:t>, I. </a:t>
+            </a:r>
+            <a:r>
+              <a:rPr lang="it-IT" sz="1400" dirty="0" err="1"/>
+              <a:t>Bratko</a:t>
+            </a:r>
+            <a:r>
+              <a:rPr lang="it-IT" sz="1400" dirty="0"/>
+              <a:t> et al. (1992). </a:t>
+            </a:r>
+            <a:r>
+              <a:rPr lang="it-IT" sz="1400" i="1" dirty="0"/>
+              <a:t>The </a:t>
+            </a:r>
+            <a:r>
+              <a:rPr lang="it-IT" sz="1400" i="1" dirty="0" err="1"/>
+              <a:t>MONK's</a:t>
+            </a:r>
+            <a:r>
+              <a:rPr lang="it-IT" sz="1400" i="1" dirty="0"/>
+              <a:t> </a:t>
+            </a:r>
+            <a:r>
+              <a:rPr lang="it-IT" sz="1400" i="1" dirty="0" err="1"/>
+              <a:t>Problems</a:t>
+            </a:r>
+            <a:r>
+              <a:rPr lang="it-IT" sz="1400" i="1" dirty="0"/>
+              <a:t>: A Performance </a:t>
+            </a:r>
+            <a:r>
+              <a:rPr lang="it-IT" sz="1400" i="1" dirty="0" err="1"/>
+              <a:t>Comparison</a:t>
+            </a:r>
+            <a:r>
+              <a:rPr lang="it-IT" sz="1400" i="1" dirty="0"/>
+              <a:t> of </a:t>
+            </a:r>
+            <a:r>
+              <a:rPr lang="it-IT" sz="1400" i="1" dirty="0" err="1"/>
+              <a:t>Different</a:t>
+            </a:r>
+            <a:r>
+              <a:rPr lang="it-IT" sz="1400" i="1" dirty="0"/>
+              <a:t> Learning </a:t>
+            </a:r>
+            <a:r>
+              <a:rPr lang="it-IT" sz="1400" i="1" dirty="0" err="1"/>
+              <a:t>Algorithms</a:t>
+            </a:r>
+            <a:r>
+              <a:rPr lang="it-IT" sz="1400" dirty="0"/>
+              <a:t>.</a:t>
+            </a:r>
+            <a:endParaRPr lang="it-IT" sz="1400" dirty="0">
+              <a:solidFill>
+                <a:srgbClr val="FF0000"/>
+              </a:solidFill>
+            </a:endParaRPr>
+          </a:p>
+        </p:txBody>
+      </p:sp>
+      <p:sp>
+        <p:nvSpPr>
+          <p:cNvPr id="8" name="CasellaDiTesto 7">
+            <a:extLst>
+              <a:ext uri="{FF2B5EF4-FFF2-40B4-BE49-F238E27FC236}">
+                <a16:creationId xmlns:a16="http://schemas.microsoft.com/office/drawing/2014/main" id="{FC3ADDC1-64FB-1BE2-8B0F-4E761CA1CD8A}"/>
+              </a:ext>
+            </a:extLst>
+          </p:cNvPr>
+          <p:cNvSpPr txBox="1"/>
+          <p:nvPr/>
+        </p:nvSpPr>
+        <p:spPr>
+          <a:xfrm>
+            <a:off x="702426" y="2901764"/>
+            <a:ext cx="7738783" cy="338554"/>
+          </a:xfrm>
+          <a:prstGeom prst="rect">
+            <a:avLst/>
+          </a:prstGeom>
+          <a:noFill/>
+        </p:spPr>
+        <p:txBody>
+          <a:bodyPr wrap="square" rtlCol="0">
+            <a:spAutoFit/>
+          </a:bodyPr>
+          <a:lstStyle/>
+          <a:p>
+            <a:r>
+              <a:rPr lang="it-IT" sz="1600" dirty="0" err="1"/>
               <a:t>Bibliographical</a:t>
             </a:r>
             <a:r>
-              <a:rPr lang="it-IT" dirty="0"/>
+              <a:rPr lang="it-IT" sz="1600" dirty="0"/>
               <a:t> sources:</a:t>
             </a:r>
           </a:p>
@@ -20436,7 +21087,7 @@
     </p:spTree>
     <p:extLst>
       <p:ext uri="{BB962C8B-B14F-4D97-AF65-F5344CB8AC3E}">
-        <p14:creationId xmlns:p14="http://schemas.microsoft.com/office/powerpoint/2010/main" val="290779743"/>
+        <p14:creationId xmlns:p14="http://schemas.microsoft.com/office/powerpoint/2010/main" val="3814474243"/>
       </p:ext>
     </p:extLst>
   </p:cSld>
@@ -22966,7 +23617,7 @@
           <p:nvPr>
             <p:extLst>
               <p:ext uri="{D42A27DB-BD31-4B8C-83A1-F6EECF244321}">
-                <p14:modId xmlns:p14="http://schemas.microsoft.com/office/powerpoint/2010/main" val="351577486"/>
+                <p14:modId xmlns:p14="http://schemas.microsoft.com/office/powerpoint/2010/main" val="2231198098"/>
               </p:ext>
             </p:extLst>
           </p:nvPr>
@@ -23731,6 +24382,7 @@
                     <a:bodyPr/>
                     <a:lstStyle/>
                     <a:p>
+                      <a:pPr algn="ctr"/>
                       <a:r>
                         <a:rPr lang="it-IT" sz="1400" i="0" dirty="0" err="1">
                           <a:latin typeface="Consolas" panose="020B0609020204030204" pitchFamily="49" charset="0"/>
@@ -27286,7 +27938,7 @@
         </p:nvSpPr>
         <p:spPr>
           <a:xfrm>
-            <a:off x="311760" y="4336420"/>
+            <a:off x="311760" y="3945877"/>
             <a:ext cx="8520120" cy="523220"/>
           </a:xfrm>
           <a:prstGeom prst="rect">
@@ -27644,7 +28296,7 @@
         <p:spPr>
           <a:xfrm>
             <a:off x="311760" y="3422657"/>
-            <a:ext cx="8520120" cy="738664"/>
+            <a:ext cx="8520120" cy="523220"/>
           </a:xfrm>
           <a:prstGeom prst="rect">
             <a:avLst/>
@@ -27683,7 +28335,7 @@
             </a:r>
             <a:r>
               <a:rPr lang="it-IT" sz="1400" dirty="0"/>
-              <a:t> 4 models, </a:t>
+              <a:t> 2 models, </a:t>
             </a:r>
             <a:r>
               <a:rPr lang="it-IT" sz="1400" dirty="0" err="1"/>
@@ -27695,15 +28347,15 @@
             </a:r>
             <a:r>
               <a:rPr lang="it-IT" sz="1400" dirty="0" err="1"/>
-              <a:t>choices</a:t>
-            </a:r>
-            <a:r>
-              <a:rPr lang="it-IT" sz="1400" dirty="0"/>
-              <a:t> of </a:t>
-            </a:r>
-            <a:r>
-              <a:rPr lang="it-IT" sz="1400" dirty="0" err="1"/>
-              <a:t>internal</a:t>
+              <a:t>choice</a:t>
+            </a:r>
+            <a:r>
+              <a:rPr lang="it-IT" sz="1400" dirty="0"/>
+              <a:t> of the </a:t>
+            </a:r>
+            <a:r>
+              <a:rPr lang="it-IT" sz="1400" dirty="0" err="1"/>
+              <a:t>hyperparameters</a:t>
             </a:r>
             <a:r>
               <a:rPr lang="it-IT" sz="1400" dirty="0"/>
@@ -27711,7 +28363,15 @@
             </a:r>
             <a:r>
               <a:rPr lang="it-IT" sz="1400" dirty="0" err="1"/>
-              <a:t>loss</a:t>
+              <a:t>exploration</a:t>
+            </a:r>
+            <a:r>
+              <a:rPr lang="it-IT" sz="1400" dirty="0"/>
+              <a:t> strategy (full </a:t>
+            </a:r>
+            <a:r>
+              <a:rPr lang="it-IT" sz="1400" dirty="0" err="1"/>
+              <a:t>grid</a:t>
             </a:r>
             <a:r>
               <a:rPr lang="it-IT" sz="1400" dirty="0"/>
@@ -27719,15 +28379,23 @@
             </a:r>
             <a:r>
               <a:rPr lang="it-IT" sz="1400" dirty="0" err="1"/>
-              <a:t>function</a:t>
-            </a:r>
-            <a:r>
-              <a:rPr lang="it-IT" sz="1400" dirty="0"/>
-              <a:t> for training (MSE/MEE) and the </a:t>
-            </a:r>
-            <a:r>
-              <a:rPr lang="it-IT" sz="1400" dirty="0" err="1"/>
-              <a:t>hyperparameters</a:t>
+              <a:t>search</a:t>
+            </a:r>
+            <a:r>
+              <a:rPr lang="it-IT" sz="1400" dirty="0"/>
+              <a:t>/</a:t>
+            </a:r>
+            <a:r>
+              <a:rPr lang="it-IT" sz="1400" dirty="0" err="1"/>
+              <a:t>Optuna</a:t>
+            </a:r>
+            <a:r>
+              <a:rPr lang="it-IT" sz="1400" dirty="0"/>
+              <a:t>). So </a:t>
+            </a:r>
+            <a:r>
+              <a:rPr lang="it-IT" sz="1400" dirty="0" err="1"/>
+              <a:t>we</a:t>
             </a:r>
             <a:r>
               <a:rPr lang="it-IT" sz="1400" dirty="0"/>
@@ -27735,57 +28403,11 @@
             </a:r>
             <a:r>
               <a:rPr lang="it-IT" sz="1400" dirty="0" err="1"/>
-              <a:t>exploration</a:t>
-            </a:r>
-            <a:r>
-              <a:rPr lang="it-IT" sz="1400" dirty="0"/>
-              <a:t> strategy (full </a:t>
-            </a:r>
-            <a:r>
-              <a:rPr lang="it-IT" sz="1400" dirty="0" err="1"/>
-              <a:t>grid</a:t>
-            </a:r>
-            <a:r>
-              <a:rPr lang="it-IT" sz="1400" dirty="0"/>
-              <a:t> </a:t>
-            </a:r>
-            <a:r>
-              <a:rPr lang="it-IT" sz="1400" dirty="0" err="1"/>
-              <a:t>search</a:t>
-            </a:r>
-            <a:r>
-              <a:rPr lang="it-IT" sz="1400" dirty="0"/>
-              <a:t>/</a:t>
-            </a:r>
-            <a:r>
-              <a:rPr lang="it-IT" sz="1400" dirty="0" err="1"/>
-              <a:t>Optuna</a:t>
-            </a:r>
-            <a:r>
-              <a:rPr lang="it-IT" sz="1400" dirty="0"/>
-              <a:t>). </a:t>
-            </a:r>
-          </a:p>
-          <a:p>
-            <a:r>
-              <a:rPr lang="it-IT" sz="1400" dirty="0"/>
-              <a:t>So </a:t>
-            </a:r>
-            <a:r>
-              <a:rPr lang="it-IT" sz="1400" dirty="0" err="1"/>
-              <a:t>we</a:t>
-            </a:r>
-            <a:r>
-              <a:rPr lang="it-IT" sz="1400" dirty="0"/>
-              <a:t> </a:t>
-            </a:r>
-            <a:r>
-              <a:rPr lang="it-IT" sz="1400" dirty="0" err="1"/>
               <a:t>compared</a:t>
             </a:r>
             <a:r>
               <a:rPr lang="it-IT" sz="1400" dirty="0"/>
-              <a:t> 6 models in </a:t>
+              <a:t> 4 models in </a:t>
             </a:r>
             <a:r>
               <a:rPr lang="it-IT" sz="1400" dirty="0" err="1"/>
@@ -31874,7 +32496,7 @@
                     <a:cs typeface="Arial" panose="020B0604020202020204" pitchFamily="34" charset="0"/>
                     <a:hlinkClick r:id="rId3" action="ppaction://hlinksldjump"/>
                   </a:rPr>
-                  <a:t>9</a:t>
+                  <a:t>7</a:t>
                 </a:r>
                 <a:r>
                   <a:rPr lang="it-IT" sz="1400" dirty="0">
@@ -38949,606 +39571,6 @@
 </p:sld>
 </file>
 
-<file path=ppt/slides/slide41.xml><?xml version="1.0" encoding="utf-8"?>
-<p:sld xmlns:a="http://schemas.openxmlformats.org/drawingml/2006/main" xmlns:r="http://schemas.openxmlformats.org/officeDocument/2006/relationships" xmlns:p="http://schemas.openxmlformats.org/presentationml/2006/main">
-  <p:cSld>
-    <p:spTree>
-      <p:nvGrpSpPr>
-        <p:cNvPr id="1" name=""/>
-        <p:cNvGrpSpPr/>
-        <p:nvPr/>
-      </p:nvGrpSpPr>
-      <p:grpSpPr>
-        <a:xfrm>
-          <a:off x="0" y="0"/>
-          <a:ext cx="0" cy="0"/>
-          <a:chOff x="0" y="0"/>
-          <a:chExt cx="0" cy="0"/>
-        </a:xfrm>
-      </p:grpSpPr>
-      <p:sp>
-        <p:nvSpPr>
-          <p:cNvPr id="120" name="PlaceHolder 1"/>
-          <p:cNvSpPr>
-            <a:spLocks noGrp="1"/>
-          </p:cNvSpPr>
-          <p:nvPr>
-            <p:ph type="title"/>
-          </p:nvPr>
-        </p:nvSpPr>
-        <p:spPr>
-          <a:xfrm>
-            <a:off x="311760" y="0"/>
-            <a:ext cx="8520120" cy="792000"/>
-          </a:xfrm>
-          <a:prstGeom prst="rect">
-            <a:avLst/>
-          </a:prstGeom>
-          <a:noFill/>
-          <a:ln w="0">
-            <a:noFill/>
-          </a:ln>
-        </p:spPr>
-        <p:txBody>
-          <a:bodyPr tIns="91440" bIns="91440" anchor="t">
-            <a:normAutofit fontScale="90000"/>
-          </a:bodyPr>
-          <a:lstStyle/>
-          <a:p>
-            <a:pPr>
-              <a:lnSpc>
-                <a:spcPct val="100000"/>
-              </a:lnSpc>
-              <a:buNone/>
-              <a:tabLst>
-                <a:tab pos="0" algn="l"/>
-              </a:tabLst>
-            </a:pPr>
-            <a:r>
-              <a:rPr lang="it" sz="2400" b="0" strike="noStrike" spc="-1" dirty="0">
-                <a:solidFill>
-                  <a:srgbClr val="000000"/>
-                </a:solidFill>
-                <a:latin typeface="Arial"/>
-                <a:ea typeface="Arial"/>
-              </a:rPr>
-              <a:t>Appendix – </a:t>
-            </a:r>
-            <a:r>
-              <a:rPr lang="it" sz="2400" spc="-1" dirty="0">
-                <a:solidFill>
-                  <a:srgbClr val="000000"/>
-                </a:solidFill>
-                <a:latin typeface="Arial"/>
-                <a:ea typeface="Arial"/>
-              </a:rPr>
-              <a:t>15</a:t>
-            </a:r>
-            <a:br>
-              <a:rPr lang="it" sz="2400" b="0" strike="noStrike" spc="-1" dirty="0">
-                <a:solidFill>
-                  <a:srgbClr val="000000"/>
-                </a:solidFill>
-                <a:latin typeface="Arial"/>
-                <a:ea typeface="Arial"/>
-              </a:rPr>
-            </a:br>
-            <a:r>
-              <a:rPr lang="it" sz="2000" b="0" strike="noStrike" spc="-1" dirty="0">
-                <a:solidFill>
-                  <a:srgbClr val="3F3F3F"/>
-                </a:solidFill>
-                <a:latin typeface="Arial"/>
-                <a:ea typeface="Arial"/>
-              </a:rPr>
-              <a:t>Learning curves for best SVM and best Random Forest</a:t>
-            </a:r>
-            <a:endParaRPr lang="it-IT" sz="2400" b="0" strike="noStrike" spc="-1" dirty="0">
-              <a:solidFill>
-                <a:srgbClr val="3F3F3F"/>
-              </a:solidFill>
-              <a:latin typeface="Arial"/>
-            </a:endParaRPr>
-          </a:p>
-        </p:txBody>
-      </p:sp>
-      <p:sp>
-        <p:nvSpPr>
-          <p:cNvPr id="122" name="PlaceHolder 3"/>
-          <p:cNvSpPr>
-            <a:spLocks noGrp="1"/>
-          </p:cNvSpPr>
-          <p:nvPr>
-            <p:ph type="sldNum" idx="14"/>
-          </p:nvPr>
-        </p:nvSpPr>
-        <p:spPr>
-          <a:xfrm>
-            <a:off x="8472600" y="4663080"/>
-            <a:ext cx="548280" cy="393120"/>
-          </a:xfrm>
-          <a:prstGeom prst="rect">
-            <a:avLst/>
-          </a:prstGeom>
-          <a:noFill/>
-          <a:ln w="0">
-            <a:noFill/>
-          </a:ln>
-        </p:spPr>
-        <p:txBody>
-          <a:bodyPr tIns="91440" bIns="91440" anchor="ctr">
-            <a:normAutofit/>
-          </a:bodyPr>
-          <a:lstStyle>
-            <a:lvl1pPr algn="r">
-              <a:lnSpc>
-                <a:spcPct val="100000"/>
-              </a:lnSpc>
-              <a:buNone/>
-              <a:tabLst>
-                <a:tab pos="0" algn="l"/>
-              </a:tabLst>
-              <a:defRPr lang="it" sz="1000" b="0" strike="noStrike" spc="-1">
-                <a:solidFill>
-                  <a:srgbClr val="595959"/>
-                </a:solidFill>
-                <a:latin typeface="Arial"/>
-                <a:ea typeface="Arial"/>
-              </a:defRPr>
-            </a:lvl1pPr>
-          </a:lstStyle>
-          <a:p>
-            <a:pPr algn="r">
-              <a:lnSpc>
-                <a:spcPct val="100000"/>
-              </a:lnSpc>
-              <a:buNone/>
-              <a:tabLst>
-                <a:tab pos="0" algn="l"/>
-              </a:tabLst>
-            </a:pPr>
-            <a:fld id="{25B94CD5-D627-49BE-818E-4A00F2BB16DF}" type="slidenum">
-              <a:rPr lang="it" sz="1000" b="0" strike="noStrike" spc="-1">
-                <a:solidFill>
-                  <a:srgbClr val="595959"/>
-                </a:solidFill>
-                <a:latin typeface="Arial"/>
-                <a:ea typeface="Arial"/>
-              </a:rPr>
-              <a:t>41</a:t>
-            </a:fld>
-            <a:endParaRPr lang="it-IT" sz="1000" b="0" strike="noStrike" spc="-1">
-              <a:latin typeface="Times New Roman"/>
-            </a:endParaRPr>
-          </a:p>
-        </p:txBody>
-      </p:sp>
-      <p:sp>
-        <p:nvSpPr>
-          <p:cNvPr id="7" name="CasellaDiTesto 6">
-            <a:extLst>
-              <a:ext uri="{FF2B5EF4-FFF2-40B4-BE49-F238E27FC236}">
-                <a16:creationId xmlns:a16="http://schemas.microsoft.com/office/drawing/2014/main" id="{3AB702D8-9198-F185-BAA8-23304A23522E}"/>
-              </a:ext>
-            </a:extLst>
-          </p:cNvPr>
-          <p:cNvSpPr txBox="1"/>
-          <p:nvPr/>
-        </p:nvSpPr>
-        <p:spPr>
-          <a:xfrm>
-            <a:off x="1063027" y="844449"/>
-            <a:ext cx="7017946" cy="523220"/>
-          </a:xfrm>
-          <a:prstGeom prst="rect">
-            <a:avLst/>
-          </a:prstGeom>
-          <a:noFill/>
-        </p:spPr>
-        <p:txBody>
-          <a:bodyPr wrap="square" rtlCol="0">
-            <a:spAutoFit/>
-          </a:bodyPr>
-          <a:lstStyle/>
-          <a:p>
-            <a:pPr algn="ctr"/>
-            <a:r>
-              <a:rPr lang="it-IT" sz="1400" b="1" dirty="0"/>
-              <a:t>Figure</a:t>
-            </a:r>
-            <a:r>
-              <a:rPr lang="it-IT" sz="1400" b="1" dirty="0">
-                <a:solidFill>
-                  <a:srgbClr val="FF0000"/>
-                </a:solidFill>
-              </a:rPr>
-              <a:t> h</a:t>
-            </a:r>
-            <a:r>
-              <a:rPr lang="it-IT" sz="1400" b="1" dirty="0"/>
-              <a:t>: </a:t>
-            </a:r>
-            <a:r>
-              <a:rPr lang="it-IT" sz="1400" dirty="0"/>
-              <a:t>learning </a:t>
-            </a:r>
-            <a:r>
-              <a:rPr lang="it-IT" sz="1400" dirty="0" err="1"/>
-              <a:t>curves</a:t>
-            </a:r>
-            <a:r>
-              <a:rPr lang="it-IT" sz="1400" dirty="0"/>
-              <a:t> for the SVM (</a:t>
-            </a:r>
-            <a:r>
-              <a:rPr lang="it-IT" sz="1400" dirty="0" err="1"/>
-              <a:t>right</a:t>
-            </a:r>
-            <a:r>
-              <a:rPr lang="it-IT" sz="1400" dirty="0"/>
-              <a:t>) and RF (</a:t>
-            </a:r>
-            <a:r>
-              <a:rPr lang="it-IT" sz="1400" dirty="0" err="1"/>
-              <a:t>left</a:t>
-            </a:r>
-            <a:r>
-              <a:rPr lang="it-IT" sz="1400" dirty="0"/>
-              <a:t>) with the best </a:t>
-            </a:r>
-            <a:r>
-              <a:rPr lang="it-IT" sz="1400" dirty="0" err="1"/>
-              <a:t>hyperparameters</a:t>
-            </a:r>
-            <a:r>
-              <a:rPr lang="it-IT" sz="1400" dirty="0"/>
-              <a:t> </a:t>
-            </a:r>
-            <a:r>
-              <a:rPr lang="it-IT" sz="1400" dirty="0" err="1"/>
-              <a:t>found</a:t>
-            </a:r>
-            <a:r>
-              <a:rPr lang="it-IT" sz="1400" dirty="0"/>
-              <a:t> in </a:t>
-            </a:r>
-            <a:r>
-              <a:rPr lang="it-IT" sz="1400" dirty="0" err="1"/>
-              <a:t>their</a:t>
-            </a:r>
-            <a:r>
-              <a:rPr lang="it-IT" sz="1400" dirty="0"/>
-              <a:t> </a:t>
-            </a:r>
-            <a:r>
-              <a:rPr lang="it-IT" sz="1400" dirty="0" err="1"/>
-              <a:t>respective</a:t>
-            </a:r>
-            <a:r>
-              <a:rPr lang="it-IT" sz="1400" dirty="0"/>
-              <a:t> </a:t>
-            </a:r>
-            <a:r>
-              <a:rPr lang="it-IT" sz="1400" dirty="0" err="1"/>
-              <a:t>grid</a:t>
-            </a:r>
-            <a:r>
-              <a:rPr lang="it-IT" sz="1400" dirty="0"/>
-              <a:t> </a:t>
-            </a:r>
-            <a:r>
-              <a:rPr lang="it-IT" sz="1400" dirty="0" err="1"/>
-              <a:t>searches</a:t>
-            </a:r>
-            <a:r>
-              <a:rPr lang="it-IT" sz="1400" dirty="0"/>
-              <a:t>.</a:t>
-            </a:r>
-          </a:p>
-        </p:txBody>
-      </p:sp>
-      <p:sp>
-        <p:nvSpPr>
-          <p:cNvPr id="8" name="CasellaDiTesto 7">
-            <a:extLst>
-              <a:ext uri="{FF2B5EF4-FFF2-40B4-BE49-F238E27FC236}">
-                <a16:creationId xmlns:a16="http://schemas.microsoft.com/office/drawing/2014/main" id="{228AE065-2317-BB0F-4DA3-99B9C7F859AF}"/>
-              </a:ext>
-            </a:extLst>
-          </p:cNvPr>
-          <p:cNvSpPr txBox="1"/>
-          <p:nvPr/>
-        </p:nvSpPr>
-        <p:spPr>
-          <a:xfrm>
-            <a:off x="357406" y="3805518"/>
-            <a:ext cx="8428828" cy="1169551"/>
-          </a:xfrm>
-          <a:prstGeom prst="rect">
-            <a:avLst/>
-          </a:prstGeom>
-          <a:noFill/>
-        </p:spPr>
-        <p:txBody>
-          <a:bodyPr wrap="square" rtlCol="0">
-            <a:spAutoFit/>
-          </a:bodyPr>
-          <a:lstStyle/>
-          <a:p>
-            <a:r>
-              <a:rPr lang="it-IT" sz="1400" dirty="0"/>
-              <a:t>The learning </a:t>
-            </a:r>
-            <a:r>
-              <a:rPr lang="it-IT" sz="1400" dirty="0" err="1"/>
-              <a:t>curves</a:t>
-            </a:r>
-            <a:r>
-              <a:rPr lang="it-IT" sz="1400" dirty="0"/>
-              <a:t> are </a:t>
-            </a:r>
-            <a:r>
-              <a:rPr lang="it-IT" sz="1400" dirty="0" err="1"/>
-              <a:t>obtained</a:t>
-            </a:r>
-            <a:r>
-              <a:rPr lang="it-IT" sz="1400" dirty="0"/>
-              <a:t> </a:t>
-            </a:r>
-            <a:r>
-              <a:rPr lang="it-IT" sz="1400" dirty="0" err="1"/>
-              <a:t>through</a:t>
-            </a:r>
-            <a:r>
-              <a:rPr lang="it-IT" sz="1400" dirty="0"/>
-              <a:t> </a:t>
-            </a:r>
-            <a:r>
-              <a:rPr lang="it-IT" sz="1400" dirty="0" err="1"/>
-              <a:t>Scikit-Learn’s</a:t>
-            </a:r>
-            <a:r>
-              <a:rPr lang="it-IT" sz="1400" dirty="0"/>
-              <a:t> </a:t>
-            </a:r>
-            <a:r>
-              <a:rPr lang="it-IT" sz="1400" dirty="0" err="1">
-                <a:latin typeface="Consolas" panose="020B0609020204030204" pitchFamily="49" charset="0"/>
-              </a:rPr>
-              <a:t>learning_curve</a:t>
-            </a:r>
-            <a:r>
-              <a:rPr lang="it-IT" sz="1400" dirty="0"/>
-              <a:t> </a:t>
-            </a:r>
-            <a:r>
-              <a:rPr lang="it-IT" sz="1400" dirty="0" err="1"/>
-              <a:t>function</a:t>
-            </a:r>
-            <a:r>
-              <a:rPr lang="en-US" sz="1400" dirty="0"/>
-              <a:t>. The function performs 5-fold CV on increasingly big portions of the design set, to determine cross-validated training and validation scores. The curve tells how well the model scales as the amount of data increases.</a:t>
-            </a:r>
-          </a:p>
-          <a:p>
-            <a:r>
-              <a:rPr lang="it-IT" sz="1400" dirty="0"/>
-              <a:t>With </a:t>
-            </a:r>
-            <a:r>
-              <a:rPr lang="it-IT" sz="1400" dirty="0" err="1"/>
-              <a:t>this</a:t>
-            </a:r>
-            <a:r>
-              <a:rPr lang="it-IT" sz="1400" dirty="0"/>
-              <a:t> </a:t>
-            </a:r>
-            <a:r>
-              <a:rPr lang="it-IT" sz="1400" dirty="0" err="1"/>
-              <a:t>approach</a:t>
-            </a:r>
-            <a:r>
-              <a:rPr lang="it-IT" sz="1400" dirty="0"/>
-              <a:t>, </a:t>
-            </a:r>
-            <a:r>
-              <a:rPr lang="it-IT" sz="1400" dirty="0" err="1"/>
-              <a:t>we</a:t>
-            </a:r>
-            <a:r>
-              <a:rPr lang="it-IT" sz="1400" dirty="0"/>
-              <a:t> </a:t>
-            </a:r>
-            <a:r>
-              <a:rPr lang="it-IT" sz="1400" dirty="0" err="1"/>
-              <a:t>have</a:t>
-            </a:r>
-            <a:r>
-              <a:rPr lang="it-IT" sz="1400" dirty="0"/>
-              <a:t> the </a:t>
-            </a:r>
-            <a:r>
-              <a:rPr lang="it-IT" sz="1400" dirty="0" err="1"/>
-              <a:t>mean</a:t>
-            </a:r>
-            <a:r>
-              <a:rPr lang="it-IT" sz="1400" dirty="0"/>
-              <a:t> and the standard </a:t>
-            </a:r>
-            <a:r>
-              <a:rPr lang="it-IT" sz="1400" dirty="0" err="1"/>
-              <a:t>deviation</a:t>
-            </a:r>
-            <a:r>
-              <a:rPr lang="it-IT" sz="1400" dirty="0"/>
-              <a:t> over the </a:t>
-            </a:r>
-            <a:r>
-              <a:rPr lang="it-IT" sz="1400" dirty="0" err="1"/>
-              <a:t>folds</a:t>
-            </a:r>
-            <a:r>
-              <a:rPr lang="it-IT" sz="1400" dirty="0"/>
-              <a:t>, for </a:t>
-            </a:r>
-            <a:r>
-              <a:rPr lang="it-IT" sz="1400" dirty="0" err="1"/>
-              <a:t>each</a:t>
-            </a:r>
-            <a:r>
-              <a:rPr lang="it-IT" sz="1400" dirty="0"/>
-              <a:t> point (</a:t>
-            </a:r>
-            <a:r>
-              <a:rPr lang="it-IT" sz="1400" dirty="0" err="1"/>
-              <a:t>corresponding</a:t>
-            </a:r>
-            <a:r>
-              <a:rPr lang="it-IT" sz="1400" dirty="0"/>
-              <a:t> to the </a:t>
-            </a:r>
-            <a:r>
-              <a:rPr lang="it-IT" sz="1400" dirty="0" err="1"/>
-              <a:t>loss</a:t>
-            </a:r>
-            <a:r>
-              <a:rPr lang="it-IT" sz="1400" dirty="0"/>
-              <a:t> of the model on </a:t>
-            </a:r>
-            <a:r>
-              <a:rPr lang="it-IT" sz="1400" dirty="0" err="1"/>
-              <a:t>amount</a:t>
-            </a:r>
-            <a:r>
-              <a:rPr lang="it-IT" sz="1400" dirty="0"/>
-              <a:t> of data on </a:t>
-            </a:r>
-            <a:r>
-              <a:rPr lang="it-IT" sz="1400" dirty="0" err="1"/>
-              <a:t>which</a:t>
-            </a:r>
-            <a:r>
-              <a:rPr lang="it-IT" sz="1400" dirty="0"/>
-              <a:t> </a:t>
-            </a:r>
-            <a:r>
-              <a:rPr lang="it-IT" sz="1400" dirty="0" err="1"/>
-              <a:t>it</a:t>
-            </a:r>
-            <a:r>
-              <a:rPr lang="it-IT" sz="1400" dirty="0"/>
-              <a:t> </a:t>
-            </a:r>
-            <a:r>
-              <a:rPr lang="it-IT" sz="1400" dirty="0" err="1"/>
-              <a:t>is</a:t>
-            </a:r>
-            <a:r>
-              <a:rPr lang="it-IT" sz="1400" dirty="0"/>
-              <a:t> </a:t>
-            </a:r>
-            <a:r>
-              <a:rPr lang="it-IT" sz="1400" dirty="0" err="1"/>
-              <a:t>trained</a:t>
-            </a:r>
-            <a:r>
-              <a:rPr lang="it-IT" sz="1400" dirty="0"/>
-              <a:t>). </a:t>
-            </a:r>
-          </a:p>
-        </p:txBody>
-      </p:sp>
-      <p:pic>
-        <p:nvPicPr>
-          <p:cNvPr id="10" name="Immagine 9" descr="Immagine che contiene testo, schermata, linea, Diagramma&#10;&#10;Descrizione generata automaticamente">
-            <a:extLst>
-              <a:ext uri="{FF2B5EF4-FFF2-40B4-BE49-F238E27FC236}">
-                <a16:creationId xmlns:a16="http://schemas.microsoft.com/office/drawing/2014/main" id="{1B1134FF-7FDA-0381-70C1-E91BCC6DFBF9}"/>
-              </a:ext>
-            </a:extLst>
-          </p:cNvPr>
-          <p:cNvPicPr>
-            <a:picLocks noChangeAspect="1"/>
-          </p:cNvPicPr>
-          <p:nvPr/>
-        </p:nvPicPr>
-        <p:blipFill>
-          <a:blip r:embed="rId2">
-            <a:extLst>
-              <a:ext uri="{28A0092B-C50C-407E-A947-70E740481C1C}">
-                <a14:useLocalDpi xmlns:a14="http://schemas.microsoft.com/office/drawing/2010/main" val="0"/>
-              </a:ext>
-            </a:extLst>
-          </a:blip>
-          <a:stretch>
-            <a:fillRect/>
-          </a:stretch>
-        </p:blipFill>
-        <p:spPr>
-          <a:xfrm>
-            <a:off x="4800786" y="1363116"/>
-            <a:ext cx="3091932" cy="2318950"/>
-          </a:xfrm>
-          <a:prstGeom prst="rect">
-            <a:avLst/>
-          </a:prstGeom>
-          <a:ln>
-            <a:noFill/>
-          </a:ln>
-        </p:spPr>
-      </p:pic>
-      <p:pic>
-        <p:nvPicPr>
-          <p:cNvPr id="12" name="Immagine 11" descr="Immagine che contiene testo, linea, Diagramma, schermata&#10;&#10;Descrizione generata automaticamente">
-            <a:extLst>
-              <a:ext uri="{FF2B5EF4-FFF2-40B4-BE49-F238E27FC236}">
-                <a16:creationId xmlns:a16="http://schemas.microsoft.com/office/drawing/2014/main" id="{ED04E057-F57F-7FCD-2324-CA66AC089C84}"/>
-              </a:ext>
-            </a:extLst>
-          </p:cNvPr>
-          <p:cNvPicPr>
-            <a:picLocks noChangeAspect="1"/>
-          </p:cNvPicPr>
-          <p:nvPr/>
-        </p:nvPicPr>
-        <p:blipFill>
-          <a:blip r:embed="rId3">
-            <a:extLst>
-              <a:ext uri="{28A0092B-C50C-407E-A947-70E740481C1C}">
-                <a14:useLocalDpi xmlns:a14="http://schemas.microsoft.com/office/drawing/2010/main" val="0"/>
-              </a:ext>
-            </a:extLst>
-          </a:blip>
-          <a:stretch>
-            <a:fillRect/>
-          </a:stretch>
-        </p:blipFill>
-        <p:spPr>
-          <a:xfrm>
-            <a:off x="1251286" y="1363116"/>
-            <a:ext cx="3091930" cy="2318948"/>
-          </a:xfrm>
-          <a:prstGeom prst="rect">
-            <a:avLst/>
-          </a:prstGeom>
-          <a:ln>
-            <a:noFill/>
-          </a:ln>
-        </p:spPr>
-      </p:pic>
-    </p:spTree>
-    <p:extLst>
-      <p:ext uri="{BB962C8B-B14F-4D97-AF65-F5344CB8AC3E}">
-        <p14:creationId xmlns:p14="http://schemas.microsoft.com/office/powerpoint/2010/main" val="704166156"/>
-      </p:ext>
-    </p:extLst>
-  </p:cSld>
-  <p:clrMapOvr>
-    <a:masterClrMapping/>
-  </p:clrMapOvr>
-</p:sld>
-</file>
-
 <file path=ppt/slides/slide5.xml><?xml version="1.0" encoding="utf-8"?>
 <p:sld xmlns:a="http://schemas.openxmlformats.org/drawingml/2006/main" xmlns:r="http://schemas.openxmlformats.org/officeDocument/2006/relationships" xmlns:p="http://schemas.openxmlformats.org/presentationml/2006/main">
   <p:cSld>
@@ -40093,7 +40115,7 @@
                 <a:latin typeface="+mj-lt"/>
                 <a:hlinkClick r:id="rId3" action="ppaction://hlinksldjump"/>
               </a:rPr>
-              <a:t>5</a:t>
+              <a:t>2</a:t>
             </a:r>
             <a:r>
               <a:rPr lang="it-IT" sz="1400" dirty="0">
@@ -40104,9 +40126,9 @@
             <a:r>
               <a:rPr lang="it-IT" sz="1400" dirty="0">
                 <a:latin typeface="+mj-lt"/>
-                <a:hlinkClick r:id="rId4" action="ppaction://hlinksldjump"/>
-              </a:rPr>
-              <a:t>8</a:t>
+                <a:hlinkClick r:id="rId3" action="ppaction://hlinksldjump"/>
+              </a:rPr>
+              <a:t>7</a:t>
             </a:r>
             <a:r>
               <a:rPr lang="it-IT" sz="1400" dirty="0">
@@ -40695,11 +40717,14 @@
             </a:r>
             <a:r>
               <a:rPr lang="it-IT" sz="1400" dirty="0" err="1">
-                <a:hlinkClick r:id="rId5" action="ppaction://hlinksldjump"/>
+                <a:hlinkClick r:id="rId4" action="ppaction://hlinksldjump"/>
               </a:rPr>
               <a:t>Appendix</a:t>
             </a:r>
-            <a:endParaRPr lang="it-IT" sz="1400" dirty="0"/>
+            <a:r>
+              <a:rPr lang="it-IT" sz="1400" dirty="0"/>
+              <a:t>.</a:t>
+            </a:r>
           </a:p>
         </p:txBody>
       </p:sp>
@@ -41279,7 +41304,7 @@
           <p:nvPr>
             <p:extLst>
               <p:ext uri="{D42A27DB-BD31-4B8C-83A1-F6EECF244321}">
-                <p14:modId xmlns:p14="http://schemas.microsoft.com/office/powerpoint/2010/main" val="1682041379"/>
+                <p14:modId xmlns:p14="http://schemas.microsoft.com/office/powerpoint/2010/main" val="2122300503"/>
               </p:ext>
             </p:extLst>
           </p:nvPr>
@@ -42238,7 +42263,7 @@
           <p:nvPr>
             <p:extLst>
               <p:ext uri="{D42A27DB-BD31-4B8C-83A1-F6EECF244321}">
-                <p14:modId xmlns:p14="http://schemas.microsoft.com/office/powerpoint/2010/main" val="198893623"/>
+                <p14:modId xmlns:p14="http://schemas.microsoft.com/office/powerpoint/2010/main" val="3552060352"/>
               </p:ext>
             </p:extLst>
           </p:nvPr>
@@ -42613,7 +42638,7 @@
                       </a:r>
                       <a:r>
                         <a:rPr lang="it-IT" sz="1400" i="1" dirty="0"/>
-                        <a:t>  0.054</a:t>
+                        <a:t> 0.054</a:t>
                       </a:r>
                     </a:p>
                   </a:txBody>
@@ -43026,14 +43051,14 @@
           <p:nvPr>
             <p:extLst>
               <p:ext uri="{D42A27DB-BD31-4B8C-83A1-F6EECF244321}">
-                <p14:modId xmlns:p14="http://schemas.microsoft.com/office/powerpoint/2010/main" val="3535434544"/>
+                <p14:modId xmlns:p14="http://schemas.microsoft.com/office/powerpoint/2010/main" val="3067215880"/>
               </p:ext>
             </p:extLst>
           </p:nvPr>
         </p:nvGraphicFramePr>
         <p:xfrm>
-          <a:off x="311753" y="853393"/>
-          <a:ext cx="8520120" cy="883920"/>
+          <a:off x="311752" y="853393"/>
+          <a:ext cx="8520122" cy="883920"/>
         </p:xfrm>
         <a:graphic>
           <a:graphicData uri="http://schemas.openxmlformats.org/drawingml/2006/table">
@@ -43042,35 +43067,35 @@
                 <a:tableStyleId>{0E3FDE45-AF77-4B5C-9715-49D594BDF05E}</a:tableStyleId>
               </a:tblPr>
               <a:tblGrid>
-                <a:gridCol w="878312">
+                <a:gridCol w="770736">
                   <a:extLst>
                     <a:ext uri="{9D8B030D-6E8A-4147-A177-3AD203B41FA5}">
                       <a16:colId xmlns:a16="http://schemas.microsoft.com/office/drawing/2014/main" val="935040320"/>
                     </a:ext>
                   </a:extLst>
                 </a:gridCol>
-                <a:gridCol w="3899647">
+                <a:gridCol w="3933265">
                   <a:extLst>
                     <a:ext uri="{9D8B030D-6E8A-4147-A177-3AD203B41FA5}">
                       <a16:colId xmlns:a16="http://schemas.microsoft.com/office/drawing/2014/main" val="1166905258"/>
                     </a:ext>
                   </a:extLst>
                 </a:gridCol>
-                <a:gridCol w="1217205">
+                <a:gridCol w="1277471">
                   <a:extLst>
                     <a:ext uri="{9D8B030D-6E8A-4147-A177-3AD203B41FA5}">
                       <a16:colId xmlns:a16="http://schemas.microsoft.com/office/drawing/2014/main" val="50107376"/>
                     </a:ext>
                   </a:extLst>
                 </a:gridCol>
-                <a:gridCol w="1557388">
+                <a:gridCol w="1539688">
                   <a:extLst>
                     <a:ext uri="{9D8B030D-6E8A-4147-A177-3AD203B41FA5}">
                       <a16:colId xmlns:a16="http://schemas.microsoft.com/office/drawing/2014/main" val="34889993"/>
                     </a:ext>
                   </a:extLst>
                 </a:gridCol>
-                <a:gridCol w="967568">
+                <a:gridCol w="998962">
                   <a:extLst>
                     <a:ext uri="{9D8B030D-6E8A-4147-A177-3AD203B41FA5}">
                       <a16:colId xmlns:a16="http://schemas.microsoft.com/office/drawing/2014/main" val="2221366948"/>
@@ -43282,7 +43307,7 @@
                       <a:pPr algn="ctr"/>
                       <a:r>
                         <a:rPr lang="it-IT" sz="1400" dirty="0"/>
-                        <a:t>MONK 3</a:t>
+                        <a:t>Monk 3</a:t>
                       </a:r>
                     </a:p>
                   </a:txBody>
@@ -43405,7 +43430,7 @@
                             <a:schemeClr val="tx1"/>
                           </a:solidFill>
                         </a:rPr>
-                        <a:t>/</a:t>
+                        <a:t>/ </a:t>
                       </a:r>
                       <a:r>
                         <a:rPr lang="it-IT" sz="1400" i="1" dirty="0">
@@ -43413,7 +43438,7 @@
                             <a:schemeClr val="tx1"/>
                           </a:solidFill>
                         </a:rPr>
-                        <a:t> 0.106</a:t>
+                        <a:t>0.106</a:t>
                       </a:r>
                     </a:p>
                   </a:txBody>

</xml_diff>